<commit_message>
Circular Text Indicators and Screenshots
</commit_message>
<xml_diff>
--- a/Source Code/GraspBMPs/GraspCircularPrompts.pptx
+++ b/Source Code/GraspBMPs/GraspCircularPrompts.pptx
@@ -6,9 +6,9 @@
   </p:sldMasterIdLst>
   <p:sldIdLst>
     <p:sldId id="263" r:id="rId2"/>
-    <p:sldId id="267" r:id="rId3"/>
-    <p:sldId id="266" r:id="rId4"/>
-    <p:sldId id="265" r:id="rId5"/>
+    <p:sldId id="268" r:id="rId3"/>
+    <p:sldId id="269" r:id="rId4"/>
+    <p:sldId id="270" r:id="rId5"/>
   </p:sldIdLst>
   <p:sldSz cx="18434050" cy="18434050"/>
   <p:notesSz cx="6858000" cy="9144000"/>
@@ -291,7 +291,7 @@
           <a:p>
             <a:fld id="{649FEDF0-7D14-9E44-B4F2-968D163D1479}" type="datetimeFigureOut">
               <a:rPr lang="fr-FR" smtClean="0"/>
-              <a:t>6/27/16</a:t>
+              <a:t>6/28/16</a:t>
             </a:fld>
             <a:endParaRPr lang="en-US"/>
           </a:p>
@@ -461,7 +461,7 @@
           <a:p>
             <a:fld id="{649FEDF0-7D14-9E44-B4F2-968D163D1479}" type="datetimeFigureOut">
               <a:rPr lang="fr-FR" smtClean="0"/>
-              <a:t>6/27/16</a:t>
+              <a:t>6/28/16</a:t>
             </a:fld>
             <a:endParaRPr lang="en-US"/>
           </a:p>
@@ -641,7 +641,7 @@
           <a:p>
             <a:fld id="{649FEDF0-7D14-9E44-B4F2-968D163D1479}" type="datetimeFigureOut">
               <a:rPr lang="fr-FR" smtClean="0"/>
-              <a:t>6/27/16</a:t>
+              <a:t>6/28/16</a:t>
             </a:fld>
             <a:endParaRPr lang="en-US"/>
           </a:p>
@@ -811,7 +811,7 @@
           <a:p>
             <a:fld id="{649FEDF0-7D14-9E44-B4F2-968D163D1479}" type="datetimeFigureOut">
               <a:rPr lang="fr-FR" smtClean="0"/>
-              <a:t>6/27/16</a:t>
+              <a:t>6/28/16</a:t>
             </a:fld>
             <a:endParaRPr lang="en-US"/>
           </a:p>
@@ -1057,7 +1057,7 @@
           <a:p>
             <a:fld id="{649FEDF0-7D14-9E44-B4F2-968D163D1479}" type="datetimeFigureOut">
               <a:rPr lang="fr-FR" smtClean="0"/>
-              <a:t>6/27/16</a:t>
+              <a:t>6/28/16</a:t>
             </a:fld>
             <a:endParaRPr lang="en-US"/>
           </a:p>
@@ -1345,7 +1345,7 @@
           <a:p>
             <a:fld id="{649FEDF0-7D14-9E44-B4F2-968D163D1479}" type="datetimeFigureOut">
               <a:rPr lang="fr-FR" smtClean="0"/>
-              <a:t>6/27/16</a:t>
+              <a:t>6/28/16</a:t>
             </a:fld>
             <a:endParaRPr lang="en-US"/>
           </a:p>
@@ -1767,7 +1767,7 @@
           <a:p>
             <a:fld id="{649FEDF0-7D14-9E44-B4F2-968D163D1479}" type="datetimeFigureOut">
               <a:rPr lang="fr-FR" smtClean="0"/>
-              <a:t>6/27/16</a:t>
+              <a:t>6/28/16</a:t>
             </a:fld>
             <a:endParaRPr lang="en-US"/>
           </a:p>
@@ -1885,7 +1885,7 @@
           <a:p>
             <a:fld id="{649FEDF0-7D14-9E44-B4F2-968D163D1479}" type="datetimeFigureOut">
               <a:rPr lang="fr-FR" smtClean="0"/>
-              <a:t>6/27/16</a:t>
+              <a:t>6/28/16</a:t>
             </a:fld>
             <a:endParaRPr lang="en-US"/>
           </a:p>
@@ -1980,7 +1980,7 @@
           <a:p>
             <a:fld id="{649FEDF0-7D14-9E44-B4F2-968D163D1479}" type="datetimeFigureOut">
               <a:rPr lang="fr-FR" smtClean="0"/>
-              <a:t>6/27/16</a:t>
+              <a:t>6/28/16</a:t>
             </a:fld>
             <a:endParaRPr lang="en-US"/>
           </a:p>
@@ -2257,7 +2257,7 @@
           <a:p>
             <a:fld id="{649FEDF0-7D14-9E44-B4F2-968D163D1479}" type="datetimeFigureOut">
               <a:rPr lang="fr-FR" smtClean="0"/>
-              <a:t>6/27/16</a:t>
+              <a:t>6/28/16</a:t>
             </a:fld>
             <a:endParaRPr lang="en-US"/>
           </a:p>
@@ -2510,7 +2510,7 @@
           <a:p>
             <a:fld id="{649FEDF0-7D14-9E44-B4F2-968D163D1479}" type="datetimeFigureOut">
               <a:rPr lang="fr-FR" smtClean="0"/>
-              <a:t>6/27/16</a:t>
+              <a:t>6/28/16</a:t>
             </a:fld>
             <a:endParaRPr lang="en-US"/>
           </a:p>
@@ -2726,7 +2726,7 @@
           <a:p>
             <a:fld id="{649FEDF0-7D14-9E44-B4F2-968D163D1479}" type="datetimeFigureOut">
               <a:rPr lang="fr-FR" smtClean="0"/>
-              <a:t>6/27/16</a:t>
+              <a:t>6/28/16</a:t>
             </a:fld>
             <a:endParaRPr lang="en-US"/>
           </a:p>
@@ -3103,22 +3103,28 @@
       </p:grpSpPr>
       <p:sp>
         <p:nvSpPr>
-          <p:cNvPr id="13" name="Ellipse 12"/>
-          <p:cNvSpPr/>
+          <p:cNvPr id="5" name="Bouée 4"/>
+          <p:cNvSpPr>
+            <a:spLocks noChangeAspect="1"/>
+          </p:cNvSpPr>
           <p:nvPr/>
         </p:nvSpPr>
         <p:spPr>
           <a:xfrm>
-            <a:off x="1614253" y="1610486"/>
-            <a:ext cx="15205543" cy="15213071"/>
+            <a:off x="1614253" y="1610484"/>
+            <a:ext cx="15228000" cy="15228000"/>
           </a:xfrm>
-          <a:prstGeom prst="ellipse">
-            <a:avLst/>
+          <a:prstGeom prst="donut">
+            <a:avLst>
+              <a:gd name="adj" fmla="val 30982"/>
+            </a:avLst>
           </a:prstGeom>
           <a:solidFill>
-            <a:srgbClr val="FFFFFF"/>
+            <a:schemeClr val="bg1"/>
           </a:solidFill>
-          <a:ln w="152400" cmpd="sng"/>
+          <a:ln w="76200" cmpd="sng">
+            <a:noFill/>
+          </a:ln>
         </p:spPr>
         <p:style>
           <a:lnRef idx="1">
@@ -3135,11 +3141,15 @@
           </a:fontRef>
         </p:style>
         <p:txBody>
-          <a:bodyPr lIns="210669" tIns="105334" rIns="210669" bIns="105334" rtlCol="0" anchor="ctr"/>
+          <a:bodyPr rtlCol="0" anchor="ctr"/>
           <a:lstStyle/>
           <a:p>
             <a:pPr algn="ctr"/>
-            <a:endParaRPr lang="en-US"/>
+            <a:endParaRPr lang="en-US">
+              <a:solidFill>
+                <a:schemeClr val="tx1"/>
+              </a:solidFill>
+            </a:endParaRPr>
           </a:p>
         </p:txBody>
       </p:sp>
@@ -3153,8 +3163,8 @@
         </p:nvSpPr>
         <p:spPr>
           <a:xfrm rot="16200000">
-            <a:off x="3457025" y="3457026"/>
-            <a:ext cx="11520000" cy="11520000"/>
+            <a:off x="3277028" y="3277028"/>
+            <a:ext cx="11879995" cy="11879995"/>
           </a:xfrm>
           <a:prstGeom prst="rect">
             <a:avLst/>
@@ -3185,7 +3195,21 @@
                   <a:schemeClr val="accent1"/>
                 </a:solidFill>
               </a:rPr>
-              <a:t>Ready to start next trial.</a:t>
+              <a:t>  Ready </a:t>
+            </a:r>
+            <a:r>
+              <a:rPr lang="en-US" sz="23900" b="1" cap="small" spc="600" dirty="0" smtClean="0">
+                <a:ln w="12700">
+                  <a:solidFill>
+                    <a:srgbClr val="FFFFFF"/>
+                  </a:solidFill>
+                  <a:prstDash val="solid"/>
+                </a:ln>
+                <a:solidFill>
+                  <a:schemeClr val="accent1"/>
+                </a:solidFill>
+              </a:rPr>
+              <a:t>to start next trial.</a:t>
             </a:r>
             <a:endParaRPr lang="en-US" sz="23900" b="1" cap="small" spc="600" dirty="0">
               <a:ln w="12700">
@@ -3211,8 +3235,8 @@
         </p:nvSpPr>
         <p:spPr>
           <a:xfrm rot="16200000">
-            <a:off x="5437022" y="5437026"/>
-            <a:ext cx="7560006" cy="7559999"/>
+            <a:off x="5257022" y="5257026"/>
+            <a:ext cx="7920006" cy="7919999"/>
           </a:xfrm>
           <a:prstGeom prst="rect">
             <a:avLst/>
@@ -3232,7 +3256,7 @@
           <a:p>
             <a:pPr algn="ctr"/>
             <a:r>
-              <a:rPr lang="en-US" sz="13800" b="1" cap="small" spc="600" dirty="0" smtClean="0">
+              <a:rPr lang="en-US" sz="13800" b="1" cap="small" spc="300" dirty="0" smtClean="0">
                 <a:ln w="12700">
                   <a:noFill/>
                   <a:prstDash val="solid"/>
@@ -3253,7 +3277,7 @@
               <a:t> Press </a:t>
             </a:r>
             <a:r>
-              <a:rPr lang="en-US" sz="13800" b="1" cap="small" spc="600" dirty="0">
+              <a:rPr lang="en-US" sz="13800" b="1" cap="small" spc="300" dirty="0">
                 <a:ln w="12700">
                   <a:noFill/>
                   <a:prstDash val="solid"/>
@@ -3274,7 +3298,7 @@
               <a:t>a button to continue</a:t>
             </a:r>
             <a:r>
-              <a:rPr lang="en-US" sz="13800" b="1" cap="small" spc="600" dirty="0" smtClean="0">
+              <a:rPr lang="en-US" sz="13800" b="1" cap="small" spc="300" dirty="0" smtClean="0">
                 <a:ln w="12700">
                   <a:noFill/>
                   <a:prstDash val="solid"/>
@@ -3294,7 +3318,7 @@
               </a:rPr>
               <a:t>.</a:t>
             </a:r>
-            <a:endParaRPr lang="en-US" sz="13800" b="1" cap="small" spc="600" dirty="0">
+            <a:endParaRPr lang="en-US" sz="13800" b="1" cap="small" spc="300" dirty="0">
               <a:ln w="12700">
                 <a:noFill/>
                 <a:prstDash val="solid"/>
@@ -3347,22 +3371,28 @@
       </p:grpSpPr>
       <p:sp>
         <p:nvSpPr>
-          <p:cNvPr id="13" name="Ellipse 12"/>
-          <p:cNvSpPr/>
+          <p:cNvPr id="5" name="Bouée 4"/>
+          <p:cNvSpPr>
+            <a:spLocks noChangeAspect="1"/>
+          </p:cNvSpPr>
           <p:nvPr/>
         </p:nvSpPr>
         <p:spPr>
           <a:xfrm>
-            <a:off x="1614253" y="1610486"/>
-            <a:ext cx="15205543" cy="15213071"/>
+            <a:off x="1614253" y="1610484"/>
+            <a:ext cx="15228000" cy="15228000"/>
           </a:xfrm>
-          <a:prstGeom prst="ellipse">
-            <a:avLst/>
+          <a:prstGeom prst="donut">
+            <a:avLst>
+              <a:gd name="adj" fmla="val 30982"/>
+            </a:avLst>
           </a:prstGeom>
           <a:solidFill>
-            <a:srgbClr val="FFFFFF"/>
+            <a:schemeClr val="bg1"/>
           </a:solidFill>
-          <a:ln w="152400" cmpd="sng"/>
+          <a:ln w="76200" cmpd="sng">
+            <a:noFill/>
+          </a:ln>
         </p:spPr>
         <p:style>
           <a:lnRef idx="1">
@@ -3379,11 +3409,15 @@
           </a:fontRef>
         </p:style>
         <p:txBody>
-          <a:bodyPr lIns="210669" tIns="105334" rIns="210669" bIns="105334" rtlCol="0" anchor="ctr"/>
+          <a:bodyPr rtlCol="0" anchor="ctr"/>
           <a:lstStyle/>
           <a:p>
             <a:pPr algn="ctr"/>
-            <a:endParaRPr lang="en-US"/>
+            <a:endParaRPr lang="en-US">
+              <a:solidFill>
+                <a:schemeClr val="tx1"/>
+              </a:solidFill>
+            </a:endParaRPr>
           </a:p>
         </p:txBody>
       </p:sp>
@@ -3397,8 +3431,8 @@
         </p:nvSpPr>
         <p:spPr>
           <a:xfrm rot="16200000">
-            <a:off x="3457025" y="3457026"/>
-            <a:ext cx="11520000" cy="11520000"/>
+            <a:off x="3277028" y="3277028"/>
+            <a:ext cx="11879995" cy="11879995"/>
           </a:xfrm>
           <a:prstGeom prst="rect">
             <a:avLst/>
@@ -3455,8 +3489,8 @@
         </p:nvSpPr>
         <p:spPr>
           <a:xfrm rot="16200000">
-            <a:off x="5437022" y="5437026"/>
-            <a:ext cx="7560006" cy="7559999"/>
+            <a:off x="5257022" y="5257026"/>
+            <a:ext cx="7920006" cy="7919999"/>
           </a:xfrm>
           <a:prstGeom prst="rect">
             <a:avLst/>
@@ -3476,7 +3510,7 @@
           <a:p>
             <a:pPr algn="ctr"/>
             <a:r>
-              <a:rPr lang="en-US" sz="11500" b="1" cap="small" spc="300" dirty="0" smtClean="0">
+              <a:rPr lang="en-US" sz="13800" b="1" cap="small" spc="300" dirty="0" smtClean="0">
                 <a:ln w="12700">
                   <a:noFill/>
                   <a:prstDash val="solid"/>
@@ -3497,7 +3531,7 @@
               <a:t> Press </a:t>
             </a:r>
             <a:r>
-              <a:rPr lang="en-US" sz="11500" b="1" cap="small" spc="300" dirty="0">
+              <a:rPr lang="en-US" sz="13800" b="1" cap="small" spc="300" dirty="0">
                 <a:ln w="12700">
                   <a:noFill/>
                   <a:prstDash val="solid"/>
@@ -3515,10 +3549,10 @@
                   </a:outerShdw>
                 </a:effectLst>
               </a:rPr>
-              <a:t>a button </a:t>
-            </a:r>
-            <a:r>
-              <a:rPr lang="en-US" sz="11500" b="1" cap="small" spc="300" dirty="0" smtClean="0">
+              <a:t>a button to continue</a:t>
+            </a:r>
+            <a:r>
+              <a:rPr lang="en-US" sz="13800" b="1" cap="small" spc="300" dirty="0" smtClean="0">
                 <a:ln w="12700">
                   <a:noFill/>
                   <a:prstDash val="solid"/>
@@ -3536,9 +3570,9 @@
                   </a:outerShdw>
                 </a:effectLst>
               </a:rPr>
-              <a:t>then remove HMD.</a:t>
-            </a:r>
-            <a:endParaRPr lang="en-US" sz="11500" b="1" cap="small" spc="300" dirty="0">
+              <a:t>.</a:t>
+            </a:r>
+            <a:endParaRPr lang="en-US" sz="13800" b="1" cap="small" spc="300" dirty="0">
               <a:ln w="12700">
                 <a:noFill/>
                 <a:prstDash val="solid"/>
@@ -3562,7 +3596,7 @@
     </p:spTree>
     <p:extLst>
       <p:ext uri="{BB962C8B-B14F-4D97-AF65-F5344CB8AC3E}">
-        <p14:creationId xmlns:p14="http://schemas.microsoft.com/office/powerpoint/2010/main" val="809798856"/>
+        <p14:creationId xmlns:p14="http://schemas.microsoft.com/office/powerpoint/2010/main" val="2090264467"/>
       </p:ext>
     </p:extLst>
   </p:cSld>
@@ -3591,22 +3625,28 @@
       </p:grpSpPr>
       <p:sp>
         <p:nvSpPr>
-          <p:cNvPr id="13" name="Ellipse 12"/>
-          <p:cNvSpPr/>
+          <p:cNvPr id="5" name="Bouée 4"/>
+          <p:cNvSpPr>
+            <a:spLocks noChangeAspect="1"/>
+          </p:cNvSpPr>
           <p:nvPr/>
         </p:nvSpPr>
         <p:spPr>
           <a:xfrm>
-            <a:off x="1614253" y="1610486"/>
-            <a:ext cx="15205543" cy="15213071"/>
+            <a:off x="1614253" y="1610484"/>
+            <a:ext cx="15228000" cy="15228000"/>
           </a:xfrm>
-          <a:prstGeom prst="ellipse">
-            <a:avLst/>
+          <a:prstGeom prst="donut">
+            <a:avLst>
+              <a:gd name="adj" fmla="val 30982"/>
+            </a:avLst>
           </a:prstGeom>
           <a:solidFill>
-            <a:srgbClr val="FFFFFF"/>
+            <a:schemeClr val="bg1"/>
           </a:solidFill>
-          <a:ln w="152400" cmpd="sng"/>
+          <a:ln w="76200" cmpd="sng">
+            <a:noFill/>
+          </a:ln>
         </p:spPr>
         <p:style>
           <a:lnRef idx="1">
@@ -3623,11 +3663,15 @@
           </a:fontRef>
         </p:style>
         <p:txBody>
-          <a:bodyPr lIns="210669" tIns="105334" rIns="210669" bIns="105334" rtlCol="0" anchor="ctr"/>
+          <a:bodyPr rtlCol="0" anchor="ctr"/>
           <a:lstStyle/>
           <a:p>
             <a:pPr algn="ctr"/>
-            <a:endParaRPr lang="en-US"/>
+            <a:endParaRPr lang="en-US">
+              <a:solidFill>
+                <a:schemeClr val="tx1"/>
+              </a:solidFill>
+            </a:endParaRPr>
           </a:p>
         </p:txBody>
       </p:sp>
@@ -3641,8 +3685,8 @@
         </p:nvSpPr>
         <p:spPr>
           <a:xfrm rot="16200000">
-            <a:off x="3457025" y="3457026"/>
-            <a:ext cx="11520000" cy="11520000"/>
+            <a:off x="3277028" y="3277028"/>
+            <a:ext cx="11879995" cy="11879995"/>
           </a:xfrm>
           <a:prstGeom prst="rect">
             <a:avLst/>
@@ -3662,7 +3706,7 @@
           <a:p>
             <a:pPr algn="ctr"/>
             <a:r>
-              <a:rPr lang="en-US" sz="23900" b="1" cap="small" dirty="0" smtClean="0">
+              <a:rPr lang="en-US" sz="23900" b="1" cap="small" spc="600" dirty="0" smtClean="0">
                 <a:ln w="12700">
                   <a:solidFill>
                     <a:srgbClr val="FFFFFF"/>
@@ -3675,7 +3719,7 @@
               </a:rPr>
               <a:t>Head tilt was not constant.</a:t>
             </a:r>
-            <a:endParaRPr lang="en-US" sz="23900" b="1" cap="small" dirty="0">
+            <a:endParaRPr lang="en-US" sz="23900" b="1" cap="small" spc="600" dirty="0">
               <a:ln w="12700">
                 <a:solidFill>
                   <a:srgbClr val="FFFFFF"/>
@@ -3699,8 +3743,8 @@
         </p:nvSpPr>
         <p:spPr>
           <a:xfrm rot="16200000">
-            <a:off x="5437022" y="5437026"/>
-            <a:ext cx="7560006" cy="7559999"/>
+            <a:off x="5257022" y="5257026"/>
+            <a:ext cx="7920006" cy="7919999"/>
           </a:xfrm>
           <a:prstGeom prst="rect">
             <a:avLst/>
@@ -3720,7 +3764,7 @@
           <a:p>
             <a:pPr algn="ctr"/>
             <a:r>
-              <a:rPr lang="en-US" sz="13800" b="1" cap="small" spc="600" dirty="0" smtClean="0">
+              <a:rPr lang="en-US" sz="13800" b="1" cap="small" spc="300" dirty="0" smtClean="0">
                 <a:ln w="12700">
                   <a:noFill/>
                   <a:prstDash val="solid"/>
@@ -3741,7 +3785,7 @@
               <a:t> Press </a:t>
             </a:r>
             <a:r>
-              <a:rPr lang="en-US" sz="13800" b="1" cap="small" spc="600" dirty="0">
+              <a:rPr lang="en-US" sz="13800" b="1" cap="small" spc="300" dirty="0">
                 <a:ln w="12700">
                   <a:noFill/>
                   <a:prstDash val="solid"/>
@@ -3762,7 +3806,7 @@
               <a:t>a button to continue</a:t>
             </a:r>
             <a:r>
-              <a:rPr lang="en-US" sz="13800" b="1" cap="small" spc="600" dirty="0" smtClean="0">
+              <a:rPr lang="en-US" sz="13800" b="1" cap="small" spc="300" dirty="0" smtClean="0">
                 <a:ln w="12700">
                   <a:noFill/>
                   <a:prstDash val="solid"/>
@@ -3782,7 +3826,7 @@
               </a:rPr>
               <a:t>.</a:t>
             </a:r>
-            <a:endParaRPr lang="en-US" sz="13800" b="1" cap="small" spc="600" dirty="0">
+            <a:endParaRPr lang="en-US" sz="13800" b="1" cap="small" spc="300" dirty="0">
               <a:ln w="12700">
                 <a:noFill/>
                 <a:prstDash val="solid"/>
@@ -3806,7 +3850,7 @@
     </p:spTree>
     <p:extLst>
       <p:ext uri="{BB962C8B-B14F-4D97-AF65-F5344CB8AC3E}">
-        <p14:creationId xmlns:p14="http://schemas.microsoft.com/office/powerpoint/2010/main" val="3631373981"/>
+        <p14:creationId xmlns:p14="http://schemas.microsoft.com/office/powerpoint/2010/main" val="2090264467"/>
       </p:ext>
     </p:extLst>
   </p:cSld>
@@ -3835,22 +3879,28 @@
       </p:grpSpPr>
       <p:sp>
         <p:nvSpPr>
-          <p:cNvPr id="13" name="Ellipse 12"/>
-          <p:cNvSpPr/>
+          <p:cNvPr id="5" name="Bouée 4"/>
+          <p:cNvSpPr>
+            <a:spLocks noChangeAspect="1"/>
+          </p:cNvSpPr>
           <p:nvPr/>
         </p:nvSpPr>
         <p:spPr>
           <a:xfrm>
-            <a:off x="1614253" y="1610486"/>
-            <a:ext cx="15205543" cy="15213071"/>
+            <a:off x="1614253" y="1610484"/>
+            <a:ext cx="15228000" cy="15228000"/>
           </a:xfrm>
-          <a:prstGeom prst="ellipse">
-            <a:avLst/>
+          <a:prstGeom prst="donut">
+            <a:avLst>
+              <a:gd name="adj" fmla="val 30982"/>
+            </a:avLst>
           </a:prstGeom>
           <a:solidFill>
-            <a:srgbClr val="FFFFFF"/>
+            <a:schemeClr val="bg1"/>
           </a:solidFill>
-          <a:ln w="152400" cmpd="sng"/>
+          <a:ln w="76200" cmpd="sng">
+            <a:noFill/>
+          </a:ln>
         </p:spPr>
         <p:style>
           <a:lnRef idx="1">
@@ -3867,11 +3917,15 @@
           </a:fontRef>
         </p:style>
         <p:txBody>
-          <a:bodyPr lIns="210669" tIns="105334" rIns="210669" bIns="105334" rtlCol="0" anchor="ctr"/>
+          <a:bodyPr rtlCol="0" anchor="ctr"/>
           <a:lstStyle/>
           <a:p>
             <a:pPr algn="ctr"/>
-            <a:endParaRPr lang="en-US"/>
+            <a:endParaRPr lang="en-US">
+              <a:solidFill>
+                <a:schemeClr val="tx1"/>
+              </a:solidFill>
+            </a:endParaRPr>
           </a:p>
         </p:txBody>
       </p:sp>
@@ -3885,8 +3939,8 @@
         </p:nvSpPr>
         <p:spPr>
           <a:xfrm rot="16200000">
-            <a:off x="3457025" y="3457026"/>
-            <a:ext cx="11520000" cy="11520000"/>
+            <a:off x="3277028" y="3277028"/>
+            <a:ext cx="11879995" cy="11879995"/>
           </a:xfrm>
           <a:prstGeom prst="rect">
             <a:avLst/>
@@ -3943,8 +3997,8 @@
         </p:nvSpPr>
         <p:spPr>
           <a:xfrm rot="16200000">
-            <a:off x="5437022" y="5437026"/>
-            <a:ext cx="7560006" cy="7559999"/>
+            <a:off x="5257022" y="5257026"/>
+            <a:ext cx="7920006" cy="7919999"/>
           </a:xfrm>
           <a:prstGeom prst="rect">
             <a:avLst/>
@@ -3964,7 +4018,7 @@
           <a:p>
             <a:pPr algn="ctr"/>
             <a:r>
-              <a:rPr lang="en-US" sz="13800" b="1" cap="small" spc="600" dirty="0" smtClean="0">
+              <a:rPr lang="en-US" sz="13800" b="1" cap="small" spc="300" dirty="0" smtClean="0">
                 <a:ln w="12700">
                   <a:noFill/>
                   <a:prstDash val="solid"/>
@@ -3985,7 +4039,7 @@
               <a:t> Press </a:t>
             </a:r>
             <a:r>
-              <a:rPr lang="en-US" sz="13800" b="1" cap="small" spc="600" dirty="0">
+              <a:rPr lang="en-US" sz="13800" b="1" cap="small" spc="300" dirty="0">
                 <a:ln w="12700">
                   <a:noFill/>
                   <a:prstDash val="solid"/>
@@ -4006,7 +4060,7 @@
               <a:t>a button to continue</a:t>
             </a:r>
             <a:r>
-              <a:rPr lang="en-US" sz="13800" b="1" cap="small" spc="600" dirty="0" smtClean="0">
+              <a:rPr lang="en-US" sz="13800" b="1" cap="small" spc="300" dirty="0" smtClean="0">
                 <a:ln w="12700">
                   <a:noFill/>
                   <a:prstDash val="solid"/>
@@ -4026,7 +4080,7 @@
               </a:rPr>
               <a:t>.</a:t>
             </a:r>
-            <a:endParaRPr lang="en-US" sz="13800" b="1" cap="small" spc="600" dirty="0">
+            <a:endParaRPr lang="en-US" sz="13800" b="1" cap="small" spc="300" dirty="0">
               <a:ln w="12700">
                 <a:noFill/>
                 <a:prstDash val="solid"/>
@@ -4049,7 +4103,7 @@
       </p:sp>
       <p:grpSp>
         <p:nvGrpSpPr>
-          <p:cNvPr id="5" name="Grouper 4"/>
+          <p:cNvPr id="6" name="Grouper 5"/>
           <p:cNvGrpSpPr/>
           <p:nvPr/>
         </p:nvGrpSpPr>
@@ -4063,7 +4117,7 @@
         </p:grpSpPr>
         <p:sp>
           <p:nvSpPr>
-            <p:cNvPr id="6" name="Ellipse 5"/>
+            <p:cNvPr id="7" name="Ellipse 6"/>
             <p:cNvSpPr>
               <a:spLocks noChangeAspect="1"/>
             </p:cNvSpPr>
@@ -4077,6 +4131,11 @@
             <a:prstGeom prst="ellipse">
               <a:avLst/>
             </a:prstGeom>
+            <a:ln>
+              <a:solidFill>
+                <a:schemeClr val="accent2"/>
+              </a:solidFill>
+            </a:ln>
             <a:effectLst>
               <a:outerShdw blurRad="76200" dir="18900000" sy="23000" kx="-1200000" algn="bl" rotWithShape="0">
                 <a:prstClr val="black">
@@ -4110,7 +4169,7 @@
         </p:sp>
         <p:sp>
           <p:nvSpPr>
-            <p:cNvPr id="7" name="Secteurs 6"/>
+            <p:cNvPr id="8" name="Secteurs 7"/>
             <p:cNvSpPr>
               <a:spLocks noChangeAspect="1"/>
             </p:cNvSpPr>
@@ -4130,6 +4189,11 @@
             <a:solidFill>
               <a:srgbClr val="FFFFFF"/>
             </a:solidFill>
+            <a:ln>
+              <a:solidFill>
+                <a:schemeClr val="accent2"/>
+              </a:solidFill>
+            </a:ln>
           </p:spPr>
           <p:style>
             <a:lnRef idx="1">
@@ -4160,9 +4224,9 @@
         </p:sp>
         <p:cxnSp>
           <p:nvCxnSpPr>
-            <p:cNvPr id="8" name="Connecteur droit avec flèche 7"/>
+            <p:cNvPr id="9" name="Connecteur droit avec flèche 8"/>
             <p:cNvCxnSpPr>
-              <a:endCxn id="6" idx="0"/>
+              <a:endCxn id="7" idx="0"/>
             </p:cNvCxnSpPr>
             <p:nvPr/>
           </p:nvCxnSpPr>
@@ -4176,7 +4240,7 @@
             </a:prstGeom>
             <a:ln w="57150" cmpd="sng">
               <a:solidFill>
-                <a:srgbClr val="FF0000"/>
+                <a:schemeClr val="accent2"/>
               </a:solidFill>
               <a:tailEnd type="arrow"/>
             </a:ln>
@@ -4198,7 +4262,7 @@
         </p:cxnSp>
         <p:grpSp>
           <p:nvGrpSpPr>
-            <p:cNvPr id="9" name="Grouper 8"/>
+            <p:cNvPr id="10" name="Grouper 9"/>
             <p:cNvGrpSpPr/>
             <p:nvPr/>
           </p:nvGrpSpPr>
@@ -4227,7 +4291,11 @@
                   <a:gd name="adj2" fmla="val 19010120"/>
                 </a:avLst>
               </a:prstGeom>
-              <a:ln w="38100" cmpd="sng"/>
+              <a:ln w="38100" cmpd="sng">
+                <a:solidFill>
+                  <a:schemeClr val="accent2"/>
+                </a:solidFill>
+              </a:ln>
             </p:spPr>
             <p:style>
               <a:lnRef idx="2">
@@ -4271,7 +4339,11 @@
                   <a:gd name="adj2" fmla="val 19319877"/>
                 </a:avLst>
               </a:prstGeom>
-              <a:ln w="38100" cmpd="sng"/>
+              <a:ln w="38100" cmpd="sng">
+                <a:solidFill>
+                  <a:schemeClr val="accent2"/>
+                </a:solidFill>
+              </a:ln>
             </p:spPr>
             <p:style>
               <a:lnRef idx="2">
@@ -4315,7 +4387,11 @@
                   <a:gd name="adj2" fmla="val 19569505"/>
                 </a:avLst>
               </a:prstGeom>
-              <a:ln w="38100" cmpd="sng"/>
+              <a:ln w="38100" cmpd="sng">
+                <a:solidFill>
+                  <a:schemeClr val="accent2"/>
+                </a:solidFill>
+              </a:ln>
             </p:spPr>
             <p:style>
               <a:lnRef idx="2">
@@ -4349,7 +4425,7 @@
         </p:grpSp>
         <p:grpSp>
           <p:nvGrpSpPr>
-            <p:cNvPr id="10" name="Grouper 9"/>
+            <p:cNvPr id="11" name="Grouper 10"/>
             <p:cNvGrpSpPr/>
             <p:nvPr/>
           </p:nvGrpSpPr>
@@ -4363,7 +4439,7 @@
           </p:grpSpPr>
           <p:sp>
             <p:nvSpPr>
-              <p:cNvPr id="11" name="Arc 10"/>
+              <p:cNvPr id="12" name="Arc 11"/>
               <p:cNvSpPr/>
               <p:nvPr/>
             </p:nvSpPr>
@@ -4378,7 +4454,11 @@
                   <a:gd name="adj2" fmla="val 19010120"/>
                 </a:avLst>
               </a:prstGeom>
-              <a:ln w="38100" cmpd="sng"/>
+              <a:ln w="38100" cmpd="sng">
+                <a:solidFill>
+                  <a:schemeClr val="accent2"/>
+                </a:solidFill>
+              </a:ln>
             </p:spPr>
             <p:style>
               <a:lnRef idx="2">
@@ -4405,7 +4485,7 @@
           </p:sp>
           <p:sp>
             <p:nvSpPr>
-              <p:cNvPr id="12" name="Arc 11"/>
+              <p:cNvPr id="13" name="Arc 12"/>
               <p:cNvSpPr>
                 <a:spLocks noChangeAspect="1"/>
               </p:cNvSpPr>
@@ -4422,7 +4502,11 @@
                   <a:gd name="adj2" fmla="val 19319877"/>
                 </a:avLst>
               </a:prstGeom>
-              <a:ln w="38100" cmpd="sng"/>
+              <a:ln w="38100" cmpd="sng">
+                <a:solidFill>
+                  <a:schemeClr val="accent2"/>
+                </a:solidFill>
+              </a:ln>
             </p:spPr>
             <p:style>
               <a:lnRef idx="2">
@@ -4466,7 +4550,11 @@
                   <a:gd name="adj2" fmla="val 19569505"/>
                 </a:avLst>
               </a:prstGeom>
-              <a:ln w="38100" cmpd="sng"/>
+              <a:ln w="38100" cmpd="sng">
+                <a:solidFill>
+                  <a:schemeClr val="accent2"/>
+                </a:solidFill>
+              </a:ln>
             </p:spPr>
             <p:style>
               <a:lnRef idx="2">
@@ -4502,7 +4590,7 @@
     </p:spTree>
     <p:extLst>
       <p:ext uri="{BB962C8B-B14F-4D97-AF65-F5344CB8AC3E}">
-        <p14:creationId xmlns:p14="http://schemas.microsoft.com/office/powerpoint/2010/main" val="62252854"/>
+        <p14:creationId xmlns:p14="http://schemas.microsoft.com/office/powerpoint/2010/main" val="2090264467"/>
       </p:ext>
     </p:extLst>
   </p:cSld>

</xml_diff>

<commit_message>
Updates to circular messages.
</commit_message>
<xml_diff>
--- a/Source Code/GraspBMPs/GraspCircularPrompts.pptx
+++ b/Source Code/GraspBMPs/GraspCircularPrompts.pptx
@@ -3528,49 +3528,7 @@
                   </a:outerShdw>
                 </a:effectLst>
               </a:rPr>
-              <a:t> Press </a:t>
-            </a:r>
-            <a:r>
-              <a:rPr lang="en-US" sz="13800" b="1" cap="small" spc="300" dirty="0">
-                <a:ln w="12700">
-                  <a:noFill/>
-                  <a:prstDash val="solid"/>
-                </a:ln>
-                <a:solidFill>
-                  <a:schemeClr val="accent3">
-                    <a:lumMod val="75000"/>
-                  </a:schemeClr>
-                </a:solidFill>
-                <a:effectLst>
-                  <a:outerShdw blurRad="41275" dist="20320" dir="1800000" algn="tl" rotWithShape="0">
-                    <a:srgbClr val="000000">
-                      <a:alpha val="40000"/>
-                    </a:srgbClr>
-                  </a:outerShdw>
-                </a:effectLst>
-              </a:rPr>
-              <a:t>a button to continue</a:t>
-            </a:r>
-            <a:r>
-              <a:rPr lang="en-US" sz="13800" b="1" cap="small" spc="300" dirty="0" smtClean="0">
-                <a:ln w="12700">
-                  <a:noFill/>
-                  <a:prstDash val="solid"/>
-                </a:ln>
-                <a:solidFill>
-                  <a:schemeClr val="accent3">
-                    <a:lumMod val="75000"/>
-                  </a:schemeClr>
-                </a:solidFill>
-                <a:effectLst>
-                  <a:outerShdw blurRad="41275" dist="20320" dir="1800000" algn="tl" rotWithShape="0">
-                    <a:srgbClr val="000000">
-                      <a:alpha val="40000"/>
-                    </a:srgbClr>
-                  </a:outerShdw>
-                </a:effectLst>
-              </a:rPr>
-              <a:t>.</a:t>
+              <a:t>Doff HMD and press ‘Return’.</a:t>
             </a:r>
             <a:endParaRPr lang="en-US" sz="13800" b="1" cap="small" spc="300" dirty="0">
               <a:ln w="12700">

</xml_diff>

<commit_message>
Added additional prompts (raise/lower arm etc.)
</commit_message>
<xml_diff>
--- a/Source Code/GraspBMPs/GraspCircularPrompts.pptx
+++ b/Source Code/GraspBMPs/GraspCircularPrompts.pptx
@@ -9,6 +9,10 @@
     <p:sldId id="268" r:id="rId3"/>
     <p:sldId id="269" r:id="rId4"/>
     <p:sldId id="270" r:id="rId5"/>
+    <p:sldId id="271" r:id="rId6"/>
+    <p:sldId id="272" r:id="rId7"/>
+    <p:sldId id="273" r:id="rId8"/>
+    <p:sldId id="274" r:id="rId9"/>
   </p:sldIdLst>
   <p:sldSz cx="18434050" cy="18434050"/>
   <p:notesSz cx="6858000" cy="9144000"/>
@@ -291,7 +295,7 @@
           <a:p>
             <a:fld id="{649FEDF0-7D14-9E44-B4F2-968D163D1479}" type="datetimeFigureOut">
               <a:rPr lang="fr-FR" smtClean="0"/>
-              <a:t>6/28/16</a:t>
+              <a:t>7/2/16</a:t>
             </a:fld>
             <a:endParaRPr lang="en-US"/>
           </a:p>
@@ -461,7 +465,7 @@
           <a:p>
             <a:fld id="{649FEDF0-7D14-9E44-B4F2-968D163D1479}" type="datetimeFigureOut">
               <a:rPr lang="fr-FR" smtClean="0"/>
-              <a:t>6/28/16</a:t>
+              <a:t>7/2/16</a:t>
             </a:fld>
             <a:endParaRPr lang="en-US"/>
           </a:p>
@@ -641,7 +645,7 @@
           <a:p>
             <a:fld id="{649FEDF0-7D14-9E44-B4F2-968D163D1479}" type="datetimeFigureOut">
               <a:rPr lang="fr-FR" smtClean="0"/>
-              <a:t>6/28/16</a:t>
+              <a:t>7/2/16</a:t>
             </a:fld>
             <a:endParaRPr lang="en-US"/>
           </a:p>
@@ -811,7 +815,7 @@
           <a:p>
             <a:fld id="{649FEDF0-7D14-9E44-B4F2-968D163D1479}" type="datetimeFigureOut">
               <a:rPr lang="fr-FR" smtClean="0"/>
-              <a:t>6/28/16</a:t>
+              <a:t>7/2/16</a:t>
             </a:fld>
             <a:endParaRPr lang="en-US"/>
           </a:p>
@@ -1057,7 +1061,7 @@
           <a:p>
             <a:fld id="{649FEDF0-7D14-9E44-B4F2-968D163D1479}" type="datetimeFigureOut">
               <a:rPr lang="fr-FR" smtClean="0"/>
-              <a:t>6/28/16</a:t>
+              <a:t>7/2/16</a:t>
             </a:fld>
             <a:endParaRPr lang="en-US"/>
           </a:p>
@@ -1345,7 +1349,7 @@
           <a:p>
             <a:fld id="{649FEDF0-7D14-9E44-B4F2-968D163D1479}" type="datetimeFigureOut">
               <a:rPr lang="fr-FR" smtClean="0"/>
-              <a:t>6/28/16</a:t>
+              <a:t>7/2/16</a:t>
             </a:fld>
             <a:endParaRPr lang="en-US"/>
           </a:p>
@@ -1767,7 +1771,7 @@
           <a:p>
             <a:fld id="{649FEDF0-7D14-9E44-B4F2-968D163D1479}" type="datetimeFigureOut">
               <a:rPr lang="fr-FR" smtClean="0"/>
-              <a:t>6/28/16</a:t>
+              <a:t>7/2/16</a:t>
             </a:fld>
             <a:endParaRPr lang="en-US"/>
           </a:p>
@@ -1885,7 +1889,7 @@
           <a:p>
             <a:fld id="{649FEDF0-7D14-9E44-B4F2-968D163D1479}" type="datetimeFigureOut">
               <a:rPr lang="fr-FR" smtClean="0"/>
-              <a:t>6/28/16</a:t>
+              <a:t>7/2/16</a:t>
             </a:fld>
             <a:endParaRPr lang="en-US"/>
           </a:p>
@@ -1980,7 +1984,7 @@
           <a:p>
             <a:fld id="{649FEDF0-7D14-9E44-B4F2-968D163D1479}" type="datetimeFigureOut">
               <a:rPr lang="fr-FR" smtClean="0"/>
-              <a:t>6/28/16</a:t>
+              <a:t>7/2/16</a:t>
             </a:fld>
             <a:endParaRPr lang="en-US"/>
           </a:p>
@@ -2257,7 +2261,7 @@
           <a:p>
             <a:fld id="{649FEDF0-7D14-9E44-B4F2-968D163D1479}" type="datetimeFigureOut">
               <a:rPr lang="fr-FR" smtClean="0"/>
-              <a:t>6/28/16</a:t>
+              <a:t>7/2/16</a:t>
             </a:fld>
             <a:endParaRPr lang="en-US"/>
           </a:p>
@@ -2510,7 +2514,7 @@
           <a:p>
             <a:fld id="{649FEDF0-7D14-9E44-B4F2-968D163D1479}" type="datetimeFigureOut">
               <a:rPr lang="fr-FR" smtClean="0"/>
-              <a:t>6/28/16</a:t>
+              <a:t>7/2/16</a:t>
             </a:fld>
             <a:endParaRPr lang="en-US"/>
           </a:p>
@@ -2726,7 +2730,7 @@
           <a:p>
             <a:fld id="{649FEDF0-7D14-9E44-B4F2-968D163D1479}" type="datetimeFigureOut">
               <a:rPr lang="fr-FR" smtClean="0"/>
-              <a:t>6/28/16</a:t>
+              <a:t>7/2/16</a:t>
             </a:fld>
             <a:endParaRPr lang="en-US"/>
           </a:p>
@@ -3192,24 +3196,12 @@
                   <a:prstDash val="solid"/>
                 </a:ln>
                 <a:solidFill>
-                  <a:schemeClr val="accent1"/>
+                  <a:schemeClr val="accent3">
+                    <a:lumMod val="75000"/>
+                  </a:schemeClr>
                 </a:solidFill>
               </a:rPr>
-              <a:t>  Ready </a:t>
-            </a:r>
-            <a:r>
-              <a:rPr lang="en-US" sz="23900" b="1" cap="small" spc="600" dirty="0" smtClean="0">
-                <a:ln w="12700">
-                  <a:solidFill>
-                    <a:srgbClr val="FFFFFF"/>
-                  </a:solidFill>
-                  <a:prstDash val="solid"/>
-                </a:ln>
-                <a:solidFill>
-                  <a:schemeClr val="accent1"/>
-                </a:solidFill>
-              </a:rPr>
-              <a:t>to start next trial.</a:t>
+              <a:t>  Ready to start next trial.</a:t>
             </a:r>
             <a:endParaRPr lang="en-US" sz="23900" b="1" cap="small" spc="600" dirty="0">
               <a:ln w="12700">
@@ -3219,7 +3211,9 @@
                 <a:prstDash val="solid"/>
               </a:ln>
               <a:solidFill>
-                <a:schemeClr val="accent1"/>
+                <a:schemeClr val="accent3">
+                  <a:lumMod val="75000"/>
+                </a:schemeClr>
               </a:solidFill>
             </a:endParaRPr>
           </a:p>
@@ -3262,9 +3256,7 @@
                   <a:prstDash val="solid"/>
                 </a:ln>
                 <a:solidFill>
-                  <a:schemeClr val="accent3">
-                    <a:lumMod val="75000"/>
-                  </a:schemeClr>
+                  <a:schemeClr val="accent1"/>
                 </a:solidFill>
                 <a:effectLst>
                   <a:outerShdw blurRad="41275" dist="20320" dir="1800000" algn="tl" rotWithShape="0">
@@ -3283,9 +3275,7 @@
                   <a:prstDash val="solid"/>
                 </a:ln>
                 <a:solidFill>
-                  <a:schemeClr val="accent3">
-                    <a:lumMod val="75000"/>
-                  </a:schemeClr>
+                  <a:schemeClr val="accent1"/>
                 </a:solidFill>
                 <a:effectLst>
                   <a:outerShdw blurRad="41275" dist="20320" dir="1800000" algn="tl" rotWithShape="0">
@@ -3304,9 +3294,7 @@
                   <a:prstDash val="solid"/>
                 </a:ln>
                 <a:solidFill>
-                  <a:schemeClr val="accent3">
-                    <a:lumMod val="75000"/>
-                  </a:schemeClr>
+                  <a:schemeClr val="accent1"/>
                 </a:solidFill>
                 <a:effectLst>
                   <a:outerShdw blurRad="41275" dist="20320" dir="1800000" algn="tl" rotWithShape="0">
@@ -3324,9 +3312,7 @@
                 <a:prstDash val="solid"/>
               </a:ln>
               <a:solidFill>
-                <a:schemeClr val="accent3">
-                  <a:lumMod val="75000"/>
-                </a:schemeClr>
+                <a:schemeClr val="accent1"/>
               </a:solidFill>
               <a:effectLst>
                 <a:outerShdw blurRad="41275" dist="20320" dir="1800000" algn="tl" rotWithShape="0">
@@ -3460,7 +3446,9 @@
                   <a:prstDash val="solid"/>
                 </a:ln>
                 <a:solidFill>
-                  <a:schemeClr val="accent1"/>
+                  <a:schemeClr val="accent3">
+                    <a:lumMod val="75000"/>
+                  </a:schemeClr>
                 </a:solidFill>
               </a:rPr>
               <a:t>Trial block completed.</a:t>
@@ -3473,7 +3461,9 @@
                 <a:prstDash val="solid"/>
               </a:ln>
               <a:solidFill>
-                <a:schemeClr val="accent1"/>
+                <a:schemeClr val="accent3">
+                  <a:lumMod val="75000"/>
+                </a:schemeClr>
               </a:solidFill>
             </a:endParaRPr>
           </a:p>
@@ -3516,9 +3506,7 @@
                   <a:prstDash val="solid"/>
                 </a:ln>
                 <a:solidFill>
-                  <a:schemeClr val="accent3">
-                    <a:lumMod val="75000"/>
-                  </a:schemeClr>
+                  <a:schemeClr val="accent1"/>
                 </a:solidFill>
                 <a:effectLst>
                   <a:outerShdw blurRad="41275" dist="20320" dir="1800000" algn="tl" rotWithShape="0">
@@ -3536,9 +3524,7 @@
                 <a:prstDash val="solid"/>
               </a:ln>
               <a:solidFill>
-                <a:schemeClr val="accent3">
-                  <a:lumMod val="75000"/>
-                </a:schemeClr>
+                <a:schemeClr val="accent1"/>
               </a:solidFill>
               <a:effectLst>
                 <a:outerShdw blurRad="41275" dist="20320" dir="1800000" algn="tl" rotWithShape="0">
@@ -3672,10 +3658,24 @@
                   <a:prstDash val="solid"/>
                 </a:ln>
                 <a:solidFill>
-                  <a:schemeClr val="accent1"/>
+                  <a:schemeClr val="accent2"/>
                 </a:solidFill>
               </a:rPr>
-              <a:t>Head tilt was not constant.</a:t>
+              <a:t>Head tilt </a:t>
+            </a:r>
+            <a:r>
+              <a:rPr lang="en-US" sz="23900" b="1" cap="small" spc="600" dirty="0" smtClean="0">
+                <a:ln w="12700">
+                  <a:solidFill>
+                    <a:srgbClr val="FFFFFF"/>
+                  </a:solidFill>
+                  <a:prstDash val="solid"/>
+                </a:ln>
+                <a:solidFill>
+                  <a:schemeClr val="accent2"/>
+                </a:solidFill>
+              </a:rPr>
+              <a:t>not maintained.</a:t>
             </a:r>
             <a:endParaRPr lang="en-US" sz="23900" b="1" cap="small" spc="600" dirty="0">
               <a:ln w="12700">
@@ -3685,7 +3685,7 @@
                 <a:prstDash val="solid"/>
               </a:ln>
               <a:solidFill>
-                <a:schemeClr val="accent1"/>
+                <a:schemeClr val="accent2"/>
               </a:solidFill>
             </a:endParaRPr>
           </a:p>
@@ -3728,9 +3728,7 @@
                   <a:prstDash val="solid"/>
                 </a:ln>
                 <a:solidFill>
-                  <a:schemeClr val="accent3">
-                    <a:lumMod val="75000"/>
-                  </a:schemeClr>
+                  <a:schemeClr val="accent1"/>
                 </a:solidFill>
                 <a:effectLst>
                   <a:outerShdw blurRad="41275" dist="20320" dir="1800000" algn="tl" rotWithShape="0">
@@ -3749,9 +3747,7 @@
                   <a:prstDash val="solid"/>
                 </a:ln>
                 <a:solidFill>
-                  <a:schemeClr val="accent3">
-                    <a:lumMod val="75000"/>
-                  </a:schemeClr>
+                  <a:schemeClr val="accent1"/>
                 </a:solidFill>
                 <a:effectLst>
                   <a:outerShdw blurRad="41275" dist="20320" dir="1800000" algn="tl" rotWithShape="0">
@@ -3770,9 +3766,7 @@
                   <a:prstDash val="solid"/>
                 </a:ln>
                 <a:solidFill>
-                  <a:schemeClr val="accent3">
-                    <a:lumMod val="75000"/>
-                  </a:schemeClr>
+                  <a:schemeClr val="accent1"/>
                 </a:solidFill>
                 <a:effectLst>
                   <a:outerShdw blurRad="41275" dist="20320" dir="1800000" algn="tl" rotWithShape="0">
@@ -3790,9 +3784,7 @@
                 <a:prstDash val="solid"/>
               </a:ln>
               <a:solidFill>
-                <a:schemeClr val="accent3">
-                  <a:lumMod val="75000"/>
-                </a:schemeClr>
+                <a:schemeClr val="accent1"/>
               </a:solidFill>
               <a:effectLst>
                 <a:outerShdw blurRad="41275" dist="20320" dir="1800000" algn="tl" rotWithShape="0">
@@ -3926,10 +3918,10 @@
                   <a:prstDash val="solid"/>
                 </a:ln>
                 <a:solidFill>
-                  <a:schemeClr val="accent1"/>
+                  <a:schemeClr val="accent2"/>
                 </a:solidFill>
               </a:rPr>
-              <a:t>Time limit was exceeded.</a:t>
+              <a:t>Time limit exceeded.</a:t>
             </a:r>
             <a:endParaRPr lang="en-US" sz="23900" b="1" cap="small" spc="600" dirty="0">
               <a:ln w="12700">
@@ -3939,7 +3931,7 @@
                 <a:prstDash val="solid"/>
               </a:ln>
               <a:solidFill>
-                <a:schemeClr val="accent1"/>
+                <a:schemeClr val="accent2"/>
               </a:solidFill>
             </a:endParaRPr>
           </a:p>
@@ -3982,9 +3974,7 @@
                   <a:prstDash val="solid"/>
                 </a:ln>
                 <a:solidFill>
-                  <a:schemeClr val="accent3">
-                    <a:lumMod val="75000"/>
-                  </a:schemeClr>
+                  <a:schemeClr val="accent1"/>
                 </a:solidFill>
                 <a:effectLst>
                   <a:outerShdw blurRad="41275" dist="20320" dir="1800000" algn="tl" rotWithShape="0">
@@ -4003,9 +3993,7 @@
                   <a:prstDash val="solid"/>
                 </a:ln>
                 <a:solidFill>
-                  <a:schemeClr val="accent3">
-                    <a:lumMod val="75000"/>
-                  </a:schemeClr>
+                  <a:schemeClr val="accent1"/>
                 </a:solidFill>
                 <a:effectLst>
                   <a:outerShdw blurRad="41275" dist="20320" dir="1800000" algn="tl" rotWithShape="0">
@@ -4024,9 +4012,7 @@
                   <a:prstDash val="solid"/>
                 </a:ln>
                 <a:solidFill>
-                  <a:schemeClr val="accent3">
-                    <a:lumMod val="75000"/>
-                  </a:schemeClr>
+                  <a:schemeClr val="accent1"/>
                 </a:solidFill>
                 <a:effectLst>
                   <a:outerShdw blurRad="41275" dist="20320" dir="1800000" algn="tl" rotWithShape="0">
@@ -4044,9 +4030,7 @@
                 <a:prstDash val="solid"/>
               </a:ln>
               <a:solidFill>
-                <a:schemeClr val="accent3">
-                  <a:lumMod val="75000"/>
-                </a:schemeClr>
+                <a:schemeClr val="accent1"/>
               </a:solidFill>
               <a:effectLst>
                 <a:outerShdw blurRad="41275" dist="20320" dir="1800000" algn="tl" rotWithShape="0">
@@ -4549,6 +4533,3032 @@
     <p:extLst>
       <p:ext uri="{BB962C8B-B14F-4D97-AF65-F5344CB8AC3E}">
         <p14:creationId xmlns:p14="http://schemas.microsoft.com/office/powerpoint/2010/main" val="2090264467"/>
+      </p:ext>
+    </p:extLst>
+  </p:cSld>
+  <p:clrMapOvr>
+    <a:masterClrMapping/>
+  </p:clrMapOvr>
+</p:sld>
+</file>
+
+<file path=ppt/slides/slide5.xml><?xml version="1.0" encoding="utf-8"?>
+<p:sld xmlns:a="http://schemas.openxmlformats.org/drawingml/2006/main" xmlns:r="http://schemas.openxmlformats.org/officeDocument/2006/relationships" xmlns:p="http://schemas.openxmlformats.org/presentationml/2006/main">
+  <p:cSld>
+    <p:spTree>
+      <p:nvGrpSpPr>
+        <p:cNvPr id="1" name=""/>
+        <p:cNvGrpSpPr/>
+        <p:nvPr/>
+      </p:nvGrpSpPr>
+      <p:grpSpPr>
+        <a:xfrm>
+          <a:off x="0" y="0"/>
+          <a:ext cx="0" cy="0"/>
+          <a:chOff x="0" y="0"/>
+          <a:chExt cx="0" cy="0"/>
+        </a:xfrm>
+      </p:grpSpPr>
+      <p:sp>
+        <p:nvSpPr>
+          <p:cNvPr id="5" name="Bouée 4"/>
+          <p:cNvSpPr>
+            <a:spLocks noChangeAspect="1"/>
+          </p:cNvSpPr>
+          <p:nvPr/>
+        </p:nvSpPr>
+        <p:spPr>
+          <a:xfrm>
+            <a:off x="1614253" y="1610484"/>
+            <a:ext cx="15228000" cy="15228000"/>
+          </a:xfrm>
+          <a:prstGeom prst="donut">
+            <a:avLst>
+              <a:gd name="adj" fmla="val 30982"/>
+            </a:avLst>
+          </a:prstGeom>
+          <a:solidFill>
+            <a:schemeClr val="bg1"/>
+          </a:solidFill>
+          <a:ln w="76200" cmpd="sng">
+            <a:noFill/>
+          </a:ln>
+        </p:spPr>
+        <p:style>
+          <a:lnRef idx="1">
+            <a:schemeClr val="accent1"/>
+          </a:lnRef>
+          <a:fillRef idx="3">
+            <a:schemeClr val="accent1"/>
+          </a:fillRef>
+          <a:effectRef idx="2">
+            <a:schemeClr val="accent1"/>
+          </a:effectRef>
+          <a:fontRef idx="minor">
+            <a:schemeClr val="lt1"/>
+          </a:fontRef>
+        </p:style>
+        <p:txBody>
+          <a:bodyPr rtlCol="0" anchor="ctr"/>
+          <a:lstStyle/>
+          <a:p>
+            <a:pPr algn="ctr"/>
+            <a:endParaRPr lang="en-US">
+              <a:solidFill>
+                <a:schemeClr val="tx1"/>
+              </a:solidFill>
+            </a:endParaRPr>
+          </a:p>
+        </p:txBody>
+      </p:sp>
+      <p:sp>
+        <p:nvSpPr>
+          <p:cNvPr id="2" name="Rectangle 1"/>
+          <p:cNvSpPr>
+            <a:spLocks noChangeAspect="1"/>
+          </p:cNvSpPr>
+          <p:nvPr/>
+        </p:nvSpPr>
+        <p:spPr>
+          <a:xfrm rot="16200000">
+            <a:off x="3277028" y="3277028"/>
+            <a:ext cx="11879995" cy="11879995"/>
+          </a:xfrm>
+          <a:prstGeom prst="rect">
+            <a:avLst/>
+          </a:prstGeom>
+          <a:noFill/>
+        </p:spPr>
+        <p:txBody>
+          <a:bodyPr wrap="none" lIns="210669" tIns="105334" rIns="210669" bIns="105334">
+            <a:prstTxWarp prst="textCircle">
+              <a:avLst>
+                <a:gd name="adj" fmla="val 10946467"/>
+              </a:avLst>
+            </a:prstTxWarp>
+            <a:spAutoFit/>
+          </a:bodyPr>
+          <a:lstStyle/>
+          <a:p>
+            <a:pPr algn="ctr"/>
+            <a:r>
+              <a:rPr lang="en-US" sz="23900" b="1" cap="small" spc="600" dirty="0" smtClean="0">
+                <a:ln w="12700">
+                  <a:solidFill>
+                    <a:srgbClr val="FFFFFF"/>
+                  </a:solidFill>
+                  <a:prstDash val="solid"/>
+                </a:ln>
+                <a:solidFill>
+                  <a:schemeClr val="accent2"/>
+                </a:solidFill>
+              </a:rPr>
+              <a:t>Failed to lower </a:t>
+            </a:r>
+            <a:r>
+              <a:rPr lang="en-US" sz="23900" b="1" cap="small" spc="600" dirty="0" smtClean="0">
+                <a:ln w="12700">
+                  <a:solidFill>
+                    <a:srgbClr val="FFFFFF"/>
+                  </a:solidFill>
+                  <a:prstDash val="solid"/>
+                </a:ln>
+                <a:solidFill>
+                  <a:schemeClr val="accent2"/>
+                </a:solidFill>
+              </a:rPr>
+              <a:t>arm in time.</a:t>
+            </a:r>
+            <a:endParaRPr lang="en-US" sz="23900" b="1" cap="small" spc="600" dirty="0">
+              <a:ln w="12700">
+                <a:solidFill>
+                  <a:srgbClr val="FFFFFF"/>
+                </a:solidFill>
+                <a:prstDash val="solid"/>
+              </a:ln>
+              <a:solidFill>
+                <a:schemeClr val="accent2"/>
+              </a:solidFill>
+            </a:endParaRPr>
+          </a:p>
+        </p:txBody>
+      </p:sp>
+      <p:sp>
+        <p:nvSpPr>
+          <p:cNvPr id="3" name="Rectangle 2"/>
+          <p:cNvSpPr>
+            <a:spLocks noChangeAspect="1"/>
+          </p:cNvSpPr>
+          <p:nvPr/>
+        </p:nvSpPr>
+        <p:spPr>
+          <a:xfrm rot="16200000">
+            <a:off x="5257022" y="5257026"/>
+            <a:ext cx="7920006" cy="7919999"/>
+          </a:xfrm>
+          <a:prstGeom prst="rect">
+            <a:avLst/>
+          </a:prstGeom>
+          <a:noFill/>
+        </p:spPr>
+        <p:txBody>
+          <a:bodyPr wrap="none" lIns="210669" tIns="105334" rIns="210669" bIns="105334">
+            <a:prstTxWarp prst="textCircle">
+              <a:avLst>
+                <a:gd name="adj" fmla="val 10916975"/>
+              </a:avLst>
+            </a:prstTxWarp>
+            <a:spAutoFit/>
+          </a:bodyPr>
+          <a:lstStyle/>
+          <a:p>
+            <a:pPr algn="ctr"/>
+            <a:r>
+              <a:rPr lang="en-US" sz="13800" b="1" cap="small" spc="300" dirty="0" smtClean="0">
+                <a:ln w="12700">
+                  <a:noFill/>
+                  <a:prstDash val="solid"/>
+                </a:ln>
+                <a:solidFill>
+                  <a:schemeClr val="accent1"/>
+                </a:solidFill>
+                <a:effectLst>
+                  <a:outerShdw blurRad="41275" dist="20320" dir="1800000" algn="tl" rotWithShape="0">
+                    <a:srgbClr val="000000">
+                      <a:alpha val="40000"/>
+                    </a:srgbClr>
+                  </a:outerShdw>
+                </a:effectLst>
+              </a:rPr>
+              <a:t> Press </a:t>
+            </a:r>
+            <a:r>
+              <a:rPr lang="en-US" sz="13800" b="1" cap="small" spc="300" dirty="0">
+                <a:ln w="12700">
+                  <a:noFill/>
+                  <a:prstDash val="solid"/>
+                </a:ln>
+                <a:solidFill>
+                  <a:schemeClr val="accent1"/>
+                </a:solidFill>
+                <a:effectLst>
+                  <a:outerShdw blurRad="41275" dist="20320" dir="1800000" algn="tl" rotWithShape="0">
+                    <a:srgbClr val="000000">
+                      <a:alpha val="40000"/>
+                    </a:srgbClr>
+                  </a:outerShdw>
+                </a:effectLst>
+              </a:rPr>
+              <a:t>a button to continue</a:t>
+            </a:r>
+            <a:r>
+              <a:rPr lang="en-US" sz="13800" b="1" cap="small" spc="300" dirty="0" smtClean="0">
+                <a:ln w="12700">
+                  <a:noFill/>
+                  <a:prstDash val="solid"/>
+                </a:ln>
+                <a:solidFill>
+                  <a:schemeClr val="accent1"/>
+                </a:solidFill>
+                <a:effectLst>
+                  <a:outerShdw blurRad="41275" dist="20320" dir="1800000" algn="tl" rotWithShape="0">
+                    <a:srgbClr val="000000">
+                      <a:alpha val="40000"/>
+                    </a:srgbClr>
+                  </a:outerShdw>
+                </a:effectLst>
+              </a:rPr>
+              <a:t>.</a:t>
+            </a:r>
+            <a:endParaRPr lang="en-US" sz="13800" b="1" cap="small" spc="300" dirty="0">
+              <a:ln w="12700">
+                <a:noFill/>
+                <a:prstDash val="solid"/>
+              </a:ln>
+              <a:solidFill>
+                <a:schemeClr val="accent1"/>
+              </a:solidFill>
+              <a:effectLst>
+                <a:outerShdw blurRad="41275" dist="20320" dir="1800000" algn="tl" rotWithShape="0">
+                  <a:srgbClr val="000000">
+                    <a:alpha val="40000"/>
+                  </a:srgbClr>
+                </a:outerShdw>
+              </a:effectLst>
+            </a:endParaRPr>
+          </a:p>
+        </p:txBody>
+      </p:sp>
+      <p:grpSp>
+        <p:nvGrpSpPr>
+          <p:cNvPr id="6" name="Grouper 5"/>
+          <p:cNvGrpSpPr/>
+          <p:nvPr/>
+        </p:nvGrpSpPr>
+        <p:grpSpPr>
+          <a:xfrm>
+            <a:off x="6758168" y="6943137"/>
+            <a:ext cx="5001192" cy="5044481"/>
+            <a:chOff x="6494949" y="6943137"/>
+            <a:chExt cx="5001192" cy="5044481"/>
+          </a:xfrm>
+        </p:grpSpPr>
+        <p:sp>
+          <p:nvSpPr>
+            <p:cNvPr id="7" name="Ellipse 6"/>
+            <p:cNvSpPr>
+              <a:spLocks noChangeAspect="1"/>
+            </p:cNvSpPr>
+            <p:nvPr/>
+          </p:nvSpPr>
+          <p:spPr>
+            <a:xfrm>
+              <a:off x="7350417" y="7841894"/>
+              <a:ext cx="3290257" cy="3290257"/>
+            </a:xfrm>
+            <a:prstGeom prst="ellipse">
+              <a:avLst/>
+            </a:prstGeom>
+            <a:ln>
+              <a:solidFill>
+                <a:schemeClr val="accent2"/>
+              </a:solidFill>
+            </a:ln>
+            <a:effectLst>
+              <a:outerShdw blurRad="76200" dir="18900000" sy="23000" kx="-1200000" algn="bl" rotWithShape="0">
+                <a:prstClr val="black">
+                  <a:alpha val="20000"/>
+                </a:prstClr>
+              </a:outerShdw>
+            </a:effectLst>
+          </p:spPr>
+          <p:style>
+            <a:lnRef idx="1">
+              <a:schemeClr val="accent1"/>
+            </a:lnRef>
+            <a:fillRef idx="3">
+              <a:schemeClr val="accent1"/>
+            </a:fillRef>
+            <a:effectRef idx="2">
+              <a:schemeClr val="accent1"/>
+            </a:effectRef>
+            <a:fontRef idx="minor">
+              <a:schemeClr val="lt1"/>
+            </a:fontRef>
+          </p:style>
+          <p:txBody>
+            <a:bodyPr rtlCol="0" anchor="ctr"/>
+            <a:lstStyle/>
+            <a:p>
+              <a:pPr algn="ctr"/>
+              <a:endParaRPr lang="en-US"/>
+            </a:p>
+          </p:txBody>
+        </p:sp>
+        <p:sp>
+          <p:nvSpPr>
+            <p:cNvPr id="8" name="Secteurs 7"/>
+            <p:cNvSpPr>
+              <a:spLocks noChangeAspect="1"/>
+            </p:cNvSpPr>
+            <p:nvPr/>
+          </p:nvSpPr>
+          <p:spPr>
+            <a:xfrm>
+              <a:off x="7371136" y="7841899"/>
+              <a:ext cx="3248819" cy="3290246"/>
+            </a:xfrm>
+            <a:prstGeom prst="pie">
+              <a:avLst>
+                <a:gd name="adj1" fmla="val 17697688"/>
+                <a:gd name="adj2" fmla="val 16200000"/>
+              </a:avLst>
+            </a:prstGeom>
+            <a:solidFill>
+              <a:srgbClr val="FFFFFF"/>
+            </a:solidFill>
+            <a:ln>
+              <a:solidFill>
+                <a:schemeClr val="accent2"/>
+              </a:solidFill>
+            </a:ln>
+          </p:spPr>
+          <p:style>
+            <a:lnRef idx="1">
+              <a:schemeClr val="accent1"/>
+            </a:lnRef>
+            <a:fillRef idx="3">
+              <a:schemeClr val="accent1"/>
+            </a:fillRef>
+            <a:effectRef idx="2">
+              <a:schemeClr val="accent1"/>
+            </a:effectRef>
+            <a:fontRef idx="minor">
+              <a:schemeClr val="lt1"/>
+            </a:fontRef>
+          </p:style>
+          <p:txBody>
+            <a:bodyPr rtlCol="0" anchor="ctr"/>
+            <a:lstStyle/>
+            <a:p>
+              <a:pPr algn="ctr"/>
+              <a:endParaRPr lang="en-US">
+                <a:solidFill>
+                  <a:schemeClr val="tx1"/>
+                </a:solidFill>
+              </a:endParaRPr>
+            </a:p>
+          </p:txBody>
+        </p:sp>
+        <p:cxnSp>
+          <p:nvCxnSpPr>
+            <p:cNvPr id="9" name="Connecteur droit avec flèche 8"/>
+            <p:cNvCxnSpPr>
+              <a:endCxn id="7" idx="0"/>
+            </p:cNvCxnSpPr>
+            <p:nvPr/>
+          </p:nvCxnSpPr>
+          <p:spPr>
+            <a:xfrm flipV="1">
+              <a:off x="8995545" y="7841894"/>
+              <a:ext cx="0" cy="1601840"/>
+            </a:xfrm>
+            <a:prstGeom prst="straightConnector1">
+              <a:avLst/>
+            </a:prstGeom>
+            <a:ln w="57150" cmpd="sng">
+              <a:solidFill>
+                <a:schemeClr val="accent2"/>
+              </a:solidFill>
+              <a:tailEnd type="arrow"/>
+            </a:ln>
+          </p:spPr>
+          <p:style>
+            <a:lnRef idx="2">
+              <a:schemeClr val="accent1"/>
+            </a:lnRef>
+            <a:fillRef idx="0">
+              <a:schemeClr val="accent1"/>
+            </a:fillRef>
+            <a:effectRef idx="1">
+              <a:schemeClr val="accent1"/>
+            </a:effectRef>
+            <a:fontRef idx="minor">
+              <a:schemeClr val="tx1"/>
+            </a:fontRef>
+          </p:style>
+        </p:cxnSp>
+        <p:grpSp>
+          <p:nvGrpSpPr>
+            <p:cNvPr id="10" name="Grouper 9"/>
+            <p:cNvGrpSpPr/>
+            <p:nvPr/>
+          </p:nvGrpSpPr>
+          <p:grpSpPr>
+            <a:xfrm>
+              <a:off x="6494949" y="6986428"/>
+              <a:ext cx="5001192" cy="5001190"/>
+              <a:chOff x="2759620" y="2052934"/>
+              <a:chExt cx="2735998" cy="2735997"/>
+            </a:xfrm>
+          </p:grpSpPr>
+          <p:sp>
+            <p:nvSpPr>
+              <p:cNvPr id="15" name="Arc 14"/>
+              <p:cNvSpPr/>
+              <p:nvPr/>
+            </p:nvSpPr>
+            <p:spPr>
+              <a:xfrm>
+                <a:off x="3119619" y="2340933"/>
+                <a:ext cx="2016000" cy="2159999"/>
+              </a:xfrm>
+              <a:prstGeom prst="arc">
+                <a:avLst>
+                  <a:gd name="adj1" fmla="val 17494394"/>
+                  <a:gd name="adj2" fmla="val 19010120"/>
+                </a:avLst>
+              </a:prstGeom>
+              <a:ln w="38100" cmpd="sng">
+                <a:solidFill>
+                  <a:schemeClr val="accent2"/>
+                </a:solidFill>
+              </a:ln>
+            </p:spPr>
+            <p:style>
+              <a:lnRef idx="2">
+                <a:schemeClr val="accent1"/>
+              </a:lnRef>
+              <a:fillRef idx="0">
+                <a:schemeClr val="accent1"/>
+              </a:fillRef>
+              <a:effectRef idx="1">
+                <a:schemeClr val="accent1"/>
+              </a:effectRef>
+              <a:fontRef idx="minor">
+                <a:schemeClr val="tx1"/>
+              </a:fontRef>
+            </p:style>
+            <p:txBody>
+              <a:bodyPr rtlCol="0" anchor="ctr"/>
+              <a:lstStyle/>
+              <a:p>
+                <a:pPr algn="ctr"/>
+                <a:endParaRPr lang="en-US"/>
+              </a:p>
+            </p:txBody>
+          </p:sp>
+          <p:sp>
+            <p:nvSpPr>
+              <p:cNvPr id="16" name="Arc 15"/>
+              <p:cNvSpPr>
+                <a:spLocks noChangeAspect="1"/>
+              </p:cNvSpPr>
+              <p:nvPr/>
+            </p:nvSpPr>
+            <p:spPr>
+              <a:xfrm>
+                <a:off x="2903620" y="2196933"/>
+                <a:ext cx="2447999" cy="2447998"/>
+              </a:xfrm>
+              <a:prstGeom prst="arc">
+                <a:avLst>
+                  <a:gd name="adj1" fmla="val 17258218"/>
+                  <a:gd name="adj2" fmla="val 19319877"/>
+                </a:avLst>
+              </a:prstGeom>
+              <a:ln w="38100" cmpd="sng">
+                <a:solidFill>
+                  <a:schemeClr val="accent2"/>
+                </a:solidFill>
+              </a:ln>
+            </p:spPr>
+            <p:style>
+              <a:lnRef idx="2">
+                <a:schemeClr val="accent1"/>
+              </a:lnRef>
+              <a:fillRef idx="0">
+                <a:schemeClr val="accent1"/>
+              </a:fillRef>
+              <a:effectRef idx="1">
+                <a:schemeClr val="accent1"/>
+              </a:effectRef>
+              <a:fontRef idx="minor">
+                <a:schemeClr val="tx1"/>
+              </a:fontRef>
+            </p:style>
+            <p:txBody>
+              <a:bodyPr rtlCol="0" anchor="ctr"/>
+              <a:lstStyle/>
+              <a:p>
+                <a:pPr algn="ctr"/>
+                <a:endParaRPr lang="en-US"/>
+              </a:p>
+            </p:txBody>
+          </p:sp>
+          <p:sp>
+            <p:nvSpPr>
+              <p:cNvPr id="17" name="Arc 16"/>
+              <p:cNvSpPr>
+                <a:spLocks noChangeAspect="1"/>
+              </p:cNvSpPr>
+              <p:nvPr/>
+            </p:nvSpPr>
+            <p:spPr>
+              <a:xfrm>
+                <a:off x="2759620" y="2052934"/>
+                <a:ext cx="2735998" cy="2735997"/>
+              </a:xfrm>
+              <a:prstGeom prst="arc">
+                <a:avLst>
+                  <a:gd name="adj1" fmla="val 17058860"/>
+                  <a:gd name="adj2" fmla="val 19569505"/>
+                </a:avLst>
+              </a:prstGeom>
+              <a:ln w="38100" cmpd="sng">
+                <a:solidFill>
+                  <a:schemeClr val="accent2"/>
+                </a:solidFill>
+              </a:ln>
+            </p:spPr>
+            <p:style>
+              <a:lnRef idx="2">
+                <a:schemeClr val="accent1"/>
+              </a:lnRef>
+              <a:fillRef idx="0">
+                <a:schemeClr val="accent1"/>
+              </a:fillRef>
+              <a:effectRef idx="1">
+                <a:schemeClr val="accent1"/>
+              </a:effectRef>
+              <a:fontRef idx="minor">
+                <a:schemeClr val="tx1"/>
+              </a:fontRef>
+            </p:style>
+            <p:txBody>
+              <a:bodyPr rtlCol="0" anchor="ctr"/>
+              <a:lstStyle/>
+              <a:p>
+                <a:pPr algn="ctr"/>
+                <a:endParaRPr lang="en-US">
+                  <a:ln w="38100" cmpd="sng">
+                    <a:solidFill>
+                      <a:srgbClr val="000000"/>
+                    </a:solidFill>
+                  </a:ln>
+                </a:endParaRPr>
+              </a:p>
+            </p:txBody>
+          </p:sp>
+        </p:grpSp>
+        <p:grpSp>
+          <p:nvGrpSpPr>
+            <p:cNvPr id="11" name="Grouper 10"/>
+            <p:cNvGrpSpPr/>
+            <p:nvPr/>
+          </p:nvGrpSpPr>
+          <p:grpSpPr>
+            <a:xfrm flipH="1">
+              <a:off x="6494949" y="6943137"/>
+              <a:ext cx="5001192" cy="5001190"/>
+              <a:chOff x="2759620" y="2052934"/>
+              <a:chExt cx="2735998" cy="2735997"/>
+            </a:xfrm>
+          </p:grpSpPr>
+          <p:sp>
+            <p:nvSpPr>
+              <p:cNvPr id="12" name="Arc 11"/>
+              <p:cNvSpPr/>
+              <p:nvPr/>
+            </p:nvSpPr>
+            <p:spPr>
+              <a:xfrm>
+                <a:off x="3119619" y="2340933"/>
+                <a:ext cx="2016000" cy="2159999"/>
+              </a:xfrm>
+              <a:prstGeom prst="arc">
+                <a:avLst>
+                  <a:gd name="adj1" fmla="val 17494394"/>
+                  <a:gd name="adj2" fmla="val 19010120"/>
+                </a:avLst>
+              </a:prstGeom>
+              <a:ln w="38100" cmpd="sng">
+                <a:solidFill>
+                  <a:schemeClr val="accent2"/>
+                </a:solidFill>
+              </a:ln>
+            </p:spPr>
+            <p:style>
+              <a:lnRef idx="2">
+                <a:schemeClr val="accent1"/>
+              </a:lnRef>
+              <a:fillRef idx="0">
+                <a:schemeClr val="accent1"/>
+              </a:fillRef>
+              <a:effectRef idx="1">
+                <a:schemeClr val="accent1"/>
+              </a:effectRef>
+              <a:fontRef idx="minor">
+                <a:schemeClr val="tx1"/>
+              </a:fontRef>
+            </p:style>
+            <p:txBody>
+              <a:bodyPr rtlCol="0" anchor="ctr"/>
+              <a:lstStyle/>
+              <a:p>
+                <a:pPr algn="ctr"/>
+                <a:endParaRPr lang="en-US"/>
+              </a:p>
+            </p:txBody>
+          </p:sp>
+          <p:sp>
+            <p:nvSpPr>
+              <p:cNvPr id="13" name="Arc 12"/>
+              <p:cNvSpPr>
+                <a:spLocks noChangeAspect="1"/>
+              </p:cNvSpPr>
+              <p:nvPr/>
+            </p:nvSpPr>
+            <p:spPr>
+              <a:xfrm>
+                <a:off x="2903620" y="2196933"/>
+                <a:ext cx="2447999" cy="2447998"/>
+              </a:xfrm>
+              <a:prstGeom prst="arc">
+                <a:avLst>
+                  <a:gd name="adj1" fmla="val 17258218"/>
+                  <a:gd name="adj2" fmla="val 19319877"/>
+                </a:avLst>
+              </a:prstGeom>
+              <a:ln w="38100" cmpd="sng">
+                <a:solidFill>
+                  <a:schemeClr val="accent2"/>
+                </a:solidFill>
+              </a:ln>
+            </p:spPr>
+            <p:style>
+              <a:lnRef idx="2">
+                <a:schemeClr val="accent1"/>
+              </a:lnRef>
+              <a:fillRef idx="0">
+                <a:schemeClr val="accent1"/>
+              </a:fillRef>
+              <a:effectRef idx="1">
+                <a:schemeClr val="accent1"/>
+              </a:effectRef>
+              <a:fontRef idx="minor">
+                <a:schemeClr val="tx1"/>
+              </a:fontRef>
+            </p:style>
+            <p:txBody>
+              <a:bodyPr rtlCol="0" anchor="ctr"/>
+              <a:lstStyle/>
+              <a:p>
+                <a:pPr algn="ctr"/>
+                <a:endParaRPr lang="en-US"/>
+              </a:p>
+            </p:txBody>
+          </p:sp>
+          <p:sp>
+            <p:nvSpPr>
+              <p:cNvPr id="14" name="Arc 13"/>
+              <p:cNvSpPr>
+                <a:spLocks noChangeAspect="1"/>
+              </p:cNvSpPr>
+              <p:nvPr/>
+            </p:nvSpPr>
+            <p:spPr>
+              <a:xfrm>
+                <a:off x="2759620" y="2052934"/>
+                <a:ext cx="2735998" cy="2735997"/>
+              </a:xfrm>
+              <a:prstGeom prst="arc">
+                <a:avLst>
+                  <a:gd name="adj1" fmla="val 17058860"/>
+                  <a:gd name="adj2" fmla="val 19569505"/>
+                </a:avLst>
+              </a:prstGeom>
+              <a:ln w="38100" cmpd="sng">
+                <a:solidFill>
+                  <a:schemeClr val="accent2"/>
+                </a:solidFill>
+              </a:ln>
+            </p:spPr>
+            <p:style>
+              <a:lnRef idx="2">
+                <a:schemeClr val="accent1"/>
+              </a:lnRef>
+              <a:fillRef idx="0">
+                <a:schemeClr val="accent1"/>
+              </a:fillRef>
+              <a:effectRef idx="1">
+                <a:schemeClr val="accent1"/>
+              </a:effectRef>
+              <a:fontRef idx="minor">
+                <a:schemeClr val="tx1"/>
+              </a:fontRef>
+            </p:style>
+            <p:txBody>
+              <a:bodyPr rtlCol="0" anchor="ctr"/>
+              <a:lstStyle/>
+              <a:p>
+                <a:pPr algn="ctr"/>
+                <a:endParaRPr lang="en-US">
+                  <a:ln w="38100" cmpd="sng">
+                    <a:solidFill>
+                      <a:srgbClr val="000000"/>
+                    </a:solidFill>
+                  </a:ln>
+                </a:endParaRPr>
+              </a:p>
+            </p:txBody>
+          </p:sp>
+        </p:grpSp>
+      </p:grpSp>
+    </p:spTree>
+    <p:extLst>
+      <p:ext uri="{BB962C8B-B14F-4D97-AF65-F5344CB8AC3E}">
+        <p14:creationId xmlns:p14="http://schemas.microsoft.com/office/powerpoint/2010/main" val="291435061"/>
+      </p:ext>
+    </p:extLst>
+  </p:cSld>
+  <p:clrMapOvr>
+    <a:masterClrMapping/>
+  </p:clrMapOvr>
+</p:sld>
+</file>
+
+<file path=ppt/slides/slide6.xml><?xml version="1.0" encoding="utf-8"?>
+<p:sld xmlns:a="http://schemas.openxmlformats.org/drawingml/2006/main" xmlns:r="http://schemas.openxmlformats.org/officeDocument/2006/relationships" xmlns:p="http://schemas.openxmlformats.org/presentationml/2006/main">
+  <p:cSld>
+    <p:spTree>
+      <p:nvGrpSpPr>
+        <p:cNvPr id="1" name=""/>
+        <p:cNvGrpSpPr/>
+        <p:nvPr/>
+      </p:nvGrpSpPr>
+      <p:grpSpPr>
+        <a:xfrm>
+          <a:off x="0" y="0"/>
+          <a:ext cx="0" cy="0"/>
+          <a:chOff x="0" y="0"/>
+          <a:chExt cx="0" cy="0"/>
+        </a:xfrm>
+      </p:grpSpPr>
+      <p:sp>
+        <p:nvSpPr>
+          <p:cNvPr id="5" name="Bouée 4"/>
+          <p:cNvSpPr>
+            <a:spLocks noChangeAspect="1"/>
+          </p:cNvSpPr>
+          <p:nvPr/>
+        </p:nvSpPr>
+        <p:spPr>
+          <a:xfrm>
+            <a:off x="1614253" y="1610484"/>
+            <a:ext cx="15228000" cy="15228000"/>
+          </a:xfrm>
+          <a:prstGeom prst="donut">
+            <a:avLst>
+              <a:gd name="adj" fmla="val 30982"/>
+            </a:avLst>
+          </a:prstGeom>
+          <a:solidFill>
+            <a:schemeClr val="bg1"/>
+          </a:solidFill>
+          <a:ln w="76200" cmpd="sng">
+            <a:noFill/>
+          </a:ln>
+        </p:spPr>
+        <p:style>
+          <a:lnRef idx="1">
+            <a:schemeClr val="accent1"/>
+          </a:lnRef>
+          <a:fillRef idx="3">
+            <a:schemeClr val="accent1"/>
+          </a:fillRef>
+          <a:effectRef idx="2">
+            <a:schemeClr val="accent1"/>
+          </a:effectRef>
+          <a:fontRef idx="minor">
+            <a:schemeClr val="lt1"/>
+          </a:fontRef>
+        </p:style>
+        <p:txBody>
+          <a:bodyPr rtlCol="0" anchor="ctr"/>
+          <a:lstStyle/>
+          <a:p>
+            <a:pPr algn="ctr"/>
+            <a:endParaRPr lang="en-US">
+              <a:solidFill>
+                <a:schemeClr val="tx1"/>
+              </a:solidFill>
+            </a:endParaRPr>
+          </a:p>
+        </p:txBody>
+      </p:sp>
+      <p:sp>
+        <p:nvSpPr>
+          <p:cNvPr id="2" name="Rectangle 1"/>
+          <p:cNvSpPr>
+            <a:spLocks noChangeAspect="1"/>
+          </p:cNvSpPr>
+          <p:nvPr/>
+        </p:nvSpPr>
+        <p:spPr>
+          <a:xfrm rot="16200000">
+            <a:off x="3277028" y="3277028"/>
+            <a:ext cx="11879995" cy="11879995"/>
+          </a:xfrm>
+          <a:prstGeom prst="rect">
+            <a:avLst/>
+          </a:prstGeom>
+          <a:noFill/>
+        </p:spPr>
+        <p:txBody>
+          <a:bodyPr wrap="none" lIns="210669" tIns="105334" rIns="210669" bIns="105334">
+            <a:prstTxWarp prst="textCircle">
+              <a:avLst>
+                <a:gd name="adj" fmla="val 10946467"/>
+              </a:avLst>
+            </a:prstTxWarp>
+            <a:spAutoFit/>
+          </a:bodyPr>
+          <a:lstStyle/>
+          <a:p>
+            <a:pPr algn="ctr"/>
+            <a:r>
+              <a:rPr lang="en-US" sz="23900" b="1" cap="small" spc="600" dirty="0" smtClean="0">
+                <a:ln w="12700">
+                  <a:solidFill>
+                    <a:srgbClr val="FFFFFF"/>
+                  </a:solidFill>
+                  <a:prstDash val="solid"/>
+                </a:ln>
+                <a:solidFill>
+                  <a:schemeClr val="accent2"/>
+                </a:solidFill>
+              </a:rPr>
+              <a:t>Failed to </a:t>
+            </a:r>
+            <a:r>
+              <a:rPr lang="en-US" sz="23900" b="1" cap="small" spc="600" dirty="0" smtClean="0">
+                <a:ln w="12700">
+                  <a:solidFill>
+                    <a:srgbClr val="FFFFFF"/>
+                  </a:solidFill>
+                  <a:prstDash val="solid"/>
+                </a:ln>
+                <a:solidFill>
+                  <a:schemeClr val="accent2"/>
+                </a:solidFill>
+              </a:rPr>
+              <a:t>Raise arm in time.</a:t>
+            </a:r>
+            <a:endParaRPr lang="en-US" sz="23900" b="1" cap="small" spc="600" dirty="0">
+              <a:ln w="12700">
+                <a:solidFill>
+                  <a:srgbClr val="FFFFFF"/>
+                </a:solidFill>
+                <a:prstDash val="solid"/>
+              </a:ln>
+              <a:solidFill>
+                <a:schemeClr val="accent2"/>
+              </a:solidFill>
+            </a:endParaRPr>
+          </a:p>
+        </p:txBody>
+      </p:sp>
+      <p:sp>
+        <p:nvSpPr>
+          <p:cNvPr id="3" name="Rectangle 2"/>
+          <p:cNvSpPr>
+            <a:spLocks noChangeAspect="1"/>
+          </p:cNvSpPr>
+          <p:nvPr/>
+        </p:nvSpPr>
+        <p:spPr>
+          <a:xfrm rot="16200000">
+            <a:off x="5257022" y="5257026"/>
+            <a:ext cx="7920006" cy="7919999"/>
+          </a:xfrm>
+          <a:prstGeom prst="rect">
+            <a:avLst/>
+          </a:prstGeom>
+          <a:noFill/>
+        </p:spPr>
+        <p:txBody>
+          <a:bodyPr wrap="none" lIns="210669" tIns="105334" rIns="210669" bIns="105334">
+            <a:prstTxWarp prst="textCircle">
+              <a:avLst>
+                <a:gd name="adj" fmla="val 10916975"/>
+              </a:avLst>
+            </a:prstTxWarp>
+            <a:spAutoFit/>
+          </a:bodyPr>
+          <a:lstStyle/>
+          <a:p>
+            <a:pPr algn="ctr"/>
+            <a:r>
+              <a:rPr lang="en-US" sz="13800" b="1" cap="small" spc="300" dirty="0" smtClean="0">
+                <a:ln w="12700">
+                  <a:noFill/>
+                  <a:prstDash val="solid"/>
+                </a:ln>
+                <a:solidFill>
+                  <a:schemeClr val="accent1"/>
+                </a:solidFill>
+                <a:effectLst>
+                  <a:outerShdw blurRad="41275" dist="20320" dir="1800000" algn="tl" rotWithShape="0">
+                    <a:srgbClr val="000000">
+                      <a:alpha val="40000"/>
+                    </a:srgbClr>
+                  </a:outerShdw>
+                </a:effectLst>
+              </a:rPr>
+              <a:t> Press </a:t>
+            </a:r>
+            <a:r>
+              <a:rPr lang="en-US" sz="13800" b="1" cap="small" spc="300" dirty="0">
+                <a:ln w="12700">
+                  <a:noFill/>
+                  <a:prstDash val="solid"/>
+                </a:ln>
+                <a:solidFill>
+                  <a:schemeClr val="accent1"/>
+                </a:solidFill>
+                <a:effectLst>
+                  <a:outerShdw blurRad="41275" dist="20320" dir="1800000" algn="tl" rotWithShape="0">
+                    <a:srgbClr val="000000">
+                      <a:alpha val="40000"/>
+                    </a:srgbClr>
+                  </a:outerShdw>
+                </a:effectLst>
+              </a:rPr>
+              <a:t>a button to continue</a:t>
+            </a:r>
+            <a:r>
+              <a:rPr lang="en-US" sz="13800" b="1" cap="small" spc="300" dirty="0" smtClean="0">
+                <a:ln w="12700">
+                  <a:noFill/>
+                  <a:prstDash val="solid"/>
+                </a:ln>
+                <a:solidFill>
+                  <a:schemeClr val="accent1"/>
+                </a:solidFill>
+                <a:effectLst>
+                  <a:outerShdw blurRad="41275" dist="20320" dir="1800000" algn="tl" rotWithShape="0">
+                    <a:srgbClr val="000000">
+                      <a:alpha val="40000"/>
+                    </a:srgbClr>
+                  </a:outerShdw>
+                </a:effectLst>
+              </a:rPr>
+              <a:t>.</a:t>
+            </a:r>
+            <a:endParaRPr lang="en-US" sz="13800" b="1" cap="small" spc="300" dirty="0">
+              <a:ln w="12700">
+                <a:noFill/>
+                <a:prstDash val="solid"/>
+              </a:ln>
+              <a:solidFill>
+                <a:schemeClr val="accent1"/>
+              </a:solidFill>
+              <a:effectLst>
+                <a:outerShdw blurRad="41275" dist="20320" dir="1800000" algn="tl" rotWithShape="0">
+                  <a:srgbClr val="000000">
+                    <a:alpha val="40000"/>
+                  </a:srgbClr>
+                </a:outerShdw>
+              </a:effectLst>
+            </a:endParaRPr>
+          </a:p>
+        </p:txBody>
+      </p:sp>
+      <p:grpSp>
+        <p:nvGrpSpPr>
+          <p:cNvPr id="6" name="Grouper 5"/>
+          <p:cNvGrpSpPr/>
+          <p:nvPr/>
+        </p:nvGrpSpPr>
+        <p:grpSpPr>
+          <a:xfrm>
+            <a:off x="6758168" y="6943137"/>
+            <a:ext cx="5001192" cy="5044481"/>
+            <a:chOff x="6494949" y="6943137"/>
+            <a:chExt cx="5001192" cy="5044481"/>
+          </a:xfrm>
+        </p:grpSpPr>
+        <p:sp>
+          <p:nvSpPr>
+            <p:cNvPr id="7" name="Ellipse 6"/>
+            <p:cNvSpPr>
+              <a:spLocks noChangeAspect="1"/>
+            </p:cNvSpPr>
+            <p:nvPr/>
+          </p:nvSpPr>
+          <p:spPr>
+            <a:xfrm>
+              <a:off x="7350417" y="7841894"/>
+              <a:ext cx="3290257" cy="3290257"/>
+            </a:xfrm>
+            <a:prstGeom prst="ellipse">
+              <a:avLst/>
+            </a:prstGeom>
+            <a:ln>
+              <a:solidFill>
+                <a:schemeClr val="accent2"/>
+              </a:solidFill>
+            </a:ln>
+            <a:effectLst>
+              <a:outerShdw blurRad="76200" dir="18900000" sy="23000" kx="-1200000" algn="bl" rotWithShape="0">
+                <a:prstClr val="black">
+                  <a:alpha val="20000"/>
+                </a:prstClr>
+              </a:outerShdw>
+            </a:effectLst>
+          </p:spPr>
+          <p:style>
+            <a:lnRef idx="1">
+              <a:schemeClr val="accent1"/>
+            </a:lnRef>
+            <a:fillRef idx="3">
+              <a:schemeClr val="accent1"/>
+            </a:fillRef>
+            <a:effectRef idx="2">
+              <a:schemeClr val="accent1"/>
+            </a:effectRef>
+            <a:fontRef idx="minor">
+              <a:schemeClr val="lt1"/>
+            </a:fontRef>
+          </p:style>
+          <p:txBody>
+            <a:bodyPr rtlCol="0" anchor="ctr"/>
+            <a:lstStyle/>
+            <a:p>
+              <a:pPr algn="ctr"/>
+              <a:endParaRPr lang="en-US"/>
+            </a:p>
+          </p:txBody>
+        </p:sp>
+        <p:sp>
+          <p:nvSpPr>
+            <p:cNvPr id="8" name="Secteurs 7"/>
+            <p:cNvSpPr>
+              <a:spLocks noChangeAspect="1"/>
+            </p:cNvSpPr>
+            <p:nvPr/>
+          </p:nvSpPr>
+          <p:spPr>
+            <a:xfrm>
+              <a:off x="7371136" y="7841899"/>
+              <a:ext cx="3248819" cy="3290246"/>
+            </a:xfrm>
+            <a:prstGeom prst="pie">
+              <a:avLst>
+                <a:gd name="adj1" fmla="val 17697688"/>
+                <a:gd name="adj2" fmla="val 16200000"/>
+              </a:avLst>
+            </a:prstGeom>
+            <a:solidFill>
+              <a:srgbClr val="FFFFFF"/>
+            </a:solidFill>
+            <a:ln>
+              <a:solidFill>
+                <a:schemeClr val="accent2"/>
+              </a:solidFill>
+            </a:ln>
+          </p:spPr>
+          <p:style>
+            <a:lnRef idx="1">
+              <a:schemeClr val="accent1"/>
+            </a:lnRef>
+            <a:fillRef idx="3">
+              <a:schemeClr val="accent1"/>
+            </a:fillRef>
+            <a:effectRef idx="2">
+              <a:schemeClr val="accent1"/>
+            </a:effectRef>
+            <a:fontRef idx="minor">
+              <a:schemeClr val="lt1"/>
+            </a:fontRef>
+          </p:style>
+          <p:txBody>
+            <a:bodyPr rtlCol="0" anchor="ctr"/>
+            <a:lstStyle/>
+            <a:p>
+              <a:pPr algn="ctr"/>
+              <a:endParaRPr lang="en-US">
+                <a:solidFill>
+                  <a:schemeClr val="tx1"/>
+                </a:solidFill>
+              </a:endParaRPr>
+            </a:p>
+          </p:txBody>
+        </p:sp>
+        <p:cxnSp>
+          <p:nvCxnSpPr>
+            <p:cNvPr id="9" name="Connecteur droit avec flèche 8"/>
+            <p:cNvCxnSpPr>
+              <a:endCxn id="7" idx="0"/>
+            </p:cNvCxnSpPr>
+            <p:nvPr/>
+          </p:nvCxnSpPr>
+          <p:spPr>
+            <a:xfrm flipV="1">
+              <a:off x="8995545" y="7841894"/>
+              <a:ext cx="0" cy="1601840"/>
+            </a:xfrm>
+            <a:prstGeom prst="straightConnector1">
+              <a:avLst/>
+            </a:prstGeom>
+            <a:ln w="57150" cmpd="sng">
+              <a:solidFill>
+                <a:schemeClr val="accent2"/>
+              </a:solidFill>
+              <a:tailEnd type="arrow"/>
+            </a:ln>
+          </p:spPr>
+          <p:style>
+            <a:lnRef idx="2">
+              <a:schemeClr val="accent1"/>
+            </a:lnRef>
+            <a:fillRef idx="0">
+              <a:schemeClr val="accent1"/>
+            </a:fillRef>
+            <a:effectRef idx="1">
+              <a:schemeClr val="accent1"/>
+            </a:effectRef>
+            <a:fontRef idx="minor">
+              <a:schemeClr val="tx1"/>
+            </a:fontRef>
+          </p:style>
+        </p:cxnSp>
+        <p:grpSp>
+          <p:nvGrpSpPr>
+            <p:cNvPr id="10" name="Grouper 9"/>
+            <p:cNvGrpSpPr/>
+            <p:nvPr/>
+          </p:nvGrpSpPr>
+          <p:grpSpPr>
+            <a:xfrm>
+              <a:off x="6494949" y="6986428"/>
+              <a:ext cx="5001192" cy="5001190"/>
+              <a:chOff x="2759620" y="2052934"/>
+              <a:chExt cx="2735998" cy="2735997"/>
+            </a:xfrm>
+          </p:grpSpPr>
+          <p:sp>
+            <p:nvSpPr>
+              <p:cNvPr id="15" name="Arc 14"/>
+              <p:cNvSpPr/>
+              <p:nvPr/>
+            </p:nvSpPr>
+            <p:spPr>
+              <a:xfrm>
+                <a:off x="3119619" y="2340933"/>
+                <a:ext cx="2016000" cy="2159999"/>
+              </a:xfrm>
+              <a:prstGeom prst="arc">
+                <a:avLst>
+                  <a:gd name="adj1" fmla="val 17494394"/>
+                  <a:gd name="adj2" fmla="val 19010120"/>
+                </a:avLst>
+              </a:prstGeom>
+              <a:ln w="38100" cmpd="sng">
+                <a:solidFill>
+                  <a:schemeClr val="accent2"/>
+                </a:solidFill>
+              </a:ln>
+            </p:spPr>
+            <p:style>
+              <a:lnRef idx="2">
+                <a:schemeClr val="accent1"/>
+              </a:lnRef>
+              <a:fillRef idx="0">
+                <a:schemeClr val="accent1"/>
+              </a:fillRef>
+              <a:effectRef idx="1">
+                <a:schemeClr val="accent1"/>
+              </a:effectRef>
+              <a:fontRef idx="minor">
+                <a:schemeClr val="tx1"/>
+              </a:fontRef>
+            </p:style>
+            <p:txBody>
+              <a:bodyPr rtlCol="0" anchor="ctr"/>
+              <a:lstStyle/>
+              <a:p>
+                <a:pPr algn="ctr"/>
+                <a:endParaRPr lang="en-US"/>
+              </a:p>
+            </p:txBody>
+          </p:sp>
+          <p:sp>
+            <p:nvSpPr>
+              <p:cNvPr id="16" name="Arc 15"/>
+              <p:cNvSpPr>
+                <a:spLocks noChangeAspect="1"/>
+              </p:cNvSpPr>
+              <p:nvPr/>
+            </p:nvSpPr>
+            <p:spPr>
+              <a:xfrm>
+                <a:off x="2903620" y="2196933"/>
+                <a:ext cx="2447999" cy="2447998"/>
+              </a:xfrm>
+              <a:prstGeom prst="arc">
+                <a:avLst>
+                  <a:gd name="adj1" fmla="val 17258218"/>
+                  <a:gd name="adj2" fmla="val 19319877"/>
+                </a:avLst>
+              </a:prstGeom>
+              <a:ln w="38100" cmpd="sng">
+                <a:solidFill>
+                  <a:schemeClr val="accent2"/>
+                </a:solidFill>
+              </a:ln>
+            </p:spPr>
+            <p:style>
+              <a:lnRef idx="2">
+                <a:schemeClr val="accent1"/>
+              </a:lnRef>
+              <a:fillRef idx="0">
+                <a:schemeClr val="accent1"/>
+              </a:fillRef>
+              <a:effectRef idx="1">
+                <a:schemeClr val="accent1"/>
+              </a:effectRef>
+              <a:fontRef idx="minor">
+                <a:schemeClr val="tx1"/>
+              </a:fontRef>
+            </p:style>
+            <p:txBody>
+              <a:bodyPr rtlCol="0" anchor="ctr"/>
+              <a:lstStyle/>
+              <a:p>
+                <a:pPr algn="ctr"/>
+                <a:endParaRPr lang="en-US"/>
+              </a:p>
+            </p:txBody>
+          </p:sp>
+          <p:sp>
+            <p:nvSpPr>
+              <p:cNvPr id="17" name="Arc 16"/>
+              <p:cNvSpPr>
+                <a:spLocks noChangeAspect="1"/>
+              </p:cNvSpPr>
+              <p:nvPr/>
+            </p:nvSpPr>
+            <p:spPr>
+              <a:xfrm>
+                <a:off x="2759620" y="2052934"/>
+                <a:ext cx="2735998" cy="2735997"/>
+              </a:xfrm>
+              <a:prstGeom prst="arc">
+                <a:avLst>
+                  <a:gd name="adj1" fmla="val 17058860"/>
+                  <a:gd name="adj2" fmla="val 19569505"/>
+                </a:avLst>
+              </a:prstGeom>
+              <a:ln w="38100" cmpd="sng">
+                <a:solidFill>
+                  <a:schemeClr val="accent2"/>
+                </a:solidFill>
+              </a:ln>
+            </p:spPr>
+            <p:style>
+              <a:lnRef idx="2">
+                <a:schemeClr val="accent1"/>
+              </a:lnRef>
+              <a:fillRef idx="0">
+                <a:schemeClr val="accent1"/>
+              </a:fillRef>
+              <a:effectRef idx="1">
+                <a:schemeClr val="accent1"/>
+              </a:effectRef>
+              <a:fontRef idx="minor">
+                <a:schemeClr val="tx1"/>
+              </a:fontRef>
+            </p:style>
+            <p:txBody>
+              <a:bodyPr rtlCol="0" anchor="ctr"/>
+              <a:lstStyle/>
+              <a:p>
+                <a:pPr algn="ctr"/>
+                <a:endParaRPr lang="en-US">
+                  <a:ln w="38100" cmpd="sng">
+                    <a:solidFill>
+                      <a:srgbClr val="000000"/>
+                    </a:solidFill>
+                  </a:ln>
+                </a:endParaRPr>
+              </a:p>
+            </p:txBody>
+          </p:sp>
+        </p:grpSp>
+        <p:grpSp>
+          <p:nvGrpSpPr>
+            <p:cNvPr id="11" name="Grouper 10"/>
+            <p:cNvGrpSpPr/>
+            <p:nvPr/>
+          </p:nvGrpSpPr>
+          <p:grpSpPr>
+            <a:xfrm flipH="1">
+              <a:off x="6494949" y="6943137"/>
+              <a:ext cx="5001192" cy="5001190"/>
+              <a:chOff x="2759620" y="2052934"/>
+              <a:chExt cx="2735998" cy="2735997"/>
+            </a:xfrm>
+          </p:grpSpPr>
+          <p:sp>
+            <p:nvSpPr>
+              <p:cNvPr id="12" name="Arc 11"/>
+              <p:cNvSpPr/>
+              <p:nvPr/>
+            </p:nvSpPr>
+            <p:spPr>
+              <a:xfrm>
+                <a:off x="3119619" y="2340933"/>
+                <a:ext cx="2016000" cy="2159999"/>
+              </a:xfrm>
+              <a:prstGeom prst="arc">
+                <a:avLst>
+                  <a:gd name="adj1" fmla="val 17494394"/>
+                  <a:gd name="adj2" fmla="val 19010120"/>
+                </a:avLst>
+              </a:prstGeom>
+              <a:ln w="38100" cmpd="sng">
+                <a:solidFill>
+                  <a:schemeClr val="accent2"/>
+                </a:solidFill>
+              </a:ln>
+            </p:spPr>
+            <p:style>
+              <a:lnRef idx="2">
+                <a:schemeClr val="accent1"/>
+              </a:lnRef>
+              <a:fillRef idx="0">
+                <a:schemeClr val="accent1"/>
+              </a:fillRef>
+              <a:effectRef idx="1">
+                <a:schemeClr val="accent1"/>
+              </a:effectRef>
+              <a:fontRef idx="minor">
+                <a:schemeClr val="tx1"/>
+              </a:fontRef>
+            </p:style>
+            <p:txBody>
+              <a:bodyPr rtlCol="0" anchor="ctr"/>
+              <a:lstStyle/>
+              <a:p>
+                <a:pPr algn="ctr"/>
+                <a:endParaRPr lang="en-US"/>
+              </a:p>
+            </p:txBody>
+          </p:sp>
+          <p:sp>
+            <p:nvSpPr>
+              <p:cNvPr id="13" name="Arc 12"/>
+              <p:cNvSpPr>
+                <a:spLocks noChangeAspect="1"/>
+              </p:cNvSpPr>
+              <p:nvPr/>
+            </p:nvSpPr>
+            <p:spPr>
+              <a:xfrm>
+                <a:off x="2903620" y="2196933"/>
+                <a:ext cx="2447999" cy="2447998"/>
+              </a:xfrm>
+              <a:prstGeom prst="arc">
+                <a:avLst>
+                  <a:gd name="adj1" fmla="val 17258218"/>
+                  <a:gd name="adj2" fmla="val 19319877"/>
+                </a:avLst>
+              </a:prstGeom>
+              <a:ln w="38100" cmpd="sng">
+                <a:solidFill>
+                  <a:schemeClr val="accent2"/>
+                </a:solidFill>
+              </a:ln>
+            </p:spPr>
+            <p:style>
+              <a:lnRef idx="2">
+                <a:schemeClr val="accent1"/>
+              </a:lnRef>
+              <a:fillRef idx="0">
+                <a:schemeClr val="accent1"/>
+              </a:fillRef>
+              <a:effectRef idx="1">
+                <a:schemeClr val="accent1"/>
+              </a:effectRef>
+              <a:fontRef idx="minor">
+                <a:schemeClr val="tx1"/>
+              </a:fontRef>
+            </p:style>
+            <p:txBody>
+              <a:bodyPr rtlCol="0" anchor="ctr"/>
+              <a:lstStyle/>
+              <a:p>
+                <a:pPr algn="ctr"/>
+                <a:endParaRPr lang="en-US"/>
+              </a:p>
+            </p:txBody>
+          </p:sp>
+          <p:sp>
+            <p:nvSpPr>
+              <p:cNvPr id="14" name="Arc 13"/>
+              <p:cNvSpPr>
+                <a:spLocks noChangeAspect="1"/>
+              </p:cNvSpPr>
+              <p:nvPr/>
+            </p:nvSpPr>
+            <p:spPr>
+              <a:xfrm>
+                <a:off x="2759620" y="2052934"/>
+                <a:ext cx="2735998" cy="2735997"/>
+              </a:xfrm>
+              <a:prstGeom prst="arc">
+                <a:avLst>
+                  <a:gd name="adj1" fmla="val 17058860"/>
+                  <a:gd name="adj2" fmla="val 19569505"/>
+                </a:avLst>
+              </a:prstGeom>
+              <a:ln w="38100" cmpd="sng">
+                <a:solidFill>
+                  <a:schemeClr val="accent2"/>
+                </a:solidFill>
+              </a:ln>
+            </p:spPr>
+            <p:style>
+              <a:lnRef idx="2">
+                <a:schemeClr val="accent1"/>
+              </a:lnRef>
+              <a:fillRef idx="0">
+                <a:schemeClr val="accent1"/>
+              </a:fillRef>
+              <a:effectRef idx="1">
+                <a:schemeClr val="accent1"/>
+              </a:effectRef>
+              <a:fontRef idx="minor">
+                <a:schemeClr val="tx1"/>
+              </a:fontRef>
+            </p:style>
+            <p:txBody>
+              <a:bodyPr rtlCol="0" anchor="ctr"/>
+              <a:lstStyle/>
+              <a:p>
+                <a:pPr algn="ctr"/>
+                <a:endParaRPr lang="en-US">
+                  <a:ln w="38100" cmpd="sng">
+                    <a:solidFill>
+                      <a:srgbClr val="000000"/>
+                    </a:solidFill>
+                  </a:ln>
+                </a:endParaRPr>
+              </a:p>
+            </p:txBody>
+          </p:sp>
+        </p:grpSp>
+      </p:grpSp>
+    </p:spTree>
+    <p:extLst>
+      <p:ext uri="{BB962C8B-B14F-4D97-AF65-F5344CB8AC3E}">
+        <p14:creationId xmlns:p14="http://schemas.microsoft.com/office/powerpoint/2010/main" val="193441351"/>
+      </p:ext>
+    </p:extLst>
+  </p:cSld>
+  <p:clrMapOvr>
+    <a:masterClrMapping/>
+  </p:clrMapOvr>
+</p:sld>
+</file>
+
+<file path=ppt/slides/slide7.xml><?xml version="1.0" encoding="utf-8"?>
+<p:sld xmlns:a="http://schemas.openxmlformats.org/drawingml/2006/main" xmlns:r="http://schemas.openxmlformats.org/officeDocument/2006/relationships" xmlns:p="http://schemas.openxmlformats.org/presentationml/2006/main">
+  <p:cSld>
+    <p:spTree>
+      <p:nvGrpSpPr>
+        <p:cNvPr id="1" name=""/>
+        <p:cNvGrpSpPr/>
+        <p:nvPr/>
+      </p:nvGrpSpPr>
+      <p:grpSpPr>
+        <a:xfrm>
+          <a:off x="0" y="0"/>
+          <a:ext cx="0" cy="0"/>
+          <a:chOff x="0" y="0"/>
+          <a:chExt cx="0" cy="0"/>
+        </a:xfrm>
+      </p:grpSpPr>
+      <p:sp>
+        <p:nvSpPr>
+          <p:cNvPr id="5" name="Bouée 4"/>
+          <p:cNvSpPr>
+            <a:spLocks noChangeAspect="1"/>
+          </p:cNvSpPr>
+          <p:nvPr/>
+        </p:nvSpPr>
+        <p:spPr>
+          <a:xfrm>
+            <a:off x="1614253" y="1610484"/>
+            <a:ext cx="15228000" cy="15228000"/>
+          </a:xfrm>
+          <a:prstGeom prst="donut">
+            <a:avLst>
+              <a:gd name="adj" fmla="val 30982"/>
+            </a:avLst>
+          </a:prstGeom>
+          <a:solidFill>
+            <a:schemeClr val="bg1"/>
+          </a:solidFill>
+          <a:ln w="76200" cmpd="sng">
+            <a:noFill/>
+          </a:ln>
+        </p:spPr>
+        <p:style>
+          <a:lnRef idx="1">
+            <a:schemeClr val="accent1"/>
+          </a:lnRef>
+          <a:fillRef idx="3">
+            <a:schemeClr val="accent1"/>
+          </a:fillRef>
+          <a:effectRef idx="2">
+            <a:schemeClr val="accent1"/>
+          </a:effectRef>
+          <a:fontRef idx="minor">
+            <a:schemeClr val="lt1"/>
+          </a:fontRef>
+        </p:style>
+        <p:txBody>
+          <a:bodyPr rtlCol="0" anchor="ctr"/>
+          <a:lstStyle/>
+          <a:p>
+            <a:pPr algn="ctr"/>
+            <a:endParaRPr lang="en-US">
+              <a:solidFill>
+                <a:schemeClr val="tx1"/>
+              </a:solidFill>
+            </a:endParaRPr>
+          </a:p>
+        </p:txBody>
+      </p:sp>
+      <p:sp>
+        <p:nvSpPr>
+          <p:cNvPr id="2" name="Rectangle 1"/>
+          <p:cNvSpPr>
+            <a:spLocks noChangeAspect="1"/>
+          </p:cNvSpPr>
+          <p:nvPr/>
+        </p:nvSpPr>
+        <p:spPr>
+          <a:xfrm rot="16200000">
+            <a:off x="3277028" y="3277028"/>
+            <a:ext cx="11879995" cy="11879995"/>
+          </a:xfrm>
+          <a:prstGeom prst="rect">
+            <a:avLst/>
+          </a:prstGeom>
+          <a:noFill/>
+        </p:spPr>
+        <p:txBody>
+          <a:bodyPr wrap="none" lIns="210669" tIns="105334" rIns="210669" bIns="105334">
+            <a:prstTxWarp prst="textCircle">
+              <a:avLst>
+                <a:gd name="adj" fmla="val 10946467"/>
+              </a:avLst>
+            </a:prstTxWarp>
+            <a:spAutoFit/>
+          </a:bodyPr>
+          <a:lstStyle/>
+          <a:p>
+            <a:pPr algn="ctr"/>
+            <a:r>
+              <a:rPr lang="en-US" sz="23900" b="1" cap="small" spc="600" dirty="0" smtClean="0">
+                <a:ln w="12700">
+                  <a:solidFill>
+                    <a:srgbClr val="FFFFFF"/>
+                  </a:solidFill>
+                  <a:prstDash val="solid"/>
+                </a:ln>
+                <a:solidFill>
+                  <a:schemeClr val="accent2"/>
+                </a:solidFill>
+              </a:rPr>
+              <a:t>Time </a:t>
+            </a:r>
+            <a:r>
+              <a:rPr lang="en-US" sz="23900" b="1" cap="small" spc="600" dirty="0" smtClean="0">
+                <a:ln w="12700">
+                  <a:solidFill>
+                    <a:srgbClr val="FFFFFF"/>
+                  </a:solidFill>
+                  <a:prstDash val="solid"/>
+                </a:ln>
+                <a:solidFill>
+                  <a:schemeClr val="accent2"/>
+                </a:solidFill>
+              </a:rPr>
+              <a:t>to tilt head</a:t>
+            </a:r>
+            <a:r>
+              <a:rPr lang="en-US" sz="23900" b="1" cap="small" spc="600" dirty="0" smtClean="0">
+                <a:ln w="12700">
+                  <a:solidFill>
+                    <a:srgbClr val="FFFFFF"/>
+                  </a:solidFill>
+                  <a:prstDash val="solid"/>
+                </a:ln>
+                <a:solidFill>
+                  <a:schemeClr val="accent2"/>
+                </a:solidFill>
+              </a:rPr>
+              <a:t> </a:t>
+            </a:r>
+            <a:r>
+              <a:rPr lang="en-US" sz="23900" b="1" cap="small" spc="600" dirty="0" smtClean="0">
+                <a:ln w="12700">
+                  <a:solidFill>
+                    <a:srgbClr val="FFFFFF"/>
+                  </a:solidFill>
+                  <a:prstDash val="solid"/>
+                </a:ln>
+                <a:solidFill>
+                  <a:schemeClr val="accent2"/>
+                </a:solidFill>
+              </a:rPr>
+              <a:t>exceeded.</a:t>
+            </a:r>
+            <a:endParaRPr lang="en-US" sz="23900" b="1" cap="small" spc="600" dirty="0">
+              <a:ln w="12700">
+                <a:solidFill>
+                  <a:srgbClr val="FFFFFF"/>
+                </a:solidFill>
+                <a:prstDash val="solid"/>
+              </a:ln>
+              <a:solidFill>
+                <a:schemeClr val="accent2"/>
+              </a:solidFill>
+            </a:endParaRPr>
+          </a:p>
+        </p:txBody>
+      </p:sp>
+      <p:sp>
+        <p:nvSpPr>
+          <p:cNvPr id="3" name="Rectangle 2"/>
+          <p:cNvSpPr>
+            <a:spLocks noChangeAspect="1"/>
+          </p:cNvSpPr>
+          <p:nvPr/>
+        </p:nvSpPr>
+        <p:spPr>
+          <a:xfrm rot="16200000">
+            <a:off x="5257022" y="5257026"/>
+            <a:ext cx="7920006" cy="7919999"/>
+          </a:xfrm>
+          <a:prstGeom prst="rect">
+            <a:avLst/>
+          </a:prstGeom>
+          <a:noFill/>
+        </p:spPr>
+        <p:txBody>
+          <a:bodyPr wrap="none" lIns="210669" tIns="105334" rIns="210669" bIns="105334">
+            <a:prstTxWarp prst="textCircle">
+              <a:avLst>
+                <a:gd name="adj" fmla="val 10916975"/>
+              </a:avLst>
+            </a:prstTxWarp>
+            <a:spAutoFit/>
+          </a:bodyPr>
+          <a:lstStyle/>
+          <a:p>
+            <a:pPr algn="ctr"/>
+            <a:r>
+              <a:rPr lang="en-US" sz="13800" b="1" cap="small" spc="300" dirty="0" smtClean="0">
+                <a:ln w="12700">
+                  <a:noFill/>
+                  <a:prstDash val="solid"/>
+                </a:ln>
+                <a:solidFill>
+                  <a:schemeClr val="accent1"/>
+                </a:solidFill>
+                <a:effectLst>
+                  <a:outerShdw blurRad="41275" dist="20320" dir="1800000" algn="tl" rotWithShape="0">
+                    <a:srgbClr val="000000">
+                      <a:alpha val="40000"/>
+                    </a:srgbClr>
+                  </a:outerShdw>
+                </a:effectLst>
+              </a:rPr>
+              <a:t> Press </a:t>
+            </a:r>
+            <a:r>
+              <a:rPr lang="en-US" sz="13800" b="1" cap="small" spc="300" dirty="0">
+                <a:ln w="12700">
+                  <a:noFill/>
+                  <a:prstDash val="solid"/>
+                </a:ln>
+                <a:solidFill>
+                  <a:schemeClr val="accent1"/>
+                </a:solidFill>
+                <a:effectLst>
+                  <a:outerShdw blurRad="41275" dist="20320" dir="1800000" algn="tl" rotWithShape="0">
+                    <a:srgbClr val="000000">
+                      <a:alpha val="40000"/>
+                    </a:srgbClr>
+                  </a:outerShdw>
+                </a:effectLst>
+              </a:rPr>
+              <a:t>a button to continue</a:t>
+            </a:r>
+            <a:r>
+              <a:rPr lang="en-US" sz="13800" b="1" cap="small" spc="300" dirty="0" smtClean="0">
+                <a:ln w="12700">
+                  <a:noFill/>
+                  <a:prstDash val="solid"/>
+                </a:ln>
+                <a:solidFill>
+                  <a:schemeClr val="accent1"/>
+                </a:solidFill>
+                <a:effectLst>
+                  <a:outerShdw blurRad="41275" dist="20320" dir="1800000" algn="tl" rotWithShape="0">
+                    <a:srgbClr val="000000">
+                      <a:alpha val="40000"/>
+                    </a:srgbClr>
+                  </a:outerShdw>
+                </a:effectLst>
+              </a:rPr>
+              <a:t>.</a:t>
+            </a:r>
+            <a:endParaRPr lang="en-US" sz="13800" b="1" cap="small" spc="300" dirty="0">
+              <a:ln w="12700">
+                <a:noFill/>
+                <a:prstDash val="solid"/>
+              </a:ln>
+              <a:solidFill>
+                <a:schemeClr val="accent1"/>
+              </a:solidFill>
+              <a:effectLst>
+                <a:outerShdw blurRad="41275" dist="20320" dir="1800000" algn="tl" rotWithShape="0">
+                  <a:srgbClr val="000000">
+                    <a:alpha val="40000"/>
+                  </a:srgbClr>
+                </a:outerShdw>
+              </a:effectLst>
+            </a:endParaRPr>
+          </a:p>
+        </p:txBody>
+      </p:sp>
+      <p:grpSp>
+        <p:nvGrpSpPr>
+          <p:cNvPr id="6" name="Grouper 5"/>
+          <p:cNvGrpSpPr/>
+          <p:nvPr/>
+        </p:nvGrpSpPr>
+        <p:grpSpPr>
+          <a:xfrm>
+            <a:off x="6758168" y="6943137"/>
+            <a:ext cx="5001192" cy="5044481"/>
+            <a:chOff x="6494949" y="6943137"/>
+            <a:chExt cx="5001192" cy="5044481"/>
+          </a:xfrm>
+        </p:grpSpPr>
+        <p:sp>
+          <p:nvSpPr>
+            <p:cNvPr id="7" name="Ellipse 6"/>
+            <p:cNvSpPr>
+              <a:spLocks noChangeAspect="1"/>
+            </p:cNvSpPr>
+            <p:nvPr/>
+          </p:nvSpPr>
+          <p:spPr>
+            <a:xfrm>
+              <a:off x="7350417" y="7841894"/>
+              <a:ext cx="3290257" cy="3290257"/>
+            </a:xfrm>
+            <a:prstGeom prst="ellipse">
+              <a:avLst/>
+            </a:prstGeom>
+            <a:ln>
+              <a:solidFill>
+                <a:schemeClr val="accent2"/>
+              </a:solidFill>
+            </a:ln>
+            <a:effectLst>
+              <a:outerShdw blurRad="76200" dir="18900000" sy="23000" kx="-1200000" algn="bl" rotWithShape="0">
+                <a:prstClr val="black">
+                  <a:alpha val="20000"/>
+                </a:prstClr>
+              </a:outerShdw>
+            </a:effectLst>
+          </p:spPr>
+          <p:style>
+            <a:lnRef idx="1">
+              <a:schemeClr val="accent1"/>
+            </a:lnRef>
+            <a:fillRef idx="3">
+              <a:schemeClr val="accent1"/>
+            </a:fillRef>
+            <a:effectRef idx="2">
+              <a:schemeClr val="accent1"/>
+            </a:effectRef>
+            <a:fontRef idx="minor">
+              <a:schemeClr val="lt1"/>
+            </a:fontRef>
+          </p:style>
+          <p:txBody>
+            <a:bodyPr rtlCol="0" anchor="ctr"/>
+            <a:lstStyle/>
+            <a:p>
+              <a:pPr algn="ctr"/>
+              <a:endParaRPr lang="en-US"/>
+            </a:p>
+          </p:txBody>
+        </p:sp>
+        <p:sp>
+          <p:nvSpPr>
+            <p:cNvPr id="8" name="Secteurs 7"/>
+            <p:cNvSpPr>
+              <a:spLocks noChangeAspect="1"/>
+            </p:cNvSpPr>
+            <p:nvPr/>
+          </p:nvSpPr>
+          <p:spPr>
+            <a:xfrm>
+              <a:off x="7371136" y="7841899"/>
+              <a:ext cx="3248819" cy="3290246"/>
+            </a:xfrm>
+            <a:prstGeom prst="pie">
+              <a:avLst>
+                <a:gd name="adj1" fmla="val 17697688"/>
+                <a:gd name="adj2" fmla="val 16200000"/>
+              </a:avLst>
+            </a:prstGeom>
+            <a:solidFill>
+              <a:srgbClr val="FFFFFF"/>
+            </a:solidFill>
+            <a:ln>
+              <a:solidFill>
+                <a:schemeClr val="accent2"/>
+              </a:solidFill>
+            </a:ln>
+          </p:spPr>
+          <p:style>
+            <a:lnRef idx="1">
+              <a:schemeClr val="accent1"/>
+            </a:lnRef>
+            <a:fillRef idx="3">
+              <a:schemeClr val="accent1"/>
+            </a:fillRef>
+            <a:effectRef idx="2">
+              <a:schemeClr val="accent1"/>
+            </a:effectRef>
+            <a:fontRef idx="minor">
+              <a:schemeClr val="lt1"/>
+            </a:fontRef>
+          </p:style>
+          <p:txBody>
+            <a:bodyPr rtlCol="0" anchor="ctr"/>
+            <a:lstStyle/>
+            <a:p>
+              <a:pPr algn="ctr"/>
+              <a:endParaRPr lang="en-US">
+                <a:solidFill>
+                  <a:schemeClr val="tx1"/>
+                </a:solidFill>
+              </a:endParaRPr>
+            </a:p>
+          </p:txBody>
+        </p:sp>
+        <p:cxnSp>
+          <p:nvCxnSpPr>
+            <p:cNvPr id="9" name="Connecteur droit avec flèche 8"/>
+            <p:cNvCxnSpPr>
+              <a:endCxn id="7" idx="0"/>
+            </p:cNvCxnSpPr>
+            <p:nvPr/>
+          </p:nvCxnSpPr>
+          <p:spPr>
+            <a:xfrm flipV="1">
+              <a:off x="8995545" y="7841894"/>
+              <a:ext cx="0" cy="1601840"/>
+            </a:xfrm>
+            <a:prstGeom prst="straightConnector1">
+              <a:avLst/>
+            </a:prstGeom>
+            <a:ln w="57150" cmpd="sng">
+              <a:solidFill>
+                <a:schemeClr val="accent2"/>
+              </a:solidFill>
+              <a:tailEnd type="arrow"/>
+            </a:ln>
+          </p:spPr>
+          <p:style>
+            <a:lnRef idx="2">
+              <a:schemeClr val="accent1"/>
+            </a:lnRef>
+            <a:fillRef idx="0">
+              <a:schemeClr val="accent1"/>
+            </a:fillRef>
+            <a:effectRef idx="1">
+              <a:schemeClr val="accent1"/>
+            </a:effectRef>
+            <a:fontRef idx="minor">
+              <a:schemeClr val="tx1"/>
+            </a:fontRef>
+          </p:style>
+        </p:cxnSp>
+        <p:grpSp>
+          <p:nvGrpSpPr>
+            <p:cNvPr id="10" name="Grouper 9"/>
+            <p:cNvGrpSpPr/>
+            <p:nvPr/>
+          </p:nvGrpSpPr>
+          <p:grpSpPr>
+            <a:xfrm>
+              <a:off x="6494949" y="6986428"/>
+              <a:ext cx="5001192" cy="5001190"/>
+              <a:chOff x="2759620" y="2052934"/>
+              <a:chExt cx="2735998" cy="2735997"/>
+            </a:xfrm>
+          </p:grpSpPr>
+          <p:sp>
+            <p:nvSpPr>
+              <p:cNvPr id="15" name="Arc 14"/>
+              <p:cNvSpPr/>
+              <p:nvPr/>
+            </p:nvSpPr>
+            <p:spPr>
+              <a:xfrm>
+                <a:off x="3119619" y="2340933"/>
+                <a:ext cx="2016000" cy="2159999"/>
+              </a:xfrm>
+              <a:prstGeom prst="arc">
+                <a:avLst>
+                  <a:gd name="adj1" fmla="val 17494394"/>
+                  <a:gd name="adj2" fmla="val 19010120"/>
+                </a:avLst>
+              </a:prstGeom>
+              <a:ln w="38100" cmpd="sng">
+                <a:solidFill>
+                  <a:schemeClr val="accent2"/>
+                </a:solidFill>
+              </a:ln>
+            </p:spPr>
+            <p:style>
+              <a:lnRef idx="2">
+                <a:schemeClr val="accent1"/>
+              </a:lnRef>
+              <a:fillRef idx="0">
+                <a:schemeClr val="accent1"/>
+              </a:fillRef>
+              <a:effectRef idx="1">
+                <a:schemeClr val="accent1"/>
+              </a:effectRef>
+              <a:fontRef idx="minor">
+                <a:schemeClr val="tx1"/>
+              </a:fontRef>
+            </p:style>
+            <p:txBody>
+              <a:bodyPr rtlCol="0" anchor="ctr"/>
+              <a:lstStyle/>
+              <a:p>
+                <a:pPr algn="ctr"/>
+                <a:endParaRPr lang="en-US"/>
+              </a:p>
+            </p:txBody>
+          </p:sp>
+          <p:sp>
+            <p:nvSpPr>
+              <p:cNvPr id="16" name="Arc 15"/>
+              <p:cNvSpPr>
+                <a:spLocks noChangeAspect="1"/>
+              </p:cNvSpPr>
+              <p:nvPr/>
+            </p:nvSpPr>
+            <p:spPr>
+              <a:xfrm>
+                <a:off x="2903620" y="2196933"/>
+                <a:ext cx="2447999" cy="2447998"/>
+              </a:xfrm>
+              <a:prstGeom prst="arc">
+                <a:avLst>
+                  <a:gd name="adj1" fmla="val 17258218"/>
+                  <a:gd name="adj2" fmla="val 19319877"/>
+                </a:avLst>
+              </a:prstGeom>
+              <a:ln w="38100" cmpd="sng">
+                <a:solidFill>
+                  <a:schemeClr val="accent2"/>
+                </a:solidFill>
+              </a:ln>
+            </p:spPr>
+            <p:style>
+              <a:lnRef idx="2">
+                <a:schemeClr val="accent1"/>
+              </a:lnRef>
+              <a:fillRef idx="0">
+                <a:schemeClr val="accent1"/>
+              </a:fillRef>
+              <a:effectRef idx="1">
+                <a:schemeClr val="accent1"/>
+              </a:effectRef>
+              <a:fontRef idx="minor">
+                <a:schemeClr val="tx1"/>
+              </a:fontRef>
+            </p:style>
+            <p:txBody>
+              <a:bodyPr rtlCol="0" anchor="ctr"/>
+              <a:lstStyle/>
+              <a:p>
+                <a:pPr algn="ctr"/>
+                <a:endParaRPr lang="en-US"/>
+              </a:p>
+            </p:txBody>
+          </p:sp>
+          <p:sp>
+            <p:nvSpPr>
+              <p:cNvPr id="17" name="Arc 16"/>
+              <p:cNvSpPr>
+                <a:spLocks noChangeAspect="1"/>
+              </p:cNvSpPr>
+              <p:nvPr/>
+            </p:nvSpPr>
+            <p:spPr>
+              <a:xfrm>
+                <a:off x="2759620" y="2052934"/>
+                <a:ext cx="2735998" cy="2735997"/>
+              </a:xfrm>
+              <a:prstGeom prst="arc">
+                <a:avLst>
+                  <a:gd name="adj1" fmla="val 17058860"/>
+                  <a:gd name="adj2" fmla="val 19569505"/>
+                </a:avLst>
+              </a:prstGeom>
+              <a:ln w="38100" cmpd="sng">
+                <a:solidFill>
+                  <a:schemeClr val="accent2"/>
+                </a:solidFill>
+              </a:ln>
+            </p:spPr>
+            <p:style>
+              <a:lnRef idx="2">
+                <a:schemeClr val="accent1"/>
+              </a:lnRef>
+              <a:fillRef idx="0">
+                <a:schemeClr val="accent1"/>
+              </a:fillRef>
+              <a:effectRef idx="1">
+                <a:schemeClr val="accent1"/>
+              </a:effectRef>
+              <a:fontRef idx="minor">
+                <a:schemeClr val="tx1"/>
+              </a:fontRef>
+            </p:style>
+            <p:txBody>
+              <a:bodyPr rtlCol="0" anchor="ctr"/>
+              <a:lstStyle/>
+              <a:p>
+                <a:pPr algn="ctr"/>
+                <a:endParaRPr lang="en-US">
+                  <a:ln w="38100" cmpd="sng">
+                    <a:solidFill>
+                      <a:srgbClr val="000000"/>
+                    </a:solidFill>
+                  </a:ln>
+                </a:endParaRPr>
+              </a:p>
+            </p:txBody>
+          </p:sp>
+        </p:grpSp>
+        <p:grpSp>
+          <p:nvGrpSpPr>
+            <p:cNvPr id="11" name="Grouper 10"/>
+            <p:cNvGrpSpPr/>
+            <p:nvPr/>
+          </p:nvGrpSpPr>
+          <p:grpSpPr>
+            <a:xfrm flipH="1">
+              <a:off x="6494949" y="6943137"/>
+              <a:ext cx="5001192" cy="5001190"/>
+              <a:chOff x="2759620" y="2052934"/>
+              <a:chExt cx="2735998" cy="2735997"/>
+            </a:xfrm>
+          </p:grpSpPr>
+          <p:sp>
+            <p:nvSpPr>
+              <p:cNvPr id="12" name="Arc 11"/>
+              <p:cNvSpPr/>
+              <p:nvPr/>
+            </p:nvSpPr>
+            <p:spPr>
+              <a:xfrm>
+                <a:off x="3119619" y="2340933"/>
+                <a:ext cx="2016000" cy="2159999"/>
+              </a:xfrm>
+              <a:prstGeom prst="arc">
+                <a:avLst>
+                  <a:gd name="adj1" fmla="val 17494394"/>
+                  <a:gd name="adj2" fmla="val 19010120"/>
+                </a:avLst>
+              </a:prstGeom>
+              <a:ln w="38100" cmpd="sng">
+                <a:solidFill>
+                  <a:schemeClr val="accent2"/>
+                </a:solidFill>
+              </a:ln>
+            </p:spPr>
+            <p:style>
+              <a:lnRef idx="2">
+                <a:schemeClr val="accent1"/>
+              </a:lnRef>
+              <a:fillRef idx="0">
+                <a:schemeClr val="accent1"/>
+              </a:fillRef>
+              <a:effectRef idx="1">
+                <a:schemeClr val="accent1"/>
+              </a:effectRef>
+              <a:fontRef idx="minor">
+                <a:schemeClr val="tx1"/>
+              </a:fontRef>
+            </p:style>
+            <p:txBody>
+              <a:bodyPr rtlCol="0" anchor="ctr"/>
+              <a:lstStyle/>
+              <a:p>
+                <a:pPr algn="ctr"/>
+                <a:endParaRPr lang="en-US"/>
+              </a:p>
+            </p:txBody>
+          </p:sp>
+          <p:sp>
+            <p:nvSpPr>
+              <p:cNvPr id="13" name="Arc 12"/>
+              <p:cNvSpPr>
+                <a:spLocks noChangeAspect="1"/>
+              </p:cNvSpPr>
+              <p:nvPr/>
+            </p:nvSpPr>
+            <p:spPr>
+              <a:xfrm>
+                <a:off x="2903620" y="2196933"/>
+                <a:ext cx="2447999" cy="2447998"/>
+              </a:xfrm>
+              <a:prstGeom prst="arc">
+                <a:avLst>
+                  <a:gd name="adj1" fmla="val 17258218"/>
+                  <a:gd name="adj2" fmla="val 19319877"/>
+                </a:avLst>
+              </a:prstGeom>
+              <a:ln w="38100" cmpd="sng">
+                <a:solidFill>
+                  <a:schemeClr val="accent2"/>
+                </a:solidFill>
+              </a:ln>
+            </p:spPr>
+            <p:style>
+              <a:lnRef idx="2">
+                <a:schemeClr val="accent1"/>
+              </a:lnRef>
+              <a:fillRef idx="0">
+                <a:schemeClr val="accent1"/>
+              </a:fillRef>
+              <a:effectRef idx="1">
+                <a:schemeClr val="accent1"/>
+              </a:effectRef>
+              <a:fontRef idx="minor">
+                <a:schemeClr val="tx1"/>
+              </a:fontRef>
+            </p:style>
+            <p:txBody>
+              <a:bodyPr rtlCol="0" anchor="ctr"/>
+              <a:lstStyle/>
+              <a:p>
+                <a:pPr algn="ctr"/>
+                <a:endParaRPr lang="en-US"/>
+              </a:p>
+            </p:txBody>
+          </p:sp>
+          <p:sp>
+            <p:nvSpPr>
+              <p:cNvPr id="14" name="Arc 13"/>
+              <p:cNvSpPr>
+                <a:spLocks noChangeAspect="1"/>
+              </p:cNvSpPr>
+              <p:nvPr/>
+            </p:nvSpPr>
+            <p:spPr>
+              <a:xfrm>
+                <a:off x="2759620" y="2052934"/>
+                <a:ext cx="2735998" cy="2735997"/>
+              </a:xfrm>
+              <a:prstGeom prst="arc">
+                <a:avLst>
+                  <a:gd name="adj1" fmla="val 17058860"/>
+                  <a:gd name="adj2" fmla="val 19569505"/>
+                </a:avLst>
+              </a:prstGeom>
+              <a:ln w="38100" cmpd="sng">
+                <a:solidFill>
+                  <a:schemeClr val="accent2"/>
+                </a:solidFill>
+              </a:ln>
+            </p:spPr>
+            <p:style>
+              <a:lnRef idx="2">
+                <a:schemeClr val="accent1"/>
+              </a:lnRef>
+              <a:fillRef idx="0">
+                <a:schemeClr val="accent1"/>
+              </a:fillRef>
+              <a:effectRef idx="1">
+                <a:schemeClr val="accent1"/>
+              </a:effectRef>
+              <a:fontRef idx="minor">
+                <a:schemeClr val="tx1"/>
+              </a:fontRef>
+            </p:style>
+            <p:txBody>
+              <a:bodyPr rtlCol="0" anchor="ctr"/>
+              <a:lstStyle/>
+              <a:p>
+                <a:pPr algn="ctr"/>
+                <a:endParaRPr lang="en-US">
+                  <a:ln w="38100" cmpd="sng">
+                    <a:solidFill>
+                      <a:srgbClr val="000000"/>
+                    </a:solidFill>
+                  </a:ln>
+                </a:endParaRPr>
+              </a:p>
+            </p:txBody>
+          </p:sp>
+        </p:grpSp>
+      </p:grpSp>
+    </p:spTree>
+    <p:extLst>
+      <p:ext uri="{BB962C8B-B14F-4D97-AF65-F5344CB8AC3E}">
+        <p14:creationId xmlns:p14="http://schemas.microsoft.com/office/powerpoint/2010/main" val="1908434010"/>
+      </p:ext>
+    </p:extLst>
+  </p:cSld>
+  <p:clrMapOvr>
+    <a:masterClrMapping/>
+  </p:clrMapOvr>
+</p:sld>
+</file>
+
+<file path=ppt/slides/slide8.xml><?xml version="1.0" encoding="utf-8"?>
+<p:sld xmlns:a="http://schemas.openxmlformats.org/drawingml/2006/main" xmlns:r="http://schemas.openxmlformats.org/officeDocument/2006/relationships" xmlns:p="http://schemas.openxmlformats.org/presentationml/2006/main">
+  <p:cSld>
+    <p:spTree>
+      <p:nvGrpSpPr>
+        <p:cNvPr id="1" name=""/>
+        <p:cNvGrpSpPr/>
+        <p:nvPr/>
+      </p:nvGrpSpPr>
+      <p:grpSpPr>
+        <a:xfrm>
+          <a:off x="0" y="0"/>
+          <a:ext cx="0" cy="0"/>
+          <a:chOff x="0" y="0"/>
+          <a:chExt cx="0" cy="0"/>
+        </a:xfrm>
+      </p:grpSpPr>
+      <p:sp>
+        <p:nvSpPr>
+          <p:cNvPr id="5" name="Bouée 4"/>
+          <p:cNvSpPr>
+            <a:spLocks noChangeAspect="1"/>
+          </p:cNvSpPr>
+          <p:nvPr/>
+        </p:nvSpPr>
+        <p:spPr>
+          <a:xfrm>
+            <a:off x="1614253" y="1610484"/>
+            <a:ext cx="15228000" cy="15228000"/>
+          </a:xfrm>
+          <a:prstGeom prst="donut">
+            <a:avLst>
+              <a:gd name="adj" fmla="val 30982"/>
+            </a:avLst>
+          </a:prstGeom>
+          <a:solidFill>
+            <a:schemeClr val="bg1"/>
+          </a:solidFill>
+          <a:ln w="76200" cmpd="sng">
+            <a:noFill/>
+          </a:ln>
+        </p:spPr>
+        <p:style>
+          <a:lnRef idx="1">
+            <a:schemeClr val="accent1"/>
+          </a:lnRef>
+          <a:fillRef idx="3">
+            <a:schemeClr val="accent1"/>
+          </a:fillRef>
+          <a:effectRef idx="2">
+            <a:schemeClr val="accent1"/>
+          </a:effectRef>
+          <a:fontRef idx="minor">
+            <a:schemeClr val="lt1"/>
+          </a:fontRef>
+        </p:style>
+        <p:txBody>
+          <a:bodyPr rtlCol="0" anchor="ctr"/>
+          <a:lstStyle/>
+          <a:p>
+            <a:pPr algn="ctr"/>
+            <a:endParaRPr lang="en-US">
+              <a:solidFill>
+                <a:schemeClr val="tx1"/>
+              </a:solidFill>
+            </a:endParaRPr>
+          </a:p>
+        </p:txBody>
+      </p:sp>
+      <p:sp>
+        <p:nvSpPr>
+          <p:cNvPr id="2" name="Rectangle 1"/>
+          <p:cNvSpPr>
+            <a:spLocks noChangeAspect="1"/>
+          </p:cNvSpPr>
+          <p:nvPr/>
+        </p:nvSpPr>
+        <p:spPr>
+          <a:xfrm rot="16200000">
+            <a:off x="3277028" y="3277028"/>
+            <a:ext cx="11879995" cy="11879995"/>
+          </a:xfrm>
+          <a:prstGeom prst="rect">
+            <a:avLst/>
+          </a:prstGeom>
+          <a:noFill/>
+        </p:spPr>
+        <p:txBody>
+          <a:bodyPr wrap="none" lIns="210669" tIns="105334" rIns="210669" bIns="105334">
+            <a:prstTxWarp prst="textCircle">
+              <a:avLst>
+                <a:gd name="adj" fmla="val 10946467"/>
+              </a:avLst>
+            </a:prstTxWarp>
+            <a:spAutoFit/>
+          </a:bodyPr>
+          <a:lstStyle/>
+          <a:p>
+            <a:pPr algn="ctr"/>
+            <a:r>
+              <a:rPr lang="en-US" sz="23900" b="1" cap="small" spc="600" dirty="0" smtClean="0">
+                <a:ln w="12700">
+                  <a:solidFill>
+                    <a:srgbClr val="FFFFFF"/>
+                  </a:solidFill>
+                  <a:prstDash val="solid"/>
+                </a:ln>
+                <a:solidFill>
+                  <a:schemeClr val="accent2"/>
+                </a:solidFill>
+              </a:rPr>
+              <a:t>Time </a:t>
+            </a:r>
+            <a:r>
+              <a:rPr lang="en-US" sz="23900" b="1" cap="small" spc="600" dirty="0" smtClean="0">
+                <a:ln w="12700">
+                  <a:solidFill>
+                    <a:srgbClr val="FFFFFF"/>
+                  </a:solidFill>
+                  <a:prstDash val="solid"/>
+                </a:ln>
+                <a:solidFill>
+                  <a:schemeClr val="accent2"/>
+                </a:solidFill>
+              </a:rPr>
+              <a:t>to respond exceeded</a:t>
+            </a:r>
+            <a:r>
+              <a:rPr lang="en-US" sz="23900" b="1" cap="small" spc="600" dirty="0" smtClean="0">
+                <a:ln w="12700">
+                  <a:solidFill>
+                    <a:srgbClr val="FFFFFF"/>
+                  </a:solidFill>
+                  <a:prstDash val="solid"/>
+                </a:ln>
+                <a:solidFill>
+                  <a:schemeClr val="accent2"/>
+                </a:solidFill>
+              </a:rPr>
+              <a:t>.</a:t>
+            </a:r>
+            <a:endParaRPr lang="en-US" sz="23900" b="1" cap="small" spc="600" dirty="0">
+              <a:ln w="12700">
+                <a:solidFill>
+                  <a:srgbClr val="FFFFFF"/>
+                </a:solidFill>
+                <a:prstDash val="solid"/>
+              </a:ln>
+              <a:solidFill>
+                <a:schemeClr val="accent2"/>
+              </a:solidFill>
+            </a:endParaRPr>
+          </a:p>
+        </p:txBody>
+      </p:sp>
+      <p:sp>
+        <p:nvSpPr>
+          <p:cNvPr id="3" name="Rectangle 2"/>
+          <p:cNvSpPr>
+            <a:spLocks noChangeAspect="1"/>
+          </p:cNvSpPr>
+          <p:nvPr/>
+        </p:nvSpPr>
+        <p:spPr>
+          <a:xfrm rot="16200000">
+            <a:off x="5257022" y="5257026"/>
+            <a:ext cx="7920006" cy="7919999"/>
+          </a:xfrm>
+          <a:prstGeom prst="rect">
+            <a:avLst/>
+          </a:prstGeom>
+          <a:noFill/>
+        </p:spPr>
+        <p:txBody>
+          <a:bodyPr wrap="none" lIns="210669" tIns="105334" rIns="210669" bIns="105334">
+            <a:prstTxWarp prst="textCircle">
+              <a:avLst>
+                <a:gd name="adj" fmla="val 10916975"/>
+              </a:avLst>
+            </a:prstTxWarp>
+            <a:spAutoFit/>
+          </a:bodyPr>
+          <a:lstStyle/>
+          <a:p>
+            <a:pPr algn="ctr"/>
+            <a:r>
+              <a:rPr lang="en-US" sz="13800" b="1" cap="small" spc="300" dirty="0" smtClean="0">
+                <a:ln w="12700">
+                  <a:noFill/>
+                  <a:prstDash val="solid"/>
+                </a:ln>
+                <a:solidFill>
+                  <a:schemeClr val="accent1"/>
+                </a:solidFill>
+                <a:effectLst>
+                  <a:outerShdw blurRad="41275" dist="20320" dir="1800000" algn="tl" rotWithShape="0">
+                    <a:srgbClr val="000000">
+                      <a:alpha val="40000"/>
+                    </a:srgbClr>
+                  </a:outerShdw>
+                </a:effectLst>
+              </a:rPr>
+              <a:t> Press </a:t>
+            </a:r>
+            <a:r>
+              <a:rPr lang="en-US" sz="13800" b="1" cap="small" spc="300" dirty="0">
+                <a:ln w="12700">
+                  <a:noFill/>
+                  <a:prstDash val="solid"/>
+                </a:ln>
+                <a:solidFill>
+                  <a:schemeClr val="accent1"/>
+                </a:solidFill>
+                <a:effectLst>
+                  <a:outerShdw blurRad="41275" dist="20320" dir="1800000" algn="tl" rotWithShape="0">
+                    <a:srgbClr val="000000">
+                      <a:alpha val="40000"/>
+                    </a:srgbClr>
+                  </a:outerShdw>
+                </a:effectLst>
+              </a:rPr>
+              <a:t>a button to continue</a:t>
+            </a:r>
+            <a:r>
+              <a:rPr lang="en-US" sz="13800" b="1" cap="small" spc="300" dirty="0" smtClean="0">
+                <a:ln w="12700">
+                  <a:noFill/>
+                  <a:prstDash val="solid"/>
+                </a:ln>
+                <a:solidFill>
+                  <a:schemeClr val="accent1"/>
+                </a:solidFill>
+                <a:effectLst>
+                  <a:outerShdw blurRad="41275" dist="20320" dir="1800000" algn="tl" rotWithShape="0">
+                    <a:srgbClr val="000000">
+                      <a:alpha val="40000"/>
+                    </a:srgbClr>
+                  </a:outerShdw>
+                </a:effectLst>
+              </a:rPr>
+              <a:t>.</a:t>
+            </a:r>
+            <a:endParaRPr lang="en-US" sz="13800" b="1" cap="small" spc="300" dirty="0">
+              <a:ln w="12700">
+                <a:noFill/>
+                <a:prstDash val="solid"/>
+              </a:ln>
+              <a:solidFill>
+                <a:schemeClr val="accent1"/>
+              </a:solidFill>
+              <a:effectLst>
+                <a:outerShdw blurRad="41275" dist="20320" dir="1800000" algn="tl" rotWithShape="0">
+                  <a:srgbClr val="000000">
+                    <a:alpha val="40000"/>
+                  </a:srgbClr>
+                </a:outerShdw>
+              </a:effectLst>
+            </a:endParaRPr>
+          </a:p>
+        </p:txBody>
+      </p:sp>
+      <p:grpSp>
+        <p:nvGrpSpPr>
+          <p:cNvPr id="6" name="Grouper 5"/>
+          <p:cNvGrpSpPr/>
+          <p:nvPr/>
+        </p:nvGrpSpPr>
+        <p:grpSpPr>
+          <a:xfrm>
+            <a:off x="6758168" y="6943137"/>
+            <a:ext cx="5001192" cy="5044481"/>
+            <a:chOff x="6494949" y="6943137"/>
+            <a:chExt cx="5001192" cy="5044481"/>
+          </a:xfrm>
+        </p:grpSpPr>
+        <p:sp>
+          <p:nvSpPr>
+            <p:cNvPr id="7" name="Ellipse 6"/>
+            <p:cNvSpPr>
+              <a:spLocks noChangeAspect="1"/>
+            </p:cNvSpPr>
+            <p:nvPr/>
+          </p:nvSpPr>
+          <p:spPr>
+            <a:xfrm>
+              <a:off x="7350417" y="7841894"/>
+              <a:ext cx="3290257" cy="3290257"/>
+            </a:xfrm>
+            <a:prstGeom prst="ellipse">
+              <a:avLst/>
+            </a:prstGeom>
+            <a:ln>
+              <a:solidFill>
+                <a:schemeClr val="accent2"/>
+              </a:solidFill>
+            </a:ln>
+            <a:effectLst>
+              <a:outerShdw blurRad="76200" dir="18900000" sy="23000" kx="-1200000" algn="bl" rotWithShape="0">
+                <a:prstClr val="black">
+                  <a:alpha val="20000"/>
+                </a:prstClr>
+              </a:outerShdw>
+            </a:effectLst>
+          </p:spPr>
+          <p:style>
+            <a:lnRef idx="1">
+              <a:schemeClr val="accent1"/>
+            </a:lnRef>
+            <a:fillRef idx="3">
+              <a:schemeClr val="accent1"/>
+            </a:fillRef>
+            <a:effectRef idx="2">
+              <a:schemeClr val="accent1"/>
+            </a:effectRef>
+            <a:fontRef idx="minor">
+              <a:schemeClr val="lt1"/>
+            </a:fontRef>
+          </p:style>
+          <p:txBody>
+            <a:bodyPr rtlCol="0" anchor="ctr"/>
+            <a:lstStyle/>
+            <a:p>
+              <a:pPr algn="ctr"/>
+              <a:endParaRPr lang="en-US"/>
+            </a:p>
+          </p:txBody>
+        </p:sp>
+        <p:sp>
+          <p:nvSpPr>
+            <p:cNvPr id="8" name="Secteurs 7"/>
+            <p:cNvSpPr>
+              <a:spLocks noChangeAspect="1"/>
+            </p:cNvSpPr>
+            <p:nvPr/>
+          </p:nvSpPr>
+          <p:spPr>
+            <a:xfrm>
+              <a:off x="7371136" y="7841899"/>
+              <a:ext cx="3248819" cy="3290246"/>
+            </a:xfrm>
+            <a:prstGeom prst="pie">
+              <a:avLst>
+                <a:gd name="adj1" fmla="val 17697688"/>
+                <a:gd name="adj2" fmla="val 16200000"/>
+              </a:avLst>
+            </a:prstGeom>
+            <a:solidFill>
+              <a:srgbClr val="FFFFFF"/>
+            </a:solidFill>
+            <a:ln>
+              <a:solidFill>
+                <a:schemeClr val="accent2"/>
+              </a:solidFill>
+            </a:ln>
+          </p:spPr>
+          <p:style>
+            <a:lnRef idx="1">
+              <a:schemeClr val="accent1"/>
+            </a:lnRef>
+            <a:fillRef idx="3">
+              <a:schemeClr val="accent1"/>
+            </a:fillRef>
+            <a:effectRef idx="2">
+              <a:schemeClr val="accent1"/>
+            </a:effectRef>
+            <a:fontRef idx="minor">
+              <a:schemeClr val="lt1"/>
+            </a:fontRef>
+          </p:style>
+          <p:txBody>
+            <a:bodyPr rtlCol="0" anchor="ctr"/>
+            <a:lstStyle/>
+            <a:p>
+              <a:pPr algn="ctr"/>
+              <a:endParaRPr lang="en-US">
+                <a:solidFill>
+                  <a:schemeClr val="tx1"/>
+                </a:solidFill>
+              </a:endParaRPr>
+            </a:p>
+          </p:txBody>
+        </p:sp>
+        <p:cxnSp>
+          <p:nvCxnSpPr>
+            <p:cNvPr id="9" name="Connecteur droit avec flèche 8"/>
+            <p:cNvCxnSpPr>
+              <a:endCxn id="7" idx="0"/>
+            </p:cNvCxnSpPr>
+            <p:nvPr/>
+          </p:nvCxnSpPr>
+          <p:spPr>
+            <a:xfrm flipV="1">
+              <a:off x="8995545" y="7841894"/>
+              <a:ext cx="0" cy="1601840"/>
+            </a:xfrm>
+            <a:prstGeom prst="straightConnector1">
+              <a:avLst/>
+            </a:prstGeom>
+            <a:ln w="57150" cmpd="sng">
+              <a:solidFill>
+                <a:schemeClr val="accent2"/>
+              </a:solidFill>
+              <a:tailEnd type="arrow"/>
+            </a:ln>
+          </p:spPr>
+          <p:style>
+            <a:lnRef idx="2">
+              <a:schemeClr val="accent1"/>
+            </a:lnRef>
+            <a:fillRef idx="0">
+              <a:schemeClr val="accent1"/>
+            </a:fillRef>
+            <a:effectRef idx="1">
+              <a:schemeClr val="accent1"/>
+            </a:effectRef>
+            <a:fontRef idx="minor">
+              <a:schemeClr val="tx1"/>
+            </a:fontRef>
+          </p:style>
+        </p:cxnSp>
+        <p:grpSp>
+          <p:nvGrpSpPr>
+            <p:cNvPr id="10" name="Grouper 9"/>
+            <p:cNvGrpSpPr/>
+            <p:nvPr/>
+          </p:nvGrpSpPr>
+          <p:grpSpPr>
+            <a:xfrm>
+              <a:off x="6494949" y="6986428"/>
+              <a:ext cx="5001192" cy="5001190"/>
+              <a:chOff x="2759620" y="2052934"/>
+              <a:chExt cx="2735998" cy="2735997"/>
+            </a:xfrm>
+          </p:grpSpPr>
+          <p:sp>
+            <p:nvSpPr>
+              <p:cNvPr id="15" name="Arc 14"/>
+              <p:cNvSpPr/>
+              <p:nvPr/>
+            </p:nvSpPr>
+            <p:spPr>
+              <a:xfrm>
+                <a:off x="3119619" y="2340933"/>
+                <a:ext cx="2016000" cy="2159999"/>
+              </a:xfrm>
+              <a:prstGeom prst="arc">
+                <a:avLst>
+                  <a:gd name="adj1" fmla="val 17494394"/>
+                  <a:gd name="adj2" fmla="val 19010120"/>
+                </a:avLst>
+              </a:prstGeom>
+              <a:ln w="38100" cmpd="sng">
+                <a:solidFill>
+                  <a:schemeClr val="accent2"/>
+                </a:solidFill>
+              </a:ln>
+            </p:spPr>
+            <p:style>
+              <a:lnRef idx="2">
+                <a:schemeClr val="accent1"/>
+              </a:lnRef>
+              <a:fillRef idx="0">
+                <a:schemeClr val="accent1"/>
+              </a:fillRef>
+              <a:effectRef idx="1">
+                <a:schemeClr val="accent1"/>
+              </a:effectRef>
+              <a:fontRef idx="minor">
+                <a:schemeClr val="tx1"/>
+              </a:fontRef>
+            </p:style>
+            <p:txBody>
+              <a:bodyPr rtlCol="0" anchor="ctr"/>
+              <a:lstStyle/>
+              <a:p>
+                <a:pPr algn="ctr"/>
+                <a:endParaRPr lang="en-US"/>
+              </a:p>
+            </p:txBody>
+          </p:sp>
+          <p:sp>
+            <p:nvSpPr>
+              <p:cNvPr id="16" name="Arc 15"/>
+              <p:cNvSpPr>
+                <a:spLocks noChangeAspect="1"/>
+              </p:cNvSpPr>
+              <p:nvPr/>
+            </p:nvSpPr>
+            <p:spPr>
+              <a:xfrm>
+                <a:off x="2903620" y="2196933"/>
+                <a:ext cx="2447999" cy="2447998"/>
+              </a:xfrm>
+              <a:prstGeom prst="arc">
+                <a:avLst>
+                  <a:gd name="adj1" fmla="val 17258218"/>
+                  <a:gd name="adj2" fmla="val 19319877"/>
+                </a:avLst>
+              </a:prstGeom>
+              <a:ln w="38100" cmpd="sng">
+                <a:solidFill>
+                  <a:schemeClr val="accent2"/>
+                </a:solidFill>
+              </a:ln>
+            </p:spPr>
+            <p:style>
+              <a:lnRef idx="2">
+                <a:schemeClr val="accent1"/>
+              </a:lnRef>
+              <a:fillRef idx="0">
+                <a:schemeClr val="accent1"/>
+              </a:fillRef>
+              <a:effectRef idx="1">
+                <a:schemeClr val="accent1"/>
+              </a:effectRef>
+              <a:fontRef idx="minor">
+                <a:schemeClr val="tx1"/>
+              </a:fontRef>
+            </p:style>
+            <p:txBody>
+              <a:bodyPr rtlCol="0" anchor="ctr"/>
+              <a:lstStyle/>
+              <a:p>
+                <a:pPr algn="ctr"/>
+                <a:endParaRPr lang="en-US"/>
+              </a:p>
+            </p:txBody>
+          </p:sp>
+          <p:sp>
+            <p:nvSpPr>
+              <p:cNvPr id="17" name="Arc 16"/>
+              <p:cNvSpPr>
+                <a:spLocks noChangeAspect="1"/>
+              </p:cNvSpPr>
+              <p:nvPr/>
+            </p:nvSpPr>
+            <p:spPr>
+              <a:xfrm>
+                <a:off x="2759620" y="2052934"/>
+                <a:ext cx="2735998" cy="2735997"/>
+              </a:xfrm>
+              <a:prstGeom prst="arc">
+                <a:avLst>
+                  <a:gd name="adj1" fmla="val 17058860"/>
+                  <a:gd name="adj2" fmla="val 19569505"/>
+                </a:avLst>
+              </a:prstGeom>
+              <a:ln w="38100" cmpd="sng">
+                <a:solidFill>
+                  <a:schemeClr val="accent2"/>
+                </a:solidFill>
+              </a:ln>
+            </p:spPr>
+            <p:style>
+              <a:lnRef idx="2">
+                <a:schemeClr val="accent1"/>
+              </a:lnRef>
+              <a:fillRef idx="0">
+                <a:schemeClr val="accent1"/>
+              </a:fillRef>
+              <a:effectRef idx="1">
+                <a:schemeClr val="accent1"/>
+              </a:effectRef>
+              <a:fontRef idx="minor">
+                <a:schemeClr val="tx1"/>
+              </a:fontRef>
+            </p:style>
+            <p:txBody>
+              <a:bodyPr rtlCol="0" anchor="ctr"/>
+              <a:lstStyle/>
+              <a:p>
+                <a:pPr algn="ctr"/>
+                <a:endParaRPr lang="en-US">
+                  <a:ln w="38100" cmpd="sng">
+                    <a:solidFill>
+                      <a:srgbClr val="000000"/>
+                    </a:solidFill>
+                  </a:ln>
+                </a:endParaRPr>
+              </a:p>
+            </p:txBody>
+          </p:sp>
+        </p:grpSp>
+        <p:grpSp>
+          <p:nvGrpSpPr>
+            <p:cNvPr id="11" name="Grouper 10"/>
+            <p:cNvGrpSpPr/>
+            <p:nvPr/>
+          </p:nvGrpSpPr>
+          <p:grpSpPr>
+            <a:xfrm flipH="1">
+              <a:off x="6494949" y="6943137"/>
+              <a:ext cx="5001192" cy="5001190"/>
+              <a:chOff x="2759620" y="2052934"/>
+              <a:chExt cx="2735998" cy="2735997"/>
+            </a:xfrm>
+          </p:grpSpPr>
+          <p:sp>
+            <p:nvSpPr>
+              <p:cNvPr id="12" name="Arc 11"/>
+              <p:cNvSpPr/>
+              <p:nvPr/>
+            </p:nvSpPr>
+            <p:spPr>
+              <a:xfrm>
+                <a:off x="3119619" y="2340933"/>
+                <a:ext cx="2016000" cy="2159999"/>
+              </a:xfrm>
+              <a:prstGeom prst="arc">
+                <a:avLst>
+                  <a:gd name="adj1" fmla="val 17494394"/>
+                  <a:gd name="adj2" fmla="val 19010120"/>
+                </a:avLst>
+              </a:prstGeom>
+              <a:ln w="38100" cmpd="sng">
+                <a:solidFill>
+                  <a:schemeClr val="accent2"/>
+                </a:solidFill>
+              </a:ln>
+            </p:spPr>
+            <p:style>
+              <a:lnRef idx="2">
+                <a:schemeClr val="accent1"/>
+              </a:lnRef>
+              <a:fillRef idx="0">
+                <a:schemeClr val="accent1"/>
+              </a:fillRef>
+              <a:effectRef idx="1">
+                <a:schemeClr val="accent1"/>
+              </a:effectRef>
+              <a:fontRef idx="minor">
+                <a:schemeClr val="tx1"/>
+              </a:fontRef>
+            </p:style>
+            <p:txBody>
+              <a:bodyPr rtlCol="0" anchor="ctr"/>
+              <a:lstStyle/>
+              <a:p>
+                <a:pPr algn="ctr"/>
+                <a:endParaRPr lang="en-US"/>
+              </a:p>
+            </p:txBody>
+          </p:sp>
+          <p:sp>
+            <p:nvSpPr>
+              <p:cNvPr id="13" name="Arc 12"/>
+              <p:cNvSpPr>
+                <a:spLocks noChangeAspect="1"/>
+              </p:cNvSpPr>
+              <p:nvPr/>
+            </p:nvSpPr>
+            <p:spPr>
+              <a:xfrm>
+                <a:off x="2903620" y="2196933"/>
+                <a:ext cx="2447999" cy="2447998"/>
+              </a:xfrm>
+              <a:prstGeom prst="arc">
+                <a:avLst>
+                  <a:gd name="adj1" fmla="val 17258218"/>
+                  <a:gd name="adj2" fmla="val 19319877"/>
+                </a:avLst>
+              </a:prstGeom>
+              <a:ln w="38100" cmpd="sng">
+                <a:solidFill>
+                  <a:schemeClr val="accent2"/>
+                </a:solidFill>
+              </a:ln>
+            </p:spPr>
+            <p:style>
+              <a:lnRef idx="2">
+                <a:schemeClr val="accent1"/>
+              </a:lnRef>
+              <a:fillRef idx="0">
+                <a:schemeClr val="accent1"/>
+              </a:fillRef>
+              <a:effectRef idx="1">
+                <a:schemeClr val="accent1"/>
+              </a:effectRef>
+              <a:fontRef idx="minor">
+                <a:schemeClr val="tx1"/>
+              </a:fontRef>
+            </p:style>
+            <p:txBody>
+              <a:bodyPr rtlCol="0" anchor="ctr"/>
+              <a:lstStyle/>
+              <a:p>
+                <a:pPr algn="ctr"/>
+                <a:endParaRPr lang="en-US"/>
+              </a:p>
+            </p:txBody>
+          </p:sp>
+          <p:sp>
+            <p:nvSpPr>
+              <p:cNvPr id="14" name="Arc 13"/>
+              <p:cNvSpPr>
+                <a:spLocks noChangeAspect="1"/>
+              </p:cNvSpPr>
+              <p:nvPr/>
+            </p:nvSpPr>
+            <p:spPr>
+              <a:xfrm>
+                <a:off x="2759620" y="2052934"/>
+                <a:ext cx="2735998" cy="2735997"/>
+              </a:xfrm>
+              <a:prstGeom prst="arc">
+                <a:avLst>
+                  <a:gd name="adj1" fmla="val 17058860"/>
+                  <a:gd name="adj2" fmla="val 19569505"/>
+                </a:avLst>
+              </a:prstGeom>
+              <a:ln w="38100" cmpd="sng">
+                <a:solidFill>
+                  <a:schemeClr val="accent2"/>
+                </a:solidFill>
+              </a:ln>
+            </p:spPr>
+            <p:style>
+              <a:lnRef idx="2">
+                <a:schemeClr val="accent1"/>
+              </a:lnRef>
+              <a:fillRef idx="0">
+                <a:schemeClr val="accent1"/>
+              </a:fillRef>
+              <a:effectRef idx="1">
+                <a:schemeClr val="accent1"/>
+              </a:effectRef>
+              <a:fontRef idx="minor">
+                <a:schemeClr val="tx1"/>
+              </a:fontRef>
+            </p:style>
+            <p:txBody>
+              <a:bodyPr rtlCol="0" anchor="ctr"/>
+              <a:lstStyle/>
+              <a:p>
+                <a:pPr algn="ctr"/>
+                <a:endParaRPr lang="en-US">
+                  <a:ln w="38100" cmpd="sng">
+                    <a:solidFill>
+                      <a:srgbClr val="000000"/>
+                    </a:solidFill>
+                  </a:ln>
+                </a:endParaRPr>
+              </a:p>
+            </p:txBody>
+          </p:sp>
+        </p:grpSp>
+      </p:grpSp>
+    </p:spTree>
+    <p:extLst>
+      <p:ext uri="{BB962C8B-B14F-4D97-AF65-F5344CB8AC3E}">
+        <p14:creationId xmlns:p14="http://schemas.microsoft.com/office/powerpoint/2010/main" val="1908434010"/>
       </p:ext>
     </p:extLst>
   </p:cSld>

</xml_diff>

<commit_message>
Make prompts round in tiff files.
</commit_message>
<xml_diff>
--- a/Source Code/GraspBMPs/GraspCircularPrompts.pptx
+++ b/Source Code/GraspBMPs/GraspCircularPrompts.pptx
@@ -295,7 +295,7 @@
           <a:p>
             <a:fld id="{649FEDF0-7D14-9E44-B4F2-968D163D1479}" type="datetimeFigureOut">
               <a:rPr lang="fr-FR" smtClean="0"/>
-              <a:t>7/2/16</a:t>
+              <a:t>7/3/16</a:t>
             </a:fld>
             <a:endParaRPr lang="en-US"/>
           </a:p>
@@ -465,7 +465,7 @@
           <a:p>
             <a:fld id="{649FEDF0-7D14-9E44-B4F2-968D163D1479}" type="datetimeFigureOut">
               <a:rPr lang="fr-FR" smtClean="0"/>
-              <a:t>7/2/16</a:t>
+              <a:t>7/3/16</a:t>
             </a:fld>
             <a:endParaRPr lang="en-US"/>
           </a:p>
@@ -645,7 +645,7 @@
           <a:p>
             <a:fld id="{649FEDF0-7D14-9E44-B4F2-968D163D1479}" type="datetimeFigureOut">
               <a:rPr lang="fr-FR" smtClean="0"/>
-              <a:t>7/2/16</a:t>
+              <a:t>7/3/16</a:t>
             </a:fld>
             <a:endParaRPr lang="en-US"/>
           </a:p>
@@ -815,7 +815,7 @@
           <a:p>
             <a:fld id="{649FEDF0-7D14-9E44-B4F2-968D163D1479}" type="datetimeFigureOut">
               <a:rPr lang="fr-FR" smtClean="0"/>
-              <a:t>7/2/16</a:t>
+              <a:t>7/3/16</a:t>
             </a:fld>
             <a:endParaRPr lang="en-US"/>
           </a:p>
@@ -1061,7 +1061,7 @@
           <a:p>
             <a:fld id="{649FEDF0-7D14-9E44-B4F2-968D163D1479}" type="datetimeFigureOut">
               <a:rPr lang="fr-FR" smtClean="0"/>
-              <a:t>7/2/16</a:t>
+              <a:t>7/3/16</a:t>
             </a:fld>
             <a:endParaRPr lang="en-US"/>
           </a:p>
@@ -1349,7 +1349,7 @@
           <a:p>
             <a:fld id="{649FEDF0-7D14-9E44-B4F2-968D163D1479}" type="datetimeFigureOut">
               <a:rPr lang="fr-FR" smtClean="0"/>
-              <a:t>7/2/16</a:t>
+              <a:t>7/3/16</a:t>
             </a:fld>
             <a:endParaRPr lang="en-US"/>
           </a:p>
@@ -1771,7 +1771,7 @@
           <a:p>
             <a:fld id="{649FEDF0-7D14-9E44-B4F2-968D163D1479}" type="datetimeFigureOut">
               <a:rPr lang="fr-FR" smtClean="0"/>
-              <a:t>7/2/16</a:t>
+              <a:t>7/3/16</a:t>
             </a:fld>
             <a:endParaRPr lang="en-US"/>
           </a:p>
@@ -1889,7 +1889,7 @@
           <a:p>
             <a:fld id="{649FEDF0-7D14-9E44-B4F2-968D163D1479}" type="datetimeFigureOut">
               <a:rPr lang="fr-FR" smtClean="0"/>
-              <a:t>7/2/16</a:t>
+              <a:t>7/3/16</a:t>
             </a:fld>
             <a:endParaRPr lang="en-US"/>
           </a:p>
@@ -1984,7 +1984,7 @@
           <a:p>
             <a:fld id="{649FEDF0-7D14-9E44-B4F2-968D163D1479}" type="datetimeFigureOut">
               <a:rPr lang="fr-FR" smtClean="0"/>
-              <a:t>7/2/16</a:t>
+              <a:t>7/3/16</a:t>
             </a:fld>
             <a:endParaRPr lang="en-US"/>
           </a:p>
@@ -2029,6 +2029,54 @@
               <a:t>‹#›</a:t>
             </a:fld>
             <a:endParaRPr lang="en-US"/>
+          </a:p>
+        </p:txBody>
+      </p:sp>
+      <p:sp>
+        <p:nvSpPr>
+          <p:cNvPr id="5" name="Ellipse 4"/>
+          <p:cNvSpPr/>
+          <p:nvPr userDrawn="1"/>
+        </p:nvSpPr>
+        <p:spPr>
+          <a:xfrm>
+            <a:off x="0" y="0"/>
+            <a:ext cx="18434050" cy="18434050"/>
+          </a:xfrm>
+          <a:prstGeom prst="ellipse">
+            <a:avLst/>
+          </a:prstGeom>
+          <a:solidFill>
+            <a:schemeClr val="accent1"/>
+          </a:solidFill>
+          <a:ln>
+            <a:noFill/>
+          </a:ln>
+        </p:spPr>
+        <p:style>
+          <a:lnRef idx="1">
+            <a:schemeClr val="accent1"/>
+          </a:lnRef>
+          <a:fillRef idx="3">
+            <a:schemeClr val="accent1"/>
+          </a:fillRef>
+          <a:effectRef idx="2">
+            <a:schemeClr val="accent1"/>
+          </a:effectRef>
+          <a:fontRef idx="minor">
+            <a:schemeClr val="lt1"/>
+          </a:fontRef>
+        </p:style>
+        <p:txBody>
+          <a:bodyPr rtlCol="0" anchor="ctr"/>
+          <a:lstStyle/>
+          <a:p>
+            <a:pPr algn="ctr"/>
+            <a:endParaRPr lang="en-US" dirty="0" smtClean="0"/>
+          </a:p>
+          <a:p>
+            <a:pPr algn="ctr"/>
+            <a:endParaRPr lang="en-US" dirty="0"/>
           </a:p>
         </p:txBody>
       </p:sp>
@@ -2261,7 +2309,7 @@
           <a:p>
             <a:fld id="{649FEDF0-7D14-9E44-B4F2-968D163D1479}" type="datetimeFigureOut">
               <a:rPr lang="fr-FR" smtClean="0"/>
-              <a:t>7/2/16</a:t>
+              <a:t>7/3/16</a:t>
             </a:fld>
             <a:endParaRPr lang="en-US"/>
           </a:p>
@@ -2514,7 +2562,7 @@
           <a:p>
             <a:fld id="{649FEDF0-7D14-9E44-B4F2-968D163D1479}" type="datetimeFigureOut">
               <a:rPr lang="fr-FR" smtClean="0"/>
-              <a:t>7/2/16</a:t>
+              <a:t>7/3/16</a:t>
             </a:fld>
             <a:endParaRPr lang="en-US"/>
           </a:p>
@@ -2581,7 +2629,7 @@
     <p:bg>
       <p:bgPr>
         <a:solidFill>
-          <a:schemeClr val="accent1"/>
+          <a:schemeClr val="bg1"/>
         </a:solidFill>
         <a:effectLst/>
       </p:bgPr>
@@ -2730,7 +2778,7 @@
           <a:p>
             <a:fld id="{649FEDF0-7D14-9E44-B4F2-968D163D1479}" type="datetimeFigureOut">
               <a:rPr lang="fr-FR" smtClean="0"/>
-              <a:t>7/2/16</a:t>
+              <a:t>7/3/16</a:t>
             </a:fld>
             <a:endParaRPr lang="en-US"/>
           </a:p>
@@ -2811,6 +2859,54 @@
               <a:t>‹#›</a:t>
             </a:fld>
             <a:endParaRPr lang="en-US"/>
+          </a:p>
+        </p:txBody>
+      </p:sp>
+      <p:sp>
+        <p:nvSpPr>
+          <p:cNvPr id="7" name="Ellipse 6"/>
+          <p:cNvSpPr/>
+          <p:nvPr userDrawn="1"/>
+        </p:nvSpPr>
+        <p:spPr>
+          <a:xfrm>
+            <a:off x="0" y="0"/>
+            <a:ext cx="18434050" cy="18434050"/>
+          </a:xfrm>
+          <a:prstGeom prst="ellipse">
+            <a:avLst/>
+          </a:prstGeom>
+          <a:solidFill>
+            <a:schemeClr val="accent1"/>
+          </a:solidFill>
+          <a:ln>
+            <a:noFill/>
+          </a:ln>
+        </p:spPr>
+        <p:style>
+          <a:lnRef idx="1">
+            <a:schemeClr val="accent1"/>
+          </a:lnRef>
+          <a:fillRef idx="3">
+            <a:schemeClr val="accent1"/>
+          </a:fillRef>
+          <a:effectRef idx="2">
+            <a:schemeClr val="accent1"/>
+          </a:effectRef>
+          <a:fontRef idx="minor">
+            <a:schemeClr val="lt1"/>
+          </a:fontRef>
+        </p:style>
+        <p:txBody>
+          <a:bodyPr rtlCol="0" anchor="ctr"/>
+          <a:lstStyle/>
+          <a:p>
+            <a:pPr algn="ctr"/>
+            <a:endParaRPr lang="en-US" dirty="0" smtClean="0"/>
+          </a:p>
+          <a:p>
+            <a:pPr algn="ctr"/>
+            <a:endParaRPr lang="en-US" dirty="0"/>
           </a:p>
         </p:txBody>
       </p:sp>
@@ -3661,21 +3757,7 @@
                   <a:schemeClr val="accent2"/>
                 </a:solidFill>
               </a:rPr>
-              <a:t>Head tilt </a:t>
-            </a:r>
-            <a:r>
-              <a:rPr lang="en-US" sz="23900" b="1" cap="small" spc="600" dirty="0" smtClean="0">
-                <a:ln w="12700">
-                  <a:solidFill>
-                    <a:srgbClr val="FFFFFF"/>
-                  </a:solidFill>
-                  <a:prstDash val="solid"/>
-                </a:ln>
-                <a:solidFill>
-                  <a:schemeClr val="accent2"/>
-                </a:solidFill>
-              </a:rPr>
-              <a:t>not maintained.</a:t>
+              <a:t>Head tilt not maintained.</a:t>
             </a:r>
             <a:endParaRPr lang="en-US" sz="23900" b="1" cap="small" spc="600" dirty="0">
               <a:ln w="12700">
@@ -4653,21 +4735,7 @@
                   <a:schemeClr val="accent2"/>
                 </a:solidFill>
               </a:rPr>
-              <a:t>Failed to lower </a:t>
-            </a:r>
-            <a:r>
-              <a:rPr lang="en-US" sz="23900" b="1" cap="small" spc="600" dirty="0" smtClean="0">
-                <a:ln w="12700">
-                  <a:solidFill>
-                    <a:srgbClr val="FFFFFF"/>
-                  </a:solidFill>
-                  <a:prstDash val="solid"/>
-                </a:ln>
-                <a:solidFill>
-                  <a:schemeClr val="accent2"/>
-                </a:solidFill>
-              </a:rPr>
-              <a:t>arm in time.</a:t>
+              <a:t>Failed to lower arm in time.</a:t>
             </a:r>
             <a:endParaRPr lang="en-US" sz="23900" b="1" cap="small" spc="600" dirty="0">
               <a:ln w="12700">
@@ -5399,21 +5467,7 @@
                   <a:schemeClr val="accent2"/>
                 </a:solidFill>
               </a:rPr>
-              <a:t>Failed to </a:t>
-            </a:r>
-            <a:r>
-              <a:rPr lang="en-US" sz="23900" b="1" cap="small" spc="600" dirty="0" smtClean="0">
-                <a:ln w="12700">
-                  <a:solidFill>
-                    <a:srgbClr val="FFFFFF"/>
-                  </a:solidFill>
-                  <a:prstDash val="solid"/>
-                </a:ln>
-                <a:solidFill>
-                  <a:schemeClr val="accent2"/>
-                </a:solidFill>
-              </a:rPr>
-              <a:t>Raise arm in time.</a:t>
+              <a:t>Failed to Raise arm in time.</a:t>
             </a:r>
             <a:endParaRPr lang="en-US" sz="23900" b="1" cap="small" spc="600" dirty="0">
               <a:ln w="12700">
@@ -6145,49 +6199,7 @@
                   <a:schemeClr val="accent2"/>
                 </a:solidFill>
               </a:rPr>
-              <a:t>Time </a:t>
-            </a:r>
-            <a:r>
-              <a:rPr lang="en-US" sz="23900" b="1" cap="small" spc="600" dirty="0" smtClean="0">
-                <a:ln w="12700">
-                  <a:solidFill>
-                    <a:srgbClr val="FFFFFF"/>
-                  </a:solidFill>
-                  <a:prstDash val="solid"/>
-                </a:ln>
-                <a:solidFill>
-                  <a:schemeClr val="accent2"/>
-                </a:solidFill>
-              </a:rPr>
-              <a:t>to tilt head</a:t>
-            </a:r>
-            <a:r>
-              <a:rPr lang="en-US" sz="23900" b="1" cap="small" spc="600" dirty="0" smtClean="0">
-                <a:ln w="12700">
-                  <a:solidFill>
-                    <a:srgbClr val="FFFFFF"/>
-                  </a:solidFill>
-                  <a:prstDash val="solid"/>
-                </a:ln>
-                <a:solidFill>
-                  <a:schemeClr val="accent2"/>
-                </a:solidFill>
-              </a:rPr>
-              <a:t> </a:t>
-            </a:r>
-            <a:r>
-              <a:rPr lang="en-US" sz="23900" b="1" cap="small" spc="600" dirty="0" smtClean="0">
-                <a:ln w="12700">
-                  <a:solidFill>
-                    <a:srgbClr val="FFFFFF"/>
-                  </a:solidFill>
-                  <a:prstDash val="solid"/>
-                </a:ln>
-                <a:solidFill>
-                  <a:schemeClr val="accent2"/>
-                </a:solidFill>
-              </a:rPr>
-              <a:t>exceeded.</a:t>
+              <a:t>Time to tilt head exceeded.</a:t>
             </a:r>
             <a:endParaRPr lang="en-US" sz="23900" b="1" cap="small" spc="600" dirty="0">
               <a:ln w="12700">
@@ -6919,35 +6931,7 @@
                   <a:schemeClr val="accent2"/>
                 </a:solidFill>
               </a:rPr>
-              <a:t>Time </a:t>
-            </a:r>
-            <a:r>
-              <a:rPr lang="en-US" sz="23900" b="1" cap="small" spc="600" dirty="0" smtClean="0">
-                <a:ln w="12700">
-                  <a:solidFill>
-                    <a:srgbClr val="FFFFFF"/>
-                  </a:solidFill>
-                  <a:prstDash val="solid"/>
-                </a:ln>
-                <a:solidFill>
-                  <a:schemeClr val="accent2"/>
-                </a:solidFill>
-              </a:rPr>
-              <a:t>to respond exceeded</a:t>
-            </a:r>
-            <a:r>
-              <a:rPr lang="en-US" sz="23900" b="1" cap="small" spc="600" dirty="0" smtClean="0">
-                <a:ln w="12700">
-                  <a:solidFill>
-                    <a:srgbClr val="FFFFFF"/>
-                  </a:solidFill>
-                  <a:prstDash val="solid"/>
-                </a:ln>
-                <a:solidFill>
-                  <a:schemeClr val="accent2"/>
-                </a:solidFill>
-              </a:rPr>
-              <a:t>.</a:t>
+              <a:t>Time to respond exceeded.</a:t>
             </a:r>
             <a:endParaRPr lang="en-US" sz="23900" b="1" cap="small" spc="600" dirty="0">
               <a:ln w="12700">

</xml_diff>

<commit_message>
New prompts / New order
</commit_message>
<xml_diff>
--- a/Source Code/GraspBMPs/GraspCircularPrompts.pptx
+++ b/Source Code/GraspBMPs/GraspCircularPrompts.pptx
@@ -5,14 +5,17 @@
     <p:sldMasterId id="2147483648" r:id="rId1"/>
   </p:sldMasterIdLst>
   <p:sldIdLst>
-    <p:sldId id="263" r:id="rId2"/>
-    <p:sldId id="268" r:id="rId3"/>
-    <p:sldId id="269" r:id="rId4"/>
-    <p:sldId id="270" r:id="rId5"/>
+    <p:sldId id="275" r:id="rId2"/>
+    <p:sldId id="263" r:id="rId3"/>
+    <p:sldId id="268" r:id="rId4"/>
+    <p:sldId id="276" r:id="rId5"/>
     <p:sldId id="271" r:id="rId6"/>
-    <p:sldId id="272" r:id="rId7"/>
-    <p:sldId id="273" r:id="rId8"/>
-    <p:sldId id="274" r:id="rId9"/>
+    <p:sldId id="277" r:id="rId7"/>
+    <p:sldId id="272" r:id="rId8"/>
+    <p:sldId id="269" r:id="rId9"/>
+    <p:sldId id="273" r:id="rId10"/>
+    <p:sldId id="274" r:id="rId11"/>
+    <p:sldId id="270" r:id="rId12"/>
   </p:sldIdLst>
   <p:sldSz cx="18434050" cy="18434050"/>
   <p:notesSz cx="6858000" cy="9144000"/>
@@ -295,7 +298,7 @@
           <a:p>
             <a:fld id="{649FEDF0-7D14-9E44-B4F2-968D163D1479}" type="datetimeFigureOut">
               <a:rPr lang="fr-FR" smtClean="0"/>
-              <a:t>7/3/16</a:t>
+              <a:t>30/07/16</a:t>
             </a:fld>
             <a:endParaRPr lang="en-US"/>
           </a:p>
@@ -465,7 +468,7 @@
           <a:p>
             <a:fld id="{649FEDF0-7D14-9E44-B4F2-968D163D1479}" type="datetimeFigureOut">
               <a:rPr lang="fr-FR" smtClean="0"/>
-              <a:t>7/3/16</a:t>
+              <a:t>30/07/16</a:t>
             </a:fld>
             <a:endParaRPr lang="en-US"/>
           </a:p>
@@ -645,7 +648,7 @@
           <a:p>
             <a:fld id="{649FEDF0-7D14-9E44-B4F2-968D163D1479}" type="datetimeFigureOut">
               <a:rPr lang="fr-FR" smtClean="0"/>
-              <a:t>7/3/16</a:t>
+              <a:t>30/07/16</a:t>
             </a:fld>
             <a:endParaRPr lang="en-US"/>
           </a:p>
@@ -815,7 +818,7 @@
           <a:p>
             <a:fld id="{649FEDF0-7D14-9E44-B4F2-968D163D1479}" type="datetimeFigureOut">
               <a:rPr lang="fr-FR" smtClean="0"/>
-              <a:t>7/3/16</a:t>
+              <a:t>30/07/16</a:t>
             </a:fld>
             <a:endParaRPr lang="en-US"/>
           </a:p>
@@ -1061,7 +1064,7 @@
           <a:p>
             <a:fld id="{649FEDF0-7D14-9E44-B4F2-968D163D1479}" type="datetimeFigureOut">
               <a:rPr lang="fr-FR" smtClean="0"/>
-              <a:t>7/3/16</a:t>
+              <a:t>30/07/16</a:t>
             </a:fld>
             <a:endParaRPr lang="en-US"/>
           </a:p>
@@ -1349,7 +1352,7 @@
           <a:p>
             <a:fld id="{649FEDF0-7D14-9E44-B4F2-968D163D1479}" type="datetimeFigureOut">
               <a:rPr lang="fr-FR" smtClean="0"/>
-              <a:t>7/3/16</a:t>
+              <a:t>30/07/16</a:t>
             </a:fld>
             <a:endParaRPr lang="en-US"/>
           </a:p>
@@ -1771,7 +1774,7 @@
           <a:p>
             <a:fld id="{649FEDF0-7D14-9E44-B4F2-968D163D1479}" type="datetimeFigureOut">
               <a:rPr lang="fr-FR" smtClean="0"/>
-              <a:t>7/3/16</a:t>
+              <a:t>30/07/16</a:t>
             </a:fld>
             <a:endParaRPr lang="en-US"/>
           </a:p>
@@ -1889,7 +1892,7 @@
           <a:p>
             <a:fld id="{649FEDF0-7D14-9E44-B4F2-968D163D1479}" type="datetimeFigureOut">
               <a:rPr lang="fr-FR" smtClean="0"/>
-              <a:t>7/3/16</a:t>
+              <a:t>30/07/16</a:t>
             </a:fld>
             <a:endParaRPr lang="en-US"/>
           </a:p>
@@ -1984,7 +1987,7 @@
           <a:p>
             <a:fld id="{649FEDF0-7D14-9E44-B4F2-968D163D1479}" type="datetimeFigureOut">
               <a:rPr lang="fr-FR" smtClean="0"/>
-              <a:t>7/3/16</a:t>
+              <a:t>30/07/16</a:t>
             </a:fld>
             <a:endParaRPr lang="en-US"/>
           </a:p>
@@ -2309,7 +2312,7 @@
           <a:p>
             <a:fld id="{649FEDF0-7D14-9E44-B4F2-968D163D1479}" type="datetimeFigureOut">
               <a:rPr lang="fr-FR" smtClean="0"/>
-              <a:t>7/3/16</a:t>
+              <a:t>30/07/16</a:t>
             </a:fld>
             <a:endParaRPr lang="en-US"/>
           </a:p>
@@ -2562,7 +2565,7 @@
           <a:p>
             <a:fld id="{649FEDF0-7D14-9E44-B4F2-968D163D1479}" type="datetimeFigureOut">
               <a:rPr lang="fr-FR" smtClean="0"/>
-              <a:t>7/3/16</a:t>
+              <a:t>30/07/16</a:t>
             </a:fld>
             <a:endParaRPr lang="en-US"/>
           </a:p>
@@ -2778,7 +2781,7 @@
           <a:p>
             <a:fld id="{649FEDF0-7D14-9E44-B4F2-968D163D1479}" type="datetimeFigureOut">
               <a:rPr lang="fr-FR" smtClean="0"/>
-              <a:t>7/3/16</a:t>
+              <a:t>30/07/16</a:t>
             </a:fld>
             <a:endParaRPr lang="en-US"/>
           </a:p>
@@ -3185,6 +3188,91 @@
 </file>
 
 <file path=ppt/slides/slide1.xml><?xml version="1.0" encoding="utf-8"?>
+<p:sld xmlns:a="http://schemas.openxmlformats.org/drawingml/2006/main" xmlns:r="http://schemas.openxmlformats.org/officeDocument/2006/relationships" xmlns:p="http://schemas.openxmlformats.org/presentationml/2006/main" showMasterSp="0">
+  <p:cSld>
+    <p:spTree>
+      <p:nvGrpSpPr>
+        <p:cNvPr id="1" name=""/>
+        <p:cNvGrpSpPr/>
+        <p:nvPr/>
+      </p:nvGrpSpPr>
+      <p:grpSpPr>
+        <a:xfrm>
+          <a:off x="0" y="0"/>
+          <a:ext cx="0" cy="0"/>
+          <a:chOff x="0" y="0"/>
+          <a:chExt cx="0" cy="0"/>
+        </a:xfrm>
+      </p:grpSpPr>
+      <p:sp>
+        <p:nvSpPr>
+          <p:cNvPr id="2" name="ZoneTexte 1"/>
+          <p:cNvSpPr txBox="1"/>
+          <p:nvPr/>
+        </p:nvSpPr>
+        <p:spPr>
+          <a:xfrm>
+            <a:off x="2503838" y="3302163"/>
+            <a:ext cx="13353800" cy="3247043"/>
+          </a:xfrm>
+          <a:prstGeom prst="rect">
+            <a:avLst/>
+          </a:prstGeom>
+          <a:noFill/>
+        </p:spPr>
+        <p:txBody>
+          <a:bodyPr wrap="square" rtlCol="0">
+            <a:spAutoFit/>
+          </a:bodyPr>
+          <a:lstStyle/>
+          <a:p>
+            <a:r>
+              <a:rPr lang="en-US" dirty="0" smtClean="0"/>
+              <a:t>This file contains the source images for the circular prompts used by the </a:t>
+            </a:r>
+            <a:r>
+              <a:rPr lang="en-US" dirty="0" err="1" smtClean="0"/>
+              <a:t>Grasp.exe</a:t>
+            </a:r>
+            <a:r>
+              <a:rPr lang="en-US" dirty="0" smtClean="0"/>
+              <a:t> program.</a:t>
+            </a:r>
+          </a:p>
+          <a:p>
+            <a:endParaRPr lang="en-US" dirty="0"/>
+          </a:p>
+          <a:p>
+            <a:r>
+              <a:rPr lang="en-US" dirty="0" smtClean="0"/>
+              <a:t>See </a:t>
+            </a:r>
+            <a:r>
+              <a:rPr lang="en-US" dirty="0" err="1" smtClean="0"/>
+              <a:t>GraspBMP.mak</a:t>
+            </a:r>
+            <a:r>
+              <a:rPr lang="en-US" dirty="0" smtClean="0"/>
+              <a:t> for instructions on how to convert this file into the .bmp files needed by the program.</a:t>
+            </a:r>
+            <a:endParaRPr lang="en-US" dirty="0"/>
+          </a:p>
+        </p:txBody>
+      </p:sp>
+    </p:spTree>
+    <p:extLst>
+      <p:ext uri="{BB962C8B-B14F-4D97-AF65-F5344CB8AC3E}">
+        <p14:creationId xmlns:p14="http://schemas.microsoft.com/office/powerpoint/2010/main" val="1272425121"/>
+      </p:ext>
+    </p:extLst>
+  </p:cSld>
+  <p:clrMapOvr>
+    <a:masterClrMapping/>
+  </p:clrMapOvr>
+</p:sld>
+</file>
+
+<file path=ppt/slides/slide10.xml><?xml version="1.0" encoding="utf-8"?>
 <p:sld xmlns:a="http://schemas.openxmlformats.org/drawingml/2006/main" xmlns:r="http://schemas.openxmlformats.org/officeDocument/2006/relationships" xmlns:p="http://schemas.openxmlformats.org/presentationml/2006/main">
   <p:cSld>
     <p:spTree>
@@ -3292,718 +3380,10 @@
                   <a:prstDash val="solid"/>
                 </a:ln>
                 <a:solidFill>
-                  <a:schemeClr val="accent3">
-                    <a:lumMod val="75000"/>
-                  </a:schemeClr>
+                  <a:schemeClr val="accent2"/>
                 </a:solidFill>
               </a:rPr>
-              <a:t>  Ready to start next trial.</a:t>
-            </a:r>
-            <a:endParaRPr lang="en-US" sz="23900" b="1" cap="small" spc="600" dirty="0">
-              <a:ln w="12700">
-                <a:solidFill>
-                  <a:srgbClr val="FFFFFF"/>
-                </a:solidFill>
-                <a:prstDash val="solid"/>
-              </a:ln>
-              <a:solidFill>
-                <a:schemeClr val="accent3">
-                  <a:lumMod val="75000"/>
-                </a:schemeClr>
-              </a:solidFill>
-            </a:endParaRPr>
-          </a:p>
-        </p:txBody>
-      </p:sp>
-      <p:sp>
-        <p:nvSpPr>
-          <p:cNvPr id="3" name="Rectangle 2"/>
-          <p:cNvSpPr>
-            <a:spLocks noChangeAspect="1"/>
-          </p:cNvSpPr>
-          <p:nvPr/>
-        </p:nvSpPr>
-        <p:spPr>
-          <a:xfrm rot="16200000">
-            <a:off x="5257022" y="5257026"/>
-            <a:ext cx="7920006" cy="7919999"/>
-          </a:xfrm>
-          <a:prstGeom prst="rect">
-            <a:avLst/>
-          </a:prstGeom>
-          <a:noFill/>
-        </p:spPr>
-        <p:txBody>
-          <a:bodyPr wrap="none" lIns="210669" tIns="105334" rIns="210669" bIns="105334">
-            <a:prstTxWarp prst="textCircle">
-              <a:avLst>
-                <a:gd name="adj" fmla="val 10916975"/>
-              </a:avLst>
-            </a:prstTxWarp>
-            <a:spAutoFit/>
-          </a:bodyPr>
-          <a:lstStyle/>
-          <a:p>
-            <a:pPr algn="ctr"/>
-            <a:r>
-              <a:rPr lang="en-US" sz="13800" b="1" cap="small" spc="300" dirty="0" smtClean="0">
-                <a:ln w="12700">
-                  <a:noFill/>
-                  <a:prstDash val="solid"/>
-                </a:ln>
-                <a:solidFill>
-                  <a:schemeClr val="accent1"/>
-                </a:solidFill>
-                <a:effectLst>
-                  <a:outerShdw blurRad="41275" dist="20320" dir="1800000" algn="tl" rotWithShape="0">
-                    <a:srgbClr val="000000">
-                      <a:alpha val="40000"/>
-                    </a:srgbClr>
-                  </a:outerShdw>
-                </a:effectLst>
-              </a:rPr>
-              <a:t> Press </a:t>
-            </a:r>
-            <a:r>
-              <a:rPr lang="en-US" sz="13800" b="1" cap="small" spc="300" dirty="0">
-                <a:ln w="12700">
-                  <a:noFill/>
-                  <a:prstDash val="solid"/>
-                </a:ln>
-                <a:solidFill>
-                  <a:schemeClr val="accent1"/>
-                </a:solidFill>
-                <a:effectLst>
-                  <a:outerShdw blurRad="41275" dist="20320" dir="1800000" algn="tl" rotWithShape="0">
-                    <a:srgbClr val="000000">
-                      <a:alpha val="40000"/>
-                    </a:srgbClr>
-                  </a:outerShdw>
-                </a:effectLst>
-              </a:rPr>
-              <a:t>a button to continue</a:t>
-            </a:r>
-            <a:r>
-              <a:rPr lang="en-US" sz="13800" b="1" cap="small" spc="300" dirty="0" smtClean="0">
-                <a:ln w="12700">
-                  <a:noFill/>
-                  <a:prstDash val="solid"/>
-                </a:ln>
-                <a:solidFill>
-                  <a:schemeClr val="accent1"/>
-                </a:solidFill>
-                <a:effectLst>
-                  <a:outerShdw blurRad="41275" dist="20320" dir="1800000" algn="tl" rotWithShape="0">
-                    <a:srgbClr val="000000">
-                      <a:alpha val="40000"/>
-                    </a:srgbClr>
-                  </a:outerShdw>
-                </a:effectLst>
-              </a:rPr>
-              <a:t>.</a:t>
-            </a:r>
-            <a:endParaRPr lang="en-US" sz="13800" b="1" cap="small" spc="300" dirty="0">
-              <a:ln w="12700">
-                <a:noFill/>
-                <a:prstDash val="solid"/>
-              </a:ln>
-              <a:solidFill>
-                <a:schemeClr val="accent1"/>
-              </a:solidFill>
-              <a:effectLst>
-                <a:outerShdw blurRad="41275" dist="20320" dir="1800000" algn="tl" rotWithShape="0">
-                  <a:srgbClr val="000000">
-                    <a:alpha val="40000"/>
-                  </a:srgbClr>
-                </a:outerShdw>
-              </a:effectLst>
-            </a:endParaRPr>
-          </a:p>
-        </p:txBody>
-      </p:sp>
-    </p:spTree>
-    <p:extLst>
-      <p:ext uri="{BB962C8B-B14F-4D97-AF65-F5344CB8AC3E}">
-        <p14:creationId xmlns:p14="http://schemas.microsoft.com/office/powerpoint/2010/main" val="4227632991"/>
-      </p:ext>
-    </p:extLst>
-  </p:cSld>
-  <p:clrMapOvr>
-    <a:masterClrMapping/>
-  </p:clrMapOvr>
-</p:sld>
-</file>
-
-<file path=ppt/slides/slide2.xml><?xml version="1.0" encoding="utf-8"?>
-<p:sld xmlns:a="http://schemas.openxmlformats.org/drawingml/2006/main" xmlns:r="http://schemas.openxmlformats.org/officeDocument/2006/relationships" xmlns:p="http://schemas.openxmlformats.org/presentationml/2006/main">
-  <p:cSld>
-    <p:spTree>
-      <p:nvGrpSpPr>
-        <p:cNvPr id="1" name=""/>
-        <p:cNvGrpSpPr/>
-        <p:nvPr/>
-      </p:nvGrpSpPr>
-      <p:grpSpPr>
-        <a:xfrm>
-          <a:off x="0" y="0"/>
-          <a:ext cx="0" cy="0"/>
-          <a:chOff x="0" y="0"/>
-          <a:chExt cx="0" cy="0"/>
-        </a:xfrm>
-      </p:grpSpPr>
-      <p:sp>
-        <p:nvSpPr>
-          <p:cNvPr id="5" name="Bouée 4"/>
-          <p:cNvSpPr>
-            <a:spLocks noChangeAspect="1"/>
-          </p:cNvSpPr>
-          <p:nvPr/>
-        </p:nvSpPr>
-        <p:spPr>
-          <a:xfrm>
-            <a:off x="1614253" y="1610484"/>
-            <a:ext cx="15228000" cy="15228000"/>
-          </a:xfrm>
-          <a:prstGeom prst="donut">
-            <a:avLst>
-              <a:gd name="adj" fmla="val 30982"/>
-            </a:avLst>
-          </a:prstGeom>
-          <a:solidFill>
-            <a:schemeClr val="bg1"/>
-          </a:solidFill>
-          <a:ln w="76200" cmpd="sng">
-            <a:noFill/>
-          </a:ln>
-        </p:spPr>
-        <p:style>
-          <a:lnRef idx="1">
-            <a:schemeClr val="accent1"/>
-          </a:lnRef>
-          <a:fillRef idx="3">
-            <a:schemeClr val="accent1"/>
-          </a:fillRef>
-          <a:effectRef idx="2">
-            <a:schemeClr val="accent1"/>
-          </a:effectRef>
-          <a:fontRef idx="minor">
-            <a:schemeClr val="lt1"/>
-          </a:fontRef>
-        </p:style>
-        <p:txBody>
-          <a:bodyPr rtlCol="0" anchor="ctr"/>
-          <a:lstStyle/>
-          <a:p>
-            <a:pPr algn="ctr"/>
-            <a:endParaRPr lang="en-US">
-              <a:solidFill>
-                <a:schemeClr val="tx1"/>
-              </a:solidFill>
-            </a:endParaRPr>
-          </a:p>
-        </p:txBody>
-      </p:sp>
-      <p:sp>
-        <p:nvSpPr>
-          <p:cNvPr id="2" name="Rectangle 1"/>
-          <p:cNvSpPr>
-            <a:spLocks noChangeAspect="1"/>
-          </p:cNvSpPr>
-          <p:nvPr/>
-        </p:nvSpPr>
-        <p:spPr>
-          <a:xfrm rot="16200000">
-            <a:off x="3277028" y="3277028"/>
-            <a:ext cx="11879995" cy="11879995"/>
-          </a:xfrm>
-          <a:prstGeom prst="rect">
-            <a:avLst/>
-          </a:prstGeom>
-          <a:noFill/>
-        </p:spPr>
-        <p:txBody>
-          <a:bodyPr wrap="none" lIns="210669" tIns="105334" rIns="210669" bIns="105334">
-            <a:prstTxWarp prst="textCircle">
-              <a:avLst>
-                <a:gd name="adj" fmla="val 10946467"/>
-              </a:avLst>
-            </a:prstTxWarp>
-            <a:spAutoFit/>
-          </a:bodyPr>
-          <a:lstStyle/>
-          <a:p>
-            <a:pPr algn="ctr"/>
-            <a:r>
-              <a:rPr lang="en-US" sz="23900" b="1" cap="small" spc="600" dirty="0" smtClean="0">
-                <a:ln w="12700">
-                  <a:solidFill>
-                    <a:srgbClr val="FFFFFF"/>
-                  </a:solidFill>
-                  <a:prstDash val="solid"/>
-                </a:ln>
-                <a:solidFill>
-                  <a:schemeClr val="accent3">
-                    <a:lumMod val="75000"/>
-                  </a:schemeClr>
-                </a:solidFill>
-              </a:rPr>
-              <a:t>Trial block completed.</a:t>
-            </a:r>
-            <a:endParaRPr lang="en-US" sz="23900" b="1" cap="small" spc="600" dirty="0">
-              <a:ln w="12700">
-                <a:solidFill>
-                  <a:srgbClr val="FFFFFF"/>
-                </a:solidFill>
-                <a:prstDash val="solid"/>
-              </a:ln>
-              <a:solidFill>
-                <a:schemeClr val="accent3">
-                  <a:lumMod val="75000"/>
-                </a:schemeClr>
-              </a:solidFill>
-            </a:endParaRPr>
-          </a:p>
-        </p:txBody>
-      </p:sp>
-      <p:sp>
-        <p:nvSpPr>
-          <p:cNvPr id="3" name="Rectangle 2"/>
-          <p:cNvSpPr>
-            <a:spLocks noChangeAspect="1"/>
-          </p:cNvSpPr>
-          <p:nvPr/>
-        </p:nvSpPr>
-        <p:spPr>
-          <a:xfrm rot="16200000">
-            <a:off x="5257022" y="5257026"/>
-            <a:ext cx="7920006" cy="7919999"/>
-          </a:xfrm>
-          <a:prstGeom prst="rect">
-            <a:avLst/>
-          </a:prstGeom>
-          <a:noFill/>
-        </p:spPr>
-        <p:txBody>
-          <a:bodyPr wrap="none" lIns="210669" tIns="105334" rIns="210669" bIns="105334">
-            <a:prstTxWarp prst="textCircle">
-              <a:avLst>
-                <a:gd name="adj" fmla="val 10916975"/>
-              </a:avLst>
-            </a:prstTxWarp>
-            <a:spAutoFit/>
-          </a:bodyPr>
-          <a:lstStyle/>
-          <a:p>
-            <a:pPr algn="ctr"/>
-            <a:r>
-              <a:rPr lang="en-US" sz="13800" b="1" cap="small" spc="300" dirty="0" smtClean="0">
-                <a:ln w="12700">
-                  <a:noFill/>
-                  <a:prstDash val="solid"/>
-                </a:ln>
-                <a:solidFill>
-                  <a:schemeClr val="accent1"/>
-                </a:solidFill>
-                <a:effectLst>
-                  <a:outerShdw blurRad="41275" dist="20320" dir="1800000" algn="tl" rotWithShape="0">
-                    <a:srgbClr val="000000">
-                      <a:alpha val="40000"/>
-                    </a:srgbClr>
-                  </a:outerShdw>
-                </a:effectLst>
-              </a:rPr>
-              <a:t>Doff HMD and press ‘Return’.</a:t>
-            </a:r>
-            <a:endParaRPr lang="en-US" sz="13800" b="1" cap="small" spc="300" dirty="0">
-              <a:ln w="12700">
-                <a:noFill/>
-                <a:prstDash val="solid"/>
-              </a:ln>
-              <a:solidFill>
-                <a:schemeClr val="accent1"/>
-              </a:solidFill>
-              <a:effectLst>
-                <a:outerShdw blurRad="41275" dist="20320" dir="1800000" algn="tl" rotWithShape="0">
-                  <a:srgbClr val="000000">
-                    <a:alpha val="40000"/>
-                  </a:srgbClr>
-                </a:outerShdw>
-              </a:effectLst>
-            </a:endParaRPr>
-          </a:p>
-        </p:txBody>
-      </p:sp>
-    </p:spTree>
-    <p:extLst>
-      <p:ext uri="{BB962C8B-B14F-4D97-AF65-F5344CB8AC3E}">
-        <p14:creationId xmlns:p14="http://schemas.microsoft.com/office/powerpoint/2010/main" val="2090264467"/>
-      </p:ext>
-    </p:extLst>
-  </p:cSld>
-  <p:clrMapOvr>
-    <a:masterClrMapping/>
-  </p:clrMapOvr>
-</p:sld>
-</file>
-
-<file path=ppt/slides/slide3.xml><?xml version="1.0" encoding="utf-8"?>
-<p:sld xmlns:a="http://schemas.openxmlformats.org/drawingml/2006/main" xmlns:r="http://schemas.openxmlformats.org/officeDocument/2006/relationships" xmlns:p="http://schemas.openxmlformats.org/presentationml/2006/main">
-  <p:cSld>
-    <p:spTree>
-      <p:nvGrpSpPr>
-        <p:cNvPr id="1" name=""/>
-        <p:cNvGrpSpPr/>
-        <p:nvPr/>
-      </p:nvGrpSpPr>
-      <p:grpSpPr>
-        <a:xfrm>
-          <a:off x="0" y="0"/>
-          <a:ext cx="0" cy="0"/>
-          <a:chOff x="0" y="0"/>
-          <a:chExt cx="0" cy="0"/>
-        </a:xfrm>
-      </p:grpSpPr>
-      <p:sp>
-        <p:nvSpPr>
-          <p:cNvPr id="5" name="Bouée 4"/>
-          <p:cNvSpPr>
-            <a:spLocks noChangeAspect="1"/>
-          </p:cNvSpPr>
-          <p:nvPr/>
-        </p:nvSpPr>
-        <p:spPr>
-          <a:xfrm>
-            <a:off x="1614253" y="1610484"/>
-            <a:ext cx="15228000" cy="15228000"/>
-          </a:xfrm>
-          <a:prstGeom prst="donut">
-            <a:avLst>
-              <a:gd name="adj" fmla="val 30982"/>
-            </a:avLst>
-          </a:prstGeom>
-          <a:solidFill>
-            <a:schemeClr val="bg1"/>
-          </a:solidFill>
-          <a:ln w="76200" cmpd="sng">
-            <a:noFill/>
-          </a:ln>
-        </p:spPr>
-        <p:style>
-          <a:lnRef idx="1">
-            <a:schemeClr val="accent1"/>
-          </a:lnRef>
-          <a:fillRef idx="3">
-            <a:schemeClr val="accent1"/>
-          </a:fillRef>
-          <a:effectRef idx="2">
-            <a:schemeClr val="accent1"/>
-          </a:effectRef>
-          <a:fontRef idx="minor">
-            <a:schemeClr val="lt1"/>
-          </a:fontRef>
-        </p:style>
-        <p:txBody>
-          <a:bodyPr rtlCol="0" anchor="ctr"/>
-          <a:lstStyle/>
-          <a:p>
-            <a:pPr algn="ctr"/>
-            <a:endParaRPr lang="en-US">
-              <a:solidFill>
-                <a:schemeClr val="tx1"/>
-              </a:solidFill>
-            </a:endParaRPr>
-          </a:p>
-        </p:txBody>
-      </p:sp>
-      <p:sp>
-        <p:nvSpPr>
-          <p:cNvPr id="2" name="Rectangle 1"/>
-          <p:cNvSpPr>
-            <a:spLocks noChangeAspect="1"/>
-          </p:cNvSpPr>
-          <p:nvPr/>
-        </p:nvSpPr>
-        <p:spPr>
-          <a:xfrm rot="16200000">
-            <a:off x="3277028" y="3277028"/>
-            <a:ext cx="11879995" cy="11879995"/>
-          </a:xfrm>
-          <a:prstGeom prst="rect">
-            <a:avLst/>
-          </a:prstGeom>
-          <a:noFill/>
-        </p:spPr>
-        <p:txBody>
-          <a:bodyPr wrap="none" lIns="210669" tIns="105334" rIns="210669" bIns="105334">
-            <a:prstTxWarp prst="textCircle">
-              <a:avLst>
-                <a:gd name="adj" fmla="val 10946467"/>
-              </a:avLst>
-            </a:prstTxWarp>
-            <a:spAutoFit/>
-          </a:bodyPr>
-          <a:lstStyle/>
-          <a:p>
-            <a:pPr algn="ctr"/>
-            <a:r>
-              <a:rPr lang="en-US" sz="23900" b="1" cap="small" spc="600" dirty="0" smtClean="0">
-                <a:ln w="12700">
-                  <a:solidFill>
-                    <a:srgbClr val="FFFFFF"/>
-                  </a:solidFill>
-                  <a:prstDash val="solid"/>
-                </a:ln>
-                <a:solidFill>
-                  <a:schemeClr val="accent2"/>
-                </a:solidFill>
-              </a:rPr>
-              <a:t>Head tilt not maintained.</a:t>
-            </a:r>
-            <a:endParaRPr lang="en-US" sz="23900" b="1" cap="small" spc="600" dirty="0">
-              <a:ln w="12700">
-                <a:solidFill>
-                  <a:srgbClr val="FFFFFF"/>
-                </a:solidFill>
-                <a:prstDash val="solid"/>
-              </a:ln>
-              <a:solidFill>
-                <a:schemeClr val="accent2"/>
-              </a:solidFill>
-            </a:endParaRPr>
-          </a:p>
-        </p:txBody>
-      </p:sp>
-      <p:sp>
-        <p:nvSpPr>
-          <p:cNvPr id="3" name="Rectangle 2"/>
-          <p:cNvSpPr>
-            <a:spLocks noChangeAspect="1"/>
-          </p:cNvSpPr>
-          <p:nvPr/>
-        </p:nvSpPr>
-        <p:spPr>
-          <a:xfrm rot="16200000">
-            <a:off x="5257022" y="5257026"/>
-            <a:ext cx="7920006" cy="7919999"/>
-          </a:xfrm>
-          <a:prstGeom prst="rect">
-            <a:avLst/>
-          </a:prstGeom>
-          <a:noFill/>
-        </p:spPr>
-        <p:txBody>
-          <a:bodyPr wrap="none" lIns="210669" tIns="105334" rIns="210669" bIns="105334">
-            <a:prstTxWarp prst="textCircle">
-              <a:avLst>
-                <a:gd name="adj" fmla="val 10916975"/>
-              </a:avLst>
-            </a:prstTxWarp>
-            <a:spAutoFit/>
-          </a:bodyPr>
-          <a:lstStyle/>
-          <a:p>
-            <a:pPr algn="ctr"/>
-            <a:r>
-              <a:rPr lang="en-US" sz="13800" b="1" cap="small" spc="300" dirty="0" smtClean="0">
-                <a:ln w="12700">
-                  <a:noFill/>
-                  <a:prstDash val="solid"/>
-                </a:ln>
-                <a:solidFill>
-                  <a:schemeClr val="accent1"/>
-                </a:solidFill>
-                <a:effectLst>
-                  <a:outerShdw blurRad="41275" dist="20320" dir="1800000" algn="tl" rotWithShape="0">
-                    <a:srgbClr val="000000">
-                      <a:alpha val="40000"/>
-                    </a:srgbClr>
-                  </a:outerShdw>
-                </a:effectLst>
-              </a:rPr>
-              <a:t> Press </a:t>
-            </a:r>
-            <a:r>
-              <a:rPr lang="en-US" sz="13800" b="1" cap="small" spc="300" dirty="0">
-                <a:ln w="12700">
-                  <a:noFill/>
-                  <a:prstDash val="solid"/>
-                </a:ln>
-                <a:solidFill>
-                  <a:schemeClr val="accent1"/>
-                </a:solidFill>
-                <a:effectLst>
-                  <a:outerShdw blurRad="41275" dist="20320" dir="1800000" algn="tl" rotWithShape="0">
-                    <a:srgbClr val="000000">
-                      <a:alpha val="40000"/>
-                    </a:srgbClr>
-                  </a:outerShdw>
-                </a:effectLst>
-              </a:rPr>
-              <a:t>a button to continue</a:t>
-            </a:r>
-            <a:r>
-              <a:rPr lang="en-US" sz="13800" b="1" cap="small" spc="300" dirty="0" smtClean="0">
-                <a:ln w="12700">
-                  <a:noFill/>
-                  <a:prstDash val="solid"/>
-                </a:ln>
-                <a:solidFill>
-                  <a:schemeClr val="accent1"/>
-                </a:solidFill>
-                <a:effectLst>
-                  <a:outerShdw blurRad="41275" dist="20320" dir="1800000" algn="tl" rotWithShape="0">
-                    <a:srgbClr val="000000">
-                      <a:alpha val="40000"/>
-                    </a:srgbClr>
-                  </a:outerShdw>
-                </a:effectLst>
-              </a:rPr>
-              <a:t>.</a:t>
-            </a:r>
-            <a:endParaRPr lang="en-US" sz="13800" b="1" cap="small" spc="300" dirty="0">
-              <a:ln w="12700">
-                <a:noFill/>
-                <a:prstDash val="solid"/>
-              </a:ln>
-              <a:solidFill>
-                <a:schemeClr val="accent1"/>
-              </a:solidFill>
-              <a:effectLst>
-                <a:outerShdw blurRad="41275" dist="20320" dir="1800000" algn="tl" rotWithShape="0">
-                  <a:srgbClr val="000000">
-                    <a:alpha val="40000"/>
-                  </a:srgbClr>
-                </a:outerShdw>
-              </a:effectLst>
-            </a:endParaRPr>
-          </a:p>
-        </p:txBody>
-      </p:sp>
-    </p:spTree>
-    <p:extLst>
-      <p:ext uri="{BB962C8B-B14F-4D97-AF65-F5344CB8AC3E}">
-        <p14:creationId xmlns:p14="http://schemas.microsoft.com/office/powerpoint/2010/main" val="2090264467"/>
-      </p:ext>
-    </p:extLst>
-  </p:cSld>
-  <p:clrMapOvr>
-    <a:masterClrMapping/>
-  </p:clrMapOvr>
-</p:sld>
-</file>
-
-<file path=ppt/slides/slide4.xml><?xml version="1.0" encoding="utf-8"?>
-<p:sld xmlns:a="http://schemas.openxmlformats.org/drawingml/2006/main" xmlns:r="http://schemas.openxmlformats.org/officeDocument/2006/relationships" xmlns:p="http://schemas.openxmlformats.org/presentationml/2006/main">
-  <p:cSld>
-    <p:spTree>
-      <p:nvGrpSpPr>
-        <p:cNvPr id="1" name=""/>
-        <p:cNvGrpSpPr/>
-        <p:nvPr/>
-      </p:nvGrpSpPr>
-      <p:grpSpPr>
-        <a:xfrm>
-          <a:off x="0" y="0"/>
-          <a:ext cx="0" cy="0"/>
-          <a:chOff x="0" y="0"/>
-          <a:chExt cx="0" cy="0"/>
-        </a:xfrm>
-      </p:grpSpPr>
-      <p:sp>
-        <p:nvSpPr>
-          <p:cNvPr id="5" name="Bouée 4"/>
-          <p:cNvSpPr>
-            <a:spLocks noChangeAspect="1"/>
-          </p:cNvSpPr>
-          <p:nvPr/>
-        </p:nvSpPr>
-        <p:spPr>
-          <a:xfrm>
-            <a:off x="1614253" y="1610484"/>
-            <a:ext cx="15228000" cy="15228000"/>
-          </a:xfrm>
-          <a:prstGeom prst="donut">
-            <a:avLst>
-              <a:gd name="adj" fmla="val 30982"/>
-            </a:avLst>
-          </a:prstGeom>
-          <a:solidFill>
-            <a:schemeClr val="bg1"/>
-          </a:solidFill>
-          <a:ln w="76200" cmpd="sng">
-            <a:noFill/>
-          </a:ln>
-        </p:spPr>
-        <p:style>
-          <a:lnRef idx="1">
-            <a:schemeClr val="accent1"/>
-          </a:lnRef>
-          <a:fillRef idx="3">
-            <a:schemeClr val="accent1"/>
-          </a:fillRef>
-          <a:effectRef idx="2">
-            <a:schemeClr val="accent1"/>
-          </a:effectRef>
-          <a:fontRef idx="minor">
-            <a:schemeClr val="lt1"/>
-          </a:fontRef>
-        </p:style>
-        <p:txBody>
-          <a:bodyPr rtlCol="0" anchor="ctr"/>
-          <a:lstStyle/>
-          <a:p>
-            <a:pPr algn="ctr"/>
-            <a:endParaRPr lang="en-US">
-              <a:solidFill>
-                <a:schemeClr val="tx1"/>
-              </a:solidFill>
-            </a:endParaRPr>
-          </a:p>
-        </p:txBody>
-      </p:sp>
-      <p:sp>
-        <p:nvSpPr>
-          <p:cNvPr id="2" name="Rectangle 1"/>
-          <p:cNvSpPr>
-            <a:spLocks noChangeAspect="1"/>
-          </p:cNvSpPr>
-          <p:nvPr/>
-        </p:nvSpPr>
-        <p:spPr>
-          <a:xfrm rot="16200000">
-            <a:off x="3277028" y="3277028"/>
-            <a:ext cx="11879995" cy="11879995"/>
-          </a:xfrm>
-          <a:prstGeom prst="rect">
-            <a:avLst/>
-          </a:prstGeom>
-          <a:noFill/>
-        </p:spPr>
-        <p:txBody>
-          <a:bodyPr wrap="none" lIns="210669" tIns="105334" rIns="210669" bIns="105334">
-            <a:prstTxWarp prst="textCircle">
-              <a:avLst>
-                <a:gd name="adj" fmla="val 10946467"/>
-              </a:avLst>
-            </a:prstTxWarp>
-            <a:spAutoFit/>
-          </a:bodyPr>
-          <a:lstStyle/>
-          <a:p>
-            <a:pPr algn="ctr"/>
-            <a:r>
-              <a:rPr lang="en-US" sz="23900" b="1" cap="small" spc="600" dirty="0" smtClean="0">
-                <a:ln w="12700">
-                  <a:solidFill>
-                    <a:srgbClr val="FFFFFF"/>
-                  </a:solidFill>
-                  <a:prstDash val="solid"/>
-                </a:ln>
-                <a:solidFill>
-                  <a:schemeClr val="accent2"/>
-                </a:solidFill>
-              </a:rPr>
-              <a:t>Time limit exceeded.</a:t>
+              <a:t>Time to respond exceeded.</a:t>
             </a:r>
             <a:endParaRPr lang="en-US" sz="23900" b="1" cap="small" spc="600" dirty="0">
               <a:ln w="12700">
@@ -4614,7 +3994,7 @@
     </p:spTree>
     <p:extLst>
       <p:ext uri="{BB962C8B-B14F-4D97-AF65-F5344CB8AC3E}">
-        <p14:creationId xmlns:p14="http://schemas.microsoft.com/office/powerpoint/2010/main" val="2090264467"/>
+        <p14:creationId xmlns:p14="http://schemas.microsoft.com/office/powerpoint/2010/main" val="1908434010"/>
       </p:ext>
     </p:extLst>
   </p:cSld>
@@ -4624,7 +4004,7 @@
 </p:sld>
 </file>
 
-<file path=ppt/slides/slide5.xml><?xml version="1.0" encoding="utf-8"?>
+<file path=ppt/slides/slide11.xml><?xml version="1.0" encoding="utf-8"?>
 <p:sld xmlns:a="http://schemas.openxmlformats.org/drawingml/2006/main" xmlns:r="http://schemas.openxmlformats.org/officeDocument/2006/relationships" xmlns:p="http://schemas.openxmlformats.org/presentationml/2006/main">
   <p:cSld>
     <p:spTree>
@@ -4735,7 +4115,7 @@
                   <a:schemeClr val="accent2"/>
                 </a:solidFill>
               </a:rPr>
-              <a:t>Failed to lower arm in time.</a:t>
+              <a:t>Time limit exceeded.</a:t>
             </a:r>
             <a:endParaRPr lang="en-US" sz="23900" b="1" cap="small" spc="600" dirty="0">
               <a:ln w="12700">
@@ -5346,7 +4726,7 @@
     </p:spTree>
     <p:extLst>
       <p:ext uri="{BB962C8B-B14F-4D97-AF65-F5344CB8AC3E}">
-        <p14:creationId xmlns:p14="http://schemas.microsoft.com/office/powerpoint/2010/main" val="291435061"/>
+        <p14:creationId xmlns:p14="http://schemas.microsoft.com/office/powerpoint/2010/main" val="2090264467"/>
       </p:ext>
     </p:extLst>
   </p:cSld>
@@ -5356,7 +4736,7 @@
 </p:sld>
 </file>
 
-<file path=ppt/slides/slide6.xml><?xml version="1.0" encoding="utf-8"?>
+<file path=ppt/slides/slide2.xml><?xml version="1.0" encoding="utf-8"?>
 <p:sld xmlns:a="http://schemas.openxmlformats.org/drawingml/2006/main" xmlns:r="http://schemas.openxmlformats.org/officeDocument/2006/relationships" xmlns:p="http://schemas.openxmlformats.org/presentationml/2006/main">
   <p:cSld>
     <p:spTree>
@@ -5464,12 +4844,728 @@
                   <a:prstDash val="solid"/>
                 </a:ln>
                 <a:solidFill>
+                  <a:schemeClr val="accent3">
+                    <a:lumMod val="75000"/>
+                  </a:schemeClr>
+                </a:solidFill>
+              </a:rPr>
+              <a:t>  Ready to start next trial.</a:t>
+            </a:r>
+            <a:endParaRPr lang="en-US" sz="23900" b="1" cap="small" spc="600" dirty="0">
+              <a:ln w="12700">
+                <a:solidFill>
+                  <a:srgbClr val="FFFFFF"/>
+                </a:solidFill>
+                <a:prstDash val="solid"/>
+              </a:ln>
+              <a:solidFill>
+                <a:schemeClr val="accent3">
+                  <a:lumMod val="75000"/>
+                </a:schemeClr>
+              </a:solidFill>
+            </a:endParaRPr>
+          </a:p>
+        </p:txBody>
+      </p:sp>
+      <p:sp>
+        <p:nvSpPr>
+          <p:cNvPr id="3" name="Rectangle 2"/>
+          <p:cNvSpPr>
+            <a:spLocks noChangeAspect="1"/>
+          </p:cNvSpPr>
+          <p:nvPr/>
+        </p:nvSpPr>
+        <p:spPr>
+          <a:xfrm rot="16200000">
+            <a:off x="5257022" y="5257026"/>
+            <a:ext cx="7920006" cy="7919999"/>
+          </a:xfrm>
+          <a:prstGeom prst="rect">
+            <a:avLst/>
+          </a:prstGeom>
+          <a:noFill/>
+        </p:spPr>
+        <p:txBody>
+          <a:bodyPr wrap="none" lIns="210669" tIns="105334" rIns="210669" bIns="105334">
+            <a:prstTxWarp prst="textCircle">
+              <a:avLst>
+                <a:gd name="adj" fmla="val 10916975"/>
+              </a:avLst>
+            </a:prstTxWarp>
+            <a:spAutoFit/>
+          </a:bodyPr>
+          <a:lstStyle/>
+          <a:p>
+            <a:pPr algn="ctr"/>
+            <a:r>
+              <a:rPr lang="en-US" sz="13800" b="1" cap="small" spc="300" dirty="0" smtClean="0">
+                <a:ln w="12700">
+                  <a:noFill/>
+                  <a:prstDash val="solid"/>
+                </a:ln>
+                <a:solidFill>
+                  <a:schemeClr val="accent1"/>
+                </a:solidFill>
+                <a:effectLst>
+                  <a:outerShdw blurRad="41275" dist="20320" dir="1800000" algn="tl" rotWithShape="0">
+                    <a:srgbClr val="000000">
+                      <a:alpha val="40000"/>
+                    </a:srgbClr>
+                  </a:outerShdw>
+                </a:effectLst>
+              </a:rPr>
+              <a:t> Press </a:t>
+            </a:r>
+            <a:r>
+              <a:rPr lang="en-US" sz="13800" b="1" cap="small" spc="300" dirty="0">
+                <a:ln w="12700">
+                  <a:noFill/>
+                  <a:prstDash val="solid"/>
+                </a:ln>
+                <a:solidFill>
+                  <a:schemeClr val="accent1"/>
+                </a:solidFill>
+                <a:effectLst>
+                  <a:outerShdw blurRad="41275" dist="20320" dir="1800000" algn="tl" rotWithShape="0">
+                    <a:srgbClr val="000000">
+                      <a:alpha val="40000"/>
+                    </a:srgbClr>
+                  </a:outerShdw>
+                </a:effectLst>
+              </a:rPr>
+              <a:t>a button to continue</a:t>
+            </a:r>
+            <a:r>
+              <a:rPr lang="en-US" sz="13800" b="1" cap="small" spc="300" dirty="0" smtClean="0">
+                <a:ln w="12700">
+                  <a:noFill/>
+                  <a:prstDash val="solid"/>
+                </a:ln>
+                <a:solidFill>
+                  <a:schemeClr val="accent1"/>
+                </a:solidFill>
+                <a:effectLst>
+                  <a:outerShdw blurRad="41275" dist="20320" dir="1800000" algn="tl" rotWithShape="0">
+                    <a:srgbClr val="000000">
+                      <a:alpha val="40000"/>
+                    </a:srgbClr>
+                  </a:outerShdw>
+                </a:effectLst>
+              </a:rPr>
+              <a:t>.</a:t>
+            </a:r>
+            <a:endParaRPr lang="en-US" sz="13800" b="1" cap="small" spc="300" dirty="0">
+              <a:ln w="12700">
+                <a:noFill/>
+                <a:prstDash val="solid"/>
+              </a:ln>
+              <a:solidFill>
+                <a:schemeClr val="accent1"/>
+              </a:solidFill>
+              <a:effectLst>
+                <a:outerShdw blurRad="41275" dist="20320" dir="1800000" algn="tl" rotWithShape="0">
+                  <a:srgbClr val="000000">
+                    <a:alpha val="40000"/>
+                  </a:srgbClr>
+                </a:outerShdw>
+              </a:effectLst>
+            </a:endParaRPr>
+          </a:p>
+        </p:txBody>
+      </p:sp>
+    </p:spTree>
+    <p:extLst>
+      <p:ext uri="{BB962C8B-B14F-4D97-AF65-F5344CB8AC3E}">
+        <p14:creationId xmlns:p14="http://schemas.microsoft.com/office/powerpoint/2010/main" val="4227632991"/>
+      </p:ext>
+    </p:extLst>
+  </p:cSld>
+  <p:clrMapOvr>
+    <a:masterClrMapping/>
+  </p:clrMapOvr>
+</p:sld>
+</file>
+
+<file path=ppt/slides/slide3.xml><?xml version="1.0" encoding="utf-8"?>
+<p:sld xmlns:a="http://schemas.openxmlformats.org/drawingml/2006/main" xmlns:r="http://schemas.openxmlformats.org/officeDocument/2006/relationships" xmlns:p="http://schemas.openxmlformats.org/presentationml/2006/main">
+  <p:cSld>
+    <p:spTree>
+      <p:nvGrpSpPr>
+        <p:cNvPr id="1" name=""/>
+        <p:cNvGrpSpPr/>
+        <p:nvPr/>
+      </p:nvGrpSpPr>
+      <p:grpSpPr>
+        <a:xfrm>
+          <a:off x="0" y="0"/>
+          <a:ext cx="0" cy="0"/>
+          <a:chOff x="0" y="0"/>
+          <a:chExt cx="0" cy="0"/>
+        </a:xfrm>
+      </p:grpSpPr>
+      <p:sp>
+        <p:nvSpPr>
+          <p:cNvPr id="5" name="Bouée 4"/>
+          <p:cNvSpPr>
+            <a:spLocks noChangeAspect="1"/>
+          </p:cNvSpPr>
+          <p:nvPr/>
+        </p:nvSpPr>
+        <p:spPr>
+          <a:xfrm>
+            <a:off x="1614253" y="1610484"/>
+            <a:ext cx="15228000" cy="15228000"/>
+          </a:xfrm>
+          <a:prstGeom prst="donut">
+            <a:avLst>
+              <a:gd name="adj" fmla="val 30982"/>
+            </a:avLst>
+          </a:prstGeom>
+          <a:solidFill>
+            <a:schemeClr val="bg1"/>
+          </a:solidFill>
+          <a:ln w="76200" cmpd="sng">
+            <a:noFill/>
+          </a:ln>
+        </p:spPr>
+        <p:style>
+          <a:lnRef idx="1">
+            <a:schemeClr val="accent1"/>
+          </a:lnRef>
+          <a:fillRef idx="3">
+            <a:schemeClr val="accent1"/>
+          </a:fillRef>
+          <a:effectRef idx="2">
+            <a:schemeClr val="accent1"/>
+          </a:effectRef>
+          <a:fontRef idx="minor">
+            <a:schemeClr val="lt1"/>
+          </a:fontRef>
+        </p:style>
+        <p:txBody>
+          <a:bodyPr rtlCol="0" anchor="ctr"/>
+          <a:lstStyle/>
+          <a:p>
+            <a:pPr algn="ctr"/>
+            <a:endParaRPr lang="en-US">
+              <a:solidFill>
+                <a:schemeClr val="tx1"/>
+              </a:solidFill>
+            </a:endParaRPr>
+          </a:p>
+        </p:txBody>
+      </p:sp>
+      <p:sp>
+        <p:nvSpPr>
+          <p:cNvPr id="2" name="Rectangle 1"/>
+          <p:cNvSpPr>
+            <a:spLocks noChangeAspect="1"/>
+          </p:cNvSpPr>
+          <p:nvPr/>
+        </p:nvSpPr>
+        <p:spPr>
+          <a:xfrm rot="16200000">
+            <a:off x="3277028" y="3277028"/>
+            <a:ext cx="11879995" cy="11879995"/>
+          </a:xfrm>
+          <a:prstGeom prst="rect">
+            <a:avLst/>
+          </a:prstGeom>
+          <a:noFill/>
+        </p:spPr>
+        <p:txBody>
+          <a:bodyPr wrap="none" lIns="210669" tIns="105334" rIns="210669" bIns="105334">
+            <a:prstTxWarp prst="textCircle">
+              <a:avLst>
+                <a:gd name="adj" fmla="val 10946467"/>
+              </a:avLst>
+            </a:prstTxWarp>
+            <a:spAutoFit/>
+          </a:bodyPr>
+          <a:lstStyle/>
+          <a:p>
+            <a:pPr algn="ctr"/>
+            <a:r>
+              <a:rPr lang="en-US" sz="23900" b="1" cap="small" spc="600" dirty="0" smtClean="0">
+                <a:ln w="12700">
+                  <a:solidFill>
+                    <a:srgbClr val="FFFFFF"/>
+                  </a:solidFill>
+                  <a:prstDash val="solid"/>
+                </a:ln>
+                <a:solidFill>
+                  <a:schemeClr val="accent3">
+                    <a:lumMod val="75000"/>
+                  </a:schemeClr>
+                </a:solidFill>
+              </a:rPr>
+              <a:t>Trial block completed.</a:t>
+            </a:r>
+            <a:endParaRPr lang="en-US" sz="23900" b="1" cap="small" spc="600" dirty="0">
+              <a:ln w="12700">
+                <a:solidFill>
+                  <a:srgbClr val="FFFFFF"/>
+                </a:solidFill>
+                <a:prstDash val="solid"/>
+              </a:ln>
+              <a:solidFill>
+                <a:schemeClr val="accent3">
+                  <a:lumMod val="75000"/>
+                </a:schemeClr>
+              </a:solidFill>
+            </a:endParaRPr>
+          </a:p>
+        </p:txBody>
+      </p:sp>
+      <p:sp>
+        <p:nvSpPr>
+          <p:cNvPr id="3" name="Rectangle 2"/>
+          <p:cNvSpPr>
+            <a:spLocks noChangeAspect="1"/>
+          </p:cNvSpPr>
+          <p:nvPr/>
+        </p:nvSpPr>
+        <p:spPr>
+          <a:xfrm rot="16200000">
+            <a:off x="5257022" y="5257026"/>
+            <a:ext cx="7920006" cy="7919999"/>
+          </a:xfrm>
+          <a:prstGeom prst="rect">
+            <a:avLst/>
+          </a:prstGeom>
+          <a:noFill/>
+        </p:spPr>
+        <p:txBody>
+          <a:bodyPr wrap="none" lIns="210669" tIns="105334" rIns="210669" bIns="105334">
+            <a:prstTxWarp prst="textCircle">
+              <a:avLst>
+                <a:gd name="adj" fmla="val 10916975"/>
+              </a:avLst>
+            </a:prstTxWarp>
+            <a:spAutoFit/>
+          </a:bodyPr>
+          <a:lstStyle/>
+          <a:p>
+            <a:pPr algn="ctr"/>
+            <a:r>
+              <a:rPr lang="en-US" sz="13800" b="1" cap="small" spc="300" dirty="0" smtClean="0">
+                <a:ln w="12700">
+                  <a:noFill/>
+                  <a:prstDash val="solid"/>
+                </a:ln>
+                <a:solidFill>
+                  <a:schemeClr val="accent1"/>
+                </a:solidFill>
+                <a:effectLst>
+                  <a:outerShdw blurRad="41275" dist="20320" dir="1800000" algn="tl" rotWithShape="0">
+                    <a:srgbClr val="000000">
+                      <a:alpha val="40000"/>
+                    </a:srgbClr>
+                  </a:outerShdw>
+                </a:effectLst>
+              </a:rPr>
+              <a:t>Doff HMD and press ‘Return’.</a:t>
+            </a:r>
+            <a:endParaRPr lang="en-US" sz="13800" b="1" cap="small" spc="300" dirty="0">
+              <a:ln w="12700">
+                <a:noFill/>
+                <a:prstDash val="solid"/>
+              </a:ln>
+              <a:solidFill>
+                <a:schemeClr val="accent1"/>
+              </a:solidFill>
+              <a:effectLst>
+                <a:outerShdw blurRad="41275" dist="20320" dir="1800000" algn="tl" rotWithShape="0">
+                  <a:srgbClr val="000000">
+                    <a:alpha val="40000"/>
+                  </a:srgbClr>
+                </a:outerShdw>
+              </a:effectLst>
+            </a:endParaRPr>
+          </a:p>
+        </p:txBody>
+      </p:sp>
+    </p:spTree>
+    <p:extLst>
+      <p:ext uri="{BB962C8B-B14F-4D97-AF65-F5344CB8AC3E}">
+        <p14:creationId xmlns:p14="http://schemas.microsoft.com/office/powerpoint/2010/main" val="2090264467"/>
+      </p:ext>
+    </p:extLst>
+  </p:cSld>
+  <p:clrMapOvr>
+    <a:masterClrMapping/>
+  </p:clrMapOvr>
+</p:sld>
+</file>
+
+<file path=ppt/slides/slide4.xml><?xml version="1.0" encoding="utf-8"?>
+<p:sld xmlns:a="http://schemas.openxmlformats.org/drawingml/2006/main" xmlns:r="http://schemas.openxmlformats.org/officeDocument/2006/relationships" xmlns:p="http://schemas.openxmlformats.org/presentationml/2006/main">
+  <p:cSld>
+    <p:spTree>
+      <p:nvGrpSpPr>
+        <p:cNvPr id="1" name=""/>
+        <p:cNvGrpSpPr/>
+        <p:nvPr/>
+      </p:nvGrpSpPr>
+      <p:grpSpPr>
+        <a:xfrm>
+          <a:off x="0" y="0"/>
+          <a:ext cx="0" cy="0"/>
+          <a:chOff x="0" y="0"/>
+          <a:chExt cx="0" cy="0"/>
+        </a:xfrm>
+      </p:grpSpPr>
+      <p:sp>
+        <p:nvSpPr>
+          <p:cNvPr id="5" name="Bouée 4"/>
+          <p:cNvSpPr>
+            <a:spLocks noChangeAspect="1"/>
+          </p:cNvSpPr>
+          <p:nvPr/>
+        </p:nvSpPr>
+        <p:spPr>
+          <a:xfrm>
+            <a:off x="1614253" y="1610484"/>
+            <a:ext cx="15228000" cy="15228000"/>
+          </a:xfrm>
+          <a:prstGeom prst="donut">
+            <a:avLst>
+              <a:gd name="adj" fmla="val 30982"/>
+            </a:avLst>
+          </a:prstGeom>
+          <a:solidFill>
+            <a:schemeClr val="bg1"/>
+          </a:solidFill>
+          <a:ln w="76200" cmpd="sng">
+            <a:noFill/>
+          </a:ln>
+        </p:spPr>
+        <p:style>
+          <a:lnRef idx="1">
+            <a:schemeClr val="accent1"/>
+          </a:lnRef>
+          <a:fillRef idx="3">
+            <a:schemeClr val="accent1"/>
+          </a:fillRef>
+          <a:effectRef idx="2">
+            <a:schemeClr val="accent1"/>
+          </a:effectRef>
+          <a:fontRef idx="minor">
+            <a:schemeClr val="lt1"/>
+          </a:fontRef>
+        </p:style>
+        <p:txBody>
+          <a:bodyPr rtlCol="0" anchor="ctr"/>
+          <a:lstStyle/>
+          <a:p>
+            <a:pPr algn="ctr"/>
+            <a:endParaRPr lang="en-US">
+              <a:solidFill>
+                <a:schemeClr val="tx1"/>
+              </a:solidFill>
+            </a:endParaRPr>
+          </a:p>
+        </p:txBody>
+      </p:sp>
+      <p:pic>
+        <p:nvPicPr>
+          <p:cNvPr id="4" name="Image 3" descr="4cb46pEdi.gif"/>
+          <p:cNvPicPr>
+            <a:picLocks noChangeAspect="1"/>
+          </p:cNvPicPr>
+          <p:nvPr/>
+        </p:nvPicPr>
+        <p:blipFill>
+          <a:blip r:embed="rId2">
+            <a:extLst>
+              <a:ext uri="{28A0092B-C50C-407E-A947-70E740481C1C}">
+                <a14:useLocalDpi xmlns:a14="http://schemas.microsoft.com/office/drawing/2010/main" val="0"/>
+              </a:ext>
+            </a:extLst>
+          </a:blip>
+          <a:stretch>
+            <a:fillRect/>
+          </a:stretch>
+        </p:blipFill>
+        <p:spPr>
+          <a:xfrm>
+            <a:off x="6268275" y="5197830"/>
+            <a:ext cx="6686364" cy="10029547"/>
+          </a:xfrm>
+          <a:prstGeom prst="rect">
+            <a:avLst/>
+          </a:prstGeom>
+        </p:spPr>
+      </p:pic>
+      <p:sp>
+        <p:nvSpPr>
+          <p:cNvPr id="2" name="Rectangle 1"/>
+          <p:cNvSpPr>
+            <a:spLocks noChangeAspect="1"/>
+          </p:cNvSpPr>
+          <p:nvPr/>
+        </p:nvSpPr>
+        <p:spPr>
+          <a:xfrm rot="16200000">
+            <a:off x="3277028" y="3277028"/>
+            <a:ext cx="11879995" cy="11879995"/>
+          </a:xfrm>
+          <a:prstGeom prst="rect">
+            <a:avLst/>
+          </a:prstGeom>
+          <a:noFill/>
+        </p:spPr>
+        <p:txBody>
+          <a:bodyPr wrap="none" lIns="210669" tIns="105334" rIns="210669" bIns="105334">
+            <a:prstTxWarp prst="textCircle">
+              <a:avLst>
+                <a:gd name="adj" fmla="val 10946467"/>
+              </a:avLst>
+            </a:prstTxWarp>
+            <a:spAutoFit/>
+          </a:bodyPr>
+          <a:lstStyle/>
+          <a:p>
+            <a:pPr algn="ctr"/>
+            <a:r>
+              <a:rPr lang="en-US" sz="23900" b="1" cap="small" spc="600" dirty="0" smtClean="0">
+                <a:ln w="12700">
+                  <a:solidFill>
+                    <a:srgbClr val="FFFFFF"/>
+                  </a:solidFill>
+                  <a:prstDash val="solid"/>
+                </a:ln>
+                <a:solidFill>
                   <a:schemeClr val="accent2"/>
                 </a:solidFill>
               </a:rPr>
-              <a:t>Failed to Raise arm in time.</a:t>
+              <a:t>Lower Hand   Lower Hand</a:t>
             </a:r>
             <a:endParaRPr lang="en-US" sz="23900" b="1" cap="small" spc="600" dirty="0">
+              <a:ln w="12700">
+                <a:solidFill>
+                  <a:srgbClr val="FFFFFF"/>
+                </a:solidFill>
+                <a:prstDash val="solid"/>
+              </a:ln>
+              <a:solidFill>
+                <a:schemeClr val="accent2"/>
+              </a:solidFill>
+            </a:endParaRPr>
+          </a:p>
+        </p:txBody>
+      </p:sp>
+      <p:cxnSp>
+        <p:nvCxnSpPr>
+          <p:cNvPr id="20" name="Connecteur droit 19"/>
+          <p:cNvCxnSpPr>
+            <a:stCxn id="18" idx="1"/>
+            <a:endCxn id="18" idx="5"/>
+          </p:cNvCxnSpPr>
+          <p:nvPr/>
+        </p:nvCxnSpPr>
+        <p:spPr>
+          <a:xfrm>
+            <a:off x="6416883" y="6416882"/>
+            <a:ext cx="5600285" cy="5600286"/>
+          </a:xfrm>
+          <a:prstGeom prst="line">
+            <a:avLst/>
+          </a:prstGeom>
+          <a:ln w="304800">
+            <a:solidFill>
+              <a:schemeClr val="accent2"/>
+            </a:solidFill>
+          </a:ln>
+        </p:spPr>
+        <p:style>
+          <a:lnRef idx="2">
+            <a:schemeClr val="accent1"/>
+          </a:lnRef>
+          <a:fillRef idx="0">
+            <a:schemeClr val="accent1"/>
+          </a:fillRef>
+          <a:effectRef idx="1">
+            <a:schemeClr val="accent1"/>
+          </a:effectRef>
+          <a:fontRef idx="minor">
+            <a:schemeClr val="tx1"/>
+          </a:fontRef>
+        </p:style>
+      </p:cxnSp>
+      <p:sp>
+        <p:nvSpPr>
+          <p:cNvPr id="18" name="Ellipse 17"/>
+          <p:cNvSpPr>
+            <a:spLocks noChangeAspect="1"/>
+          </p:cNvSpPr>
+          <p:nvPr/>
+        </p:nvSpPr>
+        <p:spPr>
+          <a:xfrm>
+            <a:off x="5257026" y="5257025"/>
+            <a:ext cx="7919999" cy="7920000"/>
+          </a:xfrm>
+          <a:prstGeom prst="ellipse">
+            <a:avLst/>
+          </a:prstGeom>
+          <a:noFill/>
+          <a:ln w="304800" cmpd="sng">
+            <a:solidFill>
+              <a:schemeClr val="accent2"/>
+            </a:solidFill>
+          </a:ln>
+        </p:spPr>
+        <p:style>
+          <a:lnRef idx="1">
+            <a:schemeClr val="accent1"/>
+          </a:lnRef>
+          <a:fillRef idx="3">
+            <a:schemeClr val="accent1"/>
+          </a:fillRef>
+          <a:effectRef idx="2">
+            <a:schemeClr val="accent1"/>
+          </a:effectRef>
+          <a:fontRef idx="minor">
+            <a:schemeClr val="lt1"/>
+          </a:fontRef>
+        </p:style>
+        <p:txBody>
+          <a:bodyPr rtlCol="0" anchor="ctr"/>
+          <a:lstStyle/>
+          <a:p>
+            <a:pPr algn="ctr"/>
+            <a:endParaRPr lang="en-US"/>
+          </a:p>
+        </p:txBody>
+      </p:sp>
+    </p:spTree>
+    <p:extLst>
+      <p:ext uri="{BB962C8B-B14F-4D97-AF65-F5344CB8AC3E}">
+        <p14:creationId xmlns:p14="http://schemas.microsoft.com/office/powerpoint/2010/main" val="889738266"/>
+      </p:ext>
+    </p:extLst>
+  </p:cSld>
+  <p:clrMapOvr>
+    <a:masterClrMapping/>
+  </p:clrMapOvr>
+</p:sld>
+</file>
+
+<file path=ppt/slides/slide5.xml><?xml version="1.0" encoding="utf-8"?>
+<p:sld xmlns:a="http://schemas.openxmlformats.org/drawingml/2006/main" xmlns:r="http://schemas.openxmlformats.org/officeDocument/2006/relationships" xmlns:p="http://schemas.openxmlformats.org/presentationml/2006/main">
+  <p:cSld>
+    <p:spTree>
+      <p:nvGrpSpPr>
+        <p:cNvPr id="1" name=""/>
+        <p:cNvGrpSpPr/>
+        <p:nvPr/>
+      </p:nvGrpSpPr>
+      <p:grpSpPr>
+        <a:xfrm>
+          <a:off x="0" y="0"/>
+          <a:ext cx="0" cy="0"/>
+          <a:chOff x="0" y="0"/>
+          <a:chExt cx="0" cy="0"/>
+        </a:xfrm>
+      </p:grpSpPr>
+      <p:sp>
+        <p:nvSpPr>
+          <p:cNvPr id="5" name="Bouée 4"/>
+          <p:cNvSpPr>
+            <a:spLocks noChangeAspect="1"/>
+          </p:cNvSpPr>
+          <p:nvPr/>
+        </p:nvSpPr>
+        <p:spPr>
+          <a:xfrm>
+            <a:off x="1614253" y="1610484"/>
+            <a:ext cx="15228000" cy="15228000"/>
+          </a:xfrm>
+          <a:prstGeom prst="donut">
+            <a:avLst>
+              <a:gd name="adj" fmla="val 30982"/>
+            </a:avLst>
+          </a:prstGeom>
+          <a:solidFill>
+            <a:schemeClr val="bg1"/>
+          </a:solidFill>
+          <a:ln w="76200" cmpd="sng">
+            <a:noFill/>
+          </a:ln>
+        </p:spPr>
+        <p:style>
+          <a:lnRef idx="1">
+            <a:schemeClr val="accent1"/>
+          </a:lnRef>
+          <a:fillRef idx="3">
+            <a:schemeClr val="accent1"/>
+          </a:fillRef>
+          <a:effectRef idx="2">
+            <a:schemeClr val="accent1"/>
+          </a:effectRef>
+          <a:fontRef idx="minor">
+            <a:schemeClr val="lt1"/>
+          </a:fontRef>
+        </p:style>
+        <p:txBody>
+          <a:bodyPr rtlCol="0" anchor="ctr"/>
+          <a:lstStyle/>
+          <a:p>
+            <a:pPr algn="ctr"/>
+            <a:endParaRPr lang="en-US">
+              <a:solidFill>
+                <a:schemeClr val="tx1"/>
+              </a:solidFill>
+            </a:endParaRPr>
+          </a:p>
+        </p:txBody>
+      </p:sp>
+      <p:sp>
+        <p:nvSpPr>
+          <p:cNvPr id="2" name="Rectangle 1"/>
+          <p:cNvSpPr>
+            <a:spLocks noChangeAspect="1"/>
+          </p:cNvSpPr>
+          <p:nvPr/>
+        </p:nvSpPr>
+        <p:spPr>
+          <a:xfrm rot="16200000">
+            <a:off x="3277028" y="3277028"/>
+            <a:ext cx="11879995" cy="11879995"/>
+          </a:xfrm>
+          <a:prstGeom prst="rect">
+            <a:avLst/>
+          </a:prstGeom>
+          <a:noFill/>
+        </p:spPr>
+        <p:txBody>
+          <a:bodyPr wrap="none" lIns="210669" tIns="105334" rIns="210669" bIns="105334">
+            <a:prstTxWarp prst="textCircle">
+              <a:avLst>
+                <a:gd name="adj" fmla="val 10946467"/>
+              </a:avLst>
+            </a:prstTxWarp>
+            <a:spAutoFit/>
+          </a:bodyPr>
+          <a:lstStyle/>
+          <a:p>
+            <a:pPr algn="ctr"/>
+            <a:r>
+              <a:rPr lang="en-US" sz="23900" b="1" cap="small" spc="300" dirty="0" smtClean="0">
+                <a:ln w="12700">
+                  <a:solidFill>
+                    <a:srgbClr val="FFFFFF"/>
+                  </a:solidFill>
+                  <a:prstDash val="solid"/>
+                </a:ln>
+                <a:solidFill>
+                  <a:schemeClr val="accent2"/>
+                </a:solidFill>
+              </a:rPr>
+              <a:t>Time to lower hand exceeded.</a:t>
+            </a:r>
+            <a:endParaRPr lang="en-US" sz="23900" b="1" cap="small" spc="300" dirty="0">
               <a:ln w="12700">
                 <a:solidFill>
                   <a:srgbClr val="FFFFFF"/>
@@ -6078,7 +6174,7 @@
     </p:spTree>
     <p:extLst>
       <p:ext uri="{BB962C8B-B14F-4D97-AF65-F5344CB8AC3E}">
-        <p14:creationId xmlns:p14="http://schemas.microsoft.com/office/powerpoint/2010/main" val="193441351"/>
+        <p14:creationId xmlns:p14="http://schemas.microsoft.com/office/powerpoint/2010/main" val="291435061"/>
       </p:ext>
     </p:extLst>
   </p:cSld>
@@ -6088,7 +6184,7 @@
 </p:sld>
 </file>
 
-<file path=ppt/slides/slide7.xml><?xml version="1.0" encoding="utf-8"?>
+<file path=ppt/slides/slide6.xml><?xml version="1.0" encoding="utf-8"?>
 <p:sld xmlns:a="http://schemas.openxmlformats.org/drawingml/2006/main" xmlns:r="http://schemas.openxmlformats.org/officeDocument/2006/relationships" xmlns:p="http://schemas.openxmlformats.org/presentationml/2006/main">
   <p:cSld>
     <p:spTree>
@@ -6157,6 +6253,39 @@
           </a:p>
         </p:txBody>
       </p:sp>
+      <p:pic>
+        <p:nvPicPr>
+          <p:cNvPr id="4" name="Image 3" descr="4cb46pEdi.gif"/>
+          <p:cNvPicPr>
+            <a:picLocks noChangeAspect="1"/>
+          </p:cNvPicPr>
+          <p:nvPr/>
+        </p:nvPicPr>
+        <p:blipFill>
+          <a:blip r:embed="rId2">
+            <a:extLst>
+              <a:ext uri="{28A0092B-C50C-407E-A947-70E740481C1C}">
+                <a14:useLocalDpi xmlns:a14="http://schemas.microsoft.com/office/drawing/2010/main" val="0"/>
+              </a:ext>
+            </a:extLst>
+          </a:blip>
+          <a:stretch>
+            <a:fillRect/>
+          </a:stretch>
+        </p:blipFill>
+        <p:spPr>
+          <a:xfrm>
+            <a:off x="6268275" y="5197830"/>
+            <a:ext cx="6686364" cy="10029547"/>
+          </a:xfrm>
+          <a:prstGeom prst="rect">
+            <a:avLst/>
+          </a:prstGeom>
+          <a:ln>
+            <a:noFill/>
+          </a:ln>
+        </p:spPr>
+      </p:pic>
       <p:sp>
         <p:nvSpPr>
           <p:cNvPr id="2" name="Rectangle 1"/>
@@ -6188,6 +6317,192 @@
           <a:p>
             <a:pPr algn="ctr"/>
             <a:r>
+              <a:rPr lang="en-US" sz="23900" b="1" cap="small" dirty="0" smtClean="0">
+                <a:ln w="12700">
+                  <a:solidFill>
+                    <a:srgbClr val="FFFFFF"/>
+                  </a:solidFill>
+                  <a:prstDash val="solid"/>
+                </a:ln>
+                <a:solidFill>
+                  <a:schemeClr val="accent2"/>
+                </a:solidFill>
+              </a:rPr>
+              <a:t>Raise hand and aim at target.</a:t>
+            </a:r>
+            <a:endParaRPr lang="en-US" sz="23900" b="1" cap="small" dirty="0">
+              <a:ln w="12700">
+                <a:solidFill>
+                  <a:srgbClr val="FFFFFF"/>
+                </a:solidFill>
+                <a:prstDash val="solid"/>
+              </a:ln>
+              <a:solidFill>
+                <a:schemeClr val="accent2"/>
+              </a:solidFill>
+            </a:endParaRPr>
+          </a:p>
+        </p:txBody>
+      </p:sp>
+      <p:sp>
+        <p:nvSpPr>
+          <p:cNvPr id="18" name="Ellipse 17"/>
+          <p:cNvSpPr>
+            <a:spLocks noChangeAspect="1"/>
+          </p:cNvSpPr>
+          <p:nvPr/>
+        </p:nvSpPr>
+        <p:spPr>
+          <a:xfrm>
+            <a:off x="4897026" y="4897026"/>
+            <a:ext cx="8639998" cy="8639999"/>
+          </a:xfrm>
+          <a:prstGeom prst="ellipse">
+            <a:avLst/>
+          </a:prstGeom>
+          <a:noFill/>
+          <a:ln w="304800" cmpd="sng">
+            <a:solidFill>
+              <a:srgbClr val="008000"/>
+            </a:solidFill>
+          </a:ln>
+        </p:spPr>
+        <p:style>
+          <a:lnRef idx="1">
+            <a:schemeClr val="accent1"/>
+          </a:lnRef>
+          <a:fillRef idx="3">
+            <a:schemeClr val="accent1"/>
+          </a:fillRef>
+          <a:effectRef idx="2">
+            <a:schemeClr val="accent1"/>
+          </a:effectRef>
+          <a:fontRef idx="minor">
+            <a:schemeClr val="lt1"/>
+          </a:fontRef>
+        </p:style>
+        <p:txBody>
+          <a:bodyPr rtlCol="0" anchor="ctr"/>
+          <a:lstStyle/>
+          <a:p>
+            <a:pPr algn="ctr"/>
+            <a:endParaRPr lang="en-US"/>
+          </a:p>
+        </p:txBody>
+      </p:sp>
+    </p:spTree>
+    <p:extLst>
+      <p:ext uri="{BB962C8B-B14F-4D97-AF65-F5344CB8AC3E}">
+        <p14:creationId xmlns:p14="http://schemas.microsoft.com/office/powerpoint/2010/main" val="2779772020"/>
+      </p:ext>
+    </p:extLst>
+  </p:cSld>
+  <p:clrMapOvr>
+    <a:masterClrMapping/>
+  </p:clrMapOvr>
+</p:sld>
+</file>
+
+<file path=ppt/slides/slide7.xml><?xml version="1.0" encoding="utf-8"?>
+<p:sld xmlns:a="http://schemas.openxmlformats.org/drawingml/2006/main" xmlns:r="http://schemas.openxmlformats.org/officeDocument/2006/relationships" xmlns:p="http://schemas.openxmlformats.org/presentationml/2006/main">
+  <p:cSld>
+    <p:spTree>
+      <p:nvGrpSpPr>
+        <p:cNvPr id="1" name=""/>
+        <p:cNvGrpSpPr/>
+        <p:nvPr/>
+      </p:nvGrpSpPr>
+      <p:grpSpPr>
+        <a:xfrm>
+          <a:off x="0" y="0"/>
+          <a:ext cx="0" cy="0"/>
+          <a:chOff x="0" y="0"/>
+          <a:chExt cx="0" cy="0"/>
+        </a:xfrm>
+      </p:grpSpPr>
+      <p:sp>
+        <p:nvSpPr>
+          <p:cNvPr id="5" name="Bouée 4"/>
+          <p:cNvSpPr>
+            <a:spLocks noChangeAspect="1"/>
+          </p:cNvSpPr>
+          <p:nvPr/>
+        </p:nvSpPr>
+        <p:spPr>
+          <a:xfrm>
+            <a:off x="1614253" y="1610484"/>
+            <a:ext cx="15228000" cy="15228000"/>
+          </a:xfrm>
+          <a:prstGeom prst="donut">
+            <a:avLst>
+              <a:gd name="adj" fmla="val 30982"/>
+            </a:avLst>
+          </a:prstGeom>
+          <a:solidFill>
+            <a:schemeClr val="bg1"/>
+          </a:solidFill>
+          <a:ln w="76200" cmpd="sng">
+            <a:noFill/>
+          </a:ln>
+        </p:spPr>
+        <p:style>
+          <a:lnRef idx="1">
+            <a:schemeClr val="accent1"/>
+          </a:lnRef>
+          <a:fillRef idx="3">
+            <a:schemeClr val="accent1"/>
+          </a:fillRef>
+          <a:effectRef idx="2">
+            <a:schemeClr val="accent1"/>
+          </a:effectRef>
+          <a:fontRef idx="minor">
+            <a:schemeClr val="lt1"/>
+          </a:fontRef>
+        </p:style>
+        <p:txBody>
+          <a:bodyPr rtlCol="0" anchor="ctr"/>
+          <a:lstStyle/>
+          <a:p>
+            <a:pPr algn="ctr"/>
+            <a:endParaRPr lang="en-US">
+              <a:solidFill>
+                <a:schemeClr val="tx1"/>
+              </a:solidFill>
+            </a:endParaRPr>
+          </a:p>
+        </p:txBody>
+      </p:sp>
+      <p:sp>
+        <p:nvSpPr>
+          <p:cNvPr id="2" name="Rectangle 1"/>
+          <p:cNvSpPr>
+            <a:spLocks noChangeAspect="1"/>
+          </p:cNvSpPr>
+          <p:nvPr/>
+        </p:nvSpPr>
+        <p:spPr>
+          <a:xfrm rot="16200000">
+            <a:off x="3277028" y="3277028"/>
+            <a:ext cx="11879995" cy="11879995"/>
+          </a:xfrm>
+          <a:prstGeom prst="rect">
+            <a:avLst/>
+          </a:prstGeom>
+          <a:noFill/>
+        </p:spPr>
+        <p:txBody>
+          <a:bodyPr wrap="none" lIns="210669" tIns="105334" rIns="210669" bIns="105334">
+            <a:prstTxWarp prst="textCircle">
+              <a:avLst>
+                <a:gd name="adj" fmla="val 10946467"/>
+              </a:avLst>
+            </a:prstTxWarp>
+            <a:spAutoFit/>
+          </a:bodyPr>
+          <a:lstStyle/>
+          <a:p>
+            <a:pPr algn="ctr"/>
+            <a:r>
               <a:rPr lang="en-US" sz="23900" b="1" cap="small" spc="600" dirty="0" smtClean="0">
                 <a:ln w="12700">
                   <a:solidFill>
@@ -6199,7 +6514,21 @@
                   <a:schemeClr val="accent2"/>
                 </a:solidFill>
               </a:rPr>
-              <a:t>Time to tilt head exceeded.</a:t>
+              <a:t>Time to raise hand exceeded</a:t>
+            </a:r>
+            <a:r>
+              <a:rPr lang="en-US" sz="23900" b="1" cap="small" spc="600" dirty="0" smtClean="0">
+                <a:ln w="12700">
+                  <a:solidFill>
+                    <a:srgbClr val="FFFFFF"/>
+                  </a:solidFill>
+                  <a:prstDash val="solid"/>
+                </a:ln>
+                <a:solidFill>
+                  <a:schemeClr val="accent2"/>
+                </a:solidFill>
+              </a:rPr>
+              <a:t>.</a:t>
             </a:r>
             <a:endParaRPr lang="en-US" sz="23900" b="1" cap="small" spc="600" dirty="0">
               <a:ln w="12700">
@@ -6810,7 +7139,7 @@
     </p:spTree>
     <p:extLst>
       <p:ext uri="{BB962C8B-B14F-4D97-AF65-F5344CB8AC3E}">
-        <p14:creationId xmlns:p14="http://schemas.microsoft.com/office/powerpoint/2010/main" val="1908434010"/>
+        <p14:creationId xmlns:p14="http://schemas.microsoft.com/office/powerpoint/2010/main" val="193441351"/>
       </p:ext>
     </p:extLst>
   </p:cSld>
@@ -6931,7 +7260,253 @@
                   <a:schemeClr val="accent2"/>
                 </a:solidFill>
               </a:rPr>
-              <a:t>Time to respond exceeded.</a:t>
+              <a:t>Head tilt not maintained.</a:t>
+            </a:r>
+            <a:endParaRPr lang="en-US" sz="23900" b="1" cap="small" spc="600" dirty="0">
+              <a:ln w="12700">
+                <a:solidFill>
+                  <a:srgbClr val="FFFFFF"/>
+                </a:solidFill>
+                <a:prstDash val="solid"/>
+              </a:ln>
+              <a:solidFill>
+                <a:schemeClr val="accent2"/>
+              </a:solidFill>
+            </a:endParaRPr>
+          </a:p>
+        </p:txBody>
+      </p:sp>
+      <p:sp>
+        <p:nvSpPr>
+          <p:cNvPr id="3" name="Rectangle 2"/>
+          <p:cNvSpPr>
+            <a:spLocks noChangeAspect="1"/>
+          </p:cNvSpPr>
+          <p:nvPr/>
+        </p:nvSpPr>
+        <p:spPr>
+          <a:xfrm rot="16200000">
+            <a:off x="5257022" y="5257026"/>
+            <a:ext cx="7920006" cy="7919999"/>
+          </a:xfrm>
+          <a:prstGeom prst="rect">
+            <a:avLst/>
+          </a:prstGeom>
+          <a:noFill/>
+        </p:spPr>
+        <p:txBody>
+          <a:bodyPr wrap="none" lIns="210669" tIns="105334" rIns="210669" bIns="105334">
+            <a:prstTxWarp prst="textCircle">
+              <a:avLst>
+                <a:gd name="adj" fmla="val 10916975"/>
+              </a:avLst>
+            </a:prstTxWarp>
+            <a:spAutoFit/>
+          </a:bodyPr>
+          <a:lstStyle/>
+          <a:p>
+            <a:pPr algn="ctr"/>
+            <a:r>
+              <a:rPr lang="en-US" sz="13800" b="1" cap="small" spc="300" dirty="0" smtClean="0">
+                <a:ln w="12700">
+                  <a:noFill/>
+                  <a:prstDash val="solid"/>
+                </a:ln>
+                <a:solidFill>
+                  <a:schemeClr val="accent1"/>
+                </a:solidFill>
+                <a:effectLst>
+                  <a:outerShdw blurRad="41275" dist="20320" dir="1800000" algn="tl" rotWithShape="0">
+                    <a:srgbClr val="000000">
+                      <a:alpha val="40000"/>
+                    </a:srgbClr>
+                  </a:outerShdw>
+                </a:effectLst>
+              </a:rPr>
+              <a:t> Press </a:t>
+            </a:r>
+            <a:r>
+              <a:rPr lang="en-US" sz="13800" b="1" cap="small" spc="300" dirty="0">
+                <a:ln w="12700">
+                  <a:noFill/>
+                  <a:prstDash val="solid"/>
+                </a:ln>
+                <a:solidFill>
+                  <a:schemeClr val="accent1"/>
+                </a:solidFill>
+                <a:effectLst>
+                  <a:outerShdw blurRad="41275" dist="20320" dir="1800000" algn="tl" rotWithShape="0">
+                    <a:srgbClr val="000000">
+                      <a:alpha val="40000"/>
+                    </a:srgbClr>
+                  </a:outerShdw>
+                </a:effectLst>
+              </a:rPr>
+              <a:t>a button to continue</a:t>
+            </a:r>
+            <a:r>
+              <a:rPr lang="en-US" sz="13800" b="1" cap="small" spc="300" dirty="0" smtClean="0">
+                <a:ln w="12700">
+                  <a:noFill/>
+                  <a:prstDash val="solid"/>
+                </a:ln>
+                <a:solidFill>
+                  <a:schemeClr val="accent1"/>
+                </a:solidFill>
+                <a:effectLst>
+                  <a:outerShdw blurRad="41275" dist="20320" dir="1800000" algn="tl" rotWithShape="0">
+                    <a:srgbClr val="000000">
+                      <a:alpha val="40000"/>
+                    </a:srgbClr>
+                  </a:outerShdw>
+                </a:effectLst>
+              </a:rPr>
+              <a:t>.</a:t>
+            </a:r>
+            <a:endParaRPr lang="en-US" sz="13800" b="1" cap="small" spc="300" dirty="0">
+              <a:ln w="12700">
+                <a:noFill/>
+                <a:prstDash val="solid"/>
+              </a:ln>
+              <a:solidFill>
+                <a:schemeClr val="accent1"/>
+              </a:solidFill>
+              <a:effectLst>
+                <a:outerShdw blurRad="41275" dist="20320" dir="1800000" algn="tl" rotWithShape="0">
+                  <a:srgbClr val="000000">
+                    <a:alpha val="40000"/>
+                  </a:srgbClr>
+                </a:outerShdw>
+              </a:effectLst>
+            </a:endParaRPr>
+          </a:p>
+        </p:txBody>
+      </p:sp>
+    </p:spTree>
+    <p:extLst>
+      <p:ext uri="{BB962C8B-B14F-4D97-AF65-F5344CB8AC3E}">
+        <p14:creationId xmlns:p14="http://schemas.microsoft.com/office/powerpoint/2010/main" val="2090264467"/>
+      </p:ext>
+    </p:extLst>
+  </p:cSld>
+  <p:clrMapOvr>
+    <a:masterClrMapping/>
+  </p:clrMapOvr>
+</p:sld>
+</file>
+
+<file path=ppt/slides/slide9.xml><?xml version="1.0" encoding="utf-8"?>
+<p:sld xmlns:a="http://schemas.openxmlformats.org/drawingml/2006/main" xmlns:r="http://schemas.openxmlformats.org/officeDocument/2006/relationships" xmlns:p="http://schemas.openxmlformats.org/presentationml/2006/main">
+  <p:cSld>
+    <p:spTree>
+      <p:nvGrpSpPr>
+        <p:cNvPr id="1" name=""/>
+        <p:cNvGrpSpPr/>
+        <p:nvPr/>
+      </p:nvGrpSpPr>
+      <p:grpSpPr>
+        <a:xfrm>
+          <a:off x="0" y="0"/>
+          <a:ext cx="0" cy="0"/>
+          <a:chOff x="0" y="0"/>
+          <a:chExt cx="0" cy="0"/>
+        </a:xfrm>
+      </p:grpSpPr>
+      <p:sp>
+        <p:nvSpPr>
+          <p:cNvPr id="5" name="Bouée 4"/>
+          <p:cNvSpPr>
+            <a:spLocks noChangeAspect="1"/>
+          </p:cNvSpPr>
+          <p:nvPr/>
+        </p:nvSpPr>
+        <p:spPr>
+          <a:xfrm>
+            <a:off x="1614253" y="1610484"/>
+            <a:ext cx="15228000" cy="15228000"/>
+          </a:xfrm>
+          <a:prstGeom prst="donut">
+            <a:avLst>
+              <a:gd name="adj" fmla="val 30982"/>
+            </a:avLst>
+          </a:prstGeom>
+          <a:solidFill>
+            <a:schemeClr val="bg1"/>
+          </a:solidFill>
+          <a:ln w="76200" cmpd="sng">
+            <a:noFill/>
+          </a:ln>
+        </p:spPr>
+        <p:style>
+          <a:lnRef idx="1">
+            <a:schemeClr val="accent1"/>
+          </a:lnRef>
+          <a:fillRef idx="3">
+            <a:schemeClr val="accent1"/>
+          </a:fillRef>
+          <a:effectRef idx="2">
+            <a:schemeClr val="accent1"/>
+          </a:effectRef>
+          <a:fontRef idx="minor">
+            <a:schemeClr val="lt1"/>
+          </a:fontRef>
+        </p:style>
+        <p:txBody>
+          <a:bodyPr rtlCol="0" anchor="ctr"/>
+          <a:lstStyle/>
+          <a:p>
+            <a:pPr algn="ctr"/>
+            <a:endParaRPr lang="en-US">
+              <a:solidFill>
+                <a:schemeClr val="tx1"/>
+              </a:solidFill>
+            </a:endParaRPr>
+          </a:p>
+        </p:txBody>
+      </p:sp>
+      <p:sp>
+        <p:nvSpPr>
+          <p:cNvPr id="2" name="Rectangle 1"/>
+          <p:cNvSpPr>
+            <a:spLocks noChangeAspect="1"/>
+          </p:cNvSpPr>
+          <p:nvPr/>
+        </p:nvSpPr>
+        <p:spPr>
+          <a:xfrm rot="16200000">
+            <a:off x="3277028" y="3277028"/>
+            <a:ext cx="11879995" cy="11879995"/>
+          </a:xfrm>
+          <a:prstGeom prst="rect">
+            <a:avLst/>
+          </a:prstGeom>
+          <a:noFill/>
+        </p:spPr>
+        <p:txBody>
+          <a:bodyPr wrap="none" lIns="210669" tIns="105334" rIns="210669" bIns="105334">
+            <a:prstTxWarp prst="textCircle">
+              <a:avLst>
+                <a:gd name="adj" fmla="val 10946467"/>
+              </a:avLst>
+            </a:prstTxWarp>
+            <a:spAutoFit/>
+          </a:bodyPr>
+          <a:lstStyle/>
+          <a:p>
+            <a:pPr algn="ctr"/>
+            <a:r>
+              <a:rPr lang="en-US" sz="23900" b="1" cap="small" spc="600" dirty="0" smtClean="0">
+                <a:ln w="12700">
+                  <a:solidFill>
+                    <a:srgbClr val="FFFFFF"/>
+                  </a:solidFill>
+                  <a:prstDash val="solid"/>
+                </a:ln>
+                <a:solidFill>
+                  <a:schemeClr val="accent2"/>
+                </a:solidFill>
+              </a:rPr>
+              <a:t>Time to tilt head exceeded.</a:t>
             </a:r>
             <a:endParaRPr lang="en-US" sz="23900" b="1" cap="small" spc="600" dirty="0">
               <a:ln w="12700">

</xml_diff>

<commit_message>
More prompts (and adjusted hand orientation).
</commit_message>
<xml_diff>
--- a/Source Code/GraspBMPs/GraspCircularPrompts.pptx
+++ b/Source Code/GraspBMPs/GraspCircularPrompts.pptx
@@ -16,6 +16,9 @@
     <p:sldId id="273" r:id="rId10"/>
     <p:sldId id="274" r:id="rId11"/>
     <p:sldId id="270" r:id="rId12"/>
+    <p:sldId id="279" r:id="rId13"/>
+    <p:sldId id="278" r:id="rId14"/>
+    <p:sldId id="280" r:id="rId15"/>
   </p:sldIdLst>
   <p:sldSz cx="18434050" cy="18434050"/>
   <p:notesSz cx="6858000" cy="9144000"/>
@@ -298,7 +301,7 @@
           <a:p>
             <a:fld id="{649FEDF0-7D14-9E44-B4F2-968D163D1479}" type="datetimeFigureOut">
               <a:rPr lang="fr-FR" smtClean="0"/>
-              <a:t>30/07/16</a:t>
+              <a:t>31/07/16</a:t>
             </a:fld>
             <a:endParaRPr lang="en-US"/>
           </a:p>
@@ -468,7 +471,7 @@
           <a:p>
             <a:fld id="{649FEDF0-7D14-9E44-B4F2-968D163D1479}" type="datetimeFigureOut">
               <a:rPr lang="fr-FR" smtClean="0"/>
-              <a:t>30/07/16</a:t>
+              <a:t>31/07/16</a:t>
             </a:fld>
             <a:endParaRPr lang="en-US"/>
           </a:p>
@@ -648,7 +651,7 @@
           <a:p>
             <a:fld id="{649FEDF0-7D14-9E44-B4F2-968D163D1479}" type="datetimeFigureOut">
               <a:rPr lang="fr-FR" smtClean="0"/>
-              <a:t>30/07/16</a:t>
+              <a:t>31/07/16</a:t>
             </a:fld>
             <a:endParaRPr lang="en-US"/>
           </a:p>
@@ -818,7 +821,7 @@
           <a:p>
             <a:fld id="{649FEDF0-7D14-9E44-B4F2-968D163D1479}" type="datetimeFigureOut">
               <a:rPr lang="fr-FR" smtClean="0"/>
-              <a:t>30/07/16</a:t>
+              <a:t>31/07/16</a:t>
             </a:fld>
             <a:endParaRPr lang="en-US"/>
           </a:p>
@@ -1064,7 +1067,7 @@
           <a:p>
             <a:fld id="{649FEDF0-7D14-9E44-B4F2-968D163D1479}" type="datetimeFigureOut">
               <a:rPr lang="fr-FR" smtClean="0"/>
-              <a:t>30/07/16</a:t>
+              <a:t>31/07/16</a:t>
             </a:fld>
             <a:endParaRPr lang="en-US"/>
           </a:p>
@@ -1352,7 +1355,7 @@
           <a:p>
             <a:fld id="{649FEDF0-7D14-9E44-B4F2-968D163D1479}" type="datetimeFigureOut">
               <a:rPr lang="fr-FR" smtClean="0"/>
-              <a:t>30/07/16</a:t>
+              <a:t>31/07/16</a:t>
             </a:fld>
             <a:endParaRPr lang="en-US"/>
           </a:p>
@@ -1774,7 +1777,7 @@
           <a:p>
             <a:fld id="{649FEDF0-7D14-9E44-B4F2-968D163D1479}" type="datetimeFigureOut">
               <a:rPr lang="fr-FR" smtClean="0"/>
-              <a:t>30/07/16</a:t>
+              <a:t>31/07/16</a:t>
             </a:fld>
             <a:endParaRPr lang="en-US"/>
           </a:p>
@@ -1892,7 +1895,7 @@
           <a:p>
             <a:fld id="{649FEDF0-7D14-9E44-B4F2-968D163D1479}" type="datetimeFigureOut">
               <a:rPr lang="fr-FR" smtClean="0"/>
-              <a:t>30/07/16</a:t>
+              <a:t>31/07/16</a:t>
             </a:fld>
             <a:endParaRPr lang="en-US"/>
           </a:p>
@@ -1987,7 +1990,7 @@
           <a:p>
             <a:fld id="{649FEDF0-7D14-9E44-B4F2-968D163D1479}" type="datetimeFigureOut">
               <a:rPr lang="fr-FR" smtClean="0"/>
-              <a:t>30/07/16</a:t>
+              <a:t>31/07/16</a:t>
             </a:fld>
             <a:endParaRPr lang="en-US"/>
           </a:p>
@@ -2312,7 +2315,7 @@
           <a:p>
             <a:fld id="{649FEDF0-7D14-9E44-B4F2-968D163D1479}" type="datetimeFigureOut">
               <a:rPr lang="fr-FR" smtClean="0"/>
-              <a:t>30/07/16</a:t>
+              <a:t>31/07/16</a:t>
             </a:fld>
             <a:endParaRPr lang="en-US"/>
           </a:p>
@@ -2565,7 +2568,7 @@
           <a:p>
             <a:fld id="{649FEDF0-7D14-9E44-B4F2-968D163D1479}" type="datetimeFigureOut">
               <a:rPr lang="fr-FR" smtClean="0"/>
-              <a:t>30/07/16</a:t>
+              <a:t>31/07/16</a:t>
             </a:fld>
             <a:endParaRPr lang="en-US"/>
           </a:p>
@@ -2781,7 +2784,7 @@
           <a:p>
             <a:fld id="{649FEDF0-7D14-9E44-B4F2-968D163D1479}" type="datetimeFigureOut">
               <a:rPr lang="fr-FR" smtClean="0"/>
-              <a:t>30/07/16</a:t>
+              <a:t>31/07/16</a:t>
             </a:fld>
             <a:endParaRPr lang="en-US"/>
           </a:p>
@@ -4736,7 +4739,7 @@
 </p:sld>
 </file>
 
-<file path=ppt/slides/slide2.xml><?xml version="1.0" encoding="utf-8"?>
+<file path=ppt/slides/slide12.xml><?xml version="1.0" encoding="utf-8"?>
 <p:sld xmlns:a="http://schemas.openxmlformats.org/drawingml/2006/main" xmlns:r="http://schemas.openxmlformats.org/officeDocument/2006/relationships" xmlns:p="http://schemas.openxmlformats.org/presentationml/2006/main">
   <p:cSld>
     <p:spTree>
@@ -4836,7 +4839,7 @@
           <a:p>
             <a:pPr algn="ctr"/>
             <a:r>
-              <a:rPr lang="en-US" sz="23900" b="1" cap="small" spc="600" dirty="0" smtClean="0">
+              <a:rPr lang="en-US" sz="23900" b="1" cap="small" dirty="0" smtClean="0">
                 <a:ln w="12700">
                   <a:solidFill>
                     <a:srgbClr val="FFFFFF"/>
@@ -4844,249 +4847,13 @@
                   <a:prstDash val="solid"/>
                 </a:ln>
                 <a:solidFill>
-                  <a:schemeClr val="accent3">
-                    <a:lumMod val="75000"/>
-                  </a:schemeClr>
+                  <a:schemeClr val="accent2"/>
                 </a:solidFill>
               </a:rPr>
-              <a:t>  Ready to start next trial.</a:t>
-            </a:r>
-            <a:endParaRPr lang="en-US" sz="23900" b="1" cap="small" spc="600" dirty="0">
-              <a:ln w="12700">
-                <a:solidFill>
-                  <a:srgbClr val="FFFFFF"/>
-                </a:solidFill>
-                <a:prstDash val="solid"/>
-              </a:ln>
-              <a:solidFill>
-                <a:schemeClr val="accent3">
-                  <a:lumMod val="75000"/>
-                </a:schemeClr>
-              </a:solidFill>
-            </a:endParaRPr>
-          </a:p>
-        </p:txBody>
-      </p:sp>
-      <p:sp>
-        <p:nvSpPr>
-          <p:cNvPr id="3" name="Rectangle 2"/>
-          <p:cNvSpPr>
-            <a:spLocks noChangeAspect="1"/>
-          </p:cNvSpPr>
-          <p:nvPr/>
-        </p:nvSpPr>
-        <p:spPr>
-          <a:xfrm rot="16200000">
-            <a:off x="5257022" y="5257026"/>
-            <a:ext cx="7920006" cy="7919999"/>
-          </a:xfrm>
-          <a:prstGeom prst="rect">
-            <a:avLst/>
-          </a:prstGeom>
-          <a:noFill/>
-        </p:spPr>
-        <p:txBody>
-          <a:bodyPr wrap="none" lIns="210669" tIns="105334" rIns="210669" bIns="105334">
-            <a:prstTxWarp prst="textCircle">
-              <a:avLst>
-                <a:gd name="adj" fmla="val 10916975"/>
-              </a:avLst>
-            </a:prstTxWarp>
-            <a:spAutoFit/>
-          </a:bodyPr>
-          <a:lstStyle/>
-          <a:p>
-            <a:pPr algn="ctr"/>
-            <a:r>
-              <a:rPr lang="en-US" sz="13800" b="1" cap="small" spc="300" dirty="0" smtClean="0">
-                <a:ln w="12700">
-                  <a:noFill/>
-                  <a:prstDash val="solid"/>
-                </a:ln>
-                <a:solidFill>
-                  <a:schemeClr val="accent1"/>
-                </a:solidFill>
-                <a:effectLst>
-                  <a:outerShdw blurRad="41275" dist="20320" dir="1800000" algn="tl" rotWithShape="0">
-                    <a:srgbClr val="000000">
-                      <a:alpha val="40000"/>
-                    </a:srgbClr>
-                  </a:outerShdw>
-                </a:effectLst>
-              </a:rPr>
-              <a:t> Press </a:t>
-            </a:r>
-            <a:r>
-              <a:rPr lang="en-US" sz="13800" b="1" cap="small" spc="300" dirty="0">
-                <a:ln w="12700">
-                  <a:noFill/>
-                  <a:prstDash val="solid"/>
-                </a:ln>
-                <a:solidFill>
-                  <a:schemeClr val="accent1"/>
-                </a:solidFill>
-                <a:effectLst>
-                  <a:outerShdw blurRad="41275" dist="20320" dir="1800000" algn="tl" rotWithShape="0">
-                    <a:srgbClr val="000000">
-                      <a:alpha val="40000"/>
-                    </a:srgbClr>
-                  </a:outerShdw>
-                </a:effectLst>
-              </a:rPr>
-              <a:t>a button to continue</a:t>
-            </a:r>
-            <a:r>
-              <a:rPr lang="en-US" sz="13800" b="1" cap="small" spc="300" dirty="0" smtClean="0">
-                <a:ln w="12700">
-                  <a:noFill/>
-                  <a:prstDash val="solid"/>
-                </a:ln>
-                <a:solidFill>
-                  <a:schemeClr val="accent1"/>
-                </a:solidFill>
-                <a:effectLst>
-                  <a:outerShdw blurRad="41275" dist="20320" dir="1800000" algn="tl" rotWithShape="0">
-                    <a:srgbClr val="000000">
-                      <a:alpha val="40000"/>
-                    </a:srgbClr>
-                  </a:outerShdw>
-                </a:effectLst>
-              </a:rPr>
-              <a:t>.</a:t>
-            </a:r>
-            <a:endParaRPr lang="en-US" sz="13800" b="1" cap="small" spc="300" dirty="0">
-              <a:ln w="12700">
-                <a:noFill/>
-                <a:prstDash val="solid"/>
-              </a:ln>
-              <a:solidFill>
-                <a:schemeClr val="accent1"/>
-              </a:solidFill>
-              <a:effectLst>
-                <a:outerShdw blurRad="41275" dist="20320" dir="1800000" algn="tl" rotWithShape="0">
-                  <a:srgbClr val="000000">
-                    <a:alpha val="40000"/>
-                  </a:srgbClr>
-                </a:outerShdw>
-              </a:effectLst>
-            </a:endParaRPr>
-          </a:p>
-        </p:txBody>
-      </p:sp>
-    </p:spTree>
-    <p:extLst>
-      <p:ext uri="{BB962C8B-B14F-4D97-AF65-F5344CB8AC3E}">
-        <p14:creationId xmlns:p14="http://schemas.microsoft.com/office/powerpoint/2010/main" val="4227632991"/>
-      </p:ext>
-    </p:extLst>
-  </p:cSld>
-  <p:clrMapOvr>
-    <a:masterClrMapping/>
-  </p:clrMapOvr>
-</p:sld>
-</file>
-
-<file path=ppt/slides/slide3.xml><?xml version="1.0" encoding="utf-8"?>
-<p:sld xmlns:a="http://schemas.openxmlformats.org/drawingml/2006/main" xmlns:r="http://schemas.openxmlformats.org/officeDocument/2006/relationships" xmlns:p="http://schemas.openxmlformats.org/presentationml/2006/main">
-  <p:cSld>
-    <p:spTree>
-      <p:nvGrpSpPr>
-        <p:cNvPr id="1" name=""/>
-        <p:cNvGrpSpPr/>
-        <p:nvPr/>
-      </p:nvGrpSpPr>
-      <p:grpSpPr>
-        <a:xfrm>
-          <a:off x="0" y="0"/>
-          <a:ext cx="0" cy="0"/>
-          <a:chOff x="0" y="0"/>
-          <a:chExt cx="0" cy="0"/>
-        </a:xfrm>
-      </p:grpSpPr>
-      <p:sp>
-        <p:nvSpPr>
-          <p:cNvPr id="5" name="Bouée 4"/>
-          <p:cNvSpPr>
-            <a:spLocks noChangeAspect="1"/>
-          </p:cNvSpPr>
-          <p:nvPr/>
-        </p:nvSpPr>
-        <p:spPr>
-          <a:xfrm>
-            <a:off x="1614253" y="1610484"/>
-            <a:ext cx="15228000" cy="15228000"/>
-          </a:xfrm>
-          <a:prstGeom prst="donut">
-            <a:avLst>
-              <a:gd name="adj" fmla="val 30982"/>
-            </a:avLst>
-          </a:prstGeom>
-          <a:solidFill>
-            <a:schemeClr val="bg1"/>
-          </a:solidFill>
-          <a:ln w="76200" cmpd="sng">
-            <a:noFill/>
-          </a:ln>
-        </p:spPr>
-        <p:style>
-          <a:lnRef idx="1">
-            <a:schemeClr val="accent1"/>
-          </a:lnRef>
-          <a:fillRef idx="3">
-            <a:schemeClr val="accent1"/>
-          </a:fillRef>
-          <a:effectRef idx="2">
-            <a:schemeClr val="accent1"/>
-          </a:effectRef>
-          <a:fontRef idx="minor">
-            <a:schemeClr val="lt1"/>
-          </a:fontRef>
-        </p:style>
-        <p:txBody>
-          <a:bodyPr rtlCol="0" anchor="ctr"/>
-          <a:lstStyle/>
-          <a:p>
-            <a:pPr algn="ctr"/>
-            <a:endParaRPr lang="en-US">
-              <a:solidFill>
-                <a:schemeClr val="tx1"/>
-              </a:solidFill>
-            </a:endParaRPr>
-          </a:p>
-        </p:txBody>
-      </p:sp>
-      <p:sp>
-        <p:nvSpPr>
-          <p:cNvPr id="2" name="Rectangle 1"/>
-          <p:cNvSpPr>
-            <a:spLocks noChangeAspect="1"/>
-          </p:cNvSpPr>
-          <p:nvPr/>
-        </p:nvSpPr>
-        <p:spPr>
-          <a:xfrm rot="16200000">
-            <a:off x="3277028" y="3277028"/>
-            <a:ext cx="11879995" cy="11879995"/>
-          </a:xfrm>
-          <a:prstGeom prst="rect">
-            <a:avLst/>
-          </a:prstGeom>
-          <a:noFill/>
-        </p:spPr>
-        <p:txBody>
-          <a:bodyPr wrap="none" lIns="210669" tIns="105334" rIns="210669" bIns="105334">
-            <a:prstTxWarp prst="textCircle">
-              <a:avLst>
-                <a:gd name="adj" fmla="val 10946467"/>
-              </a:avLst>
-            </a:prstTxWarp>
-            <a:spAutoFit/>
-          </a:bodyPr>
-          <a:lstStyle/>
-          <a:p>
-            <a:pPr algn="ctr"/>
-            <a:r>
-              <a:rPr lang="en-US" sz="23900" b="1" cap="small" spc="600" dirty="0" smtClean="0">
+              <a:t>Time </a:t>
+            </a:r>
+            <a:r>
+              <a:rPr lang="en-US" sz="23900" b="1" cap="small" dirty="0" smtClean="0">
                 <a:ln w="12700">
                   <a:solidFill>
                     <a:srgbClr val="FFFFFF"/>
@@ -5094,478 +4861,12 @@
                   <a:prstDash val="solid"/>
                 </a:ln>
                 <a:solidFill>
-                  <a:schemeClr val="accent3">
-                    <a:lumMod val="75000"/>
-                  </a:schemeClr>
+                  <a:schemeClr val="accent2"/>
                 </a:solidFill>
               </a:rPr>
-              <a:t>Trial block completed.</a:t>
-            </a:r>
-            <a:endParaRPr lang="en-US" sz="23900" b="1" cap="small" spc="600" dirty="0">
-              <a:ln w="12700">
-                <a:solidFill>
-                  <a:srgbClr val="FFFFFF"/>
-                </a:solidFill>
-                <a:prstDash val="solid"/>
-              </a:ln>
-              <a:solidFill>
-                <a:schemeClr val="accent3">
-                  <a:lumMod val="75000"/>
-                </a:schemeClr>
-              </a:solidFill>
-            </a:endParaRPr>
-          </a:p>
-        </p:txBody>
-      </p:sp>
-      <p:sp>
-        <p:nvSpPr>
-          <p:cNvPr id="3" name="Rectangle 2"/>
-          <p:cNvSpPr>
-            <a:spLocks noChangeAspect="1"/>
-          </p:cNvSpPr>
-          <p:nvPr/>
-        </p:nvSpPr>
-        <p:spPr>
-          <a:xfrm rot="16200000">
-            <a:off x="5257022" y="5257026"/>
-            <a:ext cx="7920006" cy="7919999"/>
-          </a:xfrm>
-          <a:prstGeom prst="rect">
-            <a:avLst/>
-          </a:prstGeom>
-          <a:noFill/>
-        </p:spPr>
-        <p:txBody>
-          <a:bodyPr wrap="none" lIns="210669" tIns="105334" rIns="210669" bIns="105334">
-            <a:prstTxWarp prst="textCircle">
-              <a:avLst>
-                <a:gd name="adj" fmla="val 10916975"/>
-              </a:avLst>
-            </a:prstTxWarp>
-            <a:spAutoFit/>
-          </a:bodyPr>
-          <a:lstStyle/>
-          <a:p>
-            <a:pPr algn="ctr"/>
-            <a:r>
-              <a:rPr lang="en-US" sz="13800" b="1" cap="small" spc="300" dirty="0" smtClean="0">
-                <a:ln w="12700">
-                  <a:noFill/>
-                  <a:prstDash val="solid"/>
-                </a:ln>
-                <a:solidFill>
-                  <a:schemeClr val="accent1"/>
-                </a:solidFill>
-                <a:effectLst>
-                  <a:outerShdw blurRad="41275" dist="20320" dir="1800000" algn="tl" rotWithShape="0">
-                    <a:srgbClr val="000000">
-                      <a:alpha val="40000"/>
-                    </a:srgbClr>
-                  </a:outerShdw>
-                </a:effectLst>
-              </a:rPr>
-              <a:t>Doff HMD and press ‘Return’.</a:t>
-            </a:r>
-            <a:endParaRPr lang="en-US" sz="13800" b="1" cap="small" spc="300" dirty="0">
-              <a:ln w="12700">
-                <a:noFill/>
-                <a:prstDash val="solid"/>
-              </a:ln>
-              <a:solidFill>
-                <a:schemeClr val="accent1"/>
-              </a:solidFill>
-              <a:effectLst>
-                <a:outerShdw blurRad="41275" dist="20320" dir="1800000" algn="tl" rotWithShape="0">
-                  <a:srgbClr val="000000">
-                    <a:alpha val="40000"/>
-                  </a:srgbClr>
-                </a:outerShdw>
-              </a:effectLst>
-            </a:endParaRPr>
-          </a:p>
-        </p:txBody>
-      </p:sp>
-    </p:spTree>
-    <p:extLst>
-      <p:ext uri="{BB962C8B-B14F-4D97-AF65-F5344CB8AC3E}">
-        <p14:creationId xmlns:p14="http://schemas.microsoft.com/office/powerpoint/2010/main" val="2090264467"/>
-      </p:ext>
-    </p:extLst>
-  </p:cSld>
-  <p:clrMapOvr>
-    <a:masterClrMapping/>
-  </p:clrMapOvr>
-</p:sld>
-</file>
-
-<file path=ppt/slides/slide4.xml><?xml version="1.0" encoding="utf-8"?>
-<p:sld xmlns:a="http://schemas.openxmlformats.org/drawingml/2006/main" xmlns:r="http://schemas.openxmlformats.org/officeDocument/2006/relationships" xmlns:p="http://schemas.openxmlformats.org/presentationml/2006/main">
-  <p:cSld>
-    <p:spTree>
-      <p:nvGrpSpPr>
-        <p:cNvPr id="1" name=""/>
-        <p:cNvGrpSpPr/>
-        <p:nvPr/>
-      </p:nvGrpSpPr>
-      <p:grpSpPr>
-        <a:xfrm>
-          <a:off x="0" y="0"/>
-          <a:ext cx="0" cy="0"/>
-          <a:chOff x="0" y="0"/>
-          <a:chExt cx="0" cy="0"/>
-        </a:xfrm>
-      </p:grpSpPr>
-      <p:sp>
-        <p:nvSpPr>
-          <p:cNvPr id="5" name="Bouée 4"/>
-          <p:cNvSpPr>
-            <a:spLocks noChangeAspect="1"/>
-          </p:cNvSpPr>
-          <p:nvPr/>
-        </p:nvSpPr>
-        <p:spPr>
-          <a:xfrm>
-            <a:off x="1614253" y="1610484"/>
-            <a:ext cx="15228000" cy="15228000"/>
-          </a:xfrm>
-          <a:prstGeom prst="donut">
-            <a:avLst>
-              <a:gd name="adj" fmla="val 30982"/>
-            </a:avLst>
-          </a:prstGeom>
-          <a:solidFill>
-            <a:schemeClr val="bg1"/>
-          </a:solidFill>
-          <a:ln w="76200" cmpd="sng">
-            <a:noFill/>
-          </a:ln>
-        </p:spPr>
-        <p:style>
-          <a:lnRef idx="1">
-            <a:schemeClr val="accent1"/>
-          </a:lnRef>
-          <a:fillRef idx="3">
-            <a:schemeClr val="accent1"/>
-          </a:fillRef>
-          <a:effectRef idx="2">
-            <a:schemeClr val="accent1"/>
-          </a:effectRef>
-          <a:fontRef idx="minor">
-            <a:schemeClr val="lt1"/>
-          </a:fontRef>
-        </p:style>
-        <p:txBody>
-          <a:bodyPr rtlCol="0" anchor="ctr"/>
-          <a:lstStyle/>
-          <a:p>
-            <a:pPr algn="ctr"/>
-            <a:endParaRPr lang="en-US">
-              <a:solidFill>
-                <a:schemeClr val="tx1"/>
-              </a:solidFill>
-            </a:endParaRPr>
-          </a:p>
-        </p:txBody>
-      </p:sp>
-      <p:pic>
-        <p:nvPicPr>
-          <p:cNvPr id="4" name="Image 3" descr="4cb46pEdi.gif"/>
-          <p:cNvPicPr>
-            <a:picLocks noChangeAspect="1"/>
-          </p:cNvPicPr>
-          <p:nvPr/>
-        </p:nvPicPr>
-        <p:blipFill>
-          <a:blip r:embed="rId2">
-            <a:extLst>
-              <a:ext uri="{28A0092B-C50C-407E-A947-70E740481C1C}">
-                <a14:useLocalDpi xmlns:a14="http://schemas.microsoft.com/office/drawing/2010/main" val="0"/>
-              </a:ext>
-            </a:extLst>
-          </a:blip>
-          <a:stretch>
-            <a:fillRect/>
-          </a:stretch>
-        </p:blipFill>
-        <p:spPr>
-          <a:xfrm>
-            <a:off x="6268275" y="5197830"/>
-            <a:ext cx="6686364" cy="10029547"/>
-          </a:xfrm>
-          <a:prstGeom prst="rect">
-            <a:avLst/>
-          </a:prstGeom>
-        </p:spPr>
-      </p:pic>
-      <p:sp>
-        <p:nvSpPr>
-          <p:cNvPr id="2" name="Rectangle 1"/>
-          <p:cNvSpPr>
-            <a:spLocks noChangeAspect="1"/>
-          </p:cNvSpPr>
-          <p:nvPr/>
-        </p:nvSpPr>
-        <p:spPr>
-          <a:xfrm rot="16200000">
-            <a:off x="3277028" y="3277028"/>
-            <a:ext cx="11879995" cy="11879995"/>
-          </a:xfrm>
-          <a:prstGeom prst="rect">
-            <a:avLst/>
-          </a:prstGeom>
-          <a:noFill/>
-        </p:spPr>
-        <p:txBody>
-          <a:bodyPr wrap="none" lIns="210669" tIns="105334" rIns="210669" bIns="105334">
-            <a:prstTxWarp prst="textCircle">
-              <a:avLst>
-                <a:gd name="adj" fmla="val 10946467"/>
-              </a:avLst>
-            </a:prstTxWarp>
-            <a:spAutoFit/>
-          </a:bodyPr>
-          <a:lstStyle/>
-          <a:p>
-            <a:pPr algn="ctr"/>
-            <a:r>
-              <a:rPr lang="en-US" sz="23900" b="1" cap="small" spc="600" dirty="0" smtClean="0">
-                <a:ln w="12700">
-                  <a:solidFill>
-                    <a:srgbClr val="FFFFFF"/>
-                  </a:solidFill>
-                  <a:prstDash val="solid"/>
-                </a:ln>
-                <a:solidFill>
-                  <a:schemeClr val="accent2"/>
-                </a:solidFill>
-              </a:rPr>
-              <a:t>Lower Hand   Lower Hand</a:t>
-            </a:r>
-            <a:endParaRPr lang="en-US" sz="23900" b="1" cap="small" spc="600" dirty="0">
-              <a:ln w="12700">
-                <a:solidFill>
-                  <a:srgbClr val="FFFFFF"/>
-                </a:solidFill>
-                <a:prstDash val="solid"/>
-              </a:ln>
-              <a:solidFill>
-                <a:schemeClr val="accent2"/>
-              </a:solidFill>
-            </a:endParaRPr>
-          </a:p>
-        </p:txBody>
-      </p:sp>
-      <p:cxnSp>
-        <p:nvCxnSpPr>
-          <p:cNvPr id="20" name="Connecteur droit 19"/>
-          <p:cNvCxnSpPr>
-            <a:stCxn id="18" idx="1"/>
-            <a:endCxn id="18" idx="5"/>
-          </p:cNvCxnSpPr>
-          <p:nvPr/>
-        </p:nvCxnSpPr>
-        <p:spPr>
-          <a:xfrm>
-            <a:off x="6416883" y="6416882"/>
-            <a:ext cx="5600285" cy="5600286"/>
-          </a:xfrm>
-          <a:prstGeom prst="line">
-            <a:avLst/>
-          </a:prstGeom>
-          <a:ln w="304800">
-            <a:solidFill>
-              <a:schemeClr val="accent2"/>
-            </a:solidFill>
-          </a:ln>
-        </p:spPr>
-        <p:style>
-          <a:lnRef idx="2">
-            <a:schemeClr val="accent1"/>
-          </a:lnRef>
-          <a:fillRef idx="0">
-            <a:schemeClr val="accent1"/>
-          </a:fillRef>
-          <a:effectRef idx="1">
-            <a:schemeClr val="accent1"/>
-          </a:effectRef>
-          <a:fontRef idx="minor">
-            <a:schemeClr val="tx1"/>
-          </a:fontRef>
-        </p:style>
-      </p:cxnSp>
-      <p:sp>
-        <p:nvSpPr>
-          <p:cNvPr id="18" name="Ellipse 17"/>
-          <p:cNvSpPr>
-            <a:spLocks noChangeAspect="1"/>
-          </p:cNvSpPr>
-          <p:nvPr/>
-        </p:nvSpPr>
-        <p:spPr>
-          <a:xfrm>
-            <a:off x="5257026" y="5257025"/>
-            <a:ext cx="7919999" cy="7920000"/>
-          </a:xfrm>
-          <a:prstGeom prst="ellipse">
-            <a:avLst/>
-          </a:prstGeom>
-          <a:noFill/>
-          <a:ln w="304800" cmpd="sng">
-            <a:solidFill>
-              <a:schemeClr val="accent2"/>
-            </a:solidFill>
-          </a:ln>
-        </p:spPr>
-        <p:style>
-          <a:lnRef idx="1">
-            <a:schemeClr val="accent1"/>
-          </a:lnRef>
-          <a:fillRef idx="3">
-            <a:schemeClr val="accent1"/>
-          </a:fillRef>
-          <a:effectRef idx="2">
-            <a:schemeClr val="accent1"/>
-          </a:effectRef>
-          <a:fontRef idx="minor">
-            <a:schemeClr val="lt1"/>
-          </a:fontRef>
-        </p:style>
-        <p:txBody>
-          <a:bodyPr rtlCol="0" anchor="ctr"/>
-          <a:lstStyle/>
-          <a:p>
-            <a:pPr algn="ctr"/>
-            <a:endParaRPr lang="en-US"/>
-          </a:p>
-        </p:txBody>
-      </p:sp>
-    </p:spTree>
-    <p:extLst>
-      <p:ext uri="{BB962C8B-B14F-4D97-AF65-F5344CB8AC3E}">
-        <p14:creationId xmlns:p14="http://schemas.microsoft.com/office/powerpoint/2010/main" val="889738266"/>
-      </p:ext>
-    </p:extLst>
-  </p:cSld>
-  <p:clrMapOvr>
-    <a:masterClrMapping/>
-  </p:clrMapOvr>
-</p:sld>
-</file>
-
-<file path=ppt/slides/slide5.xml><?xml version="1.0" encoding="utf-8"?>
-<p:sld xmlns:a="http://schemas.openxmlformats.org/drawingml/2006/main" xmlns:r="http://schemas.openxmlformats.org/officeDocument/2006/relationships" xmlns:p="http://schemas.openxmlformats.org/presentationml/2006/main">
-  <p:cSld>
-    <p:spTree>
-      <p:nvGrpSpPr>
-        <p:cNvPr id="1" name=""/>
-        <p:cNvGrpSpPr/>
-        <p:nvPr/>
-      </p:nvGrpSpPr>
-      <p:grpSpPr>
-        <a:xfrm>
-          <a:off x="0" y="0"/>
-          <a:ext cx="0" cy="0"/>
-          <a:chOff x="0" y="0"/>
-          <a:chExt cx="0" cy="0"/>
-        </a:xfrm>
-      </p:grpSpPr>
-      <p:sp>
-        <p:nvSpPr>
-          <p:cNvPr id="5" name="Bouée 4"/>
-          <p:cNvSpPr>
-            <a:spLocks noChangeAspect="1"/>
-          </p:cNvSpPr>
-          <p:nvPr/>
-        </p:nvSpPr>
-        <p:spPr>
-          <a:xfrm>
-            <a:off x="1614253" y="1610484"/>
-            <a:ext cx="15228000" cy="15228000"/>
-          </a:xfrm>
-          <a:prstGeom prst="donut">
-            <a:avLst>
-              <a:gd name="adj" fmla="val 30982"/>
-            </a:avLst>
-          </a:prstGeom>
-          <a:solidFill>
-            <a:schemeClr val="bg1"/>
-          </a:solidFill>
-          <a:ln w="76200" cmpd="sng">
-            <a:noFill/>
-          </a:ln>
-        </p:spPr>
-        <p:style>
-          <a:lnRef idx="1">
-            <a:schemeClr val="accent1"/>
-          </a:lnRef>
-          <a:fillRef idx="3">
-            <a:schemeClr val="accent1"/>
-          </a:fillRef>
-          <a:effectRef idx="2">
-            <a:schemeClr val="accent1"/>
-          </a:effectRef>
-          <a:fontRef idx="minor">
-            <a:schemeClr val="lt1"/>
-          </a:fontRef>
-        </p:style>
-        <p:txBody>
-          <a:bodyPr rtlCol="0" anchor="ctr"/>
-          <a:lstStyle/>
-          <a:p>
-            <a:pPr algn="ctr"/>
-            <a:endParaRPr lang="en-US">
-              <a:solidFill>
-                <a:schemeClr val="tx1"/>
-              </a:solidFill>
-            </a:endParaRPr>
-          </a:p>
-        </p:txBody>
-      </p:sp>
-      <p:sp>
-        <p:nvSpPr>
-          <p:cNvPr id="2" name="Rectangle 1"/>
-          <p:cNvSpPr>
-            <a:spLocks noChangeAspect="1"/>
-          </p:cNvSpPr>
-          <p:nvPr/>
-        </p:nvSpPr>
-        <p:spPr>
-          <a:xfrm rot="16200000">
-            <a:off x="3277028" y="3277028"/>
-            <a:ext cx="11879995" cy="11879995"/>
-          </a:xfrm>
-          <a:prstGeom prst="rect">
-            <a:avLst/>
-          </a:prstGeom>
-          <a:noFill/>
-        </p:spPr>
-        <p:txBody>
-          <a:bodyPr wrap="none" lIns="210669" tIns="105334" rIns="210669" bIns="105334">
-            <a:prstTxWarp prst="textCircle">
-              <a:avLst>
-                <a:gd name="adj" fmla="val 10946467"/>
-              </a:avLst>
-            </a:prstTxWarp>
-            <a:spAutoFit/>
-          </a:bodyPr>
-          <a:lstStyle/>
-          <a:p>
-            <a:pPr algn="ctr"/>
-            <a:r>
-              <a:rPr lang="en-US" sz="23900" b="1" cap="small" spc="300" dirty="0" smtClean="0">
-                <a:ln w="12700">
-                  <a:solidFill>
-                    <a:srgbClr val="FFFFFF"/>
-                  </a:solidFill>
-                  <a:prstDash val="solid"/>
-                </a:ln>
-                <a:solidFill>
-                  <a:schemeClr val="accent2"/>
-                </a:solidFill>
-              </a:rPr>
-              <a:t>Time to lower hand exceeded.</a:t>
-            </a:r>
-            <a:endParaRPr lang="en-US" sz="23900" b="1" cap="small" spc="300" dirty="0">
+              <a:t>to rotate hand exceeded.</a:t>
+            </a:r>
+            <a:endParaRPr lang="en-US" sz="23900" b="1" cap="small" dirty="0">
               <a:ln w="12700">
                 <a:solidFill>
                   <a:srgbClr val="FFFFFF"/>
@@ -6174,7 +5475,7 @@
     </p:spTree>
     <p:extLst>
       <p:ext uri="{BB962C8B-B14F-4D97-AF65-F5344CB8AC3E}">
-        <p14:creationId xmlns:p14="http://schemas.microsoft.com/office/powerpoint/2010/main" val="291435061"/>
+        <p14:creationId xmlns:p14="http://schemas.microsoft.com/office/powerpoint/2010/main" val="152836515"/>
       </p:ext>
     </p:extLst>
   </p:cSld>
@@ -6184,7 +5485,7 @@
 </p:sld>
 </file>
 
-<file path=ppt/slides/slide6.xml><?xml version="1.0" encoding="utf-8"?>
+<file path=ppt/slides/slide13.xml><?xml version="1.0" encoding="utf-8"?>
 <p:sld xmlns:a="http://schemas.openxmlformats.org/drawingml/2006/main" xmlns:r="http://schemas.openxmlformats.org/officeDocument/2006/relationships" xmlns:p="http://schemas.openxmlformats.org/presentationml/2006/main">
   <p:cSld>
     <p:spTree>
@@ -6253,39 +5554,6 @@
           </a:p>
         </p:txBody>
       </p:sp>
-      <p:pic>
-        <p:nvPicPr>
-          <p:cNvPr id="4" name="Image 3" descr="4cb46pEdi.gif"/>
-          <p:cNvPicPr>
-            <a:picLocks noChangeAspect="1"/>
-          </p:cNvPicPr>
-          <p:nvPr/>
-        </p:nvPicPr>
-        <p:blipFill>
-          <a:blip r:embed="rId2">
-            <a:extLst>
-              <a:ext uri="{28A0092B-C50C-407E-A947-70E740481C1C}">
-                <a14:useLocalDpi xmlns:a14="http://schemas.microsoft.com/office/drawing/2010/main" val="0"/>
-              </a:ext>
-            </a:extLst>
-          </a:blip>
-          <a:stretch>
-            <a:fillRect/>
-          </a:stretch>
-        </p:blipFill>
-        <p:spPr>
-          <a:xfrm>
-            <a:off x="6268275" y="5197830"/>
-            <a:ext cx="6686364" cy="10029547"/>
-          </a:xfrm>
-          <a:prstGeom prst="rect">
-            <a:avLst/>
-          </a:prstGeom>
-          <a:ln>
-            <a:noFill/>
-          </a:ln>
-        </p:spPr>
-      </p:pic>
       <p:sp>
         <p:nvSpPr>
           <p:cNvPr id="2" name="Rectangle 1"/>
@@ -6317,7 +5585,7 @@
           <a:p>
             <a:pPr algn="ctr"/>
             <a:r>
-              <a:rPr lang="en-US" sz="23900" b="1" cap="small" dirty="0" smtClean="0">
+              <a:rPr lang="en-US" sz="23900" b="1" cap="small" spc="600" dirty="0" smtClean="0">
                 <a:ln w="12700">
                   <a:solidFill>
                     <a:srgbClr val="FFFFFF"/>
@@ -6328,9 +5596,9 @@
                   <a:schemeClr val="accent2"/>
                 </a:solidFill>
               </a:rPr>
-              <a:t>Raise hand and aim at target.</a:t>
-            </a:r>
-            <a:endParaRPr lang="en-US" sz="23900" b="1" cap="small" dirty="0">
+              <a:t>Hand raised too soon.</a:t>
+            </a:r>
+            <a:endParaRPr lang="en-US" sz="23900" b="1" cap="small" spc="600" dirty="0">
               <a:ln w="12700">
                 <a:solidFill>
                   <a:srgbClr val="FFFFFF"/>
@@ -6346,54 +5614,114 @@
       </p:sp>
       <p:sp>
         <p:nvSpPr>
-          <p:cNvPr id="18" name="Ellipse 17"/>
+          <p:cNvPr id="7" name="Rectangle 6"/>
           <p:cNvSpPr>
             <a:spLocks noChangeAspect="1"/>
           </p:cNvSpPr>
           <p:nvPr/>
         </p:nvSpPr>
         <p:spPr>
-          <a:xfrm>
-            <a:off x="4897026" y="4897026"/>
-            <a:ext cx="8639998" cy="8639999"/>
+          <a:xfrm rot="16200000">
+            <a:off x="5257022" y="5257026"/>
+            <a:ext cx="7920006" cy="7919999"/>
           </a:xfrm>
-          <a:prstGeom prst="ellipse">
+          <a:prstGeom prst="rect">
             <a:avLst/>
           </a:prstGeom>
           <a:noFill/>
-          <a:ln w="304800" cmpd="sng">
-            <a:solidFill>
-              <a:srgbClr val="008000"/>
-            </a:solidFill>
-          </a:ln>
         </p:spPr>
-        <p:style>
-          <a:lnRef idx="1">
-            <a:schemeClr val="accent1"/>
-          </a:lnRef>
-          <a:fillRef idx="3">
-            <a:schemeClr val="accent1"/>
-          </a:fillRef>
-          <a:effectRef idx="2">
-            <a:schemeClr val="accent1"/>
-          </a:effectRef>
-          <a:fontRef idx="minor">
-            <a:schemeClr val="lt1"/>
-          </a:fontRef>
-        </p:style>
-        <p:txBody>
-          <a:bodyPr rtlCol="0" anchor="ctr"/>
+        <p:txBody>
+          <a:bodyPr wrap="none" lIns="210669" tIns="105334" rIns="210669" bIns="105334">
+            <a:prstTxWarp prst="textCircle">
+              <a:avLst>
+                <a:gd name="adj" fmla="val 10916975"/>
+              </a:avLst>
+            </a:prstTxWarp>
+            <a:spAutoFit/>
+          </a:bodyPr>
           <a:lstStyle/>
           <a:p>
             <a:pPr algn="ctr"/>
-            <a:endParaRPr lang="en-US"/>
+            <a:r>
+              <a:rPr lang="en-US" sz="13800" b="1" cap="small" spc="300" dirty="0" smtClean="0">
+                <a:ln w="12700">
+                  <a:noFill/>
+                  <a:prstDash val="solid"/>
+                </a:ln>
+                <a:solidFill>
+                  <a:schemeClr val="accent1"/>
+                </a:solidFill>
+                <a:effectLst>
+                  <a:outerShdw blurRad="41275" dist="20320" dir="1800000" algn="tl" rotWithShape="0">
+                    <a:srgbClr val="000000">
+                      <a:alpha val="40000"/>
+                    </a:srgbClr>
+                  </a:outerShdw>
+                </a:effectLst>
+              </a:rPr>
+              <a:t> Press </a:t>
+            </a:r>
+            <a:r>
+              <a:rPr lang="en-US" sz="13800" b="1" cap="small" spc="300" dirty="0">
+                <a:ln w="12700">
+                  <a:noFill/>
+                  <a:prstDash val="solid"/>
+                </a:ln>
+                <a:solidFill>
+                  <a:schemeClr val="accent1"/>
+                </a:solidFill>
+                <a:effectLst>
+                  <a:outerShdw blurRad="41275" dist="20320" dir="1800000" algn="tl" rotWithShape="0">
+                    <a:srgbClr val="000000">
+                      <a:alpha val="40000"/>
+                    </a:srgbClr>
+                  </a:outerShdw>
+                </a:effectLst>
+              </a:rPr>
+              <a:t>a button to continue</a:t>
+            </a:r>
+            <a:r>
+              <a:rPr lang="en-US" sz="13800" b="1" cap="small" spc="300" dirty="0" smtClean="0">
+                <a:ln w="12700">
+                  <a:noFill/>
+                  <a:prstDash val="solid"/>
+                </a:ln>
+                <a:solidFill>
+                  <a:schemeClr val="accent1"/>
+                </a:solidFill>
+                <a:effectLst>
+                  <a:outerShdw blurRad="41275" dist="20320" dir="1800000" algn="tl" rotWithShape="0">
+                    <a:srgbClr val="000000">
+                      <a:alpha val="40000"/>
+                    </a:srgbClr>
+                  </a:outerShdw>
+                </a:effectLst>
+              </a:rPr>
+              <a:t>.</a:t>
+            </a:r>
+            <a:endParaRPr lang="en-US" sz="13800" b="1" cap="small" spc="300" dirty="0">
+              <a:ln w="12700">
+                <a:noFill/>
+                <a:prstDash val="solid"/>
+              </a:ln>
+              <a:solidFill>
+                <a:schemeClr val="accent1"/>
+              </a:solidFill>
+              <a:effectLst>
+                <a:outerShdw blurRad="41275" dist="20320" dir="1800000" algn="tl" rotWithShape="0">
+                  <a:srgbClr val="000000">
+                    <a:alpha val="40000"/>
+                  </a:srgbClr>
+                </a:outerShdw>
+              </a:effectLst>
+            </a:endParaRPr>
           </a:p>
         </p:txBody>
       </p:sp>
     </p:spTree>
     <p:extLst>
       <p:ext uri="{BB962C8B-B14F-4D97-AF65-F5344CB8AC3E}">
-        <p14:creationId xmlns:p14="http://schemas.microsoft.com/office/powerpoint/2010/main" val="2779772020"/>
+        <p14:creationId xmlns:p14="http://schemas.microsoft.com/office/powerpoint/2010/main" val="250485459"/>
       </p:ext>
     </p:extLst>
   </p:cSld>
@@ -6403,7 +5731,7 @@
 </p:sld>
 </file>
 
-<file path=ppt/slides/slide7.xml><?xml version="1.0" encoding="utf-8"?>
+<file path=ppt/slides/slide14.xml><?xml version="1.0" encoding="utf-8"?>
 <p:sld xmlns:a="http://schemas.openxmlformats.org/drawingml/2006/main" xmlns:r="http://schemas.openxmlformats.org/officeDocument/2006/relationships" xmlns:p="http://schemas.openxmlformats.org/presentationml/2006/main">
   <p:cSld>
     <p:spTree>
@@ -6514,8 +5842,240 @@
                   <a:schemeClr val="accent2"/>
                 </a:solidFill>
               </a:rPr>
-              <a:t>Time to raise hand exceeded</a:t>
-            </a:r>
+              <a:t>Hand should not be raised.</a:t>
+            </a:r>
+            <a:endParaRPr lang="en-US" sz="23900" b="1" cap="small" spc="600" dirty="0">
+              <a:ln w="12700">
+                <a:solidFill>
+                  <a:srgbClr val="FFFFFF"/>
+                </a:solidFill>
+                <a:prstDash val="solid"/>
+              </a:ln>
+              <a:solidFill>
+                <a:schemeClr val="accent2"/>
+              </a:solidFill>
+            </a:endParaRPr>
+          </a:p>
+        </p:txBody>
+      </p:sp>
+      <p:sp>
+        <p:nvSpPr>
+          <p:cNvPr id="7" name="Rectangle 6"/>
+          <p:cNvSpPr>
+            <a:spLocks noChangeAspect="1"/>
+          </p:cNvSpPr>
+          <p:nvPr/>
+        </p:nvSpPr>
+        <p:spPr>
+          <a:xfrm rot="16200000">
+            <a:off x="5257022" y="5257026"/>
+            <a:ext cx="7920006" cy="7919999"/>
+          </a:xfrm>
+          <a:prstGeom prst="rect">
+            <a:avLst/>
+          </a:prstGeom>
+          <a:noFill/>
+        </p:spPr>
+        <p:txBody>
+          <a:bodyPr wrap="none" lIns="210669" tIns="105334" rIns="210669" bIns="105334">
+            <a:prstTxWarp prst="textCircle">
+              <a:avLst>
+                <a:gd name="adj" fmla="val 10916975"/>
+              </a:avLst>
+            </a:prstTxWarp>
+            <a:spAutoFit/>
+          </a:bodyPr>
+          <a:lstStyle/>
+          <a:p>
+            <a:pPr algn="ctr"/>
+            <a:r>
+              <a:rPr lang="en-US" sz="13800" b="1" cap="small" spc="300" dirty="0" smtClean="0">
+                <a:ln w="12700">
+                  <a:noFill/>
+                  <a:prstDash val="solid"/>
+                </a:ln>
+                <a:solidFill>
+                  <a:schemeClr val="accent1"/>
+                </a:solidFill>
+                <a:effectLst>
+                  <a:outerShdw blurRad="41275" dist="20320" dir="1800000" algn="tl" rotWithShape="0">
+                    <a:srgbClr val="000000">
+                      <a:alpha val="40000"/>
+                    </a:srgbClr>
+                  </a:outerShdw>
+                </a:effectLst>
+              </a:rPr>
+              <a:t> Press </a:t>
+            </a:r>
+            <a:r>
+              <a:rPr lang="en-US" sz="13800" b="1" cap="small" spc="300" dirty="0">
+                <a:ln w="12700">
+                  <a:noFill/>
+                  <a:prstDash val="solid"/>
+                </a:ln>
+                <a:solidFill>
+                  <a:schemeClr val="accent1"/>
+                </a:solidFill>
+                <a:effectLst>
+                  <a:outerShdw blurRad="41275" dist="20320" dir="1800000" algn="tl" rotWithShape="0">
+                    <a:srgbClr val="000000">
+                      <a:alpha val="40000"/>
+                    </a:srgbClr>
+                  </a:outerShdw>
+                </a:effectLst>
+              </a:rPr>
+              <a:t>a button to continue</a:t>
+            </a:r>
+            <a:r>
+              <a:rPr lang="en-US" sz="13800" b="1" cap="small" spc="300" dirty="0" smtClean="0">
+                <a:ln w="12700">
+                  <a:noFill/>
+                  <a:prstDash val="solid"/>
+                </a:ln>
+                <a:solidFill>
+                  <a:schemeClr val="accent1"/>
+                </a:solidFill>
+                <a:effectLst>
+                  <a:outerShdw blurRad="41275" dist="20320" dir="1800000" algn="tl" rotWithShape="0">
+                    <a:srgbClr val="000000">
+                      <a:alpha val="40000"/>
+                    </a:srgbClr>
+                  </a:outerShdw>
+                </a:effectLst>
+              </a:rPr>
+              <a:t>.</a:t>
+            </a:r>
+            <a:endParaRPr lang="en-US" sz="13800" b="1" cap="small" spc="300" dirty="0">
+              <a:ln w="12700">
+                <a:noFill/>
+                <a:prstDash val="solid"/>
+              </a:ln>
+              <a:solidFill>
+                <a:schemeClr val="accent1"/>
+              </a:solidFill>
+              <a:effectLst>
+                <a:outerShdw blurRad="41275" dist="20320" dir="1800000" algn="tl" rotWithShape="0">
+                  <a:srgbClr val="000000">
+                    <a:alpha val="40000"/>
+                  </a:srgbClr>
+                </a:outerShdw>
+              </a:effectLst>
+            </a:endParaRPr>
+          </a:p>
+        </p:txBody>
+      </p:sp>
+    </p:spTree>
+    <p:extLst>
+      <p:ext uri="{BB962C8B-B14F-4D97-AF65-F5344CB8AC3E}">
+        <p14:creationId xmlns:p14="http://schemas.microsoft.com/office/powerpoint/2010/main" val="1885241631"/>
+      </p:ext>
+    </p:extLst>
+  </p:cSld>
+  <p:clrMapOvr>
+    <a:masterClrMapping/>
+  </p:clrMapOvr>
+</p:sld>
+</file>
+
+<file path=ppt/slides/slide2.xml><?xml version="1.0" encoding="utf-8"?>
+<p:sld xmlns:a="http://schemas.openxmlformats.org/drawingml/2006/main" xmlns:r="http://schemas.openxmlformats.org/officeDocument/2006/relationships" xmlns:p="http://schemas.openxmlformats.org/presentationml/2006/main">
+  <p:cSld>
+    <p:spTree>
+      <p:nvGrpSpPr>
+        <p:cNvPr id="1" name=""/>
+        <p:cNvGrpSpPr/>
+        <p:nvPr/>
+      </p:nvGrpSpPr>
+      <p:grpSpPr>
+        <a:xfrm>
+          <a:off x="0" y="0"/>
+          <a:ext cx="0" cy="0"/>
+          <a:chOff x="0" y="0"/>
+          <a:chExt cx="0" cy="0"/>
+        </a:xfrm>
+      </p:grpSpPr>
+      <p:sp>
+        <p:nvSpPr>
+          <p:cNvPr id="5" name="Bouée 4"/>
+          <p:cNvSpPr>
+            <a:spLocks noChangeAspect="1"/>
+          </p:cNvSpPr>
+          <p:nvPr/>
+        </p:nvSpPr>
+        <p:spPr>
+          <a:xfrm>
+            <a:off x="1614253" y="1610484"/>
+            <a:ext cx="15228000" cy="15228000"/>
+          </a:xfrm>
+          <a:prstGeom prst="donut">
+            <a:avLst>
+              <a:gd name="adj" fmla="val 30982"/>
+            </a:avLst>
+          </a:prstGeom>
+          <a:solidFill>
+            <a:schemeClr val="bg1"/>
+          </a:solidFill>
+          <a:ln w="76200" cmpd="sng">
+            <a:noFill/>
+          </a:ln>
+        </p:spPr>
+        <p:style>
+          <a:lnRef idx="1">
+            <a:schemeClr val="accent1"/>
+          </a:lnRef>
+          <a:fillRef idx="3">
+            <a:schemeClr val="accent1"/>
+          </a:fillRef>
+          <a:effectRef idx="2">
+            <a:schemeClr val="accent1"/>
+          </a:effectRef>
+          <a:fontRef idx="minor">
+            <a:schemeClr val="lt1"/>
+          </a:fontRef>
+        </p:style>
+        <p:txBody>
+          <a:bodyPr rtlCol="0" anchor="ctr"/>
+          <a:lstStyle/>
+          <a:p>
+            <a:pPr algn="ctr"/>
+            <a:endParaRPr lang="en-US">
+              <a:solidFill>
+                <a:schemeClr val="tx1"/>
+              </a:solidFill>
+            </a:endParaRPr>
+          </a:p>
+        </p:txBody>
+      </p:sp>
+      <p:sp>
+        <p:nvSpPr>
+          <p:cNvPr id="2" name="Rectangle 1"/>
+          <p:cNvSpPr>
+            <a:spLocks noChangeAspect="1"/>
+          </p:cNvSpPr>
+          <p:nvPr/>
+        </p:nvSpPr>
+        <p:spPr>
+          <a:xfrm rot="16200000">
+            <a:off x="3277028" y="3277028"/>
+            <a:ext cx="11879995" cy="11879995"/>
+          </a:xfrm>
+          <a:prstGeom prst="rect">
+            <a:avLst/>
+          </a:prstGeom>
+          <a:noFill/>
+        </p:spPr>
+        <p:txBody>
+          <a:bodyPr wrap="none" lIns="210669" tIns="105334" rIns="210669" bIns="105334">
+            <a:prstTxWarp prst="textCircle">
+              <a:avLst>
+                <a:gd name="adj" fmla="val 10946467"/>
+              </a:avLst>
+            </a:prstTxWarp>
+            <a:spAutoFit/>
+          </a:bodyPr>
+          <a:lstStyle/>
+          <a:p>
+            <a:pPr algn="ctr"/>
             <a:r>
               <a:rPr lang="en-US" sz="23900" b="1" cap="small" spc="600" dirty="0" smtClean="0">
                 <a:ln w="12700">
@@ -6525,10 +6085,1680 @@
                   <a:prstDash val="solid"/>
                 </a:ln>
                 <a:solidFill>
-                  <a:schemeClr val="accent2"/>
-                </a:solidFill>
+                  <a:schemeClr val="accent3">
+                    <a:lumMod val="75000"/>
+                  </a:schemeClr>
+                </a:solidFill>
+              </a:rPr>
+              <a:t>  Ready to start next trial.</a:t>
+            </a:r>
+            <a:endParaRPr lang="en-US" sz="23900" b="1" cap="small" spc="600" dirty="0">
+              <a:ln w="12700">
+                <a:solidFill>
+                  <a:srgbClr val="FFFFFF"/>
+                </a:solidFill>
+                <a:prstDash val="solid"/>
+              </a:ln>
+              <a:solidFill>
+                <a:schemeClr val="accent3">
+                  <a:lumMod val="75000"/>
+                </a:schemeClr>
+              </a:solidFill>
+            </a:endParaRPr>
+          </a:p>
+        </p:txBody>
+      </p:sp>
+      <p:sp>
+        <p:nvSpPr>
+          <p:cNvPr id="3" name="Rectangle 2"/>
+          <p:cNvSpPr>
+            <a:spLocks noChangeAspect="1"/>
+          </p:cNvSpPr>
+          <p:nvPr/>
+        </p:nvSpPr>
+        <p:spPr>
+          <a:xfrm rot="16200000">
+            <a:off x="5257022" y="5257026"/>
+            <a:ext cx="7920006" cy="7919999"/>
+          </a:xfrm>
+          <a:prstGeom prst="rect">
+            <a:avLst/>
+          </a:prstGeom>
+          <a:noFill/>
+        </p:spPr>
+        <p:txBody>
+          <a:bodyPr wrap="none" lIns="210669" tIns="105334" rIns="210669" bIns="105334">
+            <a:prstTxWarp prst="textCircle">
+              <a:avLst>
+                <a:gd name="adj" fmla="val 10916975"/>
+              </a:avLst>
+            </a:prstTxWarp>
+            <a:spAutoFit/>
+          </a:bodyPr>
+          <a:lstStyle/>
+          <a:p>
+            <a:pPr algn="ctr"/>
+            <a:r>
+              <a:rPr lang="en-US" sz="13800" b="1" cap="small" spc="300" dirty="0" smtClean="0">
+                <a:ln w="12700">
+                  <a:noFill/>
+                  <a:prstDash val="solid"/>
+                </a:ln>
+                <a:solidFill>
+                  <a:schemeClr val="accent1"/>
+                </a:solidFill>
+                <a:effectLst>
+                  <a:outerShdw blurRad="41275" dist="20320" dir="1800000" algn="tl" rotWithShape="0">
+                    <a:srgbClr val="000000">
+                      <a:alpha val="40000"/>
+                    </a:srgbClr>
+                  </a:outerShdw>
+                </a:effectLst>
+              </a:rPr>
+              <a:t> Press </a:t>
+            </a:r>
+            <a:r>
+              <a:rPr lang="en-US" sz="13800" b="1" cap="small" spc="300" dirty="0">
+                <a:ln w="12700">
+                  <a:noFill/>
+                  <a:prstDash val="solid"/>
+                </a:ln>
+                <a:solidFill>
+                  <a:schemeClr val="accent1"/>
+                </a:solidFill>
+                <a:effectLst>
+                  <a:outerShdw blurRad="41275" dist="20320" dir="1800000" algn="tl" rotWithShape="0">
+                    <a:srgbClr val="000000">
+                      <a:alpha val="40000"/>
+                    </a:srgbClr>
+                  </a:outerShdw>
+                </a:effectLst>
+              </a:rPr>
+              <a:t>a button to continue</a:t>
+            </a:r>
+            <a:r>
+              <a:rPr lang="en-US" sz="13800" b="1" cap="small" spc="300" dirty="0" smtClean="0">
+                <a:ln w="12700">
+                  <a:noFill/>
+                  <a:prstDash val="solid"/>
+                </a:ln>
+                <a:solidFill>
+                  <a:schemeClr val="accent1"/>
+                </a:solidFill>
+                <a:effectLst>
+                  <a:outerShdw blurRad="41275" dist="20320" dir="1800000" algn="tl" rotWithShape="0">
+                    <a:srgbClr val="000000">
+                      <a:alpha val="40000"/>
+                    </a:srgbClr>
+                  </a:outerShdw>
+                </a:effectLst>
               </a:rPr>
               <a:t>.</a:t>
+            </a:r>
+            <a:endParaRPr lang="en-US" sz="13800" b="1" cap="small" spc="300" dirty="0">
+              <a:ln w="12700">
+                <a:noFill/>
+                <a:prstDash val="solid"/>
+              </a:ln>
+              <a:solidFill>
+                <a:schemeClr val="accent1"/>
+              </a:solidFill>
+              <a:effectLst>
+                <a:outerShdw blurRad="41275" dist="20320" dir="1800000" algn="tl" rotWithShape="0">
+                  <a:srgbClr val="000000">
+                    <a:alpha val="40000"/>
+                  </a:srgbClr>
+                </a:outerShdw>
+              </a:effectLst>
+            </a:endParaRPr>
+          </a:p>
+        </p:txBody>
+      </p:sp>
+    </p:spTree>
+    <p:extLst>
+      <p:ext uri="{BB962C8B-B14F-4D97-AF65-F5344CB8AC3E}">
+        <p14:creationId xmlns:p14="http://schemas.microsoft.com/office/powerpoint/2010/main" val="4227632991"/>
+      </p:ext>
+    </p:extLst>
+  </p:cSld>
+  <p:clrMapOvr>
+    <a:masterClrMapping/>
+  </p:clrMapOvr>
+</p:sld>
+</file>
+
+<file path=ppt/slides/slide3.xml><?xml version="1.0" encoding="utf-8"?>
+<p:sld xmlns:a="http://schemas.openxmlformats.org/drawingml/2006/main" xmlns:r="http://schemas.openxmlformats.org/officeDocument/2006/relationships" xmlns:p="http://schemas.openxmlformats.org/presentationml/2006/main">
+  <p:cSld>
+    <p:spTree>
+      <p:nvGrpSpPr>
+        <p:cNvPr id="1" name=""/>
+        <p:cNvGrpSpPr/>
+        <p:nvPr/>
+      </p:nvGrpSpPr>
+      <p:grpSpPr>
+        <a:xfrm>
+          <a:off x="0" y="0"/>
+          <a:ext cx="0" cy="0"/>
+          <a:chOff x="0" y="0"/>
+          <a:chExt cx="0" cy="0"/>
+        </a:xfrm>
+      </p:grpSpPr>
+      <p:sp>
+        <p:nvSpPr>
+          <p:cNvPr id="5" name="Bouée 4"/>
+          <p:cNvSpPr>
+            <a:spLocks noChangeAspect="1"/>
+          </p:cNvSpPr>
+          <p:nvPr/>
+        </p:nvSpPr>
+        <p:spPr>
+          <a:xfrm>
+            <a:off x="1614253" y="1610484"/>
+            <a:ext cx="15228000" cy="15228000"/>
+          </a:xfrm>
+          <a:prstGeom prst="donut">
+            <a:avLst>
+              <a:gd name="adj" fmla="val 30982"/>
+            </a:avLst>
+          </a:prstGeom>
+          <a:solidFill>
+            <a:schemeClr val="bg1"/>
+          </a:solidFill>
+          <a:ln w="76200" cmpd="sng">
+            <a:noFill/>
+          </a:ln>
+        </p:spPr>
+        <p:style>
+          <a:lnRef idx="1">
+            <a:schemeClr val="accent1"/>
+          </a:lnRef>
+          <a:fillRef idx="3">
+            <a:schemeClr val="accent1"/>
+          </a:fillRef>
+          <a:effectRef idx="2">
+            <a:schemeClr val="accent1"/>
+          </a:effectRef>
+          <a:fontRef idx="minor">
+            <a:schemeClr val="lt1"/>
+          </a:fontRef>
+        </p:style>
+        <p:txBody>
+          <a:bodyPr rtlCol="0" anchor="ctr"/>
+          <a:lstStyle/>
+          <a:p>
+            <a:pPr algn="ctr"/>
+            <a:endParaRPr lang="en-US">
+              <a:solidFill>
+                <a:schemeClr val="tx1"/>
+              </a:solidFill>
+            </a:endParaRPr>
+          </a:p>
+        </p:txBody>
+      </p:sp>
+      <p:sp>
+        <p:nvSpPr>
+          <p:cNvPr id="2" name="Rectangle 1"/>
+          <p:cNvSpPr>
+            <a:spLocks noChangeAspect="1"/>
+          </p:cNvSpPr>
+          <p:nvPr/>
+        </p:nvSpPr>
+        <p:spPr>
+          <a:xfrm rot="16200000">
+            <a:off x="3277028" y="3277028"/>
+            <a:ext cx="11879995" cy="11879995"/>
+          </a:xfrm>
+          <a:prstGeom prst="rect">
+            <a:avLst/>
+          </a:prstGeom>
+          <a:noFill/>
+        </p:spPr>
+        <p:txBody>
+          <a:bodyPr wrap="none" lIns="210669" tIns="105334" rIns="210669" bIns="105334">
+            <a:prstTxWarp prst="textCircle">
+              <a:avLst>
+                <a:gd name="adj" fmla="val 10946467"/>
+              </a:avLst>
+            </a:prstTxWarp>
+            <a:spAutoFit/>
+          </a:bodyPr>
+          <a:lstStyle/>
+          <a:p>
+            <a:pPr algn="ctr"/>
+            <a:r>
+              <a:rPr lang="en-US" sz="23900" b="1" cap="small" spc="600" dirty="0" smtClean="0">
+                <a:ln w="12700">
+                  <a:solidFill>
+                    <a:srgbClr val="FFFFFF"/>
+                  </a:solidFill>
+                  <a:prstDash val="solid"/>
+                </a:ln>
+                <a:solidFill>
+                  <a:schemeClr val="accent3">
+                    <a:lumMod val="75000"/>
+                  </a:schemeClr>
+                </a:solidFill>
+              </a:rPr>
+              <a:t>Trial block completed.</a:t>
+            </a:r>
+            <a:endParaRPr lang="en-US" sz="23900" b="1" cap="small" spc="600" dirty="0">
+              <a:ln w="12700">
+                <a:solidFill>
+                  <a:srgbClr val="FFFFFF"/>
+                </a:solidFill>
+                <a:prstDash val="solid"/>
+              </a:ln>
+              <a:solidFill>
+                <a:schemeClr val="accent3">
+                  <a:lumMod val="75000"/>
+                </a:schemeClr>
+              </a:solidFill>
+            </a:endParaRPr>
+          </a:p>
+        </p:txBody>
+      </p:sp>
+      <p:sp>
+        <p:nvSpPr>
+          <p:cNvPr id="3" name="Rectangle 2"/>
+          <p:cNvSpPr>
+            <a:spLocks noChangeAspect="1"/>
+          </p:cNvSpPr>
+          <p:nvPr/>
+        </p:nvSpPr>
+        <p:spPr>
+          <a:xfrm rot="16200000">
+            <a:off x="5257022" y="5257026"/>
+            <a:ext cx="7920006" cy="7919999"/>
+          </a:xfrm>
+          <a:prstGeom prst="rect">
+            <a:avLst/>
+          </a:prstGeom>
+          <a:noFill/>
+        </p:spPr>
+        <p:txBody>
+          <a:bodyPr wrap="none" lIns="210669" tIns="105334" rIns="210669" bIns="105334">
+            <a:prstTxWarp prst="textCircle">
+              <a:avLst>
+                <a:gd name="adj" fmla="val 10916975"/>
+              </a:avLst>
+            </a:prstTxWarp>
+            <a:spAutoFit/>
+          </a:bodyPr>
+          <a:lstStyle/>
+          <a:p>
+            <a:pPr algn="ctr"/>
+            <a:r>
+              <a:rPr lang="en-US" sz="13800" b="1" cap="small" spc="300" dirty="0" smtClean="0">
+                <a:ln w="12700">
+                  <a:noFill/>
+                  <a:prstDash val="solid"/>
+                </a:ln>
+                <a:solidFill>
+                  <a:schemeClr val="accent1"/>
+                </a:solidFill>
+                <a:effectLst>
+                  <a:outerShdw blurRad="41275" dist="20320" dir="1800000" algn="tl" rotWithShape="0">
+                    <a:srgbClr val="000000">
+                      <a:alpha val="40000"/>
+                    </a:srgbClr>
+                  </a:outerShdw>
+                </a:effectLst>
+              </a:rPr>
+              <a:t>Doff HMD and press ‘Return’.</a:t>
+            </a:r>
+            <a:endParaRPr lang="en-US" sz="13800" b="1" cap="small" spc="300" dirty="0">
+              <a:ln w="12700">
+                <a:noFill/>
+                <a:prstDash val="solid"/>
+              </a:ln>
+              <a:solidFill>
+                <a:schemeClr val="accent1"/>
+              </a:solidFill>
+              <a:effectLst>
+                <a:outerShdw blurRad="41275" dist="20320" dir="1800000" algn="tl" rotWithShape="0">
+                  <a:srgbClr val="000000">
+                    <a:alpha val="40000"/>
+                  </a:srgbClr>
+                </a:outerShdw>
+              </a:effectLst>
+            </a:endParaRPr>
+          </a:p>
+        </p:txBody>
+      </p:sp>
+    </p:spTree>
+    <p:extLst>
+      <p:ext uri="{BB962C8B-B14F-4D97-AF65-F5344CB8AC3E}">
+        <p14:creationId xmlns:p14="http://schemas.microsoft.com/office/powerpoint/2010/main" val="2090264467"/>
+      </p:ext>
+    </p:extLst>
+  </p:cSld>
+  <p:clrMapOvr>
+    <a:masterClrMapping/>
+  </p:clrMapOvr>
+</p:sld>
+</file>
+
+<file path=ppt/slides/slide4.xml><?xml version="1.0" encoding="utf-8"?>
+<p:sld xmlns:a="http://schemas.openxmlformats.org/drawingml/2006/main" xmlns:r="http://schemas.openxmlformats.org/officeDocument/2006/relationships" xmlns:p="http://schemas.openxmlformats.org/presentationml/2006/main">
+  <p:cSld>
+    <p:spTree>
+      <p:nvGrpSpPr>
+        <p:cNvPr id="1" name=""/>
+        <p:cNvGrpSpPr/>
+        <p:nvPr/>
+      </p:nvGrpSpPr>
+      <p:grpSpPr>
+        <a:xfrm>
+          <a:off x="0" y="0"/>
+          <a:ext cx="0" cy="0"/>
+          <a:chOff x="0" y="0"/>
+          <a:chExt cx="0" cy="0"/>
+        </a:xfrm>
+      </p:grpSpPr>
+      <p:sp>
+        <p:nvSpPr>
+          <p:cNvPr id="5" name="Bouée 4"/>
+          <p:cNvSpPr>
+            <a:spLocks noChangeAspect="1"/>
+          </p:cNvSpPr>
+          <p:nvPr/>
+        </p:nvSpPr>
+        <p:spPr>
+          <a:xfrm>
+            <a:off x="1614253" y="1610484"/>
+            <a:ext cx="15228000" cy="15228000"/>
+          </a:xfrm>
+          <a:prstGeom prst="donut">
+            <a:avLst>
+              <a:gd name="adj" fmla="val 30982"/>
+            </a:avLst>
+          </a:prstGeom>
+          <a:solidFill>
+            <a:schemeClr val="bg1"/>
+          </a:solidFill>
+          <a:ln w="76200" cmpd="sng">
+            <a:noFill/>
+          </a:ln>
+        </p:spPr>
+        <p:style>
+          <a:lnRef idx="1">
+            <a:schemeClr val="accent1"/>
+          </a:lnRef>
+          <a:fillRef idx="3">
+            <a:schemeClr val="accent1"/>
+          </a:fillRef>
+          <a:effectRef idx="2">
+            <a:schemeClr val="accent1"/>
+          </a:effectRef>
+          <a:fontRef idx="minor">
+            <a:schemeClr val="lt1"/>
+          </a:fontRef>
+        </p:style>
+        <p:txBody>
+          <a:bodyPr rtlCol="0" anchor="ctr"/>
+          <a:lstStyle/>
+          <a:p>
+            <a:pPr algn="ctr"/>
+            <a:endParaRPr lang="en-US">
+              <a:solidFill>
+                <a:schemeClr val="tx1"/>
+              </a:solidFill>
+            </a:endParaRPr>
+          </a:p>
+        </p:txBody>
+      </p:sp>
+      <p:pic>
+        <p:nvPicPr>
+          <p:cNvPr id="7" name="Image 6" descr="4cb46pEdi.gif"/>
+          <p:cNvPicPr>
+            <a:picLocks noChangeAspect="1"/>
+          </p:cNvPicPr>
+          <p:nvPr/>
+        </p:nvPicPr>
+        <p:blipFill>
+          <a:blip r:embed="rId2">
+            <a:extLst>
+              <a:ext uri="{28A0092B-C50C-407E-A947-70E740481C1C}">
+                <a14:useLocalDpi xmlns:a14="http://schemas.microsoft.com/office/drawing/2010/main" val="0"/>
+              </a:ext>
+            </a:extLst>
+          </a:blip>
+          <a:stretch>
+            <a:fillRect/>
+          </a:stretch>
+        </p:blipFill>
+        <p:spPr>
+          <a:xfrm rot="16200000">
+            <a:off x="6799069" y="4061837"/>
+            <a:ext cx="6686364" cy="10029547"/>
+          </a:xfrm>
+          <a:prstGeom prst="rect">
+            <a:avLst/>
+          </a:prstGeom>
+          <a:ln>
+            <a:noFill/>
+          </a:ln>
+        </p:spPr>
+      </p:pic>
+      <p:sp>
+        <p:nvSpPr>
+          <p:cNvPr id="2" name="Rectangle 1"/>
+          <p:cNvSpPr>
+            <a:spLocks noChangeAspect="1"/>
+          </p:cNvSpPr>
+          <p:nvPr/>
+        </p:nvSpPr>
+        <p:spPr>
+          <a:xfrm rot="16200000">
+            <a:off x="3277028" y="3277028"/>
+            <a:ext cx="11879995" cy="11879995"/>
+          </a:xfrm>
+          <a:prstGeom prst="rect">
+            <a:avLst/>
+          </a:prstGeom>
+          <a:noFill/>
+        </p:spPr>
+        <p:txBody>
+          <a:bodyPr wrap="none" lIns="210669" tIns="105334" rIns="210669" bIns="105334">
+            <a:prstTxWarp prst="textCircle">
+              <a:avLst>
+                <a:gd name="adj" fmla="val 10946467"/>
+              </a:avLst>
+            </a:prstTxWarp>
+            <a:spAutoFit/>
+          </a:bodyPr>
+          <a:lstStyle/>
+          <a:p>
+            <a:pPr algn="ctr"/>
+            <a:r>
+              <a:rPr lang="en-US" sz="23900" b="1" cap="small" spc="600" dirty="0" smtClean="0">
+                <a:ln w="12700">
+                  <a:solidFill>
+                    <a:srgbClr val="FFFFFF"/>
+                  </a:solidFill>
+                  <a:prstDash val="solid"/>
+                </a:ln>
+                <a:solidFill>
+                  <a:schemeClr val="accent2"/>
+                </a:solidFill>
+              </a:rPr>
+              <a:t>Lower Hand   Lower Hand</a:t>
+            </a:r>
+            <a:endParaRPr lang="en-US" sz="23900" b="1" cap="small" spc="600" dirty="0">
+              <a:ln w="12700">
+                <a:solidFill>
+                  <a:srgbClr val="FFFFFF"/>
+                </a:solidFill>
+                <a:prstDash val="solid"/>
+              </a:ln>
+              <a:solidFill>
+                <a:schemeClr val="accent2"/>
+              </a:solidFill>
+            </a:endParaRPr>
+          </a:p>
+        </p:txBody>
+      </p:sp>
+      <p:cxnSp>
+        <p:nvCxnSpPr>
+          <p:cNvPr id="20" name="Connecteur droit 19"/>
+          <p:cNvCxnSpPr>
+            <a:stCxn id="18" idx="1"/>
+            <a:endCxn id="18" idx="5"/>
+          </p:cNvCxnSpPr>
+          <p:nvPr/>
+        </p:nvCxnSpPr>
+        <p:spPr>
+          <a:xfrm>
+            <a:off x="6416883" y="6416882"/>
+            <a:ext cx="5600285" cy="5600286"/>
+          </a:xfrm>
+          <a:prstGeom prst="line">
+            <a:avLst/>
+          </a:prstGeom>
+          <a:ln w="304800">
+            <a:solidFill>
+              <a:schemeClr val="accent2"/>
+            </a:solidFill>
+          </a:ln>
+        </p:spPr>
+        <p:style>
+          <a:lnRef idx="2">
+            <a:schemeClr val="accent1"/>
+          </a:lnRef>
+          <a:fillRef idx="0">
+            <a:schemeClr val="accent1"/>
+          </a:fillRef>
+          <a:effectRef idx="1">
+            <a:schemeClr val="accent1"/>
+          </a:effectRef>
+          <a:fontRef idx="minor">
+            <a:schemeClr val="tx1"/>
+          </a:fontRef>
+        </p:style>
+      </p:cxnSp>
+      <p:sp>
+        <p:nvSpPr>
+          <p:cNvPr id="18" name="Ellipse 17"/>
+          <p:cNvSpPr>
+            <a:spLocks noChangeAspect="1"/>
+          </p:cNvSpPr>
+          <p:nvPr/>
+        </p:nvSpPr>
+        <p:spPr>
+          <a:xfrm>
+            <a:off x="5257026" y="5257025"/>
+            <a:ext cx="7919999" cy="7920000"/>
+          </a:xfrm>
+          <a:prstGeom prst="ellipse">
+            <a:avLst/>
+          </a:prstGeom>
+          <a:noFill/>
+          <a:ln w="304800" cmpd="sng">
+            <a:solidFill>
+              <a:schemeClr val="accent2"/>
+            </a:solidFill>
+          </a:ln>
+        </p:spPr>
+        <p:style>
+          <a:lnRef idx="1">
+            <a:schemeClr val="accent1"/>
+          </a:lnRef>
+          <a:fillRef idx="3">
+            <a:schemeClr val="accent1"/>
+          </a:fillRef>
+          <a:effectRef idx="2">
+            <a:schemeClr val="accent1"/>
+          </a:effectRef>
+          <a:fontRef idx="minor">
+            <a:schemeClr val="lt1"/>
+          </a:fontRef>
+        </p:style>
+        <p:txBody>
+          <a:bodyPr rtlCol="0" anchor="ctr"/>
+          <a:lstStyle/>
+          <a:p>
+            <a:pPr algn="ctr"/>
+            <a:endParaRPr lang="en-US"/>
+          </a:p>
+        </p:txBody>
+      </p:sp>
+    </p:spTree>
+    <p:extLst>
+      <p:ext uri="{BB962C8B-B14F-4D97-AF65-F5344CB8AC3E}">
+        <p14:creationId xmlns:p14="http://schemas.microsoft.com/office/powerpoint/2010/main" val="889738266"/>
+      </p:ext>
+    </p:extLst>
+  </p:cSld>
+  <p:clrMapOvr>
+    <a:masterClrMapping/>
+  </p:clrMapOvr>
+</p:sld>
+</file>
+
+<file path=ppt/slides/slide5.xml><?xml version="1.0" encoding="utf-8"?>
+<p:sld xmlns:a="http://schemas.openxmlformats.org/drawingml/2006/main" xmlns:r="http://schemas.openxmlformats.org/officeDocument/2006/relationships" xmlns:p="http://schemas.openxmlformats.org/presentationml/2006/main">
+  <p:cSld>
+    <p:spTree>
+      <p:nvGrpSpPr>
+        <p:cNvPr id="1" name=""/>
+        <p:cNvGrpSpPr/>
+        <p:nvPr/>
+      </p:nvGrpSpPr>
+      <p:grpSpPr>
+        <a:xfrm>
+          <a:off x="0" y="0"/>
+          <a:ext cx="0" cy="0"/>
+          <a:chOff x="0" y="0"/>
+          <a:chExt cx="0" cy="0"/>
+        </a:xfrm>
+      </p:grpSpPr>
+      <p:sp>
+        <p:nvSpPr>
+          <p:cNvPr id="5" name="Bouée 4"/>
+          <p:cNvSpPr>
+            <a:spLocks noChangeAspect="1"/>
+          </p:cNvSpPr>
+          <p:nvPr/>
+        </p:nvSpPr>
+        <p:spPr>
+          <a:xfrm>
+            <a:off x="1614253" y="1610484"/>
+            <a:ext cx="15228000" cy="15228000"/>
+          </a:xfrm>
+          <a:prstGeom prst="donut">
+            <a:avLst>
+              <a:gd name="adj" fmla="val 30982"/>
+            </a:avLst>
+          </a:prstGeom>
+          <a:solidFill>
+            <a:schemeClr val="bg1"/>
+          </a:solidFill>
+          <a:ln w="76200" cmpd="sng">
+            <a:noFill/>
+          </a:ln>
+        </p:spPr>
+        <p:style>
+          <a:lnRef idx="1">
+            <a:schemeClr val="accent1"/>
+          </a:lnRef>
+          <a:fillRef idx="3">
+            <a:schemeClr val="accent1"/>
+          </a:fillRef>
+          <a:effectRef idx="2">
+            <a:schemeClr val="accent1"/>
+          </a:effectRef>
+          <a:fontRef idx="minor">
+            <a:schemeClr val="lt1"/>
+          </a:fontRef>
+        </p:style>
+        <p:txBody>
+          <a:bodyPr rtlCol="0" anchor="ctr"/>
+          <a:lstStyle/>
+          <a:p>
+            <a:pPr algn="ctr"/>
+            <a:endParaRPr lang="en-US">
+              <a:solidFill>
+                <a:schemeClr val="tx1"/>
+              </a:solidFill>
+            </a:endParaRPr>
+          </a:p>
+        </p:txBody>
+      </p:sp>
+      <p:sp>
+        <p:nvSpPr>
+          <p:cNvPr id="2" name="Rectangle 1"/>
+          <p:cNvSpPr>
+            <a:spLocks noChangeAspect="1"/>
+          </p:cNvSpPr>
+          <p:nvPr/>
+        </p:nvSpPr>
+        <p:spPr>
+          <a:xfrm rot="16200000">
+            <a:off x="3277028" y="3277028"/>
+            <a:ext cx="11879995" cy="11879995"/>
+          </a:xfrm>
+          <a:prstGeom prst="rect">
+            <a:avLst/>
+          </a:prstGeom>
+          <a:noFill/>
+        </p:spPr>
+        <p:txBody>
+          <a:bodyPr wrap="none" lIns="210669" tIns="105334" rIns="210669" bIns="105334">
+            <a:prstTxWarp prst="textCircle">
+              <a:avLst>
+                <a:gd name="adj" fmla="val 10946467"/>
+              </a:avLst>
+            </a:prstTxWarp>
+            <a:spAutoFit/>
+          </a:bodyPr>
+          <a:lstStyle/>
+          <a:p>
+            <a:pPr algn="ctr"/>
+            <a:r>
+              <a:rPr lang="en-US" sz="23900" b="1" cap="small" spc="300" dirty="0" smtClean="0">
+                <a:ln w="12700">
+                  <a:solidFill>
+                    <a:srgbClr val="FFFFFF"/>
+                  </a:solidFill>
+                  <a:prstDash val="solid"/>
+                </a:ln>
+                <a:solidFill>
+                  <a:schemeClr val="accent2"/>
+                </a:solidFill>
+              </a:rPr>
+              <a:t>Time to lower hand exceeded.</a:t>
+            </a:r>
+            <a:endParaRPr lang="en-US" sz="23900" b="1" cap="small" spc="300" dirty="0">
+              <a:ln w="12700">
+                <a:solidFill>
+                  <a:srgbClr val="FFFFFF"/>
+                </a:solidFill>
+                <a:prstDash val="solid"/>
+              </a:ln>
+              <a:solidFill>
+                <a:schemeClr val="accent2"/>
+              </a:solidFill>
+            </a:endParaRPr>
+          </a:p>
+        </p:txBody>
+      </p:sp>
+      <p:sp>
+        <p:nvSpPr>
+          <p:cNvPr id="3" name="Rectangle 2"/>
+          <p:cNvSpPr>
+            <a:spLocks noChangeAspect="1"/>
+          </p:cNvSpPr>
+          <p:nvPr/>
+        </p:nvSpPr>
+        <p:spPr>
+          <a:xfrm rot="16200000">
+            <a:off x="5257022" y="5257026"/>
+            <a:ext cx="7920006" cy="7919999"/>
+          </a:xfrm>
+          <a:prstGeom prst="rect">
+            <a:avLst/>
+          </a:prstGeom>
+          <a:noFill/>
+        </p:spPr>
+        <p:txBody>
+          <a:bodyPr wrap="none" lIns="210669" tIns="105334" rIns="210669" bIns="105334">
+            <a:prstTxWarp prst="textCircle">
+              <a:avLst>
+                <a:gd name="adj" fmla="val 10916975"/>
+              </a:avLst>
+            </a:prstTxWarp>
+            <a:spAutoFit/>
+          </a:bodyPr>
+          <a:lstStyle/>
+          <a:p>
+            <a:pPr algn="ctr"/>
+            <a:r>
+              <a:rPr lang="en-US" sz="13800" b="1" cap="small" spc="300" dirty="0" smtClean="0">
+                <a:ln w="12700">
+                  <a:noFill/>
+                  <a:prstDash val="solid"/>
+                </a:ln>
+                <a:solidFill>
+                  <a:schemeClr val="accent1"/>
+                </a:solidFill>
+                <a:effectLst>
+                  <a:outerShdw blurRad="41275" dist="20320" dir="1800000" algn="tl" rotWithShape="0">
+                    <a:srgbClr val="000000">
+                      <a:alpha val="40000"/>
+                    </a:srgbClr>
+                  </a:outerShdw>
+                </a:effectLst>
+              </a:rPr>
+              <a:t> Press </a:t>
+            </a:r>
+            <a:r>
+              <a:rPr lang="en-US" sz="13800" b="1" cap="small" spc="300" dirty="0">
+                <a:ln w="12700">
+                  <a:noFill/>
+                  <a:prstDash val="solid"/>
+                </a:ln>
+                <a:solidFill>
+                  <a:schemeClr val="accent1"/>
+                </a:solidFill>
+                <a:effectLst>
+                  <a:outerShdw blurRad="41275" dist="20320" dir="1800000" algn="tl" rotWithShape="0">
+                    <a:srgbClr val="000000">
+                      <a:alpha val="40000"/>
+                    </a:srgbClr>
+                  </a:outerShdw>
+                </a:effectLst>
+              </a:rPr>
+              <a:t>a button to continue</a:t>
+            </a:r>
+            <a:r>
+              <a:rPr lang="en-US" sz="13800" b="1" cap="small" spc="300" dirty="0" smtClean="0">
+                <a:ln w="12700">
+                  <a:noFill/>
+                  <a:prstDash val="solid"/>
+                </a:ln>
+                <a:solidFill>
+                  <a:schemeClr val="accent1"/>
+                </a:solidFill>
+                <a:effectLst>
+                  <a:outerShdw blurRad="41275" dist="20320" dir="1800000" algn="tl" rotWithShape="0">
+                    <a:srgbClr val="000000">
+                      <a:alpha val="40000"/>
+                    </a:srgbClr>
+                  </a:outerShdw>
+                </a:effectLst>
+              </a:rPr>
+              <a:t>.</a:t>
+            </a:r>
+            <a:endParaRPr lang="en-US" sz="13800" b="1" cap="small" spc="300" dirty="0">
+              <a:ln w="12700">
+                <a:noFill/>
+                <a:prstDash val="solid"/>
+              </a:ln>
+              <a:solidFill>
+                <a:schemeClr val="accent1"/>
+              </a:solidFill>
+              <a:effectLst>
+                <a:outerShdw blurRad="41275" dist="20320" dir="1800000" algn="tl" rotWithShape="0">
+                  <a:srgbClr val="000000">
+                    <a:alpha val="40000"/>
+                  </a:srgbClr>
+                </a:outerShdw>
+              </a:effectLst>
+            </a:endParaRPr>
+          </a:p>
+        </p:txBody>
+      </p:sp>
+      <p:grpSp>
+        <p:nvGrpSpPr>
+          <p:cNvPr id="6" name="Grouper 5"/>
+          <p:cNvGrpSpPr/>
+          <p:nvPr/>
+        </p:nvGrpSpPr>
+        <p:grpSpPr>
+          <a:xfrm>
+            <a:off x="6758168" y="6943137"/>
+            <a:ext cx="5001192" cy="5044481"/>
+            <a:chOff x="6494949" y="6943137"/>
+            <a:chExt cx="5001192" cy="5044481"/>
+          </a:xfrm>
+        </p:grpSpPr>
+        <p:sp>
+          <p:nvSpPr>
+            <p:cNvPr id="7" name="Ellipse 6"/>
+            <p:cNvSpPr>
+              <a:spLocks noChangeAspect="1"/>
+            </p:cNvSpPr>
+            <p:nvPr/>
+          </p:nvSpPr>
+          <p:spPr>
+            <a:xfrm>
+              <a:off x="7350417" y="7841894"/>
+              <a:ext cx="3290257" cy="3290257"/>
+            </a:xfrm>
+            <a:prstGeom prst="ellipse">
+              <a:avLst/>
+            </a:prstGeom>
+            <a:ln>
+              <a:solidFill>
+                <a:schemeClr val="accent2"/>
+              </a:solidFill>
+            </a:ln>
+            <a:effectLst>
+              <a:outerShdw blurRad="76200" dir="18900000" sy="23000" kx="-1200000" algn="bl" rotWithShape="0">
+                <a:prstClr val="black">
+                  <a:alpha val="20000"/>
+                </a:prstClr>
+              </a:outerShdw>
+            </a:effectLst>
+          </p:spPr>
+          <p:style>
+            <a:lnRef idx="1">
+              <a:schemeClr val="accent1"/>
+            </a:lnRef>
+            <a:fillRef idx="3">
+              <a:schemeClr val="accent1"/>
+            </a:fillRef>
+            <a:effectRef idx="2">
+              <a:schemeClr val="accent1"/>
+            </a:effectRef>
+            <a:fontRef idx="minor">
+              <a:schemeClr val="lt1"/>
+            </a:fontRef>
+          </p:style>
+          <p:txBody>
+            <a:bodyPr rtlCol="0" anchor="ctr"/>
+            <a:lstStyle/>
+            <a:p>
+              <a:pPr algn="ctr"/>
+              <a:endParaRPr lang="en-US"/>
+            </a:p>
+          </p:txBody>
+        </p:sp>
+        <p:sp>
+          <p:nvSpPr>
+            <p:cNvPr id="8" name="Secteurs 7"/>
+            <p:cNvSpPr>
+              <a:spLocks noChangeAspect="1"/>
+            </p:cNvSpPr>
+            <p:nvPr/>
+          </p:nvSpPr>
+          <p:spPr>
+            <a:xfrm>
+              <a:off x="7371136" y="7841899"/>
+              <a:ext cx="3248819" cy="3290246"/>
+            </a:xfrm>
+            <a:prstGeom prst="pie">
+              <a:avLst>
+                <a:gd name="adj1" fmla="val 17697688"/>
+                <a:gd name="adj2" fmla="val 16200000"/>
+              </a:avLst>
+            </a:prstGeom>
+            <a:solidFill>
+              <a:srgbClr val="FFFFFF"/>
+            </a:solidFill>
+            <a:ln>
+              <a:solidFill>
+                <a:schemeClr val="accent2"/>
+              </a:solidFill>
+            </a:ln>
+          </p:spPr>
+          <p:style>
+            <a:lnRef idx="1">
+              <a:schemeClr val="accent1"/>
+            </a:lnRef>
+            <a:fillRef idx="3">
+              <a:schemeClr val="accent1"/>
+            </a:fillRef>
+            <a:effectRef idx="2">
+              <a:schemeClr val="accent1"/>
+            </a:effectRef>
+            <a:fontRef idx="minor">
+              <a:schemeClr val="lt1"/>
+            </a:fontRef>
+          </p:style>
+          <p:txBody>
+            <a:bodyPr rtlCol="0" anchor="ctr"/>
+            <a:lstStyle/>
+            <a:p>
+              <a:pPr algn="ctr"/>
+              <a:endParaRPr lang="en-US">
+                <a:solidFill>
+                  <a:schemeClr val="tx1"/>
+                </a:solidFill>
+              </a:endParaRPr>
+            </a:p>
+          </p:txBody>
+        </p:sp>
+        <p:cxnSp>
+          <p:nvCxnSpPr>
+            <p:cNvPr id="9" name="Connecteur droit avec flèche 8"/>
+            <p:cNvCxnSpPr>
+              <a:endCxn id="7" idx="0"/>
+            </p:cNvCxnSpPr>
+            <p:nvPr/>
+          </p:nvCxnSpPr>
+          <p:spPr>
+            <a:xfrm flipV="1">
+              <a:off x="8995545" y="7841894"/>
+              <a:ext cx="0" cy="1601840"/>
+            </a:xfrm>
+            <a:prstGeom prst="straightConnector1">
+              <a:avLst/>
+            </a:prstGeom>
+            <a:ln w="57150" cmpd="sng">
+              <a:solidFill>
+                <a:schemeClr val="accent2"/>
+              </a:solidFill>
+              <a:tailEnd type="arrow"/>
+            </a:ln>
+          </p:spPr>
+          <p:style>
+            <a:lnRef idx="2">
+              <a:schemeClr val="accent1"/>
+            </a:lnRef>
+            <a:fillRef idx="0">
+              <a:schemeClr val="accent1"/>
+            </a:fillRef>
+            <a:effectRef idx="1">
+              <a:schemeClr val="accent1"/>
+            </a:effectRef>
+            <a:fontRef idx="minor">
+              <a:schemeClr val="tx1"/>
+            </a:fontRef>
+          </p:style>
+        </p:cxnSp>
+        <p:grpSp>
+          <p:nvGrpSpPr>
+            <p:cNvPr id="10" name="Grouper 9"/>
+            <p:cNvGrpSpPr/>
+            <p:nvPr/>
+          </p:nvGrpSpPr>
+          <p:grpSpPr>
+            <a:xfrm>
+              <a:off x="6494949" y="6986428"/>
+              <a:ext cx="5001192" cy="5001190"/>
+              <a:chOff x="2759620" y="2052934"/>
+              <a:chExt cx="2735998" cy="2735997"/>
+            </a:xfrm>
+          </p:grpSpPr>
+          <p:sp>
+            <p:nvSpPr>
+              <p:cNvPr id="15" name="Arc 14"/>
+              <p:cNvSpPr/>
+              <p:nvPr/>
+            </p:nvSpPr>
+            <p:spPr>
+              <a:xfrm>
+                <a:off x="3119619" y="2340933"/>
+                <a:ext cx="2016000" cy="2159999"/>
+              </a:xfrm>
+              <a:prstGeom prst="arc">
+                <a:avLst>
+                  <a:gd name="adj1" fmla="val 17494394"/>
+                  <a:gd name="adj2" fmla="val 19010120"/>
+                </a:avLst>
+              </a:prstGeom>
+              <a:ln w="38100" cmpd="sng">
+                <a:solidFill>
+                  <a:schemeClr val="accent2"/>
+                </a:solidFill>
+              </a:ln>
+            </p:spPr>
+            <p:style>
+              <a:lnRef idx="2">
+                <a:schemeClr val="accent1"/>
+              </a:lnRef>
+              <a:fillRef idx="0">
+                <a:schemeClr val="accent1"/>
+              </a:fillRef>
+              <a:effectRef idx="1">
+                <a:schemeClr val="accent1"/>
+              </a:effectRef>
+              <a:fontRef idx="minor">
+                <a:schemeClr val="tx1"/>
+              </a:fontRef>
+            </p:style>
+            <p:txBody>
+              <a:bodyPr rtlCol="0" anchor="ctr"/>
+              <a:lstStyle/>
+              <a:p>
+                <a:pPr algn="ctr"/>
+                <a:endParaRPr lang="en-US"/>
+              </a:p>
+            </p:txBody>
+          </p:sp>
+          <p:sp>
+            <p:nvSpPr>
+              <p:cNvPr id="16" name="Arc 15"/>
+              <p:cNvSpPr>
+                <a:spLocks noChangeAspect="1"/>
+              </p:cNvSpPr>
+              <p:nvPr/>
+            </p:nvSpPr>
+            <p:spPr>
+              <a:xfrm>
+                <a:off x="2903620" y="2196933"/>
+                <a:ext cx="2447999" cy="2447998"/>
+              </a:xfrm>
+              <a:prstGeom prst="arc">
+                <a:avLst>
+                  <a:gd name="adj1" fmla="val 17258218"/>
+                  <a:gd name="adj2" fmla="val 19319877"/>
+                </a:avLst>
+              </a:prstGeom>
+              <a:ln w="38100" cmpd="sng">
+                <a:solidFill>
+                  <a:schemeClr val="accent2"/>
+                </a:solidFill>
+              </a:ln>
+            </p:spPr>
+            <p:style>
+              <a:lnRef idx="2">
+                <a:schemeClr val="accent1"/>
+              </a:lnRef>
+              <a:fillRef idx="0">
+                <a:schemeClr val="accent1"/>
+              </a:fillRef>
+              <a:effectRef idx="1">
+                <a:schemeClr val="accent1"/>
+              </a:effectRef>
+              <a:fontRef idx="minor">
+                <a:schemeClr val="tx1"/>
+              </a:fontRef>
+            </p:style>
+            <p:txBody>
+              <a:bodyPr rtlCol="0" anchor="ctr"/>
+              <a:lstStyle/>
+              <a:p>
+                <a:pPr algn="ctr"/>
+                <a:endParaRPr lang="en-US"/>
+              </a:p>
+            </p:txBody>
+          </p:sp>
+          <p:sp>
+            <p:nvSpPr>
+              <p:cNvPr id="17" name="Arc 16"/>
+              <p:cNvSpPr>
+                <a:spLocks noChangeAspect="1"/>
+              </p:cNvSpPr>
+              <p:nvPr/>
+            </p:nvSpPr>
+            <p:spPr>
+              <a:xfrm>
+                <a:off x="2759620" y="2052934"/>
+                <a:ext cx="2735998" cy="2735997"/>
+              </a:xfrm>
+              <a:prstGeom prst="arc">
+                <a:avLst>
+                  <a:gd name="adj1" fmla="val 17058860"/>
+                  <a:gd name="adj2" fmla="val 19569505"/>
+                </a:avLst>
+              </a:prstGeom>
+              <a:ln w="38100" cmpd="sng">
+                <a:solidFill>
+                  <a:schemeClr val="accent2"/>
+                </a:solidFill>
+              </a:ln>
+            </p:spPr>
+            <p:style>
+              <a:lnRef idx="2">
+                <a:schemeClr val="accent1"/>
+              </a:lnRef>
+              <a:fillRef idx="0">
+                <a:schemeClr val="accent1"/>
+              </a:fillRef>
+              <a:effectRef idx="1">
+                <a:schemeClr val="accent1"/>
+              </a:effectRef>
+              <a:fontRef idx="minor">
+                <a:schemeClr val="tx1"/>
+              </a:fontRef>
+            </p:style>
+            <p:txBody>
+              <a:bodyPr rtlCol="0" anchor="ctr"/>
+              <a:lstStyle/>
+              <a:p>
+                <a:pPr algn="ctr"/>
+                <a:endParaRPr lang="en-US">
+                  <a:ln w="38100" cmpd="sng">
+                    <a:solidFill>
+                      <a:srgbClr val="000000"/>
+                    </a:solidFill>
+                  </a:ln>
+                </a:endParaRPr>
+              </a:p>
+            </p:txBody>
+          </p:sp>
+        </p:grpSp>
+        <p:grpSp>
+          <p:nvGrpSpPr>
+            <p:cNvPr id="11" name="Grouper 10"/>
+            <p:cNvGrpSpPr/>
+            <p:nvPr/>
+          </p:nvGrpSpPr>
+          <p:grpSpPr>
+            <a:xfrm flipH="1">
+              <a:off x="6494949" y="6943137"/>
+              <a:ext cx="5001192" cy="5001190"/>
+              <a:chOff x="2759620" y="2052934"/>
+              <a:chExt cx="2735998" cy="2735997"/>
+            </a:xfrm>
+          </p:grpSpPr>
+          <p:sp>
+            <p:nvSpPr>
+              <p:cNvPr id="12" name="Arc 11"/>
+              <p:cNvSpPr/>
+              <p:nvPr/>
+            </p:nvSpPr>
+            <p:spPr>
+              <a:xfrm>
+                <a:off x="3119619" y="2340933"/>
+                <a:ext cx="2016000" cy="2159999"/>
+              </a:xfrm>
+              <a:prstGeom prst="arc">
+                <a:avLst>
+                  <a:gd name="adj1" fmla="val 17494394"/>
+                  <a:gd name="adj2" fmla="val 19010120"/>
+                </a:avLst>
+              </a:prstGeom>
+              <a:ln w="38100" cmpd="sng">
+                <a:solidFill>
+                  <a:schemeClr val="accent2"/>
+                </a:solidFill>
+              </a:ln>
+            </p:spPr>
+            <p:style>
+              <a:lnRef idx="2">
+                <a:schemeClr val="accent1"/>
+              </a:lnRef>
+              <a:fillRef idx="0">
+                <a:schemeClr val="accent1"/>
+              </a:fillRef>
+              <a:effectRef idx="1">
+                <a:schemeClr val="accent1"/>
+              </a:effectRef>
+              <a:fontRef idx="minor">
+                <a:schemeClr val="tx1"/>
+              </a:fontRef>
+            </p:style>
+            <p:txBody>
+              <a:bodyPr rtlCol="0" anchor="ctr"/>
+              <a:lstStyle/>
+              <a:p>
+                <a:pPr algn="ctr"/>
+                <a:endParaRPr lang="en-US"/>
+              </a:p>
+            </p:txBody>
+          </p:sp>
+          <p:sp>
+            <p:nvSpPr>
+              <p:cNvPr id="13" name="Arc 12"/>
+              <p:cNvSpPr>
+                <a:spLocks noChangeAspect="1"/>
+              </p:cNvSpPr>
+              <p:nvPr/>
+            </p:nvSpPr>
+            <p:spPr>
+              <a:xfrm>
+                <a:off x="2903620" y="2196933"/>
+                <a:ext cx="2447999" cy="2447998"/>
+              </a:xfrm>
+              <a:prstGeom prst="arc">
+                <a:avLst>
+                  <a:gd name="adj1" fmla="val 17258218"/>
+                  <a:gd name="adj2" fmla="val 19319877"/>
+                </a:avLst>
+              </a:prstGeom>
+              <a:ln w="38100" cmpd="sng">
+                <a:solidFill>
+                  <a:schemeClr val="accent2"/>
+                </a:solidFill>
+              </a:ln>
+            </p:spPr>
+            <p:style>
+              <a:lnRef idx="2">
+                <a:schemeClr val="accent1"/>
+              </a:lnRef>
+              <a:fillRef idx="0">
+                <a:schemeClr val="accent1"/>
+              </a:fillRef>
+              <a:effectRef idx="1">
+                <a:schemeClr val="accent1"/>
+              </a:effectRef>
+              <a:fontRef idx="minor">
+                <a:schemeClr val="tx1"/>
+              </a:fontRef>
+            </p:style>
+            <p:txBody>
+              <a:bodyPr rtlCol="0" anchor="ctr"/>
+              <a:lstStyle/>
+              <a:p>
+                <a:pPr algn="ctr"/>
+                <a:endParaRPr lang="en-US"/>
+              </a:p>
+            </p:txBody>
+          </p:sp>
+          <p:sp>
+            <p:nvSpPr>
+              <p:cNvPr id="14" name="Arc 13"/>
+              <p:cNvSpPr>
+                <a:spLocks noChangeAspect="1"/>
+              </p:cNvSpPr>
+              <p:nvPr/>
+            </p:nvSpPr>
+            <p:spPr>
+              <a:xfrm>
+                <a:off x="2759620" y="2052934"/>
+                <a:ext cx="2735998" cy="2735997"/>
+              </a:xfrm>
+              <a:prstGeom prst="arc">
+                <a:avLst>
+                  <a:gd name="adj1" fmla="val 17058860"/>
+                  <a:gd name="adj2" fmla="val 19569505"/>
+                </a:avLst>
+              </a:prstGeom>
+              <a:ln w="38100" cmpd="sng">
+                <a:solidFill>
+                  <a:schemeClr val="accent2"/>
+                </a:solidFill>
+              </a:ln>
+            </p:spPr>
+            <p:style>
+              <a:lnRef idx="2">
+                <a:schemeClr val="accent1"/>
+              </a:lnRef>
+              <a:fillRef idx="0">
+                <a:schemeClr val="accent1"/>
+              </a:fillRef>
+              <a:effectRef idx="1">
+                <a:schemeClr val="accent1"/>
+              </a:effectRef>
+              <a:fontRef idx="minor">
+                <a:schemeClr val="tx1"/>
+              </a:fontRef>
+            </p:style>
+            <p:txBody>
+              <a:bodyPr rtlCol="0" anchor="ctr"/>
+              <a:lstStyle/>
+              <a:p>
+                <a:pPr algn="ctr"/>
+                <a:endParaRPr lang="en-US">
+                  <a:ln w="38100" cmpd="sng">
+                    <a:solidFill>
+                      <a:srgbClr val="000000"/>
+                    </a:solidFill>
+                  </a:ln>
+                </a:endParaRPr>
+              </a:p>
+            </p:txBody>
+          </p:sp>
+        </p:grpSp>
+      </p:grpSp>
+    </p:spTree>
+    <p:extLst>
+      <p:ext uri="{BB962C8B-B14F-4D97-AF65-F5344CB8AC3E}">
+        <p14:creationId xmlns:p14="http://schemas.microsoft.com/office/powerpoint/2010/main" val="291435061"/>
+      </p:ext>
+    </p:extLst>
+  </p:cSld>
+  <p:clrMapOvr>
+    <a:masterClrMapping/>
+  </p:clrMapOvr>
+</p:sld>
+</file>
+
+<file path=ppt/slides/slide6.xml><?xml version="1.0" encoding="utf-8"?>
+<p:sld xmlns:a="http://schemas.openxmlformats.org/drawingml/2006/main" xmlns:r="http://schemas.openxmlformats.org/officeDocument/2006/relationships" xmlns:p="http://schemas.openxmlformats.org/presentationml/2006/main">
+  <p:cSld>
+    <p:spTree>
+      <p:nvGrpSpPr>
+        <p:cNvPr id="1" name=""/>
+        <p:cNvGrpSpPr/>
+        <p:nvPr/>
+      </p:nvGrpSpPr>
+      <p:grpSpPr>
+        <a:xfrm>
+          <a:off x="0" y="0"/>
+          <a:ext cx="0" cy="0"/>
+          <a:chOff x="0" y="0"/>
+          <a:chExt cx="0" cy="0"/>
+        </a:xfrm>
+      </p:grpSpPr>
+      <p:sp>
+        <p:nvSpPr>
+          <p:cNvPr id="5" name="Bouée 4"/>
+          <p:cNvSpPr>
+            <a:spLocks noChangeAspect="1"/>
+          </p:cNvSpPr>
+          <p:nvPr/>
+        </p:nvSpPr>
+        <p:spPr>
+          <a:xfrm>
+            <a:off x="1614253" y="1610484"/>
+            <a:ext cx="15228000" cy="15228000"/>
+          </a:xfrm>
+          <a:prstGeom prst="donut">
+            <a:avLst>
+              <a:gd name="adj" fmla="val 30982"/>
+            </a:avLst>
+          </a:prstGeom>
+          <a:solidFill>
+            <a:schemeClr val="bg1"/>
+          </a:solidFill>
+          <a:ln w="76200" cmpd="sng">
+            <a:noFill/>
+          </a:ln>
+        </p:spPr>
+        <p:style>
+          <a:lnRef idx="1">
+            <a:schemeClr val="accent1"/>
+          </a:lnRef>
+          <a:fillRef idx="3">
+            <a:schemeClr val="accent1"/>
+          </a:fillRef>
+          <a:effectRef idx="2">
+            <a:schemeClr val="accent1"/>
+          </a:effectRef>
+          <a:fontRef idx="minor">
+            <a:schemeClr val="lt1"/>
+          </a:fontRef>
+        </p:style>
+        <p:txBody>
+          <a:bodyPr rtlCol="0" anchor="ctr"/>
+          <a:lstStyle/>
+          <a:p>
+            <a:pPr algn="ctr"/>
+            <a:endParaRPr lang="en-US">
+              <a:solidFill>
+                <a:schemeClr val="tx1"/>
+              </a:solidFill>
+            </a:endParaRPr>
+          </a:p>
+        </p:txBody>
+      </p:sp>
+      <p:pic>
+        <p:nvPicPr>
+          <p:cNvPr id="4" name="Image 3" descr="4cb46pEdi.gif"/>
+          <p:cNvPicPr>
+            <a:picLocks noChangeAspect="1"/>
+          </p:cNvPicPr>
+          <p:nvPr/>
+        </p:nvPicPr>
+        <p:blipFill>
+          <a:blip r:embed="rId2">
+            <a:extLst>
+              <a:ext uri="{28A0092B-C50C-407E-A947-70E740481C1C}">
+                <a14:useLocalDpi xmlns:a14="http://schemas.microsoft.com/office/drawing/2010/main" val="0"/>
+              </a:ext>
+            </a:extLst>
+          </a:blip>
+          <a:stretch>
+            <a:fillRect/>
+          </a:stretch>
+        </p:blipFill>
+        <p:spPr>
+          <a:xfrm rot="16200000">
+            <a:off x="6799069" y="4061837"/>
+            <a:ext cx="6686364" cy="10029547"/>
+          </a:xfrm>
+          <a:prstGeom prst="rect">
+            <a:avLst/>
+          </a:prstGeom>
+          <a:ln>
+            <a:noFill/>
+          </a:ln>
+        </p:spPr>
+      </p:pic>
+      <p:sp>
+        <p:nvSpPr>
+          <p:cNvPr id="2" name="Rectangle 1"/>
+          <p:cNvSpPr>
+            <a:spLocks noChangeAspect="1"/>
+          </p:cNvSpPr>
+          <p:nvPr/>
+        </p:nvSpPr>
+        <p:spPr>
+          <a:xfrm rot="16200000">
+            <a:off x="3277028" y="3277028"/>
+            <a:ext cx="11879995" cy="11879995"/>
+          </a:xfrm>
+          <a:prstGeom prst="rect">
+            <a:avLst/>
+          </a:prstGeom>
+          <a:noFill/>
+        </p:spPr>
+        <p:txBody>
+          <a:bodyPr wrap="none" lIns="210669" tIns="105334" rIns="210669" bIns="105334">
+            <a:prstTxWarp prst="textCircle">
+              <a:avLst>
+                <a:gd name="adj" fmla="val 10946467"/>
+              </a:avLst>
+            </a:prstTxWarp>
+            <a:spAutoFit/>
+          </a:bodyPr>
+          <a:lstStyle/>
+          <a:p>
+            <a:pPr algn="ctr"/>
+            <a:r>
+              <a:rPr lang="en-US" sz="23900" b="1" cap="small" dirty="0" smtClean="0">
+                <a:ln w="12700">
+                  <a:solidFill>
+                    <a:srgbClr val="FFFFFF"/>
+                  </a:solidFill>
+                  <a:prstDash val="solid"/>
+                </a:ln>
+                <a:solidFill>
+                  <a:schemeClr val="accent2"/>
+                </a:solidFill>
+              </a:rPr>
+              <a:t>Raise hand and aim at target.</a:t>
+            </a:r>
+            <a:endParaRPr lang="en-US" sz="23900" b="1" cap="small" dirty="0">
+              <a:ln w="12700">
+                <a:solidFill>
+                  <a:srgbClr val="FFFFFF"/>
+                </a:solidFill>
+                <a:prstDash val="solid"/>
+              </a:ln>
+              <a:solidFill>
+                <a:schemeClr val="accent2"/>
+              </a:solidFill>
+            </a:endParaRPr>
+          </a:p>
+        </p:txBody>
+      </p:sp>
+      <p:sp>
+        <p:nvSpPr>
+          <p:cNvPr id="18" name="Ellipse 17"/>
+          <p:cNvSpPr>
+            <a:spLocks noChangeAspect="1"/>
+          </p:cNvSpPr>
+          <p:nvPr/>
+        </p:nvSpPr>
+        <p:spPr>
+          <a:xfrm>
+            <a:off x="4897026" y="4897026"/>
+            <a:ext cx="8639998" cy="8639999"/>
+          </a:xfrm>
+          <a:prstGeom prst="ellipse">
+            <a:avLst/>
+          </a:prstGeom>
+          <a:noFill/>
+          <a:ln w="304800" cmpd="sng">
+            <a:solidFill>
+              <a:srgbClr val="008000"/>
+            </a:solidFill>
+          </a:ln>
+        </p:spPr>
+        <p:style>
+          <a:lnRef idx="1">
+            <a:schemeClr val="accent1"/>
+          </a:lnRef>
+          <a:fillRef idx="3">
+            <a:schemeClr val="accent1"/>
+          </a:fillRef>
+          <a:effectRef idx="2">
+            <a:schemeClr val="accent1"/>
+          </a:effectRef>
+          <a:fontRef idx="minor">
+            <a:schemeClr val="lt1"/>
+          </a:fontRef>
+        </p:style>
+        <p:txBody>
+          <a:bodyPr rtlCol="0" anchor="ctr"/>
+          <a:lstStyle/>
+          <a:p>
+            <a:pPr algn="ctr"/>
+            <a:endParaRPr lang="en-US"/>
+          </a:p>
+        </p:txBody>
+      </p:sp>
+    </p:spTree>
+    <p:extLst>
+      <p:ext uri="{BB962C8B-B14F-4D97-AF65-F5344CB8AC3E}">
+        <p14:creationId xmlns:p14="http://schemas.microsoft.com/office/powerpoint/2010/main" val="2779772020"/>
+      </p:ext>
+    </p:extLst>
+  </p:cSld>
+  <p:clrMapOvr>
+    <a:masterClrMapping/>
+  </p:clrMapOvr>
+</p:sld>
+</file>
+
+<file path=ppt/slides/slide7.xml><?xml version="1.0" encoding="utf-8"?>
+<p:sld xmlns:a="http://schemas.openxmlformats.org/drawingml/2006/main" xmlns:r="http://schemas.openxmlformats.org/officeDocument/2006/relationships" xmlns:p="http://schemas.openxmlformats.org/presentationml/2006/main">
+  <p:cSld>
+    <p:spTree>
+      <p:nvGrpSpPr>
+        <p:cNvPr id="1" name=""/>
+        <p:cNvGrpSpPr/>
+        <p:nvPr/>
+      </p:nvGrpSpPr>
+      <p:grpSpPr>
+        <a:xfrm>
+          <a:off x="0" y="0"/>
+          <a:ext cx="0" cy="0"/>
+          <a:chOff x="0" y="0"/>
+          <a:chExt cx="0" cy="0"/>
+        </a:xfrm>
+      </p:grpSpPr>
+      <p:sp>
+        <p:nvSpPr>
+          <p:cNvPr id="5" name="Bouée 4"/>
+          <p:cNvSpPr>
+            <a:spLocks noChangeAspect="1"/>
+          </p:cNvSpPr>
+          <p:nvPr/>
+        </p:nvSpPr>
+        <p:spPr>
+          <a:xfrm>
+            <a:off x="1614253" y="1610484"/>
+            <a:ext cx="15228000" cy="15228000"/>
+          </a:xfrm>
+          <a:prstGeom prst="donut">
+            <a:avLst>
+              <a:gd name="adj" fmla="val 30982"/>
+            </a:avLst>
+          </a:prstGeom>
+          <a:solidFill>
+            <a:schemeClr val="bg1"/>
+          </a:solidFill>
+          <a:ln w="76200" cmpd="sng">
+            <a:noFill/>
+          </a:ln>
+        </p:spPr>
+        <p:style>
+          <a:lnRef idx="1">
+            <a:schemeClr val="accent1"/>
+          </a:lnRef>
+          <a:fillRef idx="3">
+            <a:schemeClr val="accent1"/>
+          </a:fillRef>
+          <a:effectRef idx="2">
+            <a:schemeClr val="accent1"/>
+          </a:effectRef>
+          <a:fontRef idx="minor">
+            <a:schemeClr val="lt1"/>
+          </a:fontRef>
+        </p:style>
+        <p:txBody>
+          <a:bodyPr rtlCol="0" anchor="ctr"/>
+          <a:lstStyle/>
+          <a:p>
+            <a:pPr algn="ctr"/>
+            <a:endParaRPr lang="en-US">
+              <a:solidFill>
+                <a:schemeClr val="tx1"/>
+              </a:solidFill>
+            </a:endParaRPr>
+          </a:p>
+        </p:txBody>
+      </p:sp>
+      <p:sp>
+        <p:nvSpPr>
+          <p:cNvPr id="2" name="Rectangle 1"/>
+          <p:cNvSpPr>
+            <a:spLocks noChangeAspect="1"/>
+          </p:cNvSpPr>
+          <p:nvPr/>
+        </p:nvSpPr>
+        <p:spPr>
+          <a:xfrm rot="16200000">
+            <a:off x="3277028" y="3277028"/>
+            <a:ext cx="11879995" cy="11879995"/>
+          </a:xfrm>
+          <a:prstGeom prst="rect">
+            <a:avLst/>
+          </a:prstGeom>
+          <a:noFill/>
+        </p:spPr>
+        <p:txBody>
+          <a:bodyPr wrap="none" lIns="210669" tIns="105334" rIns="210669" bIns="105334">
+            <a:prstTxWarp prst="textCircle">
+              <a:avLst>
+                <a:gd name="adj" fmla="val 10946467"/>
+              </a:avLst>
+            </a:prstTxWarp>
+            <a:spAutoFit/>
+          </a:bodyPr>
+          <a:lstStyle/>
+          <a:p>
+            <a:pPr algn="ctr"/>
+            <a:r>
+              <a:rPr lang="en-US" sz="23900" b="1" cap="small" spc="600" dirty="0" smtClean="0">
+                <a:ln w="12700">
+                  <a:solidFill>
+                    <a:srgbClr val="FFFFFF"/>
+                  </a:solidFill>
+                  <a:prstDash val="solid"/>
+                </a:ln>
+                <a:solidFill>
+                  <a:schemeClr val="accent2"/>
+                </a:solidFill>
+              </a:rPr>
+              <a:t>Time to raise hand exceeded.</a:t>
             </a:r>
             <a:endParaRPr lang="en-US" sz="23900" b="1" cap="small" spc="600" dirty="0">
               <a:ln w="12700">

</xml_diff>

<commit_message>
Back to contrasting colors for anomalies
</commit_message>
<xml_diff>
--- a/Source Code/GraspBMPs/GraspCircularPrompts.pptx
+++ b/Source Code/GraspBMPs/GraspCircularPrompts.pptx
@@ -302,7 +302,7 @@
           <a:p>
             <a:fld id="{649FEDF0-7D14-9E44-B4F2-968D163D1479}" type="datetimeFigureOut">
               <a:rPr lang="fr-FR" smtClean="0"/>
-              <a:t>17/08/16</a:t>
+              <a:t>19/08/16</a:t>
             </a:fld>
             <a:endParaRPr lang="en-US" dirty="0"/>
           </a:p>
@@ -472,7 +472,7 @@
           <a:p>
             <a:fld id="{649FEDF0-7D14-9E44-B4F2-968D163D1479}" type="datetimeFigureOut">
               <a:rPr lang="fr-FR" smtClean="0"/>
-              <a:t>17/08/16</a:t>
+              <a:t>19/08/16</a:t>
             </a:fld>
             <a:endParaRPr lang="en-US" dirty="0"/>
           </a:p>
@@ -652,7 +652,7 @@
           <a:p>
             <a:fld id="{649FEDF0-7D14-9E44-B4F2-968D163D1479}" type="datetimeFigureOut">
               <a:rPr lang="fr-FR" smtClean="0"/>
-              <a:t>17/08/16</a:t>
+              <a:t>19/08/16</a:t>
             </a:fld>
             <a:endParaRPr lang="en-US" dirty="0"/>
           </a:p>
@@ -822,7 +822,7 @@
           <a:p>
             <a:fld id="{649FEDF0-7D14-9E44-B4F2-968D163D1479}" type="datetimeFigureOut">
               <a:rPr lang="fr-FR" smtClean="0"/>
-              <a:t>17/08/16</a:t>
+              <a:t>19/08/16</a:t>
             </a:fld>
             <a:endParaRPr lang="en-US" dirty="0"/>
           </a:p>
@@ -1068,7 +1068,7 @@
           <a:p>
             <a:fld id="{649FEDF0-7D14-9E44-B4F2-968D163D1479}" type="datetimeFigureOut">
               <a:rPr lang="fr-FR" smtClean="0"/>
-              <a:t>17/08/16</a:t>
+              <a:t>19/08/16</a:t>
             </a:fld>
             <a:endParaRPr lang="en-US" dirty="0"/>
           </a:p>
@@ -1356,7 +1356,7 @@
           <a:p>
             <a:fld id="{649FEDF0-7D14-9E44-B4F2-968D163D1479}" type="datetimeFigureOut">
               <a:rPr lang="fr-FR" smtClean="0"/>
-              <a:t>17/08/16</a:t>
+              <a:t>19/08/16</a:t>
             </a:fld>
             <a:endParaRPr lang="en-US" dirty="0"/>
           </a:p>
@@ -1778,7 +1778,7 @@
           <a:p>
             <a:fld id="{649FEDF0-7D14-9E44-B4F2-968D163D1479}" type="datetimeFigureOut">
               <a:rPr lang="fr-FR" smtClean="0"/>
-              <a:t>17/08/16</a:t>
+              <a:t>19/08/16</a:t>
             </a:fld>
             <a:endParaRPr lang="en-US" dirty="0"/>
           </a:p>
@@ -1896,7 +1896,7 @@
           <a:p>
             <a:fld id="{649FEDF0-7D14-9E44-B4F2-968D163D1479}" type="datetimeFigureOut">
               <a:rPr lang="fr-FR" smtClean="0"/>
-              <a:t>17/08/16</a:t>
+              <a:t>19/08/16</a:t>
             </a:fld>
             <a:endParaRPr lang="en-US" dirty="0"/>
           </a:p>
@@ -1991,7 +1991,7 @@
           <a:p>
             <a:fld id="{649FEDF0-7D14-9E44-B4F2-968D163D1479}" type="datetimeFigureOut">
               <a:rPr lang="fr-FR" smtClean="0"/>
-              <a:t>17/08/16</a:t>
+              <a:t>19/08/16</a:t>
             </a:fld>
             <a:endParaRPr lang="en-US" dirty="0"/>
           </a:p>
@@ -2316,7 +2316,7 @@
           <a:p>
             <a:fld id="{649FEDF0-7D14-9E44-B4F2-968D163D1479}" type="datetimeFigureOut">
               <a:rPr lang="fr-FR" smtClean="0"/>
-              <a:t>17/08/16</a:t>
+              <a:t>19/08/16</a:t>
             </a:fld>
             <a:endParaRPr lang="en-US" dirty="0"/>
           </a:p>
@@ -2569,7 +2569,7 @@
           <a:p>
             <a:fld id="{649FEDF0-7D14-9E44-B4F2-968D163D1479}" type="datetimeFigureOut">
               <a:rPr lang="fr-FR" smtClean="0"/>
-              <a:t>17/08/16</a:t>
+              <a:t>19/08/16</a:t>
             </a:fld>
             <a:endParaRPr lang="en-US" dirty="0"/>
           </a:p>
@@ -2785,7 +2785,7 @@
           <a:p>
             <a:fld id="{649FEDF0-7D14-9E44-B4F2-968D163D1479}" type="datetimeFigureOut">
               <a:rPr lang="fr-FR" smtClean="0"/>
-              <a:t>17/08/16</a:t>
+              <a:t>19/08/16</a:t>
             </a:fld>
             <a:endParaRPr lang="en-US" dirty="0"/>
           </a:p>
@@ -3384,9 +3384,7 @@
                   <a:prstDash val="solid"/>
                 </a:ln>
                 <a:solidFill>
-                  <a:schemeClr val="accent3">
-                    <a:lumMod val="75000"/>
-                  </a:schemeClr>
+                  <a:srgbClr val="604A7B"/>
                 </a:solidFill>
               </a:rPr>
               <a:t>Time to respond exceeded.</a:t>
@@ -3399,9 +3397,7 @@
                 <a:prstDash val="solid"/>
               </a:ln>
               <a:solidFill>
-                <a:schemeClr val="accent3">
-                  <a:lumMod val="75000"/>
-                </a:schemeClr>
+                <a:srgbClr val="604A7B"/>
               </a:solidFill>
             </a:endParaRPr>
           </a:p>
@@ -4120,9 +4116,7 @@
                   <a:prstDash val="solid"/>
                 </a:ln>
                 <a:solidFill>
-                  <a:schemeClr val="accent3">
-                    <a:lumMod val="75000"/>
-                  </a:schemeClr>
+                  <a:srgbClr val="604A7B"/>
                 </a:solidFill>
               </a:rPr>
               <a:t>Time limit exceeded.</a:t>
@@ -4135,9 +4129,7 @@
                 <a:prstDash val="solid"/>
               </a:ln>
               <a:solidFill>
-                <a:schemeClr val="accent3">
-                  <a:lumMod val="75000"/>
-                </a:schemeClr>
+                <a:srgbClr val="604A7B"/>
               </a:solidFill>
             </a:endParaRPr>
           </a:p>
@@ -4856,9 +4848,7 @@
                   <a:prstDash val="solid"/>
                 </a:ln>
                 <a:solidFill>
-                  <a:schemeClr val="accent3">
-                    <a:lumMod val="75000"/>
-                  </a:schemeClr>
+                  <a:srgbClr val="604A7B"/>
                 </a:solidFill>
               </a:rPr>
               <a:t>Time to rotate hand exceeded.</a:t>
@@ -4871,9 +4861,7 @@
                 <a:prstDash val="solid"/>
               </a:ln>
               <a:solidFill>
-                <a:schemeClr val="accent3">
-                  <a:lumMod val="75000"/>
-                </a:schemeClr>
+                <a:srgbClr val="604A7B"/>
               </a:solidFill>
             </a:endParaRPr>
           </a:p>
@@ -5592,9 +5580,7 @@
                   <a:prstDash val="solid"/>
                 </a:ln>
                 <a:solidFill>
-                  <a:schemeClr val="accent3">
-                    <a:lumMod val="75000"/>
-                  </a:schemeClr>
+                  <a:srgbClr val="604A7B"/>
                 </a:solidFill>
               </a:rPr>
               <a:t>Hand raised too soon.</a:t>
@@ -5607,9 +5593,7 @@
                 <a:prstDash val="solid"/>
               </a:ln>
               <a:solidFill>
-                <a:schemeClr val="accent3">
-                  <a:lumMod val="75000"/>
-                </a:schemeClr>
+                <a:srgbClr val="604A7B"/>
               </a:solidFill>
             </a:endParaRPr>
           </a:p>
@@ -5842,9 +5826,7 @@
                   <a:prstDash val="solid"/>
                 </a:ln>
                 <a:solidFill>
-                  <a:schemeClr val="accent3">
-                    <a:lumMod val="75000"/>
-                  </a:schemeClr>
+                  <a:srgbClr val="604A7B"/>
                 </a:solidFill>
               </a:rPr>
               <a:t>Hand should not be raised.</a:t>
@@ -5857,9 +5839,7 @@
                 <a:prstDash val="solid"/>
               </a:ln>
               <a:solidFill>
-                <a:schemeClr val="accent3">
-                  <a:lumMod val="75000"/>
-                </a:schemeClr>
+                <a:srgbClr val="604A7B"/>
               </a:solidFill>
             </a:endParaRPr>
           </a:p>
@@ -6662,83 +6642,7 @@
                   </a:outerShdw>
                 </a:effectLst>
               </a:rPr>
-              <a:t>Doff </a:t>
-            </a:r>
-            <a:r>
-              <a:rPr lang="en-US" sz="13800" b="1" spc="-150" dirty="0" smtClean="0">
-                <a:ln w="12700">
-                  <a:noFill/>
-                  <a:prstDash val="solid"/>
-                </a:ln>
-                <a:solidFill>
-                  <a:schemeClr val="accent1"/>
-                </a:solidFill>
-                <a:effectLst>
-                  <a:outerShdw blurRad="41275" dist="20320" dir="1800000" algn="tl" rotWithShape="0">
-                    <a:srgbClr val="000000">
-                      <a:alpha val="40000"/>
-                    </a:srgbClr>
-                  </a:outerShdw>
-                </a:effectLst>
-              </a:rPr>
-              <a:t>VR helmet</a:t>
-            </a:r>
-            <a:r>
-              <a:rPr lang="en-US" sz="13800" b="1" spc="-150" dirty="0" smtClean="0">
-                <a:ln w="12700">
-                  <a:noFill/>
-                  <a:prstDash val="solid"/>
-                </a:ln>
-                <a:solidFill>
-                  <a:schemeClr val="accent1"/>
-                </a:solidFill>
-                <a:effectLst>
-                  <a:outerShdw blurRad="41275" dist="20320" dir="1800000" algn="tl" rotWithShape="0">
-                    <a:srgbClr val="000000">
-                      <a:alpha val="40000"/>
-                    </a:srgbClr>
-                  </a:outerShdw>
-                </a:effectLst>
-              </a:rPr>
-              <a:t> </a:t>
-            </a:r>
-            <a:r>
-              <a:rPr lang="en-US" sz="13800" b="1" spc="-150" dirty="0" smtClean="0">
-                <a:ln w="12700">
-                  <a:noFill/>
-                  <a:prstDash val="solid"/>
-                </a:ln>
-                <a:solidFill>
-                  <a:schemeClr val="accent1"/>
-                </a:solidFill>
-                <a:effectLst>
-                  <a:outerShdw blurRad="41275" dist="20320" dir="1800000" algn="tl" rotWithShape="0">
-                    <a:srgbClr val="000000">
-                      <a:alpha val="40000"/>
-                    </a:srgbClr>
-                  </a:outerShdw>
-                </a:effectLst>
-              </a:rPr>
-              <a:t>and press </a:t>
-            </a:r>
-            <a:r>
-              <a:rPr lang="en-US" sz="13800" b="1" spc="-150" dirty="0" smtClean="0">
-                <a:ln w="12700">
-                  <a:noFill/>
-                  <a:prstDash val="solid"/>
-                </a:ln>
-                <a:solidFill>
-                  <a:schemeClr val="accent1"/>
-                </a:solidFill>
-                <a:effectLst>
-                  <a:outerShdw blurRad="41275" dist="20320" dir="1800000" algn="tl" rotWithShape="0">
-                    <a:srgbClr val="000000">
-                      <a:alpha val="40000"/>
-                    </a:srgbClr>
-                  </a:outerShdw>
-                </a:effectLst>
-              </a:rPr>
-              <a:t>Return.</a:t>
+              <a:t>Doff VR helmet and press Return.</a:t>
             </a:r>
             <a:endParaRPr lang="en-US" sz="13800" b="1" spc="-150" dirty="0">
               <a:ln w="12700">
@@ -7141,7 +7045,9 @@
                   <a:prstDash val="solid"/>
                 </a:ln>
                 <a:solidFill>
-                  <a:srgbClr val="77933C"/>
+                  <a:schemeClr val="accent4">
+                    <a:lumMod val="75000"/>
+                  </a:schemeClr>
                 </a:solidFill>
               </a:rPr>
               <a:t>Time to lower hand exceeded.</a:t>
@@ -7154,7 +7060,9 @@
                 <a:prstDash val="solid"/>
               </a:ln>
               <a:solidFill>
-                <a:srgbClr val="77933C"/>
+                <a:schemeClr val="accent4">
+                  <a:lumMod val="75000"/>
+                </a:schemeClr>
               </a:solidFill>
             </a:endParaRPr>
           </a:p>
@@ -8092,7 +8000,7 @@
                   <a:prstDash val="solid"/>
                 </a:ln>
                 <a:solidFill>
-                  <a:srgbClr val="77933C"/>
+                  <a:srgbClr val="604A7B"/>
                 </a:solidFill>
               </a:rPr>
               <a:t>Time to raise hand exceeded.</a:t>
@@ -8105,7 +8013,7 @@
                 <a:prstDash val="solid"/>
               </a:ln>
               <a:solidFill>
-                <a:srgbClr val="77933C"/>
+                <a:srgbClr val="604A7B"/>
               </a:solidFill>
             </a:endParaRPr>
           </a:p>
@@ -8824,7 +8732,7 @@
                   <a:prstDash val="solid"/>
                 </a:ln>
                 <a:solidFill>
-                  <a:srgbClr val="77933C"/>
+                  <a:srgbClr val="604A7B"/>
                 </a:solidFill>
               </a:rPr>
               <a:t>Head </a:t>
@@ -8838,7 +8746,7 @@
                   <a:prstDash val="solid"/>
                 </a:ln>
                 <a:solidFill>
-                  <a:srgbClr val="77933C"/>
+                  <a:srgbClr val="604A7B"/>
                 </a:solidFill>
               </a:rPr>
               <a:t>t</a:t>
@@ -8852,7 +8760,7 @@
                   <a:prstDash val="solid"/>
                 </a:ln>
                 <a:solidFill>
-                  <a:srgbClr val="77933C"/>
+                  <a:srgbClr val="604A7B"/>
                 </a:solidFill>
               </a:rPr>
               <a:t> </a:t>
@@ -8866,7 +8774,7 @@
                   <a:prstDash val="solid"/>
                 </a:ln>
                 <a:solidFill>
-                  <a:srgbClr val="77933C"/>
+                  <a:srgbClr val="604A7B"/>
                 </a:solidFill>
               </a:rPr>
               <a:t>ilt</a:t>
@@ -8880,24 +8788,10 @@
                   <a:prstDash val="solid"/>
                 </a:ln>
                 <a:solidFill>
-                  <a:srgbClr val="77933C"/>
+                  <a:srgbClr val="604A7B"/>
                 </a:solidFill>
               </a:rPr>
-              <a:t> not </a:t>
-            </a:r>
-            <a:r>
-              <a:rPr lang="en-US" sz="23900" b="1" spc="600" dirty="0" smtClean="0">
-                <a:ln w="12700">
-                  <a:solidFill>
-                    <a:srgbClr val="FFFFFF"/>
-                  </a:solidFill>
-                  <a:prstDash val="solid"/>
-                </a:ln>
-                <a:solidFill>
-                  <a:srgbClr val="77933C"/>
-                </a:solidFill>
-              </a:rPr>
-              <a:t>maintained.</a:t>
+              <a:t> not maintained.</a:t>
             </a:r>
             <a:endParaRPr lang="en-US" sz="23900" b="1" spc="600" dirty="0">
               <a:ln w="12700">
@@ -8907,7 +8801,7 @@
                 <a:prstDash val="solid"/>
               </a:ln>
               <a:solidFill>
-                <a:srgbClr val="77933C"/>
+                <a:srgbClr val="604A7B"/>
               </a:solidFill>
             </a:endParaRPr>
           </a:p>
@@ -9140,9 +9034,7 @@
                   <a:prstDash val="solid"/>
                 </a:ln>
                 <a:solidFill>
-                  <a:schemeClr val="accent3">
-                    <a:lumMod val="75000"/>
-                  </a:schemeClr>
+                  <a:srgbClr val="604A7B"/>
                 </a:solidFill>
               </a:rPr>
               <a:t>Time to </a:t>
@@ -9156,7 +9048,7 @@
                   <a:prstDash val="solid"/>
                 </a:ln>
                 <a:solidFill>
-                  <a:srgbClr val="77933C"/>
+                  <a:srgbClr val="604A7B"/>
                 </a:solidFill>
               </a:rPr>
               <a:t>t</a:t>
@@ -9170,7 +9062,7 @@
                   <a:prstDash val="solid"/>
                 </a:ln>
                 <a:solidFill>
-                  <a:srgbClr val="77933C"/>
+                  <a:srgbClr val="604A7B"/>
                 </a:solidFill>
               </a:rPr>
               <a:t> </a:t>
@@ -9184,7 +9076,7 @@
                   <a:prstDash val="solid"/>
                 </a:ln>
                 <a:solidFill>
-                  <a:srgbClr val="77933C"/>
+                  <a:srgbClr val="604A7B"/>
                 </a:solidFill>
               </a:rPr>
               <a:t>ilt</a:t>
@@ -9198,42 +9090,10 @@
                   <a:prstDash val="solid"/>
                 </a:ln>
                 <a:solidFill>
-                  <a:srgbClr val="77933C"/>
+                  <a:srgbClr val="604A7B"/>
                 </a:solidFill>
               </a:rPr>
-              <a:t> </a:t>
-            </a:r>
-            <a:r>
-              <a:rPr lang="en-US" sz="23900" b="1" spc="600" dirty="0" smtClean="0">
-                <a:ln w="12700">
-                  <a:solidFill>
-                    <a:srgbClr val="FFFFFF"/>
-                  </a:solidFill>
-                  <a:prstDash val="solid"/>
-                </a:ln>
-                <a:solidFill>
-                  <a:schemeClr val="accent3">
-                    <a:lumMod val="75000"/>
-                  </a:schemeClr>
-                </a:solidFill>
-              </a:rPr>
-              <a:t>head </a:t>
-            </a:r>
-            <a:r>
-              <a:rPr lang="en-US" sz="23900" b="1" spc="600" dirty="0" smtClean="0">
-                <a:ln w="12700">
-                  <a:solidFill>
-                    <a:srgbClr val="FFFFFF"/>
-                  </a:solidFill>
-                  <a:prstDash val="solid"/>
-                </a:ln>
-                <a:solidFill>
-                  <a:schemeClr val="accent3">
-                    <a:lumMod val="75000"/>
-                  </a:schemeClr>
-                </a:solidFill>
-              </a:rPr>
-              <a:t>exceeded.</a:t>
+              <a:t> head exceeded.</a:t>
             </a:r>
             <a:endParaRPr lang="en-US" sz="23900" b="1" spc="600" dirty="0">
               <a:ln w="12700">
@@ -9243,9 +9103,7 @@
                 <a:prstDash val="solid"/>
               </a:ln>
               <a:solidFill>
-                <a:schemeClr val="accent3">
-                  <a:lumMod val="75000"/>
-                </a:schemeClr>
+                <a:srgbClr val="604A7B"/>
               </a:solidFill>
             </a:endParaRPr>
           </a:p>

</xml_diff>

<commit_message>
Highlight need to straighten head, per crew request.
</commit_message>
<xml_diff>
--- a/Source Code/GraspBMPs/GraspCircularPrompts.pptx
+++ b/Source Code/GraspBMPs/GraspCircularPrompts.pptx
@@ -302,7 +302,7 @@
           <a:p>
             <a:fld id="{649FEDF0-7D14-9E44-B4F2-968D163D1479}" type="datetimeFigureOut">
               <a:rPr lang="fr-FR" smtClean="0"/>
-              <a:t>19/08/16</a:t>
+              <a:t>28/09/16</a:t>
             </a:fld>
             <a:endParaRPr lang="en-US" dirty="0"/>
           </a:p>
@@ -472,7 +472,7 @@
           <a:p>
             <a:fld id="{649FEDF0-7D14-9E44-B4F2-968D163D1479}" type="datetimeFigureOut">
               <a:rPr lang="fr-FR" smtClean="0"/>
-              <a:t>19/08/16</a:t>
+              <a:t>28/09/16</a:t>
             </a:fld>
             <a:endParaRPr lang="en-US" dirty="0"/>
           </a:p>
@@ -652,7 +652,7 @@
           <a:p>
             <a:fld id="{649FEDF0-7D14-9E44-B4F2-968D163D1479}" type="datetimeFigureOut">
               <a:rPr lang="fr-FR" smtClean="0"/>
-              <a:t>19/08/16</a:t>
+              <a:t>28/09/16</a:t>
             </a:fld>
             <a:endParaRPr lang="en-US" dirty="0"/>
           </a:p>
@@ -822,7 +822,7 @@
           <a:p>
             <a:fld id="{649FEDF0-7D14-9E44-B4F2-968D163D1479}" type="datetimeFigureOut">
               <a:rPr lang="fr-FR" smtClean="0"/>
-              <a:t>19/08/16</a:t>
+              <a:t>28/09/16</a:t>
             </a:fld>
             <a:endParaRPr lang="en-US" dirty="0"/>
           </a:p>
@@ -1068,7 +1068,7 @@
           <a:p>
             <a:fld id="{649FEDF0-7D14-9E44-B4F2-968D163D1479}" type="datetimeFigureOut">
               <a:rPr lang="fr-FR" smtClean="0"/>
-              <a:t>19/08/16</a:t>
+              <a:t>28/09/16</a:t>
             </a:fld>
             <a:endParaRPr lang="en-US" dirty="0"/>
           </a:p>
@@ -1356,7 +1356,7 @@
           <a:p>
             <a:fld id="{649FEDF0-7D14-9E44-B4F2-968D163D1479}" type="datetimeFigureOut">
               <a:rPr lang="fr-FR" smtClean="0"/>
-              <a:t>19/08/16</a:t>
+              <a:t>28/09/16</a:t>
             </a:fld>
             <a:endParaRPr lang="en-US" dirty="0"/>
           </a:p>
@@ -1778,7 +1778,7 @@
           <a:p>
             <a:fld id="{649FEDF0-7D14-9E44-B4F2-968D163D1479}" type="datetimeFigureOut">
               <a:rPr lang="fr-FR" smtClean="0"/>
-              <a:t>19/08/16</a:t>
+              <a:t>28/09/16</a:t>
             </a:fld>
             <a:endParaRPr lang="en-US" dirty="0"/>
           </a:p>
@@ -1896,7 +1896,7 @@
           <a:p>
             <a:fld id="{649FEDF0-7D14-9E44-B4F2-968D163D1479}" type="datetimeFigureOut">
               <a:rPr lang="fr-FR" smtClean="0"/>
-              <a:t>19/08/16</a:t>
+              <a:t>28/09/16</a:t>
             </a:fld>
             <a:endParaRPr lang="en-US" dirty="0"/>
           </a:p>
@@ -1991,7 +1991,7 @@
           <a:p>
             <a:fld id="{649FEDF0-7D14-9E44-B4F2-968D163D1479}" type="datetimeFigureOut">
               <a:rPr lang="fr-FR" smtClean="0"/>
-              <a:t>19/08/16</a:t>
+              <a:t>28/09/16</a:t>
             </a:fld>
             <a:endParaRPr lang="en-US" dirty="0"/>
           </a:p>
@@ -2316,7 +2316,7 @@
           <a:p>
             <a:fld id="{649FEDF0-7D14-9E44-B4F2-968D163D1479}" type="datetimeFigureOut">
               <a:rPr lang="fr-FR" smtClean="0"/>
-              <a:t>19/08/16</a:t>
+              <a:t>28/09/16</a:t>
             </a:fld>
             <a:endParaRPr lang="en-US" dirty="0"/>
           </a:p>
@@ -2569,7 +2569,7 @@
           <a:p>
             <a:fld id="{649FEDF0-7D14-9E44-B4F2-968D163D1479}" type="datetimeFigureOut">
               <a:rPr lang="fr-FR" smtClean="0"/>
-              <a:t>19/08/16</a:t>
+              <a:t>28/09/16</a:t>
             </a:fld>
             <a:endParaRPr lang="en-US" dirty="0"/>
           </a:p>
@@ -2785,7 +2785,7 @@
           <a:p>
             <a:fld id="{649FEDF0-7D14-9E44-B4F2-968D163D1479}" type="datetimeFigureOut">
               <a:rPr lang="fr-FR" smtClean="0"/>
-              <a:t>19/08/16</a:t>
+              <a:t>28/09/16</a:t>
             </a:fld>
             <a:endParaRPr lang="en-US" dirty="0"/>
           </a:p>
@@ -6117,7 +6117,7 @@
           <a:bodyPr wrap="none" lIns="210669" tIns="105334" rIns="210669" bIns="105334">
             <a:prstTxWarp prst="textCircle">
               <a:avLst>
-                <a:gd name="adj" fmla="val 10916975"/>
+                <a:gd name="adj" fmla="val 11697047"/>
               </a:avLst>
             </a:prstTxWarp>
             <a:spAutoFit/>
@@ -6142,16 +6142,16 @@
                   </a:outerShdw>
                 </a:effectLst>
               </a:rPr>
-              <a:t> Press </a:t>
-            </a:r>
-            <a:r>
-              <a:rPr lang="en-US" sz="13800" b="1" spc="300" dirty="0">
+              <a:t> </a:t>
+            </a:r>
+            <a:r>
+              <a:rPr lang="en-US" sz="13800" b="1" spc="300" dirty="0" smtClean="0">
                 <a:ln w="12700">
                   <a:noFill/>
                   <a:prstDash val="solid"/>
                 </a:ln>
                 <a:solidFill>
-                  <a:schemeClr val="accent1"/>
+                  <a:srgbClr val="FF6600"/>
                 </a:solidFill>
                 <a:effectLst>
                   <a:outerShdw blurRad="41275" dist="20320" dir="1800000" algn="tl" rotWithShape="0">
@@ -6161,7 +6161,7 @@
                   </a:outerShdw>
                 </a:effectLst>
               </a:rPr>
-              <a:t>a button to continue</a:t>
+              <a:t>When head is straight, </a:t>
             </a:r>
             <a:r>
               <a:rPr lang="en-US" sz="13800" b="1" spc="300" dirty="0" smtClean="0">
@@ -6180,7 +6180,7 @@
                   </a:outerShdw>
                 </a:effectLst>
               </a:rPr>
-              <a:t>.</a:t>
+              <a:t>press button. </a:t>
             </a:r>
             <a:endParaRPr lang="en-US" sz="13800" b="1" spc="300" dirty="0">
               <a:ln w="12700">

</xml_diff>

<commit_message>
Press and Hold prompt.
</commit_message>
<xml_diff>
--- a/Source Code/GraspBMPs/GraspCircularPrompts.pptx
+++ b/Source Code/GraspBMPs/GraspCircularPrompts.pptx
@@ -302,7 +302,7 @@
           <a:p>
             <a:fld id="{649FEDF0-7D14-9E44-B4F2-968D163D1479}" type="datetimeFigureOut">
               <a:rPr lang="fr-FR" smtClean="0"/>
-              <a:t>28/09/16</a:t>
+              <a:t>05/10/16</a:t>
             </a:fld>
             <a:endParaRPr lang="en-US" dirty="0"/>
           </a:p>
@@ -472,7 +472,7 @@
           <a:p>
             <a:fld id="{649FEDF0-7D14-9E44-B4F2-968D163D1479}" type="datetimeFigureOut">
               <a:rPr lang="fr-FR" smtClean="0"/>
-              <a:t>28/09/16</a:t>
+              <a:t>05/10/16</a:t>
             </a:fld>
             <a:endParaRPr lang="en-US" dirty="0"/>
           </a:p>
@@ -652,7 +652,7 @@
           <a:p>
             <a:fld id="{649FEDF0-7D14-9E44-B4F2-968D163D1479}" type="datetimeFigureOut">
               <a:rPr lang="fr-FR" smtClean="0"/>
-              <a:t>28/09/16</a:t>
+              <a:t>05/10/16</a:t>
             </a:fld>
             <a:endParaRPr lang="en-US" dirty="0"/>
           </a:p>
@@ -822,7 +822,7 @@
           <a:p>
             <a:fld id="{649FEDF0-7D14-9E44-B4F2-968D163D1479}" type="datetimeFigureOut">
               <a:rPr lang="fr-FR" smtClean="0"/>
-              <a:t>28/09/16</a:t>
+              <a:t>05/10/16</a:t>
             </a:fld>
             <a:endParaRPr lang="en-US" dirty="0"/>
           </a:p>
@@ -1068,7 +1068,7 @@
           <a:p>
             <a:fld id="{649FEDF0-7D14-9E44-B4F2-968D163D1479}" type="datetimeFigureOut">
               <a:rPr lang="fr-FR" smtClean="0"/>
-              <a:t>28/09/16</a:t>
+              <a:t>05/10/16</a:t>
             </a:fld>
             <a:endParaRPr lang="en-US" dirty="0"/>
           </a:p>
@@ -1356,7 +1356,7 @@
           <a:p>
             <a:fld id="{649FEDF0-7D14-9E44-B4F2-968D163D1479}" type="datetimeFigureOut">
               <a:rPr lang="fr-FR" smtClean="0"/>
-              <a:t>28/09/16</a:t>
+              <a:t>05/10/16</a:t>
             </a:fld>
             <a:endParaRPr lang="en-US" dirty="0"/>
           </a:p>
@@ -1778,7 +1778,7 @@
           <a:p>
             <a:fld id="{649FEDF0-7D14-9E44-B4F2-968D163D1479}" type="datetimeFigureOut">
               <a:rPr lang="fr-FR" smtClean="0"/>
-              <a:t>28/09/16</a:t>
+              <a:t>05/10/16</a:t>
             </a:fld>
             <a:endParaRPr lang="en-US" dirty="0"/>
           </a:p>
@@ -1896,7 +1896,7 @@
           <a:p>
             <a:fld id="{649FEDF0-7D14-9E44-B4F2-968D163D1479}" type="datetimeFigureOut">
               <a:rPr lang="fr-FR" smtClean="0"/>
-              <a:t>28/09/16</a:t>
+              <a:t>05/10/16</a:t>
             </a:fld>
             <a:endParaRPr lang="en-US" dirty="0"/>
           </a:p>
@@ -1991,7 +1991,7 @@
           <a:p>
             <a:fld id="{649FEDF0-7D14-9E44-B4F2-968D163D1479}" type="datetimeFigureOut">
               <a:rPr lang="fr-FR" smtClean="0"/>
-              <a:t>28/09/16</a:t>
+              <a:t>05/10/16</a:t>
             </a:fld>
             <a:endParaRPr lang="en-US" dirty="0"/>
           </a:p>
@@ -2316,7 +2316,7 @@
           <a:p>
             <a:fld id="{649FEDF0-7D14-9E44-B4F2-968D163D1479}" type="datetimeFigureOut">
               <a:rPr lang="fr-FR" smtClean="0"/>
-              <a:t>28/09/16</a:t>
+              <a:t>05/10/16</a:t>
             </a:fld>
             <a:endParaRPr lang="en-US" dirty="0"/>
           </a:p>
@@ -2569,7 +2569,7 @@
           <a:p>
             <a:fld id="{649FEDF0-7D14-9E44-B4F2-968D163D1479}" type="datetimeFigureOut">
               <a:rPr lang="fr-FR" smtClean="0"/>
-              <a:t>28/09/16</a:t>
+              <a:t>05/10/16</a:t>
             </a:fld>
             <a:endParaRPr lang="en-US" dirty="0"/>
           </a:p>
@@ -2785,7 +2785,7 @@
           <a:p>
             <a:fld id="{649FEDF0-7D14-9E44-B4F2-968D163D1479}" type="datetimeFigureOut">
               <a:rPr lang="fr-FR" smtClean="0"/>
-              <a:t>28/09/16</a:t>
+              <a:t>05/10/16</a:t>
             </a:fld>
             <a:endParaRPr lang="en-US" dirty="0"/>
           </a:p>
@@ -6617,7 +6617,7 @@
           <a:bodyPr wrap="none" lIns="210669" tIns="105334" rIns="210669" bIns="105334">
             <a:prstTxWarp prst="textCircle">
               <a:avLst>
-                <a:gd name="adj" fmla="val 10916975"/>
+                <a:gd name="adj" fmla="val 11371993"/>
               </a:avLst>
             </a:prstTxWarp>
             <a:spAutoFit/>
@@ -6642,7 +6642,83 @@
                   </a:outerShdw>
                 </a:effectLst>
               </a:rPr>
-              <a:t>Doff VR helmet and press Return.</a:t>
+              <a:t>Click to exit.   Press and hold to </a:t>
+            </a:r>
+            <a:r>
+              <a:rPr lang="en-US" sz="13800" b="1" spc="-150" dirty="0" err="1" smtClean="0">
+                <a:ln w="12700">
+                  <a:noFill/>
+                  <a:prstDash val="solid"/>
+                </a:ln>
+                <a:solidFill>
+                  <a:schemeClr val="accent1"/>
+                </a:solidFill>
+                <a:effectLst>
+                  <a:outerShdw blurRad="41275" dist="20320" dir="1800000" algn="tl" rotWithShape="0">
+                    <a:srgbClr val="000000">
+                      <a:alpha val="40000"/>
+                    </a:srgbClr>
+                  </a:outerShdw>
+                </a:effectLst>
+              </a:rPr>
+              <a:t>cont</a:t>
+            </a:r>
+            <a:r>
+              <a:rPr lang="en-US" sz="3600" b="1" spc="-150" dirty="0" smtClean="0">
+                <a:ln w="12700">
+                  <a:noFill/>
+                  <a:prstDash val="solid"/>
+                </a:ln>
+                <a:solidFill>
+                  <a:schemeClr val="accent1"/>
+                </a:solidFill>
+                <a:effectLst>
+                  <a:outerShdw blurRad="41275" dist="20320" dir="1800000" algn="tl" rotWithShape="0">
+                    <a:srgbClr val="000000">
+                      <a:alpha val="40000"/>
+                    </a:srgbClr>
+                  </a:outerShdw>
+                </a:effectLst>
+              </a:rPr>
+              <a:t> </a:t>
+            </a:r>
+            <a:r>
+              <a:rPr lang="en-US" sz="13800" b="1" spc="-150" dirty="0" err="1" smtClean="0">
+                <a:ln w="12700">
+                  <a:noFill/>
+                  <a:prstDash val="solid"/>
+                </a:ln>
+                <a:solidFill>
+                  <a:schemeClr val="accent1"/>
+                </a:solidFill>
+                <a:effectLst>
+                  <a:outerShdw blurRad="41275" dist="20320" dir="1800000" algn="tl" rotWithShape="0">
+                    <a:srgbClr val="000000">
+                      <a:alpha val="40000"/>
+                    </a:srgbClr>
+                  </a:outerShdw>
+                </a:effectLst>
+              </a:rPr>
+              <a:t>inue</a:t>
+            </a:r>
+            <a:r>
+              <a:rPr lang="en-US" sz="13800" b="1" spc="-150" dirty="0" smtClean="0">
+                <a:ln w="12700">
+                  <a:noFill/>
+                  <a:prstDash val="solid"/>
+                </a:ln>
+                <a:solidFill>
+                  <a:schemeClr val="accent1"/>
+                </a:solidFill>
+                <a:effectLst>
+                  <a:outerShdw blurRad="41275" dist="20320" dir="1800000" algn="tl" rotWithShape="0">
+                    <a:srgbClr val="000000">
+                      <a:alpha val="40000"/>
+                    </a:srgbClr>
+                  </a:outerShdw>
+                </a:effectLst>
+              </a:rPr>
+              <a:t>. </a:t>
             </a:r>
             <a:endParaRPr lang="en-US" sz="13800" b="1" spc="-150" dirty="0">
               <a:ln w="12700">

</xml_diff>

<commit_message>
Holding 'Back' button on Remote causes multiple returns.
This has been implemented to allow the subject to pass directly from one
block of trials to the next without doffing the HMD.
</commit_message>
<xml_diff>
--- a/Source Code/GraspBMPs/GraspCircularPrompts.pptx
+++ b/Source Code/GraspBMPs/GraspCircularPrompts.pptx
@@ -6642,10 +6642,10 @@
                   </a:outerShdw>
                 </a:effectLst>
               </a:rPr>
-              <a:t>Click to exit.   Press and hold to </a:t>
-            </a:r>
-            <a:r>
-              <a:rPr lang="en-US" sz="13800" b="1" spc="-150" dirty="0" err="1" smtClean="0">
+              <a:t>Click ‘Select’ </a:t>
+            </a:r>
+            <a:r>
+              <a:rPr lang="en-US" sz="13800" b="1" spc="-150" dirty="0" smtClean="0">
                 <a:ln w="12700">
                   <a:noFill/>
                   <a:prstDash val="solid"/>
@@ -6661,10 +6661,10 @@
                   </a:outerShdw>
                 </a:effectLst>
               </a:rPr>
-              <a:t>cont</a:t>
-            </a:r>
-            <a:r>
-              <a:rPr lang="en-US" sz="3600" b="1" spc="-150" dirty="0" smtClean="0">
+              <a:t>to exit.   </a:t>
+            </a:r>
+            <a:r>
+              <a:rPr lang="en-US" sz="13800" b="1" spc="-150" dirty="0" smtClean="0">
                 <a:ln w="12700">
                   <a:noFill/>
                   <a:prstDash val="solid"/>
@@ -6680,10 +6680,10 @@
                   </a:outerShdw>
                 </a:effectLst>
               </a:rPr>
-              <a:t> </a:t>
-            </a:r>
-            <a:r>
-              <a:rPr lang="en-US" sz="13800" b="1" spc="-150" dirty="0" err="1" smtClean="0">
+              <a:t>Click </a:t>
+            </a:r>
+            <a:r>
+              <a:rPr lang="en-US" sz="13800" b="1" spc="-150" smtClean="0">
                 <a:ln w="12700">
                   <a:noFill/>
                   <a:prstDash val="solid"/>
@@ -6699,10 +6699,48 @@
                   </a:outerShdw>
                 </a:effectLst>
               </a:rPr>
-              <a:t>inue</a:t>
+              <a:t>and hold </a:t>
             </a:r>
             <a:r>
               <a:rPr lang="en-US" sz="13800" b="1" spc="-150" dirty="0" smtClean="0">
+                <a:ln w="12700">
+                  <a:noFill/>
+                  <a:prstDash val="solid"/>
+                </a:ln>
+                <a:solidFill>
+                  <a:schemeClr val="accent1"/>
+                </a:solidFill>
+                <a:effectLst>
+                  <a:outerShdw blurRad="41275" dist="20320" dir="1800000" algn="tl" rotWithShape="0">
+                    <a:srgbClr val="000000">
+                      <a:alpha val="40000"/>
+                    </a:srgbClr>
+                  </a:outerShdw>
+                </a:effectLst>
+              </a:rPr>
+              <a:t>‘Return’ </a:t>
+            </a:r>
+            <a:r>
+              <a:rPr lang="en-US" sz="13800" b="1" spc="-150" smtClean="0">
+                <a:ln w="12700">
+                  <a:noFill/>
+                  <a:prstDash val="solid"/>
+                </a:ln>
+                <a:solidFill>
+                  <a:schemeClr val="accent1"/>
+                </a:solidFill>
+                <a:effectLst>
+                  <a:outerShdw blurRad="41275" dist="20320" dir="1800000" algn="tl" rotWithShape="0">
+                    <a:srgbClr val="000000">
+                      <a:alpha val="40000"/>
+                    </a:srgbClr>
+                  </a:outerShdw>
+                </a:effectLst>
+              </a:rPr>
+              <a:t>to continue</a:t>
+            </a:r>
+            <a:r>
+              <a:rPr lang="en-US" sz="13800" b="1" spc="-150" smtClean="0">
                 <a:ln w="12700">
                   <a:noFill/>
                   <a:prstDash val="solid"/>

</xml_diff>

<commit_message>
Demo and Doff modes for Grasp
</commit_message>
<xml_diff>
--- a/Source Code/GraspBMPs/GraspCircularPrompts.pptx
+++ b/Source Code/GraspBMPs/GraspCircularPrompts.pptx
@@ -20,6 +20,8 @@
     <p:sldId id="278" r:id="rId14"/>
     <p:sldId id="280" r:id="rId15"/>
     <p:sldId id="281" r:id="rId16"/>
+    <p:sldId id="282" r:id="rId17"/>
+    <p:sldId id="283" r:id="rId18"/>
   </p:sldIdLst>
   <p:sldSz cx="18434050" cy="18434050"/>
   <p:notesSz cx="6858000" cy="9144000"/>
@@ -302,7 +304,7 @@
           <a:p>
             <a:fld id="{649FEDF0-7D14-9E44-B4F2-968D163D1479}" type="datetimeFigureOut">
               <a:rPr lang="fr-FR" smtClean="0"/>
-              <a:t>05/10/16</a:t>
+              <a:t>07/10/16</a:t>
             </a:fld>
             <a:endParaRPr lang="en-US" dirty="0"/>
           </a:p>
@@ -472,7 +474,7 @@
           <a:p>
             <a:fld id="{649FEDF0-7D14-9E44-B4F2-968D163D1479}" type="datetimeFigureOut">
               <a:rPr lang="fr-FR" smtClean="0"/>
-              <a:t>05/10/16</a:t>
+              <a:t>07/10/16</a:t>
             </a:fld>
             <a:endParaRPr lang="en-US" dirty="0"/>
           </a:p>
@@ -652,7 +654,7 @@
           <a:p>
             <a:fld id="{649FEDF0-7D14-9E44-B4F2-968D163D1479}" type="datetimeFigureOut">
               <a:rPr lang="fr-FR" smtClean="0"/>
-              <a:t>05/10/16</a:t>
+              <a:t>07/10/16</a:t>
             </a:fld>
             <a:endParaRPr lang="en-US" dirty="0"/>
           </a:p>
@@ -822,7 +824,7 @@
           <a:p>
             <a:fld id="{649FEDF0-7D14-9E44-B4F2-968D163D1479}" type="datetimeFigureOut">
               <a:rPr lang="fr-FR" smtClean="0"/>
-              <a:t>05/10/16</a:t>
+              <a:t>07/10/16</a:t>
             </a:fld>
             <a:endParaRPr lang="en-US" dirty="0"/>
           </a:p>
@@ -1068,7 +1070,7 @@
           <a:p>
             <a:fld id="{649FEDF0-7D14-9E44-B4F2-968D163D1479}" type="datetimeFigureOut">
               <a:rPr lang="fr-FR" smtClean="0"/>
-              <a:t>05/10/16</a:t>
+              <a:t>07/10/16</a:t>
             </a:fld>
             <a:endParaRPr lang="en-US" dirty="0"/>
           </a:p>
@@ -1356,7 +1358,7 @@
           <a:p>
             <a:fld id="{649FEDF0-7D14-9E44-B4F2-968D163D1479}" type="datetimeFigureOut">
               <a:rPr lang="fr-FR" smtClean="0"/>
-              <a:t>05/10/16</a:t>
+              <a:t>07/10/16</a:t>
             </a:fld>
             <a:endParaRPr lang="en-US" dirty="0"/>
           </a:p>
@@ -1778,7 +1780,7 @@
           <a:p>
             <a:fld id="{649FEDF0-7D14-9E44-B4F2-968D163D1479}" type="datetimeFigureOut">
               <a:rPr lang="fr-FR" smtClean="0"/>
-              <a:t>05/10/16</a:t>
+              <a:t>07/10/16</a:t>
             </a:fld>
             <a:endParaRPr lang="en-US" dirty="0"/>
           </a:p>
@@ -1896,7 +1898,7 @@
           <a:p>
             <a:fld id="{649FEDF0-7D14-9E44-B4F2-968D163D1479}" type="datetimeFigureOut">
               <a:rPr lang="fr-FR" smtClean="0"/>
-              <a:t>05/10/16</a:t>
+              <a:t>07/10/16</a:t>
             </a:fld>
             <a:endParaRPr lang="en-US" dirty="0"/>
           </a:p>
@@ -1991,7 +1993,7 @@
           <a:p>
             <a:fld id="{649FEDF0-7D14-9E44-B4F2-968D163D1479}" type="datetimeFigureOut">
               <a:rPr lang="fr-FR" smtClean="0"/>
-              <a:t>05/10/16</a:t>
+              <a:t>07/10/16</a:t>
             </a:fld>
             <a:endParaRPr lang="en-US" dirty="0"/>
           </a:p>
@@ -2316,7 +2318,7 @@
           <a:p>
             <a:fld id="{649FEDF0-7D14-9E44-B4F2-968D163D1479}" type="datetimeFigureOut">
               <a:rPr lang="fr-FR" smtClean="0"/>
-              <a:t>05/10/16</a:t>
+              <a:t>07/10/16</a:t>
             </a:fld>
             <a:endParaRPr lang="en-US" dirty="0"/>
           </a:p>
@@ -2569,7 +2571,7 @@
           <a:p>
             <a:fld id="{649FEDF0-7D14-9E44-B4F2-968D163D1479}" type="datetimeFigureOut">
               <a:rPr lang="fr-FR" smtClean="0"/>
-              <a:t>05/10/16</a:t>
+              <a:t>07/10/16</a:t>
             </a:fld>
             <a:endParaRPr lang="en-US" dirty="0"/>
           </a:p>
@@ -2785,7 +2787,7 @@
           <a:p>
             <a:fld id="{649FEDF0-7D14-9E44-B4F2-968D163D1479}" type="datetimeFigureOut">
               <a:rPr lang="fr-FR" smtClean="0"/>
-              <a:t>05/10/16</a:t>
+              <a:t>07/10/16</a:t>
             </a:fld>
             <a:endParaRPr lang="en-US" dirty="0"/>
           </a:p>
@@ -6214,7 +6216,7 @@
 </p:sld>
 </file>
 
-<file path=ppt/slides/slide2.xml><?xml version="1.0" encoding="utf-8"?>
+<file path=ppt/slides/slide16.xml><?xml version="1.0" encoding="utf-8"?>
 <p:sld xmlns:a="http://schemas.openxmlformats.org/drawingml/2006/main" xmlns:r="http://schemas.openxmlformats.org/officeDocument/2006/relationships" xmlns:p="http://schemas.openxmlformats.org/presentationml/2006/main">
   <p:cSld>
     <p:spTree>
@@ -6327,7 +6329,7 @@
                   </a:schemeClr>
                 </a:solidFill>
               </a:rPr>
-              <a:t>  Ready to start next trial.</a:t>
+              <a:t> VR activity completed.          </a:t>
             </a:r>
             <a:endParaRPr lang="en-US" sz="23900" b="1" spc="600" dirty="0">
               <a:ln w="12700">
@@ -6367,7 +6369,7 @@
           <a:bodyPr wrap="none" lIns="210669" tIns="105334" rIns="210669" bIns="105334">
             <a:prstTxWarp prst="textCircle">
               <a:avLst>
-                <a:gd name="adj" fmla="val 10916975"/>
+                <a:gd name="adj" fmla="val 11371993"/>
               </a:avLst>
             </a:prstTxWarp>
             <a:spAutoFit/>
@@ -6376,7 +6378,7 @@
           <a:p>
             <a:pPr algn="ctr"/>
             <a:r>
-              <a:rPr lang="en-US" sz="13800" b="1" spc="300" dirty="0" smtClean="0">
+              <a:rPr lang="en-US" sz="13800" b="1" spc="-150" dirty="0" smtClean="0">
                 <a:ln w="12700">
                   <a:noFill/>
                   <a:prstDash val="solid"/>
@@ -6392,10 +6394,10 @@
                   </a:outerShdw>
                 </a:effectLst>
               </a:rPr>
-              <a:t> Press </a:t>
-            </a:r>
-            <a:r>
-              <a:rPr lang="en-US" sz="13800" b="1" spc="300" dirty="0">
+              <a:t>Doff Virtual Reality Helmet </a:t>
+            </a:r>
+            <a:r>
+              <a:rPr lang="en-US" sz="13800" b="1" spc="-150" dirty="0" smtClean="0">
                 <a:ln w="12700">
                   <a:noFill/>
                   <a:prstDash val="solid"/>
@@ -6411,10 +6413,10 @@
                   </a:outerShdw>
                 </a:effectLst>
               </a:rPr>
-              <a:t>a button to continue</a:t>
-            </a:r>
-            <a:r>
-              <a:rPr lang="en-US" sz="13800" b="1" spc="300" dirty="0" smtClean="0">
+              <a:t>and </a:t>
+            </a:r>
+            <a:r>
+              <a:rPr lang="en-US" sz="13800" b="1" spc="-150" dirty="0" smtClean="0">
                 <a:ln w="12700">
                   <a:noFill/>
                   <a:prstDash val="solid"/>
@@ -6430,9 +6432,9 @@
                   </a:outerShdw>
                 </a:effectLst>
               </a:rPr>
-              <a:t>.</a:t>
-            </a:r>
-            <a:endParaRPr lang="en-US" sz="13800" b="1" spc="300" dirty="0">
+              <a:t>press Return. </a:t>
+            </a:r>
+            <a:endParaRPr lang="en-US" sz="13800" b="1" spc="-150" dirty="0">
               <a:ln w="12700">
                 <a:noFill/>
                 <a:prstDash val="solid"/>
@@ -6454,7 +6456,7 @@
     </p:spTree>
     <p:extLst>
       <p:ext uri="{BB962C8B-B14F-4D97-AF65-F5344CB8AC3E}">
-        <p14:creationId xmlns:p14="http://schemas.microsoft.com/office/powerpoint/2010/main" val="4227632991"/>
+        <p14:creationId xmlns:p14="http://schemas.microsoft.com/office/powerpoint/2010/main" val="2932410022"/>
       </p:ext>
     </p:extLst>
   </p:cSld>
@@ -6464,7 +6466,7 @@
 </p:sld>
 </file>
 
-<file path=ppt/slides/slide3.xml><?xml version="1.0" encoding="utf-8"?>
+<file path=ppt/slides/slide17.xml><?xml version="1.0" encoding="utf-8"?>
 <p:sld xmlns:a="http://schemas.openxmlformats.org/drawingml/2006/main" xmlns:r="http://schemas.openxmlformats.org/officeDocument/2006/relationships" xmlns:p="http://schemas.openxmlformats.org/presentationml/2006/main">
   <p:cSld>
     <p:spTree>
@@ -6577,7 +6579,7 @@
                   </a:schemeClr>
                 </a:solidFill>
               </a:rPr>
-              <a:t>Trial block completed.</a:t>
+              <a:t> VR appears to be working.          </a:t>
             </a:r>
             <a:endParaRPr lang="en-US" sz="23900" b="1" spc="600" dirty="0">
               <a:ln w="12700">
@@ -6642,10 +6644,10 @@
                   </a:outerShdw>
                 </a:effectLst>
               </a:rPr>
-              <a:t>Click ‘Select’ </a:t>
-            </a:r>
-            <a:r>
-              <a:rPr lang="en-US" sz="13800" b="1" spc="-150" dirty="0" smtClean="0">
+              <a:t>Press ‘Return’ to </a:t>
+            </a:r>
+            <a:r>
+              <a:rPr lang="en-US" sz="13800" b="1" spc="-150" dirty="0" err="1" smtClean="0">
                 <a:ln w="12700">
                   <a:noFill/>
                   <a:prstDash val="solid"/>
@@ -6661,10 +6663,10 @@
                   </a:outerShdw>
                 </a:effectLst>
               </a:rPr>
-              <a:t>to exit.   </a:t>
-            </a:r>
-            <a:r>
-              <a:rPr lang="en-US" sz="13800" b="1" spc="-150" dirty="0" smtClean="0">
+              <a:t>cont</a:t>
+            </a:r>
+            <a:r>
+              <a:rPr lang="en-US" sz="1600" b="1" spc="-150" dirty="0" smtClean="0">
                 <a:ln w="12700">
                   <a:noFill/>
                   <a:prstDash val="solid"/>
@@ -6680,10 +6682,10 @@
                   </a:outerShdw>
                 </a:effectLst>
               </a:rPr>
-              <a:t>Click </a:t>
-            </a:r>
-            <a:r>
-              <a:rPr lang="en-US" sz="13800" b="1" spc="-150" smtClean="0">
+              <a:t> </a:t>
+            </a:r>
+            <a:r>
+              <a:rPr lang="en-US" sz="13800" b="1" spc="-150" dirty="0" err="1" smtClean="0">
                 <a:ln w="12700">
                   <a:noFill/>
                   <a:prstDash val="solid"/>
@@ -6699,48 +6701,10 @@
                   </a:outerShdw>
                 </a:effectLst>
               </a:rPr>
-              <a:t>and hold </a:t>
+              <a:t>inue</a:t>
             </a:r>
             <a:r>
               <a:rPr lang="en-US" sz="13800" b="1" spc="-150" dirty="0" smtClean="0">
-                <a:ln w="12700">
-                  <a:noFill/>
-                  <a:prstDash val="solid"/>
-                </a:ln>
-                <a:solidFill>
-                  <a:schemeClr val="accent1"/>
-                </a:solidFill>
-                <a:effectLst>
-                  <a:outerShdw blurRad="41275" dist="20320" dir="1800000" algn="tl" rotWithShape="0">
-                    <a:srgbClr val="000000">
-                      <a:alpha val="40000"/>
-                    </a:srgbClr>
-                  </a:outerShdw>
-                </a:effectLst>
-              </a:rPr>
-              <a:t>‘Return’ </a:t>
-            </a:r>
-            <a:r>
-              <a:rPr lang="en-US" sz="13800" b="1" spc="-150" smtClean="0">
-                <a:ln w="12700">
-                  <a:noFill/>
-                  <a:prstDash val="solid"/>
-                </a:ln>
-                <a:solidFill>
-                  <a:schemeClr val="accent1"/>
-                </a:solidFill>
-                <a:effectLst>
-                  <a:outerShdw blurRad="41275" dist="20320" dir="1800000" algn="tl" rotWithShape="0">
-                    <a:srgbClr val="000000">
-                      <a:alpha val="40000"/>
-                    </a:srgbClr>
-                  </a:outerShdw>
-                </a:effectLst>
-              </a:rPr>
-              <a:t>to continue</a:t>
-            </a:r>
-            <a:r>
-              <a:rPr lang="en-US" sz="13800" b="1" spc="-150" smtClean="0">
                 <a:ln w="12700">
                   <a:noFill/>
                   <a:prstDash val="solid"/>
@@ -6757,6 +6721,468 @@
                 </a:effectLst>
               </a:rPr>
               <a:t>. </a:t>
+            </a:r>
+            <a:endParaRPr lang="en-US" sz="13800" b="1" spc="-150" dirty="0">
+              <a:ln w="12700">
+                <a:noFill/>
+                <a:prstDash val="solid"/>
+              </a:ln>
+              <a:solidFill>
+                <a:schemeClr val="accent1"/>
+              </a:solidFill>
+              <a:effectLst>
+                <a:outerShdw blurRad="41275" dist="20320" dir="1800000" algn="tl" rotWithShape="0">
+                  <a:srgbClr val="000000">
+                    <a:alpha val="40000"/>
+                  </a:srgbClr>
+                </a:outerShdw>
+              </a:effectLst>
+            </a:endParaRPr>
+          </a:p>
+        </p:txBody>
+      </p:sp>
+    </p:spTree>
+    <p:extLst>
+      <p:ext uri="{BB962C8B-B14F-4D97-AF65-F5344CB8AC3E}">
+        <p14:creationId xmlns:p14="http://schemas.microsoft.com/office/powerpoint/2010/main" val="3964587204"/>
+      </p:ext>
+    </p:extLst>
+  </p:cSld>
+  <p:clrMapOvr>
+    <a:masterClrMapping/>
+  </p:clrMapOvr>
+</p:sld>
+</file>
+
+<file path=ppt/slides/slide2.xml><?xml version="1.0" encoding="utf-8"?>
+<p:sld xmlns:a="http://schemas.openxmlformats.org/drawingml/2006/main" xmlns:r="http://schemas.openxmlformats.org/officeDocument/2006/relationships" xmlns:p="http://schemas.openxmlformats.org/presentationml/2006/main">
+  <p:cSld>
+    <p:spTree>
+      <p:nvGrpSpPr>
+        <p:cNvPr id="1" name=""/>
+        <p:cNvGrpSpPr/>
+        <p:nvPr/>
+      </p:nvGrpSpPr>
+      <p:grpSpPr>
+        <a:xfrm>
+          <a:off x="0" y="0"/>
+          <a:ext cx="0" cy="0"/>
+          <a:chOff x="0" y="0"/>
+          <a:chExt cx="0" cy="0"/>
+        </a:xfrm>
+      </p:grpSpPr>
+      <p:sp>
+        <p:nvSpPr>
+          <p:cNvPr id="5" name="Bouée 4"/>
+          <p:cNvSpPr>
+            <a:spLocks noChangeAspect="1"/>
+          </p:cNvSpPr>
+          <p:nvPr/>
+        </p:nvSpPr>
+        <p:spPr>
+          <a:xfrm>
+            <a:off x="1614253" y="1610484"/>
+            <a:ext cx="15228000" cy="15228000"/>
+          </a:xfrm>
+          <a:prstGeom prst="donut">
+            <a:avLst>
+              <a:gd name="adj" fmla="val 30982"/>
+            </a:avLst>
+          </a:prstGeom>
+          <a:solidFill>
+            <a:schemeClr val="bg1"/>
+          </a:solidFill>
+          <a:ln w="76200" cmpd="sng">
+            <a:noFill/>
+          </a:ln>
+        </p:spPr>
+        <p:style>
+          <a:lnRef idx="1">
+            <a:schemeClr val="accent1"/>
+          </a:lnRef>
+          <a:fillRef idx="3">
+            <a:schemeClr val="accent1"/>
+          </a:fillRef>
+          <a:effectRef idx="2">
+            <a:schemeClr val="accent1"/>
+          </a:effectRef>
+          <a:fontRef idx="minor">
+            <a:schemeClr val="lt1"/>
+          </a:fontRef>
+        </p:style>
+        <p:txBody>
+          <a:bodyPr rtlCol="0" anchor="ctr"/>
+          <a:lstStyle/>
+          <a:p>
+            <a:pPr algn="ctr"/>
+            <a:endParaRPr lang="en-US">
+              <a:solidFill>
+                <a:schemeClr val="tx1"/>
+              </a:solidFill>
+            </a:endParaRPr>
+          </a:p>
+        </p:txBody>
+      </p:sp>
+      <p:sp>
+        <p:nvSpPr>
+          <p:cNvPr id="2" name="Rectangle 1"/>
+          <p:cNvSpPr>
+            <a:spLocks noChangeAspect="1"/>
+          </p:cNvSpPr>
+          <p:nvPr/>
+        </p:nvSpPr>
+        <p:spPr>
+          <a:xfrm rot="16200000">
+            <a:off x="3277028" y="3277028"/>
+            <a:ext cx="11879995" cy="11879995"/>
+          </a:xfrm>
+          <a:prstGeom prst="rect">
+            <a:avLst/>
+          </a:prstGeom>
+          <a:noFill/>
+        </p:spPr>
+        <p:txBody>
+          <a:bodyPr wrap="none" lIns="210669" tIns="105334" rIns="210669" bIns="105334">
+            <a:prstTxWarp prst="textCircle">
+              <a:avLst>
+                <a:gd name="adj" fmla="val 10946467"/>
+              </a:avLst>
+            </a:prstTxWarp>
+            <a:spAutoFit/>
+          </a:bodyPr>
+          <a:lstStyle/>
+          <a:p>
+            <a:pPr algn="ctr"/>
+            <a:r>
+              <a:rPr lang="en-US" sz="23900" b="1" spc="600" dirty="0" smtClean="0">
+                <a:ln w="12700">
+                  <a:solidFill>
+                    <a:srgbClr val="FFFFFF"/>
+                  </a:solidFill>
+                  <a:prstDash val="solid"/>
+                </a:ln>
+                <a:solidFill>
+                  <a:schemeClr val="accent3">
+                    <a:lumMod val="75000"/>
+                  </a:schemeClr>
+                </a:solidFill>
+              </a:rPr>
+              <a:t>  Ready to start next trial.</a:t>
+            </a:r>
+            <a:endParaRPr lang="en-US" sz="23900" b="1" spc="600" dirty="0">
+              <a:ln w="12700">
+                <a:solidFill>
+                  <a:srgbClr val="FFFFFF"/>
+                </a:solidFill>
+                <a:prstDash val="solid"/>
+              </a:ln>
+              <a:solidFill>
+                <a:schemeClr val="accent3">
+                  <a:lumMod val="75000"/>
+                </a:schemeClr>
+              </a:solidFill>
+            </a:endParaRPr>
+          </a:p>
+        </p:txBody>
+      </p:sp>
+      <p:sp>
+        <p:nvSpPr>
+          <p:cNvPr id="3" name="Rectangle 2"/>
+          <p:cNvSpPr>
+            <a:spLocks noChangeAspect="1"/>
+          </p:cNvSpPr>
+          <p:nvPr/>
+        </p:nvSpPr>
+        <p:spPr>
+          <a:xfrm rot="16200000">
+            <a:off x="5257022" y="5257026"/>
+            <a:ext cx="7920006" cy="7919999"/>
+          </a:xfrm>
+          <a:prstGeom prst="rect">
+            <a:avLst/>
+          </a:prstGeom>
+          <a:noFill/>
+        </p:spPr>
+        <p:txBody>
+          <a:bodyPr wrap="none" lIns="210669" tIns="105334" rIns="210669" bIns="105334">
+            <a:prstTxWarp prst="textCircle">
+              <a:avLst>
+                <a:gd name="adj" fmla="val 10916975"/>
+              </a:avLst>
+            </a:prstTxWarp>
+            <a:spAutoFit/>
+          </a:bodyPr>
+          <a:lstStyle/>
+          <a:p>
+            <a:pPr algn="ctr"/>
+            <a:r>
+              <a:rPr lang="en-US" sz="13800" b="1" spc="300" dirty="0" smtClean="0">
+                <a:ln w="12700">
+                  <a:noFill/>
+                  <a:prstDash val="solid"/>
+                </a:ln>
+                <a:solidFill>
+                  <a:schemeClr val="accent1"/>
+                </a:solidFill>
+                <a:effectLst>
+                  <a:outerShdw blurRad="41275" dist="20320" dir="1800000" algn="tl" rotWithShape="0">
+                    <a:srgbClr val="000000">
+                      <a:alpha val="40000"/>
+                    </a:srgbClr>
+                  </a:outerShdw>
+                </a:effectLst>
+              </a:rPr>
+              <a:t> Press </a:t>
+            </a:r>
+            <a:r>
+              <a:rPr lang="en-US" sz="13800" b="1" spc="300" dirty="0">
+                <a:ln w="12700">
+                  <a:noFill/>
+                  <a:prstDash val="solid"/>
+                </a:ln>
+                <a:solidFill>
+                  <a:schemeClr val="accent1"/>
+                </a:solidFill>
+                <a:effectLst>
+                  <a:outerShdw blurRad="41275" dist="20320" dir="1800000" algn="tl" rotWithShape="0">
+                    <a:srgbClr val="000000">
+                      <a:alpha val="40000"/>
+                    </a:srgbClr>
+                  </a:outerShdw>
+                </a:effectLst>
+              </a:rPr>
+              <a:t>a button to continue</a:t>
+            </a:r>
+            <a:r>
+              <a:rPr lang="en-US" sz="13800" b="1" spc="300" dirty="0" smtClean="0">
+                <a:ln w="12700">
+                  <a:noFill/>
+                  <a:prstDash val="solid"/>
+                </a:ln>
+                <a:solidFill>
+                  <a:schemeClr val="accent1"/>
+                </a:solidFill>
+                <a:effectLst>
+                  <a:outerShdw blurRad="41275" dist="20320" dir="1800000" algn="tl" rotWithShape="0">
+                    <a:srgbClr val="000000">
+                      <a:alpha val="40000"/>
+                    </a:srgbClr>
+                  </a:outerShdw>
+                </a:effectLst>
+              </a:rPr>
+              <a:t>.</a:t>
+            </a:r>
+            <a:endParaRPr lang="en-US" sz="13800" b="1" spc="300" dirty="0">
+              <a:ln w="12700">
+                <a:noFill/>
+                <a:prstDash val="solid"/>
+              </a:ln>
+              <a:solidFill>
+                <a:schemeClr val="accent1"/>
+              </a:solidFill>
+              <a:effectLst>
+                <a:outerShdw blurRad="41275" dist="20320" dir="1800000" algn="tl" rotWithShape="0">
+                  <a:srgbClr val="000000">
+                    <a:alpha val="40000"/>
+                  </a:srgbClr>
+                </a:outerShdw>
+              </a:effectLst>
+            </a:endParaRPr>
+          </a:p>
+        </p:txBody>
+      </p:sp>
+    </p:spTree>
+    <p:extLst>
+      <p:ext uri="{BB962C8B-B14F-4D97-AF65-F5344CB8AC3E}">
+        <p14:creationId xmlns:p14="http://schemas.microsoft.com/office/powerpoint/2010/main" val="4227632991"/>
+      </p:ext>
+    </p:extLst>
+  </p:cSld>
+  <p:clrMapOvr>
+    <a:masterClrMapping/>
+  </p:clrMapOvr>
+</p:sld>
+</file>
+
+<file path=ppt/slides/slide3.xml><?xml version="1.0" encoding="utf-8"?>
+<p:sld xmlns:a="http://schemas.openxmlformats.org/drawingml/2006/main" xmlns:r="http://schemas.openxmlformats.org/officeDocument/2006/relationships" xmlns:p="http://schemas.openxmlformats.org/presentationml/2006/main">
+  <p:cSld>
+    <p:spTree>
+      <p:nvGrpSpPr>
+        <p:cNvPr id="1" name=""/>
+        <p:cNvGrpSpPr/>
+        <p:nvPr/>
+      </p:nvGrpSpPr>
+      <p:grpSpPr>
+        <a:xfrm>
+          <a:off x="0" y="0"/>
+          <a:ext cx="0" cy="0"/>
+          <a:chOff x="0" y="0"/>
+          <a:chExt cx="0" cy="0"/>
+        </a:xfrm>
+      </p:grpSpPr>
+      <p:sp>
+        <p:nvSpPr>
+          <p:cNvPr id="5" name="Bouée 4"/>
+          <p:cNvSpPr>
+            <a:spLocks noChangeAspect="1"/>
+          </p:cNvSpPr>
+          <p:nvPr/>
+        </p:nvSpPr>
+        <p:spPr>
+          <a:xfrm>
+            <a:off x="1614253" y="1610484"/>
+            <a:ext cx="15228000" cy="15228000"/>
+          </a:xfrm>
+          <a:prstGeom prst="donut">
+            <a:avLst>
+              <a:gd name="adj" fmla="val 30982"/>
+            </a:avLst>
+          </a:prstGeom>
+          <a:solidFill>
+            <a:schemeClr val="bg1"/>
+          </a:solidFill>
+          <a:ln w="76200" cmpd="sng">
+            <a:noFill/>
+          </a:ln>
+        </p:spPr>
+        <p:style>
+          <a:lnRef idx="1">
+            <a:schemeClr val="accent1"/>
+          </a:lnRef>
+          <a:fillRef idx="3">
+            <a:schemeClr val="accent1"/>
+          </a:fillRef>
+          <a:effectRef idx="2">
+            <a:schemeClr val="accent1"/>
+          </a:effectRef>
+          <a:fontRef idx="minor">
+            <a:schemeClr val="lt1"/>
+          </a:fontRef>
+        </p:style>
+        <p:txBody>
+          <a:bodyPr rtlCol="0" anchor="ctr"/>
+          <a:lstStyle/>
+          <a:p>
+            <a:pPr algn="ctr"/>
+            <a:endParaRPr lang="en-US">
+              <a:solidFill>
+                <a:schemeClr val="tx1"/>
+              </a:solidFill>
+            </a:endParaRPr>
+          </a:p>
+        </p:txBody>
+      </p:sp>
+      <p:sp>
+        <p:nvSpPr>
+          <p:cNvPr id="2" name="Rectangle 1"/>
+          <p:cNvSpPr>
+            <a:spLocks noChangeAspect="1"/>
+          </p:cNvSpPr>
+          <p:nvPr/>
+        </p:nvSpPr>
+        <p:spPr>
+          <a:xfrm rot="16200000">
+            <a:off x="3277028" y="3277028"/>
+            <a:ext cx="11879995" cy="11879995"/>
+          </a:xfrm>
+          <a:prstGeom prst="rect">
+            <a:avLst/>
+          </a:prstGeom>
+          <a:noFill/>
+        </p:spPr>
+        <p:txBody>
+          <a:bodyPr wrap="none" lIns="210669" tIns="105334" rIns="210669" bIns="105334">
+            <a:prstTxWarp prst="textCircle">
+              <a:avLst>
+                <a:gd name="adj" fmla="val 10946467"/>
+              </a:avLst>
+            </a:prstTxWarp>
+            <a:spAutoFit/>
+          </a:bodyPr>
+          <a:lstStyle/>
+          <a:p>
+            <a:pPr algn="ctr"/>
+            <a:r>
+              <a:rPr lang="en-US" sz="23900" b="1" spc="600" dirty="0" smtClean="0">
+                <a:ln w="12700">
+                  <a:solidFill>
+                    <a:srgbClr val="FFFFFF"/>
+                  </a:solidFill>
+                  <a:prstDash val="solid"/>
+                </a:ln>
+                <a:solidFill>
+                  <a:schemeClr val="accent3">
+                    <a:lumMod val="75000"/>
+                  </a:schemeClr>
+                </a:solidFill>
+              </a:rPr>
+              <a:t>Trial block completed.</a:t>
+            </a:r>
+            <a:endParaRPr lang="en-US" sz="23900" b="1" spc="600" dirty="0">
+              <a:ln w="12700">
+                <a:solidFill>
+                  <a:srgbClr val="FFFFFF"/>
+                </a:solidFill>
+                <a:prstDash val="solid"/>
+              </a:ln>
+              <a:solidFill>
+                <a:schemeClr val="accent3">
+                  <a:lumMod val="75000"/>
+                </a:schemeClr>
+              </a:solidFill>
+            </a:endParaRPr>
+          </a:p>
+        </p:txBody>
+      </p:sp>
+      <p:sp>
+        <p:nvSpPr>
+          <p:cNvPr id="3" name="Rectangle 2"/>
+          <p:cNvSpPr>
+            <a:spLocks noChangeAspect="1"/>
+          </p:cNvSpPr>
+          <p:nvPr/>
+        </p:nvSpPr>
+        <p:spPr>
+          <a:xfrm rot="16200000">
+            <a:off x="5257022" y="5257026"/>
+            <a:ext cx="7920006" cy="7919999"/>
+          </a:xfrm>
+          <a:prstGeom prst="rect">
+            <a:avLst/>
+          </a:prstGeom>
+          <a:noFill/>
+        </p:spPr>
+        <p:txBody>
+          <a:bodyPr wrap="none" lIns="210669" tIns="105334" rIns="210669" bIns="105334">
+            <a:prstTxWarp prst="textCircle">
+              <a:avLst>
+                <a:gd name="adj" fmla="val 11371993"/>
+              </a:avLst>
+            </a:prstTxWarp>
+            <a:spAutoFit/>
+          </a:bodyPr>
+          <a:lstStyle/>
+          <a:p>
+            <a:pPr algn="ctr"/>
+            <a:r>
+              <a:rPr lang="en-US" sz="13800" b="1" spc="-150" dirty="0" smtClean="0">
+                <a:ln w="12700">
+                  <a:noFill/>
+                  <a:prstDash val="solid"/>
+                </a:ln>
+                <a:solidFill>
+                  <a:schemeClr val="accent1"/>
+                </a:solidFill>
+                <a:effectLst>
+                  <a:outerShdw blurRad="41275" dist="20320" dir="1800000" algn="tl" rotWithShape="0">
+                    <a:srgbClr val="000000">
+                      <a:alpha val="40000"/>
+                    </a:srgbClr>
+                  </a:outerShdw>
+                </a:effectLst>
+              </a:rPr>
+              <a:t>Click ‘Select’ to exit.     Click and hold ‘Return’ to continue. </a:t>
             </a:r>
             <a:endParaRPr lang="en-US" sz="13800" b="1" spc="-150" dirty="0">
               <a:ln w="12700">

</xml_diff>

<commit_message>
Add voluntary interrupt BMP
</commit_message>
<xml_diff>
--- a/Source Code/GraspBMPs/GraspCircularPrompts.pptx
+++ b/Source Code/GraspBMPs/GraspCircularPrompts.pptx
@@ -22,6 +22,7 @@
     <p:sldId id="281" r:id="rId16"/>
     <p:sldId id="282" r:id="rId17"/>
     <p:sldId id="283" r:id="rId18"/>
+    <p:sldId id="284" r:id="rId19"/>
   </p:sldIdLst>
   <p:sldSz cx="18434050" cy="18434050"/>
   <p:notesSz cx="6858000" cy="9144000"/>
@@ -304,7 +305,7 @@
           <a:p>
             <a:fld id="{649FEDF0-7D14-9E44-B4F2-968D163D1479}" type="datetimeFigureOut">
               <a:rPr lang="fr-FR" smtClean="0"/>
-              <a:t>07/10/16</a:t>
+              <a:t>17/02/17</a:t>
             </a:fld>
             <a:endParaRPr lang="en-US" dirty="0"/>
           </a:p>
@@ -474,7 +475,7 @@
           <a:p>
             <a:fld id="{649FEDF0-7D14-9E44-B4F2-968D163D1479}" type="datetimeFigureOut">
               <a:rPr lang="fr-FR" smtClean="0"/>
-              <a:t>07/10/16</a:t>
+              <a:t>17/02/17</a:t>
             </a:fld>
             <a:endParaRPr lang="en-US" dirty="0"/>
           </a:p>
@@ -654,7 +655,7 @@
           <a:p>
             <a:fld id="{649FEDF0-7D14-9E44-B4F2-968D163D1479}" type="datetimeFigureOut">
               <a:rPr lang="fr-FR" smtClean="0"/>
-              <a:t>07/10/16</a:t>
+              <a:t>17/02/17</a:t>
             </a:fld>
             <a:endParaRPr lang="en-US" dirty="0"/>
           </a:p>
@@ -824,7 +825,7 @@
           <a:p>
             <a:fld id="{649FEDF0-7D14-9E44-B4F2-968D163D1479}" type="datetimeFigureOut">
               <a:rPr lang="fr-FR" smtClean="0"/>
-              <a:t>07/10/16</a:t>
+              <a:t>17/02/17</a:t>
             </a:fld>
             <a:endParaRPr lang="en-US" dirty="0"/>
           </a:p>
@@ -1070,7 +1071,7 @@
           <a:p>
             <a:fld id="{649FEDF0-7D14-9E44-B4F2-968D163D1479}" type="datetimeFigureOut">
               <a:rPr lang="fr-FR" smtClean="0"/>
-              <a:t>07/10/16</a:t>
+              <a:t>17/02/17</a:t>
             </a:fld>
             <a:endParaRPr lang="en-US" dirty="0"/>
           </a:p>
@@ -1358,7 +1359,7 @@
           <a:p>
             <a:fld id="{649FEDF0-7D14-9E44-B4F2-968D163D1479}" type="datetimeFigureOut">
               <a:rPr lang="fr-FR" smtClean="0"/>
-              <a:t>07/10/16</a:t>
+              <a:t>17/02/17</a:t>
             </a:fld>
             <a:endParaRPr lang="en-US" dirty="0"/>
           </a:p>
@@ -1780,7 +1781,7 @@
           <a:p>
             <a:fld id="{649FEDF0-7D14-9E44-B4F2-968D163D1479}" type="datetimeFigureOut">
               <a:rPr lang="fr-FR" smtClean="0"/>
-              <a:t>07/10/16</a:t>
+              <a:t>17/02/17</a:t>
             </a:fld>
             <a:endParaRPr lang="en-US" dirty="0"/>
           </a:p>
@@ -1898,7 +1899,7 @@
           <a:p>
             <a:fld id="{649FEDF0-7D14-9E44-B4F2-968D163D1479}" type="datetimeFigureOut">
               <a:rPr lang="fr-FR" smtClean="0"/>
-              <a:t>07/10/16</a:t>
+              <a:t>17/02/17</a:t>
             </a:fld>
             <a:endParaRPr lang="en-US" dirty="0"/>
           </a:p>
@@ -1993,7 +1994,7 @@
           <a:p>
             <a:fld id="{649FEDF0-7D14-9E44-B4F2-968D163D1479}" type="datetimeFigureOut">
               <a:rPr lang="fr-FR" smtClean="0"/>
-              <a:t>07/10/16</a:t>
+              <a:t>17/02/17</a:t>
             </a:fld>
             <a:endParaRPr lang="en-US" dirty="0"/>
           </a:p>
@@ -2318,7 +2319,7 @@
           <a:p>
             <a:fld id="{649FEDF0-7D14-9E44-B4F2-968D163D1479}" type="datetimeFigureOut">
               <a:rPr lang="fr-FR" smtClean="0"/>
-              <a:t>07/10/16</a:t>
+              <a:t>17/02/17</a:t>
             </a:fld>
             <a:endParaRPr lang="en-US" dirty="0"/>
           </a:p>
@@ -2571,7 +2572,7 @@
           <a:p>
             <a:fld id="{649FEDF0-7D14-9E44-B4F2-968D163D1479}" type="datetimeFigureOut">
               <a:rPr lang="fr-FR" smtClean="0"/>
-              <a:t>07/10/16</a:t>
+              <a:t>17/02/17</a:t>
             </a:fld>
             <a:endParaRPr lang="en-US" dirty="0"/>
           </a:p>
@@ -2787,7 +2788,7 @@
           <a:p>
             <a:fld id="{649FEDF0-7D14-9E44-B4F2-968D163D1479}" type="datetimeFigureOut">
               <a:rPr lang="fr-FR" smtClean="0"/>
-              <a:t>07/10/16</a:t>
+              <a:t>17/02/17</a:t>
             </a:fld>
             <a:endParaRPr lang="en-US" dirty="0"/>
           </a:p>
@@ -6394,45 +6395,7 @@
                   </a:outerShdw>
                 </a:effectLst>
               </a:rPr>
-              <a:t>Doff Virtual Reality Helmet </a:t>
-            </a:r>
-            <a:r>
-              <a:rPr lang="en-US" sz="13800" b="1" spc="-150" dirty="0" smtClean="0">
-                <a:ln w="12700">
-                  <a:noFill/>
-                  <a:prstDash val="solid"/>
-                </a:ln>
-                <a:solidFill>
-                  <a:schemeClr val="accent1"/>
-                </a:solidFill>
-                <a:effectLst>
-                  <a:outerShdw blurRad="41275" dist="20320" dir="1800000" algn="tl" rotWithShape="0">
-                    <a:srgbClr val="000000">
-                      <a:alpha val="40000"/>
-                    </a:srgbClr>
-                  </a:outerShdw>
-                </a:effectLst>
-              </a:rPr>
-              <a:t>and </a:t>
-            </a:r>
-            <a:r>
-              <a:rPr lang="en-US" sz="13800" b="1" spc="-150" dirty="0" smtClean="0">
-                <a:ln w="12700">
-                  <a:noFill/>
-                  <a:prstDash val="solid"/>
-                </a:ln>
-                <a:solidFill>
-                  <a:schemeClr val="accent1"/>
-                </a:solidFill>
-                <a:effectLst>
-                  <a:outerShdw blurRad="41275" dist="20320" dir="1800000" algn="tl" rotWithShape="0">
-                    <a:srgbClr val="000000">
-                      <a:alpha val="40000"/>
-                    </a:srgbClr>
-                  </a:outerShdw>
-                </a:effectLst>
-              </a:rPr>
-              <a:t>press Return. </a:t>
+              <a:t>Doff Virtual Reality Helmet and press Return. </a:t>
             </a:r>
             <a:endParaRPr lang="en-US" sz="13800" b="1" spc="-150" dirty="0">
               <a:ln w="12700">
@@ -6745,6 +6708,266 @@
     <p:extLst>
       <p:ext uri="{BB962C8B-B14F-4D97-AF65-F5344CB8AC3E}">
         <p14:creationId xmlns:p14="http://schemas.microsoft.com/office/powerpoint/2010/main" val="3964587204"/>
+      </p:ext>
+    </p:extLst>
+  </p:cSld>
+  <p:clrMapOvr>
+    <a:masterClrMapping/>
+  </p:clrMapOvr>
+</p:sld>
+</file>
+
+<file path=ppt/slides/slide18.xml><?xml version="1.0" encoding="utf-8"?>
+<p:sld xmlns:a="http://schemas.openxmlformats.org/drawingml/2006/main" xmlns:r="http://schemas.openxmlformats.org/officeDocument/2006/relationships" xmlns:p="http://schemas.openxmlformats.org/presentationml/2006/main">
+  <p:cSld>
+    <p:spTree>
+      <p:nvGrpSpPr>
+        <p:cNvPr id="1" name=""/>
+        <p:cNvGrpSpPr/>
+        <p:nvPr/>
+      </p:nvGrpSpPr>
+      <p:grpSpPr>
+        <a:xfrm>
+          <a:off x="0" y="0"/>
+          <a:ext cx="0" cy="0"/>
+          <a:chOff x="0" y="0"/>
+          <a:chExt cx="0" cy="0"/>
+        </a:xfrm>
+      </p:grpSpPr>
+      <p:sp>
+        <p:nvSpPr>
+          <p:cNvPr id="5" name="Bouée 4"/>
+          <p:cNvSpPr>
+            <a:spLocks noChangeAspect="1"/>
+          </p:cNvSpPr>
+          <p:nvPr/>
+        </p:nvSpPr>
+        <p:spPr>
+          <a:xfrm>
+            <a:off x="1614253" y="1610484"/>
+            <a:ext cx="15228000" cy="15228000"/>
+          </a:xfrm>
+          <a:prstGeom prst="donut">
+            <a:avLst>
+              <a:gd name="adj" fmla="val 30982"/>
+            </a:avLst>
+          </a:prstGeom>
+          <a:solidFill>
+            <a:schemeClr val="bg1"/>
+          </a:solidFill>
+          <a:ln w="76200" cmpd="sng">
+            <a:noFill/>
+          </a:ln>
+        </p:spPr>
+        <p:style>
+          <a:lnRef idx="1">
+            <a:schemeClr val="accent1"/>
+          </a:lnRef>
+          <a:fillRef idx="3">
+            <a:schemeClr val="accent1"/>
+          </a:fillRef>
+          <a:effectRef idx="2">
+            <a:schemeClr val="accent1"/>
+          </a:effectRef>
+          <a:fontRef idx="minor">
+            <a:schemeClr val="lt1"/>
+          </a:fontRef>
+        </p:style>
+        <p:txBody>
+          <a:bodyPr rtlCol="0" anchor="ctr"/>
+          <a:lstStyle/>
+          <a:p>
+            <a:pPr algn="ctr"/>
+            <a:endParaRPr lang="en-US" dirty="0">
+              <a:solidFill>
+                <a:schemeClr val="tx1"/>
+              </a:solidFill>
+            </a:endParaRPr>
+          </a:p>
+        </p:txBody>
+      </p:sp>
+      <p:sp>
+        <p:nvSpPr>
+          <p:cNvPr id="2" name="Rectangle 1"/>
+          <p:cNvSpPr>
+            <a:spLocks noChangeAspect="1"/>
+          </p:cNvSpPr>
+          <p:nvPr/>
+        </p:nvSpPr>
+        <p:spPr>
+          <a:xfrm rot="16200000">
+            <a:off x="3277028" y="3277028"/>
+            <a:ext cx="11879995" cy="11879995"/>
+          </a:xfrm>
+          <a:prstGeom prst="rect">
+            <a:avLst/>
+          </a:prstGeom>
+          <a:noFill/>
+        </p:spPr>
+        <p:txBody>
+          <a:bodyPr wrap="none" lIns="210669" tIns="105334" rIns="210669" bIns="105334">
+            <a:prstTxWarp prst="textCircle">
+              <a:avLst>
+                <a:gd name="adj" fmla="val 10946467"/>
+              </a:avLst>
+            </a:prstTxWarp>
+            <a:spAutoFit/>
+          </a:bodyPr>
+          <a:lstStyle/>
+          <a:p>
+            <a:pPr algn="ctr"/>
+            <a:r>
+              <a:rPr lang="en-US" sz="23900" b="1" spc="600" dirty="0" smtClean="0">
+                <a:ln w="12700">
+                  <a:solidFill>
+                    <a:srgbClr val="FFFFFF"/>
+                  </a:solidFill>
+                  <a:prstDash val="solid"/>
+                </a:ln>
+                <a:solidFill>
+                  <a:srgbClr val="604A7B"/>
+                </a:solidFill>
+              </a:rPr>
+              <a:t>Trial voluntarily aborted</a:t>
+            </a:r>
+            <a:r>
+              <a:rPr lang="en-US" sz="23900" b="1" spc="600" dirty="0" smtClean="0">
+                <a:ln w="12700">
+                  <a:solidFill>
+                    <a:srgbClr val="FFFFFF"/>
+                  </a:solidFill>
+                  <a:prstDash val="solid"/>
+                </a:ln>
+                <a:solidFill>
+                  <a:srgbClr val="604A7B"/>
+                </a:solidFill>
+              </a:rPr>
+              <a:t>.</a:t>
+            </a:r>
+            <a:endParaRPr lang="en-US" sz="23900" b="1" spc="600" dirty="0">
+              <a:ln w="12700">
+                <a:solidFill>
+                  <a:srgbClr val="FFFFFF"/>
+                </a:solidFill>
+                <a:prstDash val="solid"/>
+              </a:ln>
+              <a:solidFill>
+                <a:srgbClr val="604A7B"/>
+              </a:solidFill>
+            </a:endParaRPr>
+          </a:p>
+        </p:txBody>
+      </p:sp>
+      <p:sp>
+        <p:nvSpPr>
+          <p:cNvPr id="7" name="Rectangle 6"/>
+          <p:cNvSpPr>
+            <a:spLocks noChangeAspect="1"/>
+          </p:cNvSpPr>
+          <p:nvPr/>
+        </p:nvSpPr>
+        <p:spPr>
+          <a:xfrm rot="16200000">
+            <a:off x="5257022" y="5257026"/>
+            <a:ext cx="7920006" cy="7919999"/>
+          </a:xfrm>
+          <a:prstGeom prst="rect">
+            <a:avLst/>
+          </a:prstGeom>
+          <a:noFill/>
+        </p:spPr>
+        <p:txBody>
+          <a:bodyPr wrap="none" lIns="210669" tIns="105334" rIns="210669" bIns="105334">
+            <a:prstTxWarp prst="textCircle">
+              <a:avLst>
+                <a:gd name="adj" fmla="val 10916975"/>
+              </a:avLst>
+            </a:prstTxWarp>
+            <a:spAutoFit/>
+          </a:bodyPr>
+          <a:lstStyle/>
+          <a:p>
+            <a:pPr algn="ctr"/>
+            <a:r>
+              <a:rPr lang="en-US" sz="13800" b="1" spc="300" dirty="0" smtClean="0">
+                <a:ln w="12700">
+                  <a:noFill/>
+                  <a:prstDash val="solid"/>
+                </a:ln>
+                <a:solidFill>
+                  <a:schemeClr val="accent1"/>
+                </a:solidFill>
+                <a:effectLst>
+                  <a:outerShdw blurRad="41275" dist="20320" dir="1800000" algn="tl" rotWithShape="0">
+                    <a:srgbClr val="000000">
+                      <a:alpha val="40000"/>
+                    </a:srgbClr>
+                  </a:outerShdw>
+                </a:effectLst>
+              </a:rPr>
+              <a:t> Press </a:t>
+            </a:r>
+            <a:r>
+              <a:rPr lang="en-US" sz="13800" b="1" spc="300" dirty="0">
+                <a:ln w="12700">
+                  <a:noFill/>
+                  <a:prstDash val="solid"/>
+                </a:ln>
+                <a:solidFill>
+                  <a:schemeClr val="accent1"/>
+                </a:solidFill>
+                <a:effectLst>
+                  <a:outerShdw blurRad="41275" dist="20320" dir="1800000" algn="tl" rotWithShape="0">
+                    <a:srgbClr val="000000">
+                      <a:alpha val="40000"/>
+                    </a:srgbClr>
+                  </a:outerShdw>
+                </a:effectLst>
+              </a:rPr>
+              <a:t>a button to continue</a:t>
+            </a:r>
+            <a:r>
+              <a:rPr lang="en-US" sz="13800" b="1" spc="300" dirty="0" smtClean="0">
+                <a:ln w="12700">
+                  <a:noFill/>
+                  <a:prstDash val="solid"/>
+                </a:ln>
+                <a:solidFill>
+                  <a:schemeClr val="accent1"/>
+                </a:solidFill>
+                <a:effectLst>
+                  <a:outerShdw blurRad="41275" dist="20320" dir="1800000" algn="tl" rotWithShape="0">
+                    <a:srgbClr val="000000">
+                      <a:alpha val="40000"/>
+                    </a:srgbClr>
+                  </a:outerShdw>
+                </a:effectLst>
+              </a:rPr>
+              <a:t>.</a:t>
+            </a:r>
+            <a:endParaRPr lang="en-US" sz="13800" b="1" spc="300" dirty="0">
+              <a:ln w="12700">
+                <a:noFill/>
+                <a:prstDash val="solid"/>
+              </a:ln>
+              <a:solidFill>
+                <a:schemeClr val="accent1"/>
+              </a:solidFill>
+              <a:effectLst>
+                <a:outerShdw blurRad="41275" dist="20320" dir="1800000" algn="tl" rotWithShape="0">
+                  <a:srgbClr val="000000">
+                    <a:alpha val="40000"/>
+                  </a:srgbClr>
+                </a:outerShdw>
+              </a:effectLst>
+            </a:endParaRPr>
+          </a:p>
+        </p:txBody>
+      </p:sp>
+    </p:spTree>
+    <p:extLst>
+      <p:ext uri="{BB962C8B-B14F-4D97-AF65-F5344CB8AC3E}">
+        <p14:creationId xmlns:p14="http://schemas.microsoft.com/office/powerpoint/2010/main" val="3656503812"/>
       </p:ext>
     </p:extLst>
   </p:cSld>

</xml_diff>

<commit_message>
Revert "Merge GraspMMI back into master. Includes Merge-Grip-and-Grasm"
</commit_message>
<xml_diff>
--- a/Source Code/GraspBMPs/GraspCircularPrompts.pptx
+++ b/Source Code/GraspBMPs/GraspCircularPrompts.pptx
@@ -22,7 +22,6 @@
     <p:sldId id="281" r:id="rId16"/>
     <p:sldId id="282" r:id="rId17"/>
     <p:sldId id="283" r:id="rId18"/>
-    <p:sldId id="284" r:id="rId19"/>
   </p:sldIdLst>
   <p:sldSz cx="18434050" cy="18434050"/>
   <p:notesSz cx="6858000" cy="9144000"/>
@@ -305,7 +304,7 @@
           <a:p>
             <a:fld id="{649FEDF0-7D14-9E44-B4F2-968D163D1479}" type="datetimeFigureOut">
               <a:rPr lang="fr-FR" smtClean="0"/>
-              <a:t>17/02/17</a:t>
+              <a:t>07/10/16</a:t>
             </a:fld>
             <a:endParaRPr lang="en-US" dirty="0"/>
           </a:p>
@@ -475,7 +474,7 @@
           <a:p>
             <a:fld id="{649FEDF0-7D14-9E44-B4F2-968D163D1479}" type="datetimeFigureOut">
               <a:rPr lang="fr-FR" smtClean="0"/>
-              <a:t>17/02/17</a:t>
+              <a:t>07/10/16</a:t>
             </a:fld>
             <a:endParaRPr lang="en-US" dirty="0"/>
           </a:p>
@@ -655,7 +654,7 @@
           <a:p>
             <a:fld id="{649FEDF0-7D14-9E44-B4F2-968D163D1479}" type="datetimeFigureOut">
               <a:rPr lang="fr-FR" smtClean="0"/>
-              <a:t>17/02/17</a:t>
+              <a:t>07/10/16</a:t>
             </a:fld>
             <a:endParaRPr lang="en-US" dirty="0"/>
           </a:p>
@@ -825,7 +824,7 @@
           <a:p>
             <a:fld id="{649FEDF0-7D14-9E44-B4F2-968D163D1479}" type="datetimeFigureOut">
               <a:rPr lang="fr-FR" smtClean="0"/>
-              <a:t>17/02/17</a:t>
+              <a:t>07/10/16</a:t>
             </a:fld>
             <a:endParaRPr lang="en-US" dirty="0"/>
           </a:p>
@@ -1071,7 +1070,7 @@
           <a:p>
             <a:fld id="{649FEDF0-7D14-9E44-B4F2-968D163D1479}" type="datetimeFigureOut">
               <a:rPr lang="fr-FR" smtClean="0"/>
-              <a:t>17/02/17</a:t>
+              <a:t>07/10/16</a:t>
             </a:fld>
             <a:endParaRPr lang="en-US" dirty="0"/>
           </a:p>
@@ -1359,7 +1358,7 @@
           <a:p>
             <a:fld id="{649FEDF0-7D14-9E44-B4F2-968D163D1479}" type="datetimeFigureOut">
               <a:rPr lang="fr-FR" smtClean="0"/>
-              <a:t>17/02/17</a:t>
+              <a:t>07/10/16</a:t>
             </a:fld>
             <a:endParaRPr lang="en-US" dirty="0"/>
           </a:p>
@@ -1781,7 +1780,7 @@
           <a:p>
             <a:fld id="{649FEDF0-7D14-9E44-B4F2-968D163D1479}" type="datetimeFigureOut">
               <a:rPr lang="fr-FR" smtClean="0"/>
-              <a:t>17/02/17</a:t>
+              <a:t>07/10/16</a:t>
             </a:fld>
             <a:endParaRPr lang="en-US" dirty="0"/>
           </a:p>
@@ -1899,7 +1898,7 @@
           <a:p>
             <a:fld id="{649FEDF0-7D14-9E44-B4F2-968D163D1479}" type="datetimeFigureOut">
               <a:rPr lang="fr-FR" smtClean="0"/>
-              <a:t>17/02/17</a:t>
+              <a:t>07/10/16</a:t>
             </a:fld>
             <a:endParaRPr lang="en-US" dirty="0"/>
           </a:p>
@@ -1994,7 +1993,7 @@
           <a:p>
             <a:fld id="{649FEDF0-7D14-9E44-B4F2-968D163D1479}" type="datetimeFigureOut">
               <a:rPr lang="fr-FR" smtClean="0"/>
-              <a:t>17/02/17</a:t>
+              <a:t>07/10/16</a:t>
             </a:fld>
             <a:endParaRPr lang="en-US" dirty="0"/>
           </a:p>
@@ -2319,7 +2318,7 @@
           <a:p>
             <a:fld id="{649FEDF0-7D14-9E44-B4F2-968D163D1479}" type="datetimeFigureOut">
               <a:rPr lang="fr-FR" smtClean="0"/>
-              <a:t>17/02/17</a:t>
+              <a:t>07/10/16</a:t>
             </a:fld>
             <a:endParaRPr lang="en-US" dirty="0"/>
           </a:p>
@@ -2572,7 +2571,7 @@
           <a:p>
             <a:fld id="{649FEDF0-7D14-9E44-B4F2-968D163D1479}" type="datetimeFigureOut">
               <a:rPr lang="fr-FR" smtClean="0"/>
-              <a:t>17/02/17</a:t>
+              <a:t>07/10/16</a:t>
             </a:fld>
             <a:endParaRPr lang="en-US" dirty="0"/>
           </a:p>
@@ -2788,7 +2787,7 @@
           <a:p>
             <a:fld id="{649FEDF0-7D14-9E44-B4F2-968D163D1479}" type="datetimeFigureOut">
               <a:rPr lang="fr-FR" smtClean="0"/>
-              <a:t>17/02/17</a:t>
+              <a:t>07/10/16</a:t>
             </a:fld>
             <a:endParaRPr lang="en-US" dirty="0"/>
           </a:p>
@@ -6395,7 +6394,45 @@
                   </a:outerShdw>
                 </a:effectLst>
               </a:rPr>
-              <a:t>Doff Virtual Reality Helmet and press Return. </a:t>
+              <a:t>Doff Virtual Reality Helmet </a:t>
+            </a:r>
+            <a:r>
+              <a:rPr lang="en-US" sz="13800" b="1" spc="-150" dirty="0" smtClean="0">
+                <a:ln w="12700">
+                  <a:noFill/>
+                  <a:prstDash val="solid"/>
+                </a:ln>
+                <a:solidFill>
+                  <a:schemeClr val="accent1"/>
+                </a:solidFill>
+                <a:effectLst>
+                  <a:outerShdw blurRad="41275" dist="20320" dir="1800000" algn="tl" rotWithShape="0">
+                    <a:srgbClr val="000000">
+                      <a:alpha val="40000"/>
+                    </a:srgbClr>
+                  </a:outerShdw>
+                </a:effectLst>
+              </a:rPr>
+              <a:t>and </a:t>
+            </a:r>
+            <a:r>
+              <a:rPr lang="en-US" sz="13800" b="1" spc="-150" dirty="0" smtClean="0">
+                <a:ln w="12700">
+                  <a:noFill/>
+                  <a:prstDash val="solid"/>
+                </a:ln>
+                <a:solidFill>
+                  <a:schemeClr val="accent1"/>
+                </a:solidFill>
+                <a:effectLst>
+                  <a:outerShdw blurRad="41275" dist="20320" dir="1800000" algn="tl" rotWithShape="0">
+                    <a:srgbClr val="000000">
+                      <a:alpha val="40000"/>
+                    </a:srgbClr>
+                  </a:outerShdw>
+                </a:effectLst>
+              </a:rPr>
+              <a:t>press Return. </a:t>
             </a:r>
             <a:endParaRPr lang="en-US" sz="13800" b="1" spc="-150" dirty="0">
               <a:ln w="12700">
@@ -6708,266 +6745,6 @@
     <p:extLst>
       <p:ext uri="{BB962C8B-B14F-4D97-AF65-F5344CB8AC3E}">
         <p14:creationId xmlns:p14="http://schemas.microsoft.com/office/powerpoint/2010/main" val="3964587204"/>
-      </p:ext>
-    </p:extLst>
-  </p:cSld>
-  <p:clrMapOvr>
-    <a:masterClrMapping/>
-  </p:clrMapOvr>
-</p:sld>
-</file>
-
-<file path=ppt/slides/slide18.xml><?xml version="1.0" encoding="utf-8"?>
-<p:sld xmlns:a="http://schemas.openxmlformats.org/drawingml/2006/main" xmlns:r="http://schemas.openxmlformats.org/officeDocument/2006/relationships" xmlns:p="http://schemas.openxmlformats.org/presentationml/2006/main">
-  <p:cSld>
-    <p:spTree>
-      <p:nvGrpSpPr>
-        <p:cNvPr id="1" name=""/>
-        <p:cNvGrpSpPr/>
-        <p:nvPr/>
-      </p:nvGrpSpPr>
-      <p:grpSpPr>
-        <a:xfrm>
-          <a:off x="0" y="0"/>
-          <a:ext cx="0" cy="0"/>
-          <a:chOff x="0" y="0"/>
-          <a:chExt cx="0" cy="0"/>
-        </a:xfrm>
-      </p:grpSpPr>
-      <p:sp>
-        <p:nvSpPr>
-          <p:cNvPr id="5" name="Bouée 4"/>
-          <p:cNvSpPr>
-            <a:spLocks noChangeAspect="1"/>
-          </p:cNvSpPr>
-          <p:nvPr/>
-        </p:nvSpPr>
-        <p:spPr>
-          <a:xfrm>
-            <a:off x="1614253" y="1610484"/>
-            <a:ext cx="15228000" cy="15228000"/>
-          </a:xfrm>
-          <a:prstGeom prst="donut">
-            <a:avLst>
-              <a:gd name="adj" fmla="val 30982"/>
-            </a:avLst>
-          </a:prstGeom>
-          <a:solidFill>
-            <a:schemeClr val="bg1"/>
-          </a:solidFill>
-          <a:ln w="76200" cmpd="sng">
-            <a:noFill/>
-          </a:ln>
-        </p:spPr>
-        <p:style>
-          <a:lnRef idx="1">
-            <a:schemeClr val="accent1"/>
-          </a:lnRef>
-          <a:fillRef idx="3">
-            <a:schemeClr val="accent1"/>
-          </a:fillRef>
-          <a:effectRef idx="2">
-            <a:schemeClr val="accent1"/>
-          </a:effectRef>
-          <a:fontRef idx="minor">
-            <a:schemeClr val="lt1"/>
-          </a:fontRef>
-        </p:style>
-        <p:txBody>
-          <a:bodyPr rtlCol="0" anchor="ctr"/>
-          <a:lstStyle/>
-          <a:p>
-            <a:pPr algn="ctr"/>
-            <a:endParaRPr lang="en-US" dirty="0">
-              <a:solidFill>
-                <a:schemeClr val="tx1"/>
-              </a:solidFill>
-            </a:endParaRPr>
-          </a:p>
-        </p:txBody>
-      </p:sp>
-      <p:sp>
-        <p:nvSpPr>
-          <p:cNvPr id="2" name="Rectangle 1"/>
-          <p:cNvSpPr>
-            <a:spLocks noChangeAspect="1"/>
-          </p:cNvSpPr>
-          <p:nvPr/>
-        </p:nvSpPr>
-        <p:spPr>
-          <a:xfrm rot="16200000">
-            <a:off x="3277028" y="3277028"/>
-            <a:ext cx="11879995" cy="11879995"/>
-          </a:xfrm>
-          <a:prstGeom prst="rect">
-            <a:avLst/>
-          </a:prstGeom>
-          <a:noFill/>
-        </p:spPr>
-        <p:txBody>
-          <a:bodyPr wrap="none" lIns="210669" tIns="105334" rIns="210669" bIns="105334">
-            <a:prstTxWarp prst="textCircle">
-              <a:avLst>
-                <a:gd name="adj" fmla="val 10946467"/>
-              </a:avLst>
-            </a:prstTxWarp>
-            <a:spAutoFit/>
-          </a:bodyPr>
-          <a:lstStyle/>
-          <a:p>
-            <a:pPr algn="ctr"/>
-            <a:r>
-              <a:rPr lang="en-US" sz="23900" b="1" spc="600" dirty="0" smtClean="0">
-                <a:ln w="12700">
-                  <a:solidFill>
-                    <a:srgbClr val="FFFFFF"/>
-                  </a:solidFill>
-                  <a:prstDash val="solid"/>
-                </a:ln>
-                <a:solidFill>
-                  <a:srgbClr val="604A7B"/>
-                </a:solidFill>
-              </a:rPr>
-              <a:t>Trial voluntarily aborted</a:t>
-            </a:r>
-            <a:r>
-              <a:rPr lang="en-US" sz="23900" b="1" spc="600" dirty="0" smtClean="0">
-                <a:ln w="12700">
-                  <a:solidFill>
-                    <a:srgbClr val="FFFFFF"/>
-                  </a:solidFill>
-                  <a:prstDash val="solid"/>
-                </a:ln>
-                <a:solidFill>
-                  <a:srgbClr val="604A7B"/>
-                </a:solidFill>
-              </a:rPr>
-              <a:t>.</a:t>
-            </a:r>
-            <a:endParaRPr lang="en-US" sz="23900" b="1" spc="600" dirty="0">
-              <a:ln w="12700">
-                <a:solidFill>
-                  <a:srgbClr val="FFFFFF"/>
-                </a:solidFill>
-                <a:prstDash val="solid"/>
-              </a:ln>
-              <a:solidFill>
-                <a:srgbClr val="604A7B"/>
-              </a:solidFill>
-            </a:endParaRPr>
-          </a:p>
-        </p:txBody>
-      </p:sp>
-      <p:sp>
-        <p:nvSpPr>
-          <p:cNvPr id="7" name="Rectangle 6"/>
-          <p:cNvSpPr>
-            <a:spLocks noChangeAspect="1"/>
-          </p:cNvSpPr>
-          <p:nvPr/>
-        </p:nvSpPr>
-        <p:spPr>
-          <a:xfrm rot="16200000">
-            <a:off x="5257022" y="5257026"/>
-            <a:ext cx="7920006" cy="7919999"/>
-          </a:xfrm>
-          <a:prstGeom prst="rect">
-            <a:avLst/>
-          </a:prstGeom>
-          <a:noFill/>
-        </p:spPr>
-        <p:txBody>
-          <a:bodyPr wrap="none" lIns="210669" tIns="105334" rIns="210669" bIns="105334">
-            <a:prstTxWarp prst="textCircle">
-              <a:avLst>
-                <a:gd name="adj" fmla="val 10916975"/>
-              </a:avLst>
-            </a:prstTxWarp>
-            <a:spAutoFit/>
-          </a:bodyPr>
-          <a:lstStyle/>
-          <a:p>
-            <a:pPr algn="ctr"/>
-            <a:r>
-              <a:rPr lang="en-US" sz="13800" b="1" spc="300" dirty="0" smtClean="0">
-                <a:ln w="12700">
-                  <a:noFill/>
-                  <a:prstDash val="solid"/>
-                </a:ln>
-                <a:solidFill>
-                  <a:schemeClr val="accent1"/>
-                </a:solidFill>
-                <a:effectLst>
-                  <a:outerShdw blurRad="41275" dist="20320" dir="1800000" algn="tl" rotWithShape="0">
-                    <a:srgbClr val="000000">
-                      <a:alpha val="40000"/>
-                    </a:srgbClr>
-                  </a:outerShdw>
-                </a:effectLst>
-              </a:rPr>
-              <a:t> Press </a:t>
-            </a:r>
-            <a:r>
-              <a:rPr lang="en-US" sz="13800" b="1" spc="300" dirty="0">
-                <a:ln w="12700">
-                  <a:noFill/>
-                  <a:prstDash val="solid"/>
-                </a:ln>
-                <a:solidFill>
-                  <a:schemeClr val="accent1"/>
-                </a:solidFill>
-                <a:effectLst>
-                  <a:outerShdw blurRad="41275" dist="20320" dir="1800000" algn="tl" rotWithShape="0">
-                    <a:srgbClr val="000000">
-                      <a:alpha val="40000"/>
-                    </a:srgbClr>
-                  </a:outerShdw>
-                </a:effectLst>
-              </a:rPr>
-              <a:t>a button to continue</a:t>
-            </a:r>
-            <a:r>
-              <a:rPr lang="en-US" sz="13800" b="1" spc="300" dirty="0" smtClean="0">
-                <a:ln w="12700">
-                  <a:noFill/>
-                  <a:prstDash val="solid"/>
-                </a:ln>
-                <a:solidFill>
-                  <a:schemeClr val="accent1"/>
-                </a:solidFill>
-                <a:effectLst>
-                  <a:outerShdw blurRad="41275" dist="20320" dir="1800000" algn="tl" rotWithShape="0">
-                    <a:srgbClr val="000000">
-                      <a:alpha val="40000"/>
-                    </a:srgbClr>
-                  </a:outerShdw>
-                </a:effectLst>
-              </a:rPr>
-              <a:t>.</a:t>
-            </a:r>
-            <a:endParaRPr lang="en-US" sz="13800" b="1" spc="300" dirty="0">
-              <a:ln w="12700">
-                <a:noFill/>
-                <a:prstDash val="solid"/>
-              </a:ln>
-              <a:solidFill>
-                <a:schemeClr val="accent1"/>
-              </a:solidFill>
-              <a:effectLst>
-                <a:outerShdw blurRad="41275" dist="20320" dir="1800000" algn="tl" rotWithShape="0">
-                  <a:srgbClr val="000000">
-                    <a:alpha val="40000"/>
-                  </a:srgbClr>
-                </a:outerShdw>
-              </a:effectLst>
-            </a:endParaRPr>
-          </a:p>
-        </p:txBody>
-      </p:sp>
-    </p:spTree>
-    <p:extLst>
-      <p:ext uri="{BB962C8B-B14F-4D97-AF65-F5344CB8AC3E}">
-        <p14:creationId xmlns:p14="http://schemas.microsoft.com/office/powerpoint/2010/main" val="3656503812"/>
       </p:ext>
     </p:extLst>
   </p:cSld>

</xml_diff>

<commit_message>
Revert "Revert "Merge GraspMMI back into master. Includes Merge-Grip-and-Grasm""
</commit_message>
<xml_diff>
--- a/Source Code/GraspBMPs/GraspCircularPrompts.pptx
+++ b/Source Code/GraspBMPs/GraspCircularPrompts.pptx
@@ -22,6 +22,7 @@
     <p:sldId id="281" r:id="rId16"/>
     <p:sldId id="282" r:id="rId17"/>
     <p:sldId id="283" r:id="rId18"/>
+    <p:sldId id="284" r:id="rId19"/>
   </p:sldIdLst>
   <p:sldSz cx="18434050" cy="18434050"/>
   <p:notesSz cx="6858000" cy="9144000"/>
@@ -304,7 +305,7 @@
           <a:p>
             <a:fld id="{649FEDF0-7D14-9E44-B4F2-968D163D1479}" type="datetimeFigureOut">
               <a:rPr lang="fr-FR" smtClean="0"/>
-              <a:t>07/10/16</a:t>
+              <a:t>17/02/17</a:t>
             </a:fld>
             <a:endParaRPr lang="en-US" dirty="0"/>
           </a:p>
@@ -474,7 +475,7 @@
           <a:p>
             <a:fld id="{649FEDF0-7D14-9E44-B4F2-968D163D1479}" type="datetimeFigureOut">
               <a:rPr lang="fr-FR" smtClean="0"/>
-              <a:t>07/10/16</a:t>
+              <a:t>17/02/17</a:t>
             </a:fld>
             <a:endParaRPr lang="en-US" dirty="0"/>
           </a:p>
@@ -654,7 +655,7 @@
           <a:p>
             <a:fld id="{649FEDF0-7D14-9E44-B4F2-968D163D1479}" type="datetimeFigureOut">
               <a:rPr lang="fr-FR" smtClean="0"/>
-              <a:t>07/10/16</a:t>
+              <a:t>17/02/17</a:t>
             </a:fld>
             <a:endParaRPr lang="en-US" dirty="0"/>
           </a:p>
@@ -824,7 +825,7 @@
           <a:p>
             <a:fld id="{649FEDF0-7D14-9E44-B4F2-968D163D1479}" type="datetimeFigureOut">
               <a:rPr lang="fr-FR" smtClean="0"/>
-              <a:t>07/10/16</a:t>
+              <a:t>17/02/17</a:t>
             </a:fld>
             <a:endParaRPr lang="en-US" dirty="0"/>
           </a:p>
@@ -1070,7 +1071,7 @@
           <a:p>
             <a:fld id="{649FEDF0-7D14-9E44-B4F2-968D163D1479}" type="datetimeFigureOut">
               <a:rPr lang="fr-FR" smtClean="0"/>
-              <a:t>07/10/16</a:t>
+              <a:t>17/02/17</a:t>
             </a:fld>
             <a:endParaRPr lang="en-US" dirty="0"/>
           </a:p>
@@ -1358,7 +1359,7 @@
           <a:p>
             <a:fld id="{649FEDF0-7D14-9E44-B4F2-968D163D1479}" type="datetimeFigureOut">
               <a:rPr lang="fr-FR" smtClean="0"/>
-              <a:t>07/10/16</a:t>
+              <a:t>17/02/17</a:t>
             </a:fld>
             <a:endParaRPr lang="en-US" dirty="0"/>
           </a:p>
@@ -1780,7 +1781,7 @@
           <a:p>
             <a:fld id="{649FEDF0-7D14-9E44-B4F2-968D163D1479}" type="datetimeFigureOut">
               <a:rPr lang="fr-FR" smtClean="0"/>
-              <a:t>07/10/16</a:t>
+              <a:t>17/02/17</a:t>
             </a:fld>
             <a:endParaRPr lang="en-US" dirty="0"/>
           </a:p>
@@ -1898,7 +1899,7 @@
           <a:p>
             <a:fld id="{649FEDF0-7D14-9E44-B4F2-968D163D1479}" type="datetimeFigureOut">
               <a:rPr lang="fr-FR" smtClean="0"/>
-              <a:t>07/10/16</a:t>
+              <a:t>17/02/17</a:t>
             </a:fld>
             <a:endParaRPr lang="en-US" dirty="0"/>
           </a:p>
@@ -1993,7 +1994,7 @@
           <a:p>
             <a:fld id="{649FEDF0-7D14-9E44-B4F2-968D163D1479}" type="datetimeFigureOut">
               <a:rPr lang="fr-FR" smtClean="0"/>
-              <a:t>07/10/16</a:t>
+              <a:t>17/02/17</a:t>
             </a:fld>
             <a:endParaRPr lang="en-US" dirty="0"/>
           </a:p>
@@ -2318,7 +2319,7 @@
           <a:p>
             <a:fld id="{649FEDF0-7D14-9E44-B4F2-968D163D1479}" type="datetimeFigureOut">
               <a:rPr lang="fr-FR" smtClean="0"/>
-              <a:t>07/10/16</a:t>
+              <a:t>17/02/17</a:t>
             </a:fld>
             <a:endParaRPr lang="en-US" dirty="0"/>
           </a:p>
@@ -2571,7 +2572,7 @@
           <a:p>
             <a:fld id="{649FEDF0-7D14-9E44-B4F2-968D163D1479}" type="datetimeFigureOut">
               <a:rPr lang="fr-FR" smtClean="0"/>
-              <a:t>07/10/16</a:t>
+              <a:t>17/02/17</a:t>
             </a:fld>
             <a:endParaRPr lang="en-US" dirty="0"/>
           </a:p>
@@ -2787,7 +2788,7 @@
           <a:p>
             <a:fld id="{649FEDF0-7D14-9E44-B4F2-968D163D1479}" type="datetimeFigureOut">
               <a:rPr lang="fr-FR" smtClean="0"/>
-              <a:t>07/10/16</a:t>
+              <a:t>17/02/17</a:t>
             </a:fld>
             <a:endParaRPr lang="en-US" dirty="0"/>
           </a:p>
@@ -6394,45 +6395,7 @@
                   </a:outerShdw>
                 </a:effectLst>
               </a:rPr>
-              <a:t>Doff Virtual Reality Helmet </a:t>
-            </a:r>
-            <a:r>
-              <a:rPr lang="en-US" sz="13800" b="1" spc="-150" dirty="0" smtClean="0">
-                <a:ln w="12700">
-                  <a:noFill/>
-                  <a:prstDash val="solid"/>
-                </a:ln>
-                <a:solidFill>
-                  <a:schemeClr val="accent1"/>
-                </a:solidFill>
-                <a:effectLst>
-                  <a:outerShdw blurRad="41275" dist="20320" dir="1800000" algn="tl" rotWithShape="0">
-                    <a:srgbClr val="000000">
-                      <a:alpha val="40000"/>
-                    </a:srgbClr>
-                  </a:outerShdw>
-                </a:effectLst>
-              </a:rPr>
-              <a:t>and </a:t>
-            </a:r>
-            <a:r>
-              <a:rPr lang="en-US" sz="13800" b="1" spc="-150" dirty="0" smtClean="0">
-                <a:ln w="12700">
-                  <a:noFill/>
-                  <a:prstDash val="solid"/>
-                </a:ln>
-                <a:solidFill>
-                  <a:schemeClr val="accent1"/>
-                </a:solidFill>
-                <a:effectLst>
-                  <a:outerShdw blurRad="41275" dist="20320" dir="1800000" algn="tl" rotWithShape="0">
-                    <a:srgbClr val="000000">
-                      <a:alpha val="40000"/>
-                    </a:srgbClr>
-                  </a:outerShdw>
-                </a:effectLst>
-              </a:rPr>
-              <a:t>press Return. </a:t>
+              <a:t>Doff Virtual Reality Helmet and press Return. </a:t>
             </a:r>
             <a:endParaRPr lang="en-US" sz="13800" b="1" spc="-150" dirty="0">
               <a:ln w="12700">
@@ -6745,6 +6708,266 @@
     <p:extLst>
       <p:ext uri="{BB962C8B-B14F-4D97-AF65-F5344CB8AC3E}">
         <p14:creationId xmlns:p14="http://schemas.microsoft.com/office/powerpoint/2010/main" val="3964587204"/>
+      </p:ext>
+    </p:extLst>
+  </p:cSld>
+  <p:clrMapOvr>
+    <a:masterClrMapping/>
+  </p:clrMapOvr>
+</p:sld>
+</file>
+
+<file path=ppt/slides/slide18.xml><?xml version="1.0" encoding="utf-8"?>
+<p:sld xmlns:a="http://schemas.openxmlformats.org/drawingml/2006/main" xmlns:r="http://schemas.openxmlformats.org/officeDocument/2006/relationships" xmlns:p="http://schemas.openxmlformats.org/presentationml/2006/main">
+  <p:cSld>
+    <p:spTree>
+      <p:nvGrpSpPr>
+        <p:cNvPr id="1" name=""/>
+        <p:cNvGrpSpPr/>
+        <p:nvPr/>
+      </p:nvGrpSpPr>
+      <p:grpSpPr>
+        <a:xfrm>
+          <a:off x="0" y="0"/>
+          <a:ext cx="0" cy="0"/>
+          <a:chOff x="0" y="0"/>
+          <a:chExt cx="0" cy="0"/>
+        </a:xfrm>
+      </p:grpSpPr>
+      <p:sp>
+        <p:nvSpPr>
+          <p:cNvPr id="5" name="Bouée 4"/>
+          <p:cNvSpPr>
+            <a:spLocks noChangeAspect="1"/>
+          </p:cNvSpPr>
+          <p:nvPr/>
+        </p:nvSpPr>
+        <p:spPr>
+          <a:xfrm>
+            <a:off x="1614253" y="1610484"/>
+            <a:ext cx="15228000" cy="15228000"/>
+          </a:xfrm>
+          <a:prstGeom prst="donut">
+            <a:avLst>
+              <a:gd name="adj" fmla="val 30982"/>
+            </a:avLst>
+          </a:prstGeom>
+          <a:solidFill>
+            <a:schemeClr val="bg1"/>
+          </a:solidFill>
+          <a:ln w="76200" cmpd="sng">
+            <a:noFill/>
+          </a:ln>
+        </p:spPr>
+        <p:style>
+          <a:lnRef idx="1">
+            <a:schemeClr val="accent1"/>
+          </a:lnRef>
+          <a:fillRef idx="3">
+            <a:schemeClr val="accent1"/>
+          </a:fillRef>
+          <a:effectRef idx="2">
+            <a:schemeClr val="accent1"/>
+          </a:effectRef>
+          <a:fontRef idx="minor">
+            <a:schemeClr val="lt1"/>
+          </a:fontRef>
+        </p:style>
+        <p:txBody>
+          <a:bodyPr rtlCol="0" anchor="ctr"/>
+          <a:lstStyle/>
+          <a:p>
+            <a:pPr algn="ctr"/>
+            <a:endParaRPr lang="en-US" dirty="0">
+              <a:solidFill>
+                <a:schemeClr val="tx1"/>
+              </a:solidFill>
+            </a:endParaRPr>
+          </a:p>
+        </p:txBody>
+      </p:sp>
+      <p:sp>
+        <p:nvSpPr>
+          <p:cNvPr id="2" name="Rectangle 1"/>
+          <p:cNvSpPr>
+            <a:spLocks noChangeAspect="1"/>
+          </p:cNvSpPr>
+          <p:nvPr/>
+        </p:nvSpPr>
+        <p:spPr>
+          <a:xfrm rot="16200000">
+            <a:off x="3277028" y="3277028"/>
+            <a:ext cx="11879995" cy="11879995"/>
+          </a:xfrm>
+          <a:prstGeom prst="rect">
+            <a:avLst/>
+          </a:prstGeom>
+          <a:noFill/>
+        </p:spPr>
+        <p:txBody>
+          <a:bodyPr wrap="none" lIns="210669" tIns="105334" rIns="210669" bIns="105334">
+            <a:prstTxWarp prst="textCircle">
+              <a:avLst>
+                <a:gd name="adj" fmla="val 10946467"/>
+              </a:avLst>
+            </a:prstTxWarp>
+            <a:spAutoFit/>
+          </a:bodyPr>
+          <a:lstStyle/>
+          <a:p>
+            <a:pPr algn="ctr"/>
+            <a:r>
+              <a:rPr lang="en-US" sz="23900" b="1" spc="600" dirty="0" smtClean="0">
+                <a:ln w="12700">
+                  <a:solidFill>
+                    <a:srgbClr val="FFFFFF"/>
+                  </a:solidFill>
+                  <a:prstDash val="solid"/>
+                </a:ln>
+                <a:solidFill>
+                  <a:srgbClr val="604A7B"/>
+                </a:solidFill>
+              </a:rPr>
+              <a:t>Trial voluntarily aborted</a:t>
+            </a:r>
+            <a:r>
+              <a:rPr lang="en-US" sz="23900" b="1" spc="600" dirty="0" smtClean="0">
+                <a:ln w="12700">
+                  <a:solidFill>
+                    <a:srgbClr val="FFFFFF"/>
+                  </a:solidFill>
+                  <a:prstDash val="solid"/>
+                </a:ln>
+                <a:solidFill>
+                  <a:srgbClr val="604A7B"/>
+                </a:solidFill>
+              </a:rPr>
+              <a:t>.</a:t>
+            </a:r>
+            <a:endParaRPr lang="en-US" sz="23900" b="1" spc="600" dirty="0">
+              <a:ln w="12700">
+                <a:solidFill>
+                  <a:srgbClr val="FFFFFF"/>
+                </a:solidFill>
+                <a:prstDash val="solid"/>
+              </a:ln>
+              <a:solidFill>
+                <a:srgbClr val="604A7B"/>
+              </a:solidFill>
+            </a:endParaRPr>
+          </a:p>
+        </p:txBody>
+      </p:sp>
+      <p:sp>
+        <p:nvSpPr>
+          <p:cNvPr id="7" name="Rectangle 6"/>
+          <p:cNvSpPr>
+            <a:spLocks noChangeAspect="1"/>
+          </p:cNvSpPr>
+          <p:nvPr/>
+        </p:nvSpPr>
+        <p:spPr>
+          <a:xfrm rot="16200000">
+            <a:off x="5257022" y="5257026"/>
+            <a:ext cx="7920006" cy="7919999"/>
+          </a:xfrm>
+          <a:prstGeom prst="rect">
+            <a:avLst/>
+          </a:prstGeom>
+          <a:noFill/>
+        </p:spPr>
+        <p:txBody>
+          <a:bodyPr wrap="none" lIns="210669" tIns="105334" rIns="210669" bIns="105334">
+            <a:prstTxWarp prst="textCircle">
+              <a:avLst>
+                <a:gd name="adj" fmla="val 10916975"/>
+              </a:avLst>
+            </a:prstTxWarp>
+            <a:spAutoFit/>
+          </a:bodyPr>
+          <a:lstStyle/>
+          <a:p>
+            <a:pPr algn="ctr"/>
+            <a:r>
+              <a:rPr lang="en-US" sz="13800" b="1" spc="300" dirty="0" smtClean="0">
+                <a:ln w="12700">
+                  <a:noFill/>
+                  <a:prstDash val="solid"/>
+                </a:ln>
+                <a:solidFill>
+                  <a:schemeClr val="accent1"/>
+                </a:solidFill>
+                <a:effectLst>
+                  <a:outerShdw blurRad="41275" dist="20320" dir="1800000" algn="tl" rotWithShape="0">
+                    <a:srgbClr val="000000">
+                      <a:alpha val="40000"/>
+                    </a:srgbClr>
+                  </a:outerShdw>
+                </a:effectLst>
+              </a:rPr>
+              <a:t> Press </a:t>
+            </a:r>
+            <a:r>
+              <a:rPr lang="en-US" sz="13800" b="1" spc="300" dirty="0">
+                <a:ln w="12700">
+                  <a:noFill/>
+                  <a:prstDash val="solid"/>
+                </a:ln>
+                <a:solidFill>
+                  <a:schemeClr val="accent1"/>
+                </a:solidFill>
+                <a:effectLst>
+                  <a:outerShdw blurRad="41275" dist="20320" dir="1800000" algn="tl" rotWithShape="0">
+                    <a:srgbClr val="000000">
+                      <a:alpha val="40000"/>
+                    </a:srgbClr>
+                  </a:outerShdw>
+                </a:effectLst>
+              </a:rPr>
+              <a:t>a button to continue</a:t>
+            </a:r>
+            <a:r>
+              <a:rPr lang="en-US" sz="13800" b="1" spc="300" dirty="0" smtClean="0">
+                <a:ln w="12700">
+                  <a:noFill/>
+                  <a:prstDash val="solid"/>
+                </a:ln>
+                <a:solidFill>
+                  <a:schemeClr val="accent1"/>
+                </a:solidFill>
+                <a:effectLst>
+                  <a:outerShdw blurRad="41275" dist="20320" dir="1800000" algn="tl" rotWithShape="0">
+                    <a:srgbClr val="000000">
+                      <a:alpha val="40000"/>
+                    </a:srgbClr>
+                  </a:outerShdw>
+                </a:effectLst>
+              </a:rPr>
+              <a:t>.</a:t>
+            </a:r>
+            <a:endParaRPr lang="en-US" sz="13800" b="1" spc="300" dirty="0">
+              <a:ln w="12700">
+                <a:noFill/>
+                <a:prstDash val="solid"/>
+              </a:ln>
+              <a:solidFill>
+                <a:schemeClr val="accent1"/>
+              </a:solidFill>
+              <a:effectLst>
+                <a:outerShdw blurRad="41275" dist="20320" dir="1800000" algn="tl" rotWithShape="0">
+                  <a:srgbClr val="000000">
+                    <a:alpha val="40000"/>
+                  </a:srgbClr>
+                </a:outerShdw>
+              </a:effectLst>
+            </a:endParaRPr>
+          </a:p>
+        </p:txBody>
+      </p:sp>
+    </p:spTree>
+    <p:extLst>
+      <p:ext uri="{BB962C8B-B14F-4D97-AF65-F5344CB8AC3E}">
+        <p14:creationId xmlns:p14="http://schemas.microsoft.com/office/powerpoint/2010/main" val="3656503812"/>
       </p:ext>
     </p:extLst>
   </p:cSld>

</xml_diff>

<commit_message>
Change wording of VR test prompt
</commit_message>
<xml_diff>
--- a/Source Code/GraspBMPs/GraspCircularPrompts.pptx
+++ b/Source Code/GraspBMPs/GraspCircularPrompts.pptx
@@ -306,7 +306,7 @@
           <a:p>
             <a:fld id="{649FEDF0-7D14-9E44-B4F2-968D163D1479}" type="datetimeFigureOut">
               <a:rPr lang="fr-FR" smtClean="0"/>
-              <a:t>23/09/17</a:t>
+              <a:t>26/09/17</a:t>
             </a:fld>
             <a:endParaRPr lang="en-US" dirty="0"/>
           </a:p>
@@ -476,7 +476,7 @@
           <a:p>
             <a:fld id="{649FEDF0-7D14-9E44-B4F2-968D163D1479}" type="datetimeFigureOut">
               <a:rPr lang="fr-FR" smtClean="0"/>
-              <a:t>23/09/17</a:t>
+              <a:t>26/09/17</a:t>
             </a:fld>
             <a:endParaRPr lang="en-US" dirty="0"/>
           </a:p>
@@ -656,7 +656,7 @@
           <a:p>
             <a:fld id="{649FEDF0-7D14-9E44-B4F2-968D163D1479}" type="datetimeFigureOut">
               <a:rPr lang="fr-FR" smtClean="0"/>
-              <a:t>23/09/17</a:t>
+              <a:t>26/09/17</a:t>
             </a:fld>
             <a:endParaRPr lang="en-US" dirty="0"/>
           </a:p>
@@ -826,7 +826,7 @@
           <a:p>
             <a:fld id="{649FEDF0-7D14-9E44-B4F2-968D163D1479}" type="datetimeFigureOut">
               <a:rPr lang="fr-FR" smtClean="0"/>
-              <a:t>23/09/17</a:t>
+              <a:t>26/09/17</a:t>
             </a:fld>
             <a:endParaRPr lang="en-US" dirty="0"/>
           </a:p>
@@ -1072,7 +1072,7 @@
           <a:p>
             <a:fld id="{649FEDF0-7D14-9E44-B4F2-968D163D1479}" type="datetimeFigureOut">
               <a:rPr lang="fr-FR" smtClean="0"/>
-              <a:t>23/09/17</a:t>
+              <a:t>26/09/17</a:t>
             </a:fld>
             <a:endParaRPr lang="en-US" dirty="0"/>
           </a:p>
@@ -1360,7 +1360,7 @@
           <a:p>
             <a:fld id="{649FEDF0-7D14-9E44-B4F2-968D163D1479}" type="datetimeFigureOut">
               <a:rPr lang="fr-FR" smtClean="0"/>
-              <a:t>23/09/17</a:t>
+              <a:t>26/09/17</a:t>
             </a:fld>
             <a:endParaRPr lang="en-US" dirty="0"/>
           </a:p>
@@ -1782,7 +1782,7 @@
           <a:p>
             <a:fld id="{649FEDF0-7D14-9E44-B4F2-968D163D1479}" type="datetimeFigureOut">
               <a:rPr lang="fr-FR" smtClean="0"/>
-              <a:t>23/09/17</a:t>
+              <a:t>26/09/17</a:t>
             </a:fld>
             <a:endParaRPr lang="en-US" dirty="0"/>
           </a:p>
@@ -1900,7 +1900,7 @@
           <a:p>
             <a:fld id="{649FEDF0-7D14-9E44-B4F2-968D163D1479}" type="datetimeFigureOut">
               <a:rPr lang="fr-FR" smtClean="0"/>
-              <a:t>23/09/17</a:t>
+              <a:t>26/09/17</a:t>
             </a:fld>
             <a:endParaRPr lang="en-US" dirty="0"/>
           </a:p>
@@ -1995,7 +1995,7 @@
           <a:p>
             <a:fld id="{649FEDF0-7D14-9E44-B4F2-968D163D1479}" type="datetimeFigureOut">
               <a:rPr lang="fr-FR" smtClean="0"/>
-              <a:t>23/09/17</a:t>
+              <a:t>26/09/17</a:t>
             </a:fld>
             <a:endParaRPr lang="en-US" dirty="0"/>
           </a:p>
@@ -2320,7 +2320,7 @@
           <a:p>
             <a:fld id="{649FEDF0-7D14-9E44-B4F2-968D163D1479}" type="datetimeFigureOut">
               <a:rPr lang="fr-FR" smtClean="0"/>
-              <a:t>23/09/17</a:t>
+              <a:t>26/09/17</a:t>
             </a:fld>
             <a:endParaRPr lang="en-US" dirty="0"/>
           </a:p>
@@ -2573,7 +2573,7 @@
           <a:p>
             <a:fld id="{649FEDF0-7D14-9E44-B4F2-968D163D1479}" type="datetimeFigureOut">
               <a:rPr lang="fr-FR" smtClean="0"/>
-              <a:t>23/09/17</a:t>
+              <a:t>26/09/17</a:t>
             </a:fld>
             <a:endParaRPr lang="en-US" dirty="0"/>
           </a:p>
@@ -2789,7 +2789,7 @@
           <a:p>
             <a:fld id="{649FEDF0-7D14-9E44-B4F2-968D163D1479}" type="datetimeFigureOut">
               <a:rPr lang="fr-FR" smtClean="0"/>
-              <a:t>23/09/17</a:t>
+              <a:t>26/09/17</a:t>
             </a:fld>
             <a:endParaRPr lang="en-US" dirty="0"/>
           </a:p>
@@ -3448,26 +3448,7 @@
                     </a:outerShdw>
                   </a:effectLst>
                 </a:rPr>
-                <a:t> </a:t>
-              </a:r>
-              <a:r>
-                <a:rPr lang="en-US" sz="13800" b="1" spc="300" dirty="0" smtClean="0">
-                  <a:ln w="12700">
-                    <a:noFill/>
-                    <a:prstDash val="solid"/>
-                  </a:ln>
-                  <a:solidFill>
-                    <a:schemeClr val="accent1"/>
-                  </a:solidFill>
-                  <a:effectLst>
-                    <a:outerShdw blurRad="41275" dist="20320" dir="1800000" algn="tl" rotWithShape="0">
-                      <a:srgbClr val="000000">
-                        <a:alpha val="40000"/>
-                      </a:srgbClr>
-                    </a:outerShdw>
-                  </a:effectLst>
-                </a:rPr>
-                <a:t>to </a:t>
+                <a:t> to </a:t>
               </a:r>
               <a:r>
                 <a:rPr lang="en-US" sz="13800" b="1" spc="300" dirty="0">
@@ -3854,26 +3835,7 @@
                     </a:outerShdw>
                   </a:effectLst>
                 </a:rPr>
-                <a:t> </a:t>
-              </a:r>
-              <a:r>
-                <a:rPr lang="en-US" sz="13800" b="1" spc="300" dirty="0" smtClean="0">
-                  <a:ln w="12700">
-                    <a:noFill/>
-                    <a:prstDash val="solid"/>
-                  </a:ln>
-                  <a:solidFill>
-                    <a:schemeClr val="accent1"/>
-                  </a:solidFill>
-                  <a:effectLst>
-                    <a:outerShdw blurRad="41275" dist="20320" dir="1800000" algn="tl" rotWithShape="0">
-                      <a:srgbClr val="000000">
-                        <a:alpha val="40000"/>
-                      </a:srgbClr>
-                    </a:outerShdw>
-                  </a:effectLst>
-                </a:rPr>
-                <a:t>to </a:t>
+                <a:t> to </a:t>
               </a:r>
               <a:r>
                 <a:rPr lang="en-US" sz="13800" b="1" spc="300" dirty="0">
@@ -4260,26 +4222,7 @@
                     </a:outerShdw>
                   </a:effectLst>
                 </a:rPr>
-                <a:t> </a:t>
-              </a:r>
-              <a:r>
-                <a:rPr lang="en-US" sz="13800" b="1" spc="300" dirty="0" smtClean="0">
-                  <a:ln w="12700">
-                    <a:noFill/>
-                    <a:prstDash val="solid"/>
-                  </a:ln>
-                  <a:solidFill>
-                    <a:schemeClr val="accent1"/>
-                  </a:solidFill>
-                  <a:effectLst>
-                    <a:outerShdw blurRad="41275" dist="20320" dir="1800000" algn="tl" rotWithShape="0">
-                      <a:srgbClr val="000000">
-                        <a:alpha val="40000"/>
-                      </a:srgbClr>
-                    </a:outerShdw>
-                  </a:effectLst>
-                </a:rPr>
-                <a:t>to </a:t>
+                <a:t> to </a:t>
               </a:r>
               <a:r>
                 <a:rPr lang="en-US" sz="13800" b="1" spc="300" dirty="0">
@@ -4666,26 +4609,7 @@
                     </a:outerShdw>
                   </a:effectLst>
                 </a:rPr>
-                <a:t> </a:t>
-              </a:r>
-              <a:r>
-                <a:rPr lang="en-US" sz="13800" b="1" spc="300" dirty="0" smtClean="0">
-                  <a:ln w="12700">
-                    <a:noFill/>
-                    <a:prstDash val="solid"/>
-                  </a:ln>
-                  <a:solidFill>
-                    <a:schemeClr val="accent1"/>
-                  </a:solidFill>
-                  <a:effectLst>
-                    <a:outerShdw blurRad="41275" dist="20320" dir="1800000" algn="tl" rotWithShape="0">
-                      <a:srgbClr val="000000">
-                        <a:alpha val="40000"/>
-                      </a:srgbClr>
-                    </a:outerShdw>
-                  </a:effectLst>
-                </a:rPr>
-                <a:t>to </a:t>
+                <a:t> to </a:t>
               </a:r>
               <a:r>
                 <a:rPr lang="en-US" sz="13800" b="1" spc="300" dirty="0">
@@ -5072,26 +4996,7 @@
                     </a:outerShdw>
                   </a:effectLst>
                 </a:rPr>
-                <a:t> </a:t>
-              </a:r>
-              <a:r>
-                <a:rPr lang="en-US" sz="13800" b="1" spc="300" dirty="0" smtClean="0">
-                  <a:ln w="12700">
-                    <a:noFill/>
-                    <a:prstDash val="solid"/>
-                  </a:ln>
-                  <a:solidFill>
-                    <a:schemeClr val="accent1"/>
-                  </a:solidFill>
-                  <a:effectLst>
-                    <a:outerShdw blurRad="41275" dist="20320" dir="1800000" algn="tl" rotWithShape="0">
-                      <a:srgbClr val="000000">
-                        <a:alpha val="40000"/>
-                      </a:srgbClr>
-                    </a:outerShdw>
-                  </a:effectLst>
-                </a:rPr>
-                <a:t>to </a:t>
+                <a:t> to </a:t>
               </a:r>
               <a:r>
                 <a:rPr lang="en-US" sz="13800" b="1" spc="300" dirty="0">
@@ -5516,26 +5421,7 @@
                     </a:outerShdw>
                   </a:effectLst>
                 </a:rPr>
-                <a:t> </a:t>
-              </a:r>
-              <a:r>
-                <a:rPr lang="en-US" sz="13800" b="1" spc="300" dirty="0" smtClean="0">
-                  <a:ln w="12700">
-                    <a:noFill/>
-                    <a:prstDash val="solid"/>
-                  </a:ln>
-                  <a:solidFill>
-                    <a:schemeClr val="accent1"/>
-                  </a:solidFill>
-                  <a:effectLst>
-                    <a:outerShdw blurRad="41275" dist="20320" dir="1800000" algn="tl" rotWithShape="0">
-                      <a:srgbClr val="000000">
-                        <a:alpha val="40000"/>
-                      </a:srgbClr>
-                    </a:outerShdw>
-                  </a:effectLst>
-                </a:rPr>
-                <a:t>to </a:t>
+                <a:t> to </a:t>
               </a:r>
               <a:r>
                 <a:rPr lang="en-US" sz="13800" b="1" spc="300" dirty="0">
@@ -6195,7 +6081,7 @@
                   </a:schemeClr>
                 </a:solidFill>
               </a:rPr>
-              <a:t> VR appears to be working.          </a:t>
+              <a:t>VR Functional Test</a:t>
             </a:r>
             <a:endParaRPr lang="en-US" sz="23900" b="1" spc="600" dirty="0">
               <a:ln w="12700">
@@ -6260,26 +6146,7 @@
                   </a:outerShdw>
                 </a:effectLst>
               </a:rPr>
-              <a:t>Press </a:t>
-            </a:r>
-            <a:r>
-              <a:rPr lang="en-US" sz="13800" b="1" spc="-150" dirty="0" smtClean="0">
-                <a:ln w="12700">
-                  <a:noFill/>
-                  <a:prstDash val="solid"/>
-                </a:ln>
-                <a:solidFill>
-                  <a:schemeClr val="accent1"/>
-                </a:solidFill>
-                <a:effectLst>
-                  <a:outerShdw blurRad="41275" dist="20320" dir="1800000" algn="tl" rotWithShape="0">
-                    <a:srgbClr val="000000">
-                      <a:alpha val="40000"/>
-                    </a:srgbClr>
-                  </a:outerShdw>
-                </a:effectLst>
-              </a:rPr>
-              <a:t> </a:t>
+              <a:t>Press  </a:t>
             </a:r>
             <a:r>
               <a:rPr lang="en-US" sz="13800" b="1" spc="-150" dirty="0" smtClean="0">
@@ -6707,26 +6574,7 @@
                     </a:outerShdw>
                   </a:effectLst>
                 </a:rPr>
-                <a:t> </a:t>
-              </a:r>
-              <a:r>
-                <a:rPr lang="en-US" sz="13800" b="1" spc="300" dirty="0" smtClean="0">
-                  <a:ln w="12700">
-                    <a:noFill/>
-                    <a:prstDash val="solid"/>
-                  </a:ln>
-                  <a:solidFill>
-                    <a:schemeClr val="accent1"/>
-                  </a:solidFill>
-                  <a:effectLst>
-                    <a:outerShdw blurRad="41275" dist="20320" dir="1800000" algn="tl" rotWithShape="0">
-                      <a:srgbClr val="000000">
-                        <a:alpha val="40000"/>
-                      </a:srgbClr>
-                    </a:outerShdw>
-                  </a:effectLst>
-                </a:rPr>
-                <a:t>to </a:t>
+                <a:t> to </a:t>
               </a:r>
               <a:r>
                 <a:rPr lang="en-US" sz="13800" b="1" spc="300" dirty="0">
@@ -7113,26 +6961,7 @@
                     </a:outerShdw>
                   </a:effectLst>
                 </a:rPr>
-                <a:t> </a:t>
-              </a:r>
-              <a:r>
-                <a:rPr lang="en-US" sz="13800" b="1" spc="300" dirty="0" smtClean="0">
-                  <a:ln w="12700">
-                    <a:noFill/>
-                    <a:prstDash val="solid"/>
-                  </a:ln>
-                  <a:solidFill>
-                    <a:schemeClr val="accent1"/>
-                  </a:solidFill>
-                  <a:effectLst>
-                    <a:outerShdw blurRad="41275" dist="20320" dir="1800000" algn="tl" rotWithShape="0">
-                      <a:srgbClr val="000000">
-                        <a:alpha val="40000"/>
-                      </a:srgbClr>
-                    </a:outerShdw>
-                  </a:effectLst>
-                </a:rPr>
-                <a:t>to </a:t>
+                <a:t> to </a:t>
               </a:r>
               <a:r>
                 <a:rPr lang="en-US" sz="13800" b="1" spc="300" dirty="0">
@@ -7523,26 +7352,7 @@
                     </a:outerShdw>
                   </a:effectLst>
                 </a:rPr>
-                <a:t> </a:t>
-              </a:r>
-              <a:r>
-                <a:rPr lang="en-US" sz="13800" b="1" spc="300" dirty="0" smtClean="0">
-                  <a:ln w="12700">
-                    <a:noFill/>
-                    <a:prstDash val="solid"/>
-                  </a:ln>
-                  <a:solidFill>
-                    <a:schemeClr val="accent1"/>
-                  </a:solidFill>
-                  <a:effectLst>
-                    <a:outerShdw blurRad="41275" dist="20320" dir="1800000" algn="tl" rotWithShape="0">
-                      <a:srgbClr val="000000">
-                        <a:alpha val="40000"/>
-                      </a:srgbClr>
-                    </a:outerShdw>
-                  </a:effectLst>
-                </a:rPr>
-                <a:t>to </a:t>
+                <a:t> to </a:t>
               </a:r>
               <a:r>
                 <a:rPr lang="en-US" sz="13800" b="1" spc="300" dirty="0">
@@ -7878,39 +7688,7 @@
                   </a:schemeClr>
                 </a:solidFill>
               </a:rPr>
-              <a:t>Trial </a:t>
-            </a:r>
-            <a:r>
-              <a:rPr lang="en-US" sz="23900" b="1" spc="600" dirty="0" smtClean="0">
-                <a:ln w="12700">
-                  <a:solidFill>
-                    <a:srgbClr val="FFFFFF"/>
-                  </a:solidFill>
-                  <a:prstDash val="solid"/>
-                </a:ln>
-                <a:solidFill>
-                  <a:schemeClr val="accent3">
-                    <a:lumMod val="75000"/>
-                  </a:schemeClr>
-                </a:solidFill>
-              </a:rPr>
-              <a:t>block </a:t>
-            </a:r>
-            <a:r>
-              <a:rPr lang="en-US" sz="23900" b="1" spc="600" dirty="0" smtClean="0">
-                <a:ln w="12700">
-                  <a:solidFill>
-                    <a:srgbClr val="FFFFFF"/>
-                  </a:solidFill>
-                  <a:prstDash val="solid"/>
-                </a:ln>
-                <a:solidFill>
-                  <a:schemeClr val="accent3">
-                    <a:lumMod val="75000"/>
-                  </a:schemeClr>
-                </a:solidFill>
-              </a:rPr>
-              <a:t>completed.</a:t>
+              <a:t>Trial block completed.</a:t>
             </a:r>
             <a:endParaRPr lang="en-US" sz="23900" b="1" spc="600" dirty="0">
               <a:ln w="12700">
@@ -7975,26 +7753,7 @@
                   </a:outerShdw>
                 </a:effectLst>
               </a:rPr>
-              <a:t>Click </a:t>
-            </a:r>
-            <a:r>
-              <a:rPr lang="en-US" sz="13800" b="1" spc="-150" dirty="0" smtClean="0">
-                <a:ln w="12700">
-                  <a:noFill/>
-                  <a:prstDash val="solid"/>
-                </a:ln>
-                <a:solidFill>
-                  <a:schemeClr val="accent1"/>
-                </a:solidFill>
-                <a:effectLst>
-                  <a:outerShdw blurRad="41275" dist="20320" dir="1800000" algn="tl" rotWithShape="0">
-                    <a:srgbClr val="000000">
-                      <a:alpha val="40000"/>
-                    </a:srgbClr>
-                  </a:outerShdw>
-                </a:effectLst>
-              </a:rPr>
-              <a:t> </a:t>
+              <a:t>Click  </a:t>
             </a:r>
             <a:r>
               <a:rPr lang="en-US" sz="13800" b="1" spc="-150" dirty="0" smtClean="0">
@@ -8032,83 +7791,7 @@
                   </a:outerShdw>
                 </a:effectLst>
               </a:rPr>
-              <a:t> </a:t>
-            </a:r>
-            <a:r>
-              <a:rPr lang="en-US" sz="13800" b="1" spc="-150" dirty="0" smtClean="0">
-                <a:ln w="12700">
-                  <a:noFill/>
-                  <a:prstDash val="solid"/>
-                </a:ln>
-                <a:solidFill>
-                  <a:schemeClr val="accent1"/>
-                </a:solidFill>
-                <a:effectLst>
-                  <a:outerShdw blurRad="41275" dist="20320" dir="1800000" algn="tl" rotWithShape="0">
-                    <a:srgbClr val="000000">
-                      <a:alpha val="40000"/>
-                    </a:srgbClr>
-                  </a:outerShdw>
-                </a:effectLst>
-              </a:rPr>
-              <a:t>to exit.     </a:t>
-            </a:r>
-            <a:r>
-              <a:rPr lang="en-US" sz="13800" b="1" spc="-150" dirty="0" smtClean="0">
-                <a:ln w="12700">
-                  <a:noFill/>
-                  <a:prstDash val="solid"/>
-                </a:ln>
-                <a:solidFill>
-                  <a:schemeClr val="accent1"/>
-                </a:solidFill>
-                <a:effectLst>
-                  <a:outerShdw blurRad="41275" dist="20320" dir="1800000" algn="tl" rotWithShape="0">
-                    <a:srgbClr val="000000">
-                      <a:alpha val="40000"/>
-                    </a:srgbClr>
-                  </a:outerShdw>
-                </a:effectLst>
-              </a:rPr>
-              <a:t>Press and </a:t>
-            </a:r>
-            <a:r>
-              <a:rPr lang="en-US" sz="13800" b="1" spc="-150" dirty="0" smtClean="0">
-                <a:ln w="12700">
-                  <a:noFill/>
-                  <a:prstDash val="solid"/>
-                </a:ln>
-                <a:solidFill>
-                  <a:schemeClr val="accent1"/>
-                </a:solidFill>
-                <a:effectLst>
-                  <a:outerShdw blurRad="41275" dist="20320" dir="1800000" algn="tl" rotWithShape="0">
-                    <a:srgbClr val="000000">
-                      <a:alpha val="40000"/>
-                    </a:srgbClr>
-                  </a:outerShdw>
-                </a:effectLst>
-              </a:rPr>
-              <a:t>hold </a:t>
-            </a:r>
-            <a:r>
-              <a:rPr lang="en-US" sz="13800" b="1" spc="-150" dirty="0" smtClean="0">
-                <a:ln w="12700">
-                  <a:noFill/>
-                  <a:prstDash val="solid"/>
-                </a:ln>
-                <a:solidFill>
-                  <a:schemeClr val="accent1"/>
-                </a:solidFill>
-                <a:effectLst>
-                  <a:outerShdw blurRad="41275" dist="20320" dir="1800000" algn="tl" rotWithShape="0">
-                    <a:srgbClr val="000000">
-                      <a:alpha val="40000"/>
-                    </a:srgbClr>
-                  </a:outerShdw>
-                </a:effectLst>
-              </a:rPr>
-              <a:t> </a:t>
+              <a:t> to exit.     Press and hold  </a:t>
             </a:r>
             <a:r>
               <a:rPr lang="en-US" sz="13800" b="1" spc="-150" dirty="0" smtClean="0">
@@ -8146,45 +7829,7 @@
                   </a:outerShdw>
                 </a:effectLst>
               </a:rPr>
-              <a:t> </a:t>
-            </a:r>
-            <a:r>
-              <a:rPr lang="en-US" sz="13800" b="1" spc="-150" dirty="0" smtClean="0">
-                <a:ln w="12700">
-                  <a:noFill/>
-                  <a:prstDash val="solid"/>
-                </a:ln>
-                <a:solidFill>
-                  <a:schemeClr val="accent1"/>
-                </a:solidFill>
-                <a:effectLst>
-                  <a:outerShdw blurRad="41275" dist="20320" dir="1800000" algn="tl" rotWithShape="0">
-                    <a:srgbClr val="000000">
-                      <a:alpha val="40000"/>
-                    </a:srgbClr>
-                  </a:outerShdw>
-                </a:effectLst>
-              </a:rPr>
-              <a:t> </a:t>
-            </a:r>
-            <a:r>
-              <a:rPr lang="en-US" sz="13800" b="1" spc="-150" dirty="0" smtClean="0">
-                <a:ln w="12700">
-                  <a:noFill/>
-                  <a:prstDash val="solid"/>
-                </a:ln>
-                <a:solidFill>
-                  <a:schemeClr val="accent1"/>
-                </a:solidFill>
-                <a:effectLst>
-                  <a:outerShdw blurRad="41275" dist="20320" dir="1800000" algn="tl" rotWithShape="0">
-                    <a:srgbClr val="000000">
-                      <a:alpha val="40000"/>
-                    </a:srgbClr>
-                  </a:outerShdw>
-                </a:effectLst>
-              </a:rPr>
-              <a:t>to continue. </a:t>
+              <a:t>  to continue. </a:t>
             </a:r>
             <a:endParaRPr lang="en-US" sz="13800" b="1" spc="-150" dirty="0">
               <a:ln w="12700">
@@ -8955,26 +8600,7 @@
                     </a:outerShdw>
                   </a:effectLst>
                 </a:rPr>
-                <a:t> </a:t>
-              </a:r>
-              <a:r>
-                <a:rPr lang="en-US" sz="13800" b="1" spc="300" dirty="0" smtClean="0">
-                  <a:ln w="12700">
-                    <a:noFill/>
-                    <a:prstDash val="solid"/>
-                  </a:ln>
-                  <a:solidFill>
-                    <a:schemeClr val="accent1"/>
-                  </a:solidFill>
-                  <a:effectLst>
-                    <a:outerShdw blurRad="41275" dist="20320" dir="1800000" algn="tl" rotWithShape="0">
-                      <a:srgbClr val="000000">
-                        <a:alpha val="40000"/>
-                      </a:srgbClr>
-                    </a:outerShdw>
-                  </a:effectLst>
-                </a:rPr>
-                <a:t>to </a:t>
+                <a:t> to </a:t>
               </a:r>
               <a:r>
                 <a:rPr lang="en-US" sz="13800" b="1" spc="300" dirty="0">
@@ -9166,39 +8792,7 @@
                   </a:schemeClr>
                 </a:solidFill>
               </a:rPr>
-              <a:t>Time to </a:t>
-            </a:r>
-            <a:r>
-              <a:rPr lang="en-US" sz="23900" b="1" spc="-150" dirty="0" smtClean="0">
-                <a:ln w="12700">
-                  <a:solidFill>
-                    <a:srgbClr val="FFFFFF"/>
-                  </a:solidFill>
-                  <a:prstDash val="solid"/>
-                </a:ln>
-                <a:solidFill>
-                  <a:schemeClr val="accent4">
-                    <a:lumMod val="75000"/>
-                  </a:schemeClr>
-                </a:solidFill>
-              </a:rPr>
-              <a:t>lower </a:t>
-            </a:r>
-            <a:r>
-              <a:rPr lang="en-US" sz="23900" b="1" spc="-150" dirty="0" smtClean="0">
-                <a:ln w="12700">
-                  <a:solidFill>
-                    <a:srgbClr val="FFFFFF"/>
-                  </a:solidFill>
-                  <a:prstDash val="solid"/>
-                </a:ln>
-                <a:solidFill>
-                  <a:schemeClr val="accent4">
-                    <a:lumMod val="75000"/>
-                  </a:schemeClr>
-                </a:solidFill>
-              </a:rPr>
-              <a:t>hand exceeded.</a:t>
+              <a:t>Time to lower hand exceeded.</a:t>
             </a:r>
             <a:endParaRPr lang="en-US" sz="23900" b="1" spc="-150" dirty="0">
               <a:ln w="12700">
@@ -9616,26 +9210,7 @@
                     </a:outerShdw>
                   </a:effectLst>
                 </a:rPr>
-                <a:t> </a:t>
-              </a:r>
-              <a:r>
-                <a:rPr lang="en-US" sz="13800" b="1" spc="300" dirty="0" smtClean="0">
-                  <a:ln w="12700">
-                    <a:noFill/>
-                    <a:prstDash val="solid"/>
-                  </a:ln>
-                  <a:solidFill>
-                    <a:schemeClr val="accent1"/>
-                  </a:solidFill>
-                  <a:effectLst>
-                    <a:outerShdw blurRad="41275" dist="20320" dir="1800000" algn="tl" rotWithShape="0">
-                      <a:srgbClr val="000000">
-                        <a:alpha val="40000"/>
-                      </a:srgbClr>
-                    </a:outerShdw>
-                  </a:effectLst>
-                </a:rPr>
-                <a:t>to </a:t>
+                <a:t> to </a:t>
               </a:r>
               <a:r>
                 <a:rPr lang="en-US" sz="13800" b="1" spc="300" dirty="0">
@@ -10022,26 +9597,7 @@
                     </a:outerShdw>
                   </a:effectLst>
                 </a:rPr>
-                <a:t> </a:t>
-              </a:r>
-              <a:r>
-                <a:rPr lang="en-US" sz="13800" b="1" spc="300" dirty="0" smtClean="0">
-                  <a:ln w="12700">
-                    <a:noFill/>
-                    <a:prstDash val="solid"/>
-                  </a:ln>
-                  <a:solidFill>
-                    <a:schemeClr val="accent1"/>
-                  </a:solidFill>
-                  <a:effectLst>
-                    <a:outerShdw blurRad="41275" dist="20320" dir="1800000" algn="tl" rotWithShape="0">
-                      <a:srgbClr val="000000">
-                        <a:alpha val="40000"/>
-                      </a:srgbClr>
-                    </a:outerShdw>
-                  </a:effectLst>
-                </a:rPr>
-                <a:t>to </a:t>
+                <a:t> to </a:t>
               </a:r>
               <a:r>
                 <a:rPr lang="en-US" sz="13800" b="1" spc="300" dirty="0">
@@ -10484,26 +10040,7 @@
                     </a:outerShdw>
                   </a:effectLst>
                 </a:rPr>
-                <a:t> </a:t>
-              </a:r>
-              <a:r>
-                <a:rPr lang="en-US" sz="13800" b="1" spc="300" dirty="0" smtClean="0">
-                  <a:ln w="12700">
-                    <a:noFill/>
-                    <a:prstDash val="solid"/>
-                  </a:ln>
-                  <a:solidFill>
-                    <a:schemeClr val="accent1"/>
-                  </a:solidFill>
-                  <a:effectLst>
-                    <a:outerShdw blurRad="41275" dist="20320" dir="1800000" algn="tl" rotWithShape="0">
-                      <a:srgbClr val="000000">
-                        <a:alpha val="40000"/>
-                      </a:srgbClr>
-                    </a:outerShdw>
-                  </a:effectLst>
-                </a:rPr>
-                <a:t>to </a:t>
+                <a:t> to </a:t>
               </a:r>
               <a:r>
                 <a:rPr lang="en-US" sz="13800" b="1" spc="300" dirty="0">

</xml_diff>

<commit_message>
End of block behaviour
</commit_message>
<xml_diff>
--- a/Source Code/GraspBMPs/GraspCircularPrompts.pptx
+++ b/Source Code/GraspBMPs/GraspCircularPrompts.pptx
@@ -5320,7 +5320,7 @@
             <a:bodyPr wrap="none" lIns="210669" tIns="105334" rIns="210669" bIns="105334">
               <a:prstTxWarp prst="textCircle">
                 <a:avLst>
-                  <a:gd name="adj" fmla="val 10916975"/>
+                  <a:gd name="adj" fmla="val 11307874"/>
                 </a:avLst>
               </a:prstTxWarp>
               <a:spAutoFit/>
@@ -5348,7 +5348,7 @@
                 <a:t>When head is </a:t>
               </a:r>
               <a:r>
-                <a:rPr lang="en-US" sz="13800" b="1" spc="300" dirty="0" err="1" smtClean="0">
+                <a:rPr lang="en-US" sz="13800" b="1" spc="300" dirty="0" smtClean="0">
                   <a:ln w="12700">
                     <a:noFill/>
                     <a:prstDash val="solid"/>
@@ -5364,7 +5364,7 @@
                     </a:outerShdw>
                   </a:effectLst>
                 </a:rPr>
-                <a:t>straigth</a:t>
+                <a:t>straight, </a:t>
               </a:r>
               <a:r>
                 <a:rPr lang="en-US" sz="13800" b="1" spc="300" dirty="0" smtClean="0">
@@ -5383,7 +5383,7 @@
                     </a:outerShdw>
                   </a:effectLst>
                 </a:rPr>
-                <a:t>, press </a:t>
+                <a:t>press </a:t>
               </a:r>
               <a:r>
                 <a:rPr lang="en-US" sz="13800" b="1" spc="300" dirty="0" smtClean="0">
@@ -5797,7 +5797,7 @@
           <a:bodyPr wrap="none" lIns="210669" tIns="105334" rIns="210669" bIns="105334">
             <a:prstTxWarp prst="textCircle">
               <a:avLst>
-                <a:gd name="adj" fmla="val 11371993"/>
+                <a:gd name="adj" fmla="val 11768328"/>
               </a:avLst>
             </a:prstTxWarp>
             <a:spAutoFit/>
@@ -5822,7 +5822,7 @@
                   </a:outerShdw>
                 </a:effectLst>
               </a:rPr>
-              <a:t>Doff Virtual Reality Helmet and press </a:t>
+              <a:t>Press</a:t>
             </a:r>
             <a:r>
               <a:rPr lang="en-US" sz="13800" b="1" spc="-150" dirty="0" smtClean="0">
@@ -5831,7 +5831,7 @@
                   <a:prstDash val="solid"/>
                 </a:ln>
                 <a:solidFill>
-                  <a:schemeClr val="accent5"/>
+                  <a:srgbClr val="C0504D"/>
                 </a:solidFill>
                 <a:effectLst>
                   <a:outerShdw blurRad="41275" dist="20320" dir="1800000" algn="tl" rotWithShape="0">
@@ -5841,7 +5841,7 @@
                   </a:outerShdw>
                 </a:effectLst>
               </a:rPr>
-              <a:t>Return</a:t>
+              <a:t>  Select</a:t>
             </a:r>
             <a:r>
               <a:rPr lang="en-US" sz="13800" b="1" spc="-150" dirty="0" smtClean="0">
@@ -5860,7 +5860,45 @@
                   </a:outerShdw>
                 </a:effectLst>
               </a:rPr>
-              <a:t>. </a:t>
+              <a:t>  then doff </a:t>
+            </a:r>
+            <a:r>
+              <a:rPr lang="en-US" sz="13800" b="1" spc="-150" dirty="0" smtClean="0">
+                <a:ln w="12700">
+                  <a:noFill/>
+                  <a:prstDash val="solid"/>
+                </a:ln>
+                <a:solidFill>
+                  <a:schemeClr val="accent1"/>
+                </a:solidFill>
+                <a:effectLst>
+                  <a:outerShdw blurRad="41275" dist="20320" dir="1800000" algn="tl" rotWithShape="0">
+                    <a:srgbClr val="000000">
+                      <a:alpha val="40000"/>
+                    </a:srgbClr>
+                  </a:outerShdw>
+                </a:effectLst>
+              </a:rPr>
+              <a:t>Virtual Reality </a:t>
+            </a:r>
+            <a:r>
+              <a:rPr lang="en-US" sz="13800" b="1" spc="-150" dirty="0" smtClean="0">
+                <a:ln w="12700">
+                  <a:noFill/>
+                  <a:prstDash val="solid"/>
+                </a:ln>
+                <a:solidFill>
+                  <a:schemeClr val="accent1"/>
+                </a:solidFill>
+                <a:effectLst>
+                  <a:outerShdw blurRad="41275" dist="20320" dir="1800000" algn="tl" rotWithShape="0">
+                    <a:srgbClr val="000000">
+                      <a:alpha val="40000"/>
+                    </a:srgbClr>
+                  </a:outerShdw>
+                </a:effectLst>
+              </a:rPr>
+              <a:t>Helmet. </a:t>
             </a:r>
             <a:endParaRPr lang="en-US" sz="13800" b="1" spc="-150" dirty="0">
               <a:ln w="12700">
@@ -5912,14 +5950,14 @@
       </p:pic>
       <p:sp>
         <p:nvSpPr>
-          <p:cNvPr id="7" name="Ellipse 6"/>
+          <p:cNvPr id="8" name="Ellipse 7"/>
           <p:cNvSpPr/>
           <p:nvPr/>
         </p:nvSpPr>
         <p:spPr>
           <a:xfrm>
-            <a:off x="8640857" y="8922107"/>
-            <a:ext cx="1021993" cy="1021993"/>
+            <a:off x="8412657" y="6848531"/>
+            <a:ext cx="1497843" cy="1497843"/>
           </a:xfrm>
           <a:prstGeom prst="ellipse">
             <a:avLst/>
@@ -5927,10 +5965,9 @@
           <a:noFill/>
           <a:ln w="76200" cmpd="sng">
             <a:solidFill>
-              <a:srgbClr val="4BACC6"/>
+              <a:schemeClr val="accent2"/>
             </a:solidFill>
           </a:ln>
-          <a:effectLst/>
         </p:spPr>
         <p:style>
           <a:lnRef idx="1">
@@ -6155,7 +6192,7 @@
                   <a:prstDash val="solid"/>
                 </a:ln>
                 <a:solidFill>
-                  <a:srgbClr val="4BACC6"/>
+                  <a:schemeClr val="accent2"/>
                 </a:solidFill>
                 <a:effectLst>
                   <a:outerShdw blurRad="41275" dist="20320" dir="1800000" algn="tl" rotWithShape="0">
@@ -6165,16 +6202,18 @@
                   </a:outerShdw>
                 </a:effectLst>
               </a:rPr>
-              <a:t>Return</a:t>
-            </a:r>
-            <a:r>
-              <a:rPr lang="en-US" sz="13800" b="1" spc="-150" dirty="0">
+              <a:t>Select</a:t>
+            </a:r>
+            <a:r>
+              <a:rPr lang="en-US" sz="13800" b="1" spc="-150" dirty="0" smtClean="0">
                 <a:ln w="12700">
                   <a:noFill/>
                   <a:prstDash val="solid"/>
                 </a:ln>
                 <a:solidFill>
-                  <a:srgbClr val="4BACC6"/>
+                  <a:schemeClr val="accent2">
+                    <a:lumMod val="75000"/>
+                  </a:schemeClr>
                 </a:solidFill>
                 <a:effectLst>
                   <a:outerShdw blurRad="41275" dist="20320" dir="1800000" algn="tl" rotWithShape="0">
@@ -6184,26 +6223,7 @@
                   </a:outerShdw>
                 </a:effectLst>
               </a:rPr>
-              <a:t> </a:t>
-            </a:r>
-            <a:r>
-              <a:rPr lang="en-US" sz="13800" b="1" spc="-150" dirty="0" smtClean="0">
-                <a:ln w="12700">
-                  <a:noFill/>
-                  <a:prstDash val="solid"/>
-                </a:ln>
-                <a:solidFill>
-                  <a:srgbClr val="4BACC6"/>
-                </a:solidFill>
-                <a:effectLst>
-                  <a:outerShdw blurRad="41275" dist="20320" dir="1800000" algn="tl" rotWithShape="0">
-                    <a:srgbClr val="000000">
-                      <a:alpha val="40000"/>
-                    </a:srgbClr>
-                  </a:outerShdw>
-                </a:effectLst>
-              </a:rPr>
-              <a:t> </a:t>
+              <a:t>  </a:t>
             </a:r>
             <a:r>
               <a:rPr lang="en-US" sz="13800" b="1" spc="-150" dirty="0" smtClean="0">
@@ -6283,7 +6303,7 @@
       </p:sp>
       <p:pic>
         <p:nvPicPr>
-          <p:cNvPr id="6" name="Image 5" descr="OculusRemoteControl_Camera001_Beauty001.jpg5b0ba155-2aba-4e81-8c1b-dd7f1ad1d005Original.jpg"/>
+          <p:cNvPr id="8" name="Image 7" descr="OculusRemoteControl_Camera001_Beauty001.jpg5b0ba155-2aba-4e81-8c1b-dd7f1ad1d005Original.jpg"/>
           <p:cNvPicPr>
             <a:picLocks noChangeAspect="1"/>
           </p:cNvPicPr>
@@ -6312,14 +6332,14 @@
       </p:pic>
       <p:sp>
         <p:nvSpPr>
-          <p:cNvPr id="7" name="Ellipse 6"/>
+          <p:cNvPr id="9" name="Ellipse 8"/>
           <p:cNvSpPr/>
           <p:nvPr/>
         </p:nvSpPr>
         <p:spPr>
           <a:xfrm>
-            <a:off x="8640857" y="8922107"/>
-            <a:ext cx="1021993" cy="1021993"/>
+            <a:off x="8412657" y="6848531"/>
+            <a:ext cx="1497843" cy="1497843"/>
           </a:xfrm>
           <a:prstGeom prst="ellipse">
             <a:avLst/>
@@ -6327,10 +6347,9 @@
           <a:noFill/>
           <a:ln w="76200" cmpd="sng">
             <a:solidFill>
-              <a:srgbClr val="4BACC6"/>
+              <a:schemeClr val="accent2"/>
             </a:solidFill>
           </a:ln>
-          <a:effectLst/>
         </p:spPr>
         <p:style>
           <a:lnRef idx="1">

</xml_diff>

<commit_message>
Update circular prompts per CADMOS comments
CADMOS proposed increasing the size of the image of the remote. For now I just increased the thickness of the circle around the button.

Also changed wording for the raise hand prompt.
</commit_message>
<xml_diff>
--- a/Source Code/GraspBMPs/GraspCircularPrompts.pptx
+++ b/Source Code/GraspBMPs/GraspCircularPrompts.pptx
@@ -306,7 +306,7 @@
           <a:p>
             <a:fld id="{649FEDF0-7D14-9E44-B4F2-968D163D1479}" type="datetimeFigureOut">
               <a:rPr lang="fr-FR" smtClean="0"/>
-              <a:t>26/09/17</a:t>
+              <a:t>02/11/17</a:t>
             </a:fld>
             <a:endParaRPr lang="en-US" dirty="0"/>
           </a:p>
@@ -476,7 +476,7 @@
           <a:p>
             <a:fld id="{649FEDF0-7D14-9E44-B4F2-968D163D1479}" type="datetimeFigureOut">
               <a:rPr lang="fr-FR" smtClean="0"/>
-              <a:t>26/09/17</a:t>
+              <a:t>02/11/17</a:t>
             </a:fld>
             <a:endParaRPr lang="en-US" dirty="0"/>
           </a:p>
@@ -656,7 +656,7 @@
           <a:p>
             <a:fld id="{649FEDF0-7D14-9E44-B4F2-968D163D1479}" type="datetimeFigureOut">
               <a:rPr lang="fr-FR" smtClean="0"/>
-              <a:t>26/09/17</a:t>
+              <a:t>02/11/17</a:t>
             </a:fld>
             <a:endParaRPr lang="en-US" dirty="0"/>
           </a:p>
@@ -826,7 +826,7 @@
           <a:p>
             <a:fld id="{649FEDF0-7D14-9E44-B4F2-968D163D1479}" type="datetimeFigureOut">
               <a:rPr lang="fr-FR" smtClean="0"/>
-              <a:t>26/09/17</a:t>
+              <a:t>02/11/17</a:t>
             </a:fld>
             <a:endParaRPr lang="en-US" dirty="0"/>
           </a:p>
@@ -1072,7 +1072,7 @@
           <a:p>
             <a:fld id="{649FEDF0-7D14-9E44-B4F2-968D163D1479}" type="datetimeFigureOut">
               <a:rPr lang="fr-FR" smtClean="0"/>
-              <a:t>26/09/17</a:t>
+              <a:t>02/11/17</a:t>
             </a:fld>
             <a:endParaRPr lang="en-US" dirty="0"/>
           </a:p>
@@ -1360,7 +1360,7 @@
           <a:p>
             <a:fld id="{649FEDF0-7D14-9E44-B4F2-968D163D1479}" type="datetimeFigureOut">
               <a:rPr lang="fr-FR" smtClean="0"/>
-              <a:t>26/09/17</a:t>
+              <a:t>02/11/17</a:t>
             </a:fld>
             <a:endParaRPr lang="en-US" dirty="0"/>
           </a:p>
@@ -1782,7 +1782,7 @@
           <a:p>
             <a:fld id="{649FEDF0-7D14-9E44-B4F2-968D163D1479}" type="datetimeFigureOut">
               <a:rPr lang="fr-FR" smtClean="0"/>
-              <a:t>26/09/17</a:t>
+              <a:t>02/11/17</a:t>
             </a:fld>
             <a:endParaRPr lang="en-US" dirty="0"/>
           </a:p>
@@ -1900,7 +1900,7 @@
           <a:p>
             <a:fld id="{649FEDF0-7D14-9E44-B4F2-968D163D1479}" type="datetimeFigureOut">
               <a:rPr lang="fr-FR" smtClean="0"/>
-              <a:t>26/09/17</a:t>
+              <a:t>02/11/17</a:t>
             </a:fld>
             <a:endParaRPr lang="en-US" dirty="0"/>
           </a:p>
@@ -1995,7 +1995,7 @@
           <a:p>
             <a:fld id="{649FEDF0-7D14-9E44-B4F2-968D163D1479}" type="datetimeFigureOut">
               <a:rPr lang="fr-FR" smtClean="0"/>
-              <a:t>26/09/17</a:t>
+              <a:t>02/11/17</a:t>
             </a:fld>
             <a:endParaRPr lang="en-US" dirty="0"/>
           </a:p>
@@ -2320,7 +2320,7 @@
           <a:p>
             <a:fld id="{649FEDF0-7D14-9E44-B4F2-968D163D1479}" type="datetimeFigureOut">
               <a:rPr lang="fr-FR" smtClean="0"/>
-              <a:t>26/09/17</a:t>
+              <a:t>02/11/17</a:t>
             </a:fld>
             <a:endParaRPr lang="en-US" dirty="0"/>
           </a:p>
@@ -2573,7 +2573,7 @@
           <a:p>
             <a:fld id="{649FEDF0-7D14-9E44-B4F2-968D163D1479}" type="datetimeFigureOut">
               <a:rPr lang="fr-FR" smtClean="0"/>
-              <a:t>26/09/17</a:t>
+              <a:t>02/11/17</a:t>
             </a:fld>
             <a:endParaRPr lang="en-US" dirty="0"/>
           </a:p>
@@ -2789,7 +2789,7 @@
           <a:p>
             <a:fld id="{649FEDF0-7D14-9E44-B4F2-968D163D1479}" type="datetimeFigureOut">
               <a:rPr lang="fr-FR" smtClean="0"/>
-              <a:t>26/09/17</a:t>
+              <a:t>02/11/17</a:t>
             </a:fld>
             <a:endParaRPr lang="en-US" dirty="0"/>
           </a:p>
@@ -3507,94 +3507,6 @@
             </a:p>
           </p:txBody>
         </p:sp>
-        <p:grpSp>
-          <p:nvGrpSpPr>
-            <p:cNvPr id="21" name="Grouper 20"/>
-            <p:cNvGrpSpPr/>
-            <p:nvPr/>
-          </p:nvGrpSpPr>
-          <p:grpSpPr>
-            <a:xfrm>
-              <a:off x="7630464" y="6243112"/>
-              <a:ext cx="3195578" cy="5962744"/>
-              <a:chOff x="7630464" y="6243112"/>
-              <a:chExt cx="3195578" cy="5962744"/>
-            </a:xfrm>
-          </p:grpSpPr>
-          <p:pic>
-            <p:nvPicPr>
-              <p:cNvPr id="22" name="Image 21" descr="OculusRemoteControl_Camera001_Beauty001.jpg5b0ba155-2aba-4e81-8c1b-dd7f1ad1d005Original.jpg"/>
-              <p:cNvPicPr>
-                <a:picLocks noChangeAspect="1"/>
-              </p:cNvPicPr>
-              <p:nvPr/>
-            </p:nvPicPr>
-            <p:blipFill rotWithShape="1">
-              <a:blip r:embed="rId2">
-                <a:extLst>
-                  <a:ext uri="{28A0092B-C50C-407E-A947-70E740481C1C}">
-                    <a14:useLocalDpi xmlns:a14="http://schemas.microsoft.com/office/drawing/2010/main" val="0"/>
-                  </a:ext>
-                </a:extLst>
-              </a:blip>
-              <a:srcRect l="36035" r="34996"/>
-              <a:stretch/>
-            </p:blipFill>
-            <p:spPr>
-              <a:xfrm>
-                <a:off x="7630464" y="6243112"/>
-                <a:ext cx="3195578" cy="5962744"/>
-              </a:xfrm>
-              <a:prstGeom prst="rect">
-                <a:avLst/>
-              </a:prstGeom>
-            </p:spPr>
-          </p:pic>
-          <p:sp>
-            <p:nvSpPr>
-              <p:cNvPr id="23" name="Ellipse 22"/>
-              <p:cNvSpPr/>
-              <p:nvPr/>
-            </p:nvSpPr>
-            <p:spPr>
-              <a:xfrm>
-                <a:off x="8412657" y="6848531"/>
-                <a:ext cx="1497843" cy="1497843"/>
-              </a:xfrm>
-              <a:prstGeom prst="ellipse">
-                <a:avLst/>
-              </a:prstGeom>
-              <a:noFill/>
-              <a:ln w="76200" cmpd="sng">
-                <a:solidFill>
-                  <a:schemeClr val="accent2"/>
-                </a:solidFill>
-              </a:ln>
-            </p:spPr>
-            <p:style>
-              <a:lnRef idx="1">
-                <a:schemeClr val="accent1"/>
-              </a:lnRef>
-              <a:fillRef idx="3">
-                <a:schemeClr val="accent1"/>
-              </a:fillRef>
-              <a:effectRef idx="2">
-                <a:schemeClr val="accent1"/>
-              </a:effectRef>
-              <a:fontRef idx="minor">
-                <a:schemeClr val="lt1"/>
-              </a:fontRef>
-            </p:style>
-            <p:txBody>
-              <a:bodyPr rtlCol="0" anchor="ctr"/>
-              <a:lstStyle/>
-              <a:p>
-                <a:pPr algn="ctr"/>
-                <a:endParaRPr lang="en-US"/>
-              </a:p>
-            </p:txBody>
-          </p:sp>
-        </p:grpSp>
       </p:grpSp>
       <p:sp>
         <p:nvSpPr>
@@ -3654,6 +3566,94 @@
           </a:p>
         </p:txBody>
       </p:sp>
+      <p:grpSp>
+        <p:nvGrpSpPr>
+          <p:cNvPr id="9" name="Grouper 8"/>
+          <p:cNvGrpSpPr/>
+          <p:nvPr/>
+        </p:nvGrpSpPr>
+        <p:grpSpPr>
+          <a:xfrm>
+            <a:off x="7630464" y="6243112"/>
+            <a:ext cx="3195578" cy="5962744"/>
+            <a:chOff x="7630464" y="6243112"/>
+            <a:chExt cx="3195578" cy="5962744"/>
+          </a:xfrm>
+        </p:grpSpPr>
+        <p:pic>
+          <p:nvPicPr>
+            <p:cNvPr id="10" name="Image 9" descr="OculusRemoteControl_Camera001_Beauty001.jpg5b0ba155-2aba-4e81-8c1b-dd7f1ad1d005Original.jpg"/>
+            <p:cNvPicPr>
+              <a:picLocks noChangeAspect="1"/>
+            </p:cNvPicPr>
+            <p:nvPr/>
+          </p:nvPicPr>
+          <p:blipFill rotWithShape="1">
+            <a:blip r:embed="rId2">
+              <a:extLst>
+                <a:ext uri="{28A0092B-C50C-407E-A947-70E740481C1C}">
+                  <a14:useLocalDpi xmlns:a14="http://schemas.microsoft.com/office/drawing/2010/main" val="0"/>
+                </a:ext>
+              </a:extLst>
+            </a:blip>
+            <a:srcRect l="36035" r="34996"/>
+            <a:stretch/>
+          </p:blipFill>
+          <p:spPr>
+            <a:xfrm>
+              <a:off x="7630464" y="6243112"/>
+              <a:ext cx="3195578" cy="5962744"/>
+            </a:xfrm>
+            <a:prstGeom prst="rect">
+              <a:avLst/>
+            </a:prstGeom>
+          </p:spPr>
+        </p:pic>
+        <p:sp>
+          <p:nvSpPr>
+            <p:cNvPr id="11" name="Ellipse 10"/>
+            <p:cNvSpPr/>
+            <p:nvPr/>
+          </p:nvSpPr>
+          <p:spPr>
+            <a:xfrm>
+              <a:off x="8412657" y="6848531"/>
+              <a:ext cx="1497843" cy="1497843"/>
+            </a:xfrm>
+            <a:prstGeom prst="ellipse">
+              <a:avLst/>
+            </a:prstGeom>
+            <a:noFill/>
+            <a:ln w="304800" cmpd="sng">
+              <a:solidFill>
+                <a:schemeClr val="accent2"/>
+              </a:solidFill>
+            </a:ln>
+          </p:spPr>
+          <p:style>
+            <a:lnRef idx="1">
+              <a:schemeClr val="accent1"/>
+            </a:lnRef>
+            <a:fillRef idx="3">
+              <a:schemeClr val="accent1"/>
+            </a:fillRef>
+            <a:effectRef idx="2">
+              <a:schemeClr val="accent1"/>
+            </a:effectRef>
+            <a:fontRef idx="minor">
+              <a:schemeClr val="lt1"/>
+            </a:fontRef>
+          </p:style>
+          <p:txBody>
+            <a:bodyPr rtlCol="0" anchor="ctr"/>
+            <a:lstStyle/>
+            <a:p>
+              <a:pPr algn="ctr"/>
+              <a:endParaRPr lang="en-US"/>
+            </a:p>
+          </p:txBody>
+        </p:sp>
+      </p:grpSp>
     </p:spTree>
     <p:extLst>
       <p:ext uri="{BB962C8B-B14F-4D97-AF65-F5344CB8AC3E}">
@@ -3894,94 +3894,6 @@
             </a:p>
           </p:txBody>
         </p:sp>
-        <p:grpSp>
-          <p:nvGrpSpPr>
-            <p:cNvPr id="21" name="Grouper 20"/>
-            <p:cNvGrpSpPr/>
-            <p:nvPr/>
-          </p:nvGrpSpPr>
-          <p:grpSpPr>
-            <a:xfrm>
-              <a:off x="7630464" y="6243112"/>
-              <a:ext cx="3195578" cy="5962744"/>
-              <a:chOff x="7630464" y="6243112"/>
-              <a:chExt cx="3195578" cy="5962744"/>
-            </a:xfrm>
-          </p:grpSpPr>
-          <p:pic>
-            <p:nvPicPr>
-              <p:cNvPr id="22" name="Image 21" descr="OculusRemoteControl_Camera001_Beauty001.jpg5b0ba155-2aba-4e81-8c1b-dd7f1ad1d005Original.jpg"/>
-              <p:cNvPicPr>
-                <a:picLocks noChangeAspect="1"/>
-              </p:cNvPicPr>
-              <p:nvPr/>
-            </p:nvPicPr>
-            <p:blipFill rotWithShape="1">
-              <a:blip r:embed="rId2">
-                <a:extLst>
-                  <a:ext uri="{28A0092B-C50C-407E-A947-70E740481C1C}">
-                    <a14:useLocalDpi xmlns:a14="http://schemas.microsoft.com/office/drawing/2010/main" val="0"/>
-                  </a:ext>
-                </a:extLst>
-              </a:blip>
-              <a:srcRect l="36035" r="34996"/>
-              <a:stretch/>
-            </p:blipFill>
-            <p:spPr>
-              <a:xfrm>
-                <a:off x="7630464" y="6243112"/>
-                <a:ext cx="3195578" cy="5962744"/>
-              </a:xfrm>
-              <a:prstGeom prst="rect">
-                <a:avLst/>
-              </a:prstGeom>
-            </p:spPr>
-          </p:pic>
-          <p:sp>
-            <p:nvSpPr>
-              <p:cNvPr id="23" name="Ellipse 22"/>
-              <p:cNvSpPr/>
-              <p:nvPr/>
-            </p:nvSpPr>
-            <p:spPr>
-              <a:xfrm>
-                <a:off x="8412657" y="6848531"/>
-                <a:ext cx="1497843" cy="1497843"/>
-              </a:xfrm>
-              <a:prstGeom prst="ellipse">
-                <a:avLst/>
-              </a:prstGeom>
-              <a:noFill/>
-              <a:ln w="76200" cmpd="sng">
-                <a:solidFill>
-                  <a:schemeClr val="accent2"/>
-                </a:solidFill>
-              </a:ln>
-            </p:spPr>
-            <p:style>
-              <a:lnRef idx="1">
-                <a:schemeClr val="accent1"/>
-              </a:lnRef>
-              <a:fillRef idx="3">
-                <a:schemeClr val="accent1"/>
-              </a:fillRef>
-              <a:effectRef idx="2">
-                <a:schemeClr val="accent1"/>
-              </a:effectRef>
-              <a:fontRef idx="minor">
-                <a:schemeClr val="lt1"/>
-              </a:fontRef>
-            </p:style>
-            <p:txBody>
-              <a:bodyPr rtlCol="0" anchor="ctr"/>
-              <a:lstStyle/>
-              <a:p>
-                <a:pPr algn="ctr"/>
-                <a:endParaRPr lang="en-US"/>
-              </a:p>
-            </p:txBody>
-          </p:sp>
-        </p:grpSp>
       </p:grpSp>
       <p:sp>
         <p:nvSpPr>
@@ -4041,6 +3953,94 @@
           </a:p>
         </p:txBody>
       </p:sp>
+      <p:grpSp>
+        <p:nvGrpSpPr>
+          <p:cNvPr id="9" name="Grouper 8"/>
+          <p:cNvGrpSpPr/>
+          <p:nvPr/>
+        </p:nvGrpSpPr>
+        <p:grpSpPr>
+          <a:xfrm>
+            <a:off x="7630464" y="6243112"/>
+            <a:ext cx="3195578" cy="5962744"/>
+            <a:chOff x="7630464" y="6243112"/>
+            <a:chExt cx="3195578" cy="5962744"/>
+          </a:xfrm>
+        </p:grpSpPr>
+        <p:pic>
+          <p:nvPicPr>
+            <p:cNvPr id="10" name="Image 9" descr="OculusRemoteControl_Camera001_Beauty001.jpg5b0ba155-2aba-4e81-8c1b-dd7f1ad1d005Original.jpg"/>
+            <p:cNvPicPr>
+              <a:picLocks noChangeAspect="1"/>
+            </p:cNvPicPr>
+            <p:nvPr/>
+          </p:nvPicPr>
+          <p:blipFill rotWithShape="1">
+            <a:blip r:embed="rId2">
+              <a:extLst>
+                <a:ext uri="{28A0092B-C50C-407E-A947-70E740481C1C}">
+                  <a14:useLocalDpi xmlns:a14="http://schemas.microsoft.com/office/drawing/2010/main" val="0"/>
+                </a:ext>
+              </a:extLst>
+            </a:blip>
+            <a:srcRect l="36035" r="34996"/>
+            <a:stretch/>
+          </p:blipFill>
+          <p:spPr>
+            <a:xfrm>
+              <a:off x="7630464" y="6243112"/>
+              <a:ext cx="3195578" cy="5962744"/>
+            </a:xfrm>
+            <a:prstGeom prst="rect">
+              <a:avLst/>
+            </a:prstGeom>
+          </p:spPr>
+        </p:pic>
+        <p:sp>
+          <p:nvSpPr>
+            <p:cNvPr id="11" name="Ellipse 10"/>
+            <p:cNvSpPr/>
+            <p:nvPr/>
+          </p:nvSpPr>
+          <p:spPr>
+            <a:xfrm>
+              <a:off x="8412657" y="6848531"/>
+              <a:ext cx="1497843" cy="1497843"/>
+            </a:xfrm>
+            <a:prstGeom prst="ellipse">
+              <a:avLst/>
+            </a:prstGeom>
+            <a:noFill/>
+            <a:ln w="304800" cmpd="sng">
+              <a:solidFill>
+                <a:schemeClr val="accent2"/>
+              </a:solidFill>
+            </a:ln>
+          </p:spPr>
+          <p:style>
+            <a:lnRef idx="1">
+              <a:schemeClr val="accent1"/>
+            </a:lnRef>
+            <a:fillRef idx="3">
+              <a:schemeClr val="accent1"/>
+            </a:fillRef>
+            <a:effectRef idx="2">
+              <a:schemeClr val="accent1"/>
+            </a:effectRef>
+            <a:fontRef idx="minor">
+              <a:schemeClr val="lt1"/>
+            </a:fontRef>
+          </p:style>
+          <p:txBody>
+            <a:bodyPr rtlCol="0" anchor="ctr"/>
+            <a:lstStyle/>
+            <a:p>
+              <a:pPr algn="ctr"/>
+              <a:endParaRPr lang="en-US"/>
+            </a:p>
+          </p:txBody>
+        </p:sp>
+      </p:grpSp>
     </p:spTree>
     <p:extLst>
       <p:ext uri="{BB962C8B-B14F-4D97-AF65-F5344CB8AC3E}">
@@ -4281,94 +4281,6 @@
             </a:p>
           </p:txBody>
         </p:sp>
-        <p:grpSp>
-          <p:nvGrpSpPr>
-            <p:cNvPr id="21" name="Grouper 20"/>
-            <p:cNvGrpSpPr/>
-            <p:nvPr/>
-          </p:nvGrpSpPr>
-          <p:grpSpPr>
-            <a:xfrm>
-              <a:off x="7630464" y="6243112"/>
-              <a:ext cx="3195578" cy="5962744"/>
-              <a:chOff x="7630464" y="6243112"/>
-              <a:chExt cx="3195578" cy="5962744"/>
-            </a:xfrm>
-          </p:grpSpPr>
-          <p:pic>
-            <p:nvPicPr>
-              <p:cNvPr id="22" name="Image 21" descr="OculusRemoteControl_Camera001_Beauty001.jpg5b0ba155-2aba-4e81-8c1b-dd7f1ad1d005Original.jpg"/>
-              <p:cNvPicPr>
-                <a:picLocks noChangeAspect="1"/>
-              </p:cNvPicPr>
-              <p:nvPr/>
-            </p:nvPicPr>
-            <p:blipFill rotWithShape="1">
-              <a:blip r:embed="rId2">
-                <a:extLst>
-                  <a:ext uri="{28A0092B-C50C-407E-A947-70E740481C1C}">
-                    <a14:useLocalDpi xmlns:a14="http://schemas.microsoft.com/office/drawing/2010/main" val="0"/>
-                  </a:ext>
-                </a:extLst>
-              </a:blip>
-              <a:srcRect l="36035" r="34996"/>
-              <a:stretch/>
-            </p:blipFill>
-            <p:spPr>
-              <a:xfrm>
-                <a:off x="7630464" y="6243112"/>
-                <a:ext cx="3195578" cy="5962744"/>
-              </a:xfrm>
-              <a:prstGeom prst="rect">
-                <a:avLst/>
-              </a:prstGeom>
-            </p:spPr>
-          </p:pic>
-          <p:sp>
-            <p:nvSpPr>
-              <p:cNvPr id="23" name="Ellipse 22"/>
-              <p:cNvSpPr/>
-              <p:nvPr/>
-            </p:nvSpPr>
-            <p:spPr>
-              <a:xfrm>
-                <a:off x="8412657" y="6848531"/>
-                <a:ext cx="1497843" cy="1497843"/>
-              </a:xfrm>
-              <a:prstGeom prst="ellipse">
-                <a:avLst/>
-              </a:prstGeom>
-              <a:noFill/>
-              <a:ln w="76200" cmpd="sng">
-                <a:solidFill>
-                  <a:schemeClr val="accent2"/>
-                </a:solidFill>
-              </a:ln>
-            </p:spPr>
-            <p:style>
-              <a:lnRef idx="1">
-                <a:schemeClr val="accent1"/>
-              </a:lnRef>
-              <a:fillRef idx="3">
-                <a:schemeClr val="accent1"/>
-              </a:fillRef>
-              <a:effectRef idx="2">
-                <a:schemeClr val="accent1"/>
-              </a:effectRef>
-              <a:fontRef idx="minor">
-                <a:schemeClr val="lt1"/>
-              </a:fontRef>
-            </p:style>
-            <p:txBody>
-              <a:bodyPr rtlCol="0" anchor="ctr"/>
-              <a:lstStyle/>
-              <a:p>
-                <a:pPr algn="ctr"/>
-                <a:endParaRPr lang="en-US"/>
-              </a:p>
-            </p:txBody>
-          </p:sp>
-        </p:grpSp>
       </p:grpSp>
       <p:sp>
         <p:nvSpPr>
@@ -4428,6 +4340,94 @@
           </a:p>
         </p:txBody>
       </p:sp>
+      <p:grpSp>
+        <p:nvGrpSpPr>
+          <p:cNvPr id="9" name="Grouper 8"/>
+          <p:cNvGrpSpPr/>
+          <p:nvPr/>
+        </p:nvGrpSpPr>
+        <p:grpSpPr>
+          <a:xfrm>
+            <a:off x="7630464" y="6243112"/>
+            <a:ext cx="3195578" cy="5962744"/>
+            <a:chOff x="7630464" y="6243112"/>
+            <a:chExt cx="3195578" cy="5962744"/>
+          </a:xfrm>
+        </p:grpSpPr>
+        <p:pic>
+          <p:nvPicPr>
+            <p:cNvPr id="10" name="Image 9" descr="OculusRemoteControl_Camera001_Beauty001.jpg5b0ba155-2aba-4e81-8c1b-dd7f1ad1d005Original.jpg"/>
+            <p:cNvPicPr>
+              <a:picLocks noChangeAspect="1"/>
+            </p:cNvPicPr>
+            <p:nvPr/>
+          </p:nvPicPr>
+          <p:blipFill rotWithShape="1">
+            <a:blip r:embed="rId2">
+              <a:extLst>
+                <a:ext uri="{28A0092B-C50C-407E-A947-70E740481C1C}">
+                  <a14:useLocalDpi xmlns:a14="http://schemas.microsoft.com/office/drawing/2010/main" val="0"/>
+                </a:ext>
+              </a:extLst>
+            </a:blip>
+            <a:srcRect l="36035" r="34996"/>
+            <a:stretch/>
+          </p:blipFill>
+          <p:spPr>
+            <a:xfrm>
+              <a:off x="7630464" y="6243112"/>
+              <a:ext cx="3195578" cy="5962744"/>
+            </a:xfrm>
+            <a:prstGeom prst="rect">
+              <a:avLst/>
+            </a:prstGeom>
+          </p:spPr>
+        </p:pic>
+        <p:sp>
+          <p:nvSpPr>
+            <p:cNvPr id="11" name="Ellipse 10"/>
+            <p:cNvSpPr/>
+            <p:nvPr/>
+          </p:nvSpPr>
+          <p:spPr>
+            <a:xfrm>
+              <a:off x="8412657" y="6848531"/>
+              <a:ext cx="1497843" cy="1497843"/>
+            </a:xfrm>
+            <a:prstGeom prst="ellipse">
+              <a:avLst/>
+            </a:prstGeom>
+            <a:noFill/>
+            <a:ln w="304800" cmpd="sng">
+              <a:solidFill>
+                <a:schemeClr val="accent2"/>
+              </a:solidFill>
+            </a:ln>
+          </p:spPr>
+          <p:style>
+            <a:lnRef idx="1">
+              <a:schemeClr val="accent1"/>
+            </a:lnRef>
+            <a:fillRef idx="3">
+              <a:schemeClr val="accent1"/>
+            </a:fillRef>
+            <a:effectRef idx="2">
+              <a:schemeClr val="accent1"/>
+            </a:effectRef>
+            <a:fontRef idx="minor">
+              <a:schemeClr val="lt1"/>
+            </a:fontRef>
+          </p:style>
+          <p:txBody>
+            <a:bodyPr rtlCol="0" anchor="ctr"/>
+            <a:lstStyle/>
+            <a:p>
+              <a:pPr algn="ctr"/>
+              <a:endParaRPr lang="en-US"/>
+            </a:p>
+          </p:txBody>
+        </p:sp>
+      </p:grpSp>
     </p:spTree>
     <p:extLst>
       <p:ext uri="{BB962C8B-B14F-4D97-AF65-F5344CB8AC3E}">
@@ -4668,94 +4668,6 @@
             </a:p>
           </p:txBody>
         </p:sp>
-        <p:grpSp>
-          <p:nvGrpSpPr>
-            <p:cNvPr id="10" name="Grouper 9"/>
-            <p:cNvGrpSpPr/>
-            <p:nvPr/>
-          </p:nvGrpSpPr>
-          <p:grpSpPr>
-            <a:xfrm>
-              <a:off x="7630464" y="6243112"/>
-              <a:ext cx="3195578" cy="5962744"/>
-              <a:chOff x="7630464" y="6243112"/>
-              <a:chExt cx="3195578" cy="5962744"/>
-            </a:xfrm>
-          </p:grpSpPr>
-          <p:pic>
-            <p:nvPicPr>
-              <p:cNvPr id="11" name="Image 10" descr="OculusRemoteControl_Camera001_Beauty001.jpg5b0ba155-2aba-4e81-8c1b-dd7f1ad1d005Original.jpg"/>
-              <p:cNvPicPr>
-                <a:picLocks noChangeAspect="1"/>
-              </p:cNvPicPr>
-              <p:nvPr/>
-            </p:nvPicPr>
-            <p:blipFill rotWithShape="1">
-              <a:blip r:embed="rId2">
-                <a:extLst>
-                  <a:ext uri="{28A0092B-C50C-407E-A947-70E740481C1C}">
-                    <a14:useLocalDpi xmlns:a14="http://schemas.microsoft.com/office/drawing/2010/main" val="0"/>
-                  </a:ext>
-                </a:extLst>
-              </a:blip>
-              <a:srcRect l="36035" r="34996"/>
-              <a:stretch/>
-            </p:blipFill>
-            <p:spPr>
-              <a:xfrm>
-                <a:off x="7630464" y="6243112"/>
-                <a:ext cx="3195578" cy="5962744"/>
-              </a:xfrm>
-              <a:prstGeom prst="rect">
-                <a:avLst/>
-              </a:prstGeom>
-            </p:spPr>
-          </p:pic>
-          <p:sp>
-            <p:nvSpPr>
-              <p:cNvPr id="12" name="Ellipse 11"/>
-              <p:cNvSpPr/>
-              <p:nvPr/>
-            </p:nvSpPr>
-            <p:spPr>
-              <a:xfrm>
-                <a:off x="8412657" y="6848531"/>
-                <a:ext cx="1497843" cy="1497843"/>
-              </a:xfrm>
-              <a:prstGeom prst="ellipse">
-                <a:avLst/>
-              </a:prstGeom>
-              <a:noFill/>
-              <a:ln w="76200" cmpd="sng">
-                <a:solidFill>
-                  <a:schemeClr val="accent2"/>
-                </a:solidFill>
-              </a:ln>
-            </p:spPr>
-            <p:style>
-              <a:lnRef idx="1">
-                <a:schemeClr val="accent1"/>
-              </a:lnRef>
-              <a:fillRef idx="3">
-                <a:schemeClr val="accent1"/>
-              </a:fillRef>
-              <a:effectRef idx="2">
-                <a:schemeClr val="accent1"/>
-              </a:effectRef>
-              <a:fontRef idx="minor">
-                <a:schemeClr val="lt1"/>
-              </a:fontRef>
-            </p:style>
-            <p:txBody>
-              <a:bodyPr rtlCol="0" anchor="ctr"/>
-              <a:lstStyle/>
-              <a:p>
-                <a:pPr algn="ctr"/>
-                <a:endParaRPr lang="en-US"/>
-              </a:p>
-            </p:txBody>
-          </p:sp>
-        </p:grpSp>
       </p:grpSp>
       <p:sp>
         <p:nvSpPr>
@@ -4815,6 +4727,94 @@
           </a:p>
         </p:txBody>
       </p:sp>
+      <p:grpSp>
+        <p:nvGrpSpPr>
+          <p:cNvPr id="13" name="Grouper 12"/>
+          <p:cNvGrpSpPr/>
+          <p:nvPr/>
+        </p:nvGrpSpPr>
+        <p:grpSpPr>
+          <a:xfrm>
+            <a:off x="7630464" y="6243112"/>
+            <a:ext cx="3195578" cy="5962744"/>
+            <a:chOff x="7630464" y="6243112"/>
+            <a:chExt cx="3195578" cy="5962744"/>
+          </a:xfrm>
+        </p:grpSpPr>
+        <p:pic>
+          <p:nvPicPr>
+            <p:cNvPr id="14" name="Image 13" descr="OculusRemoteControl_Camera001_Beauty001.jpg5b0ba155-2aba-4e81-8c1b-dd7f1ad1d005Original.jpg"/>
+            <p:cNvPicPr>
+              <a:picLocks noChangeAspect="1"/>
+            </p:cNvPicPr>
+            <p:nvPr/>
+          </p:nvPicPr>
+          <p:blipFill rotWithShape="1">
+            <a:blip r:embed="rId2">
+              <a:extLst>
+                <a:ext uri="{28A0092B-C50C-407E-A947-70E740481C1C}">
+                  <a14:useLocalDpi xmlns:a14="http://schemas.microsoft.com/office/drawing/2010/main" val="0"/>
+                </a:ext>
+              </a:extLst>
+            </a:blip>
+            <a:srcRect l="36035" r="34996"/>
+            <a:stretch/>
+          </p:blipFill>
+          <p:spPr>
+            <a:xfrm>
+              <a:off x="7630464" y="6243112"/>
+              <a:ext cx="3195578" cy="5962744"/>
+            </a:xfrm>
+            <a:prstGeom prst="rect">
+              <a:avLst/>
+            </a:prstGeom>
+          </p:spPr>
+        </p:pic>
+        <p:sp>
+          <p:nvSpPr>
+            <p:cNvPr id="15" name="Ellipse 14"/>
+            <p:cNvSpPr/>
+            <p:nvPr/>
+          </p:nvSpPr>
+          <p:spPr>
+            <a:xfrm>
+              <a:off x="8412657" y="6848531"/>
+              <a:ext cx="1497843" cy="1497843"/>
+            </a:xfrm>
+            <a:prstGeom prst="ellipse">
+              <a:avLst/>
+            </a:prstGeom>
+            <a:noFill/>
+            <a:ln w="304800" cmpd="sng">
+              <a:solidFill>
+                <a:schemeClr val="accent2"/>
+              </a:solidFill>
+            </a:ln>
+          </p:spPr>
+          <p:style>
+            <a:lnRef idx="1">
+              <a:schemeClr val="accent1"/>
+            </a:lnRef>
+            <a:fillRef idx="3">
+              <a:schemeClr val="accent1"/>
+            </a:fillRef>
+            <a:effectRef idx="2">
+              <a:schemeClr val="accent1"/>
+            </a:effectRef>
+            <a:fontRef idx="minor">
+              <a:schemeClr val="lt1"/>
+            </a:fontRef>
+          </p:style>
+          <p:txBody>
+            <a:bodyPr rtlCol="0" anchor="ctr"/>
+            <a:lstStyle/>
+            <a:p>
+              <a:pPr algn="ctr"/>
+              <a:endParaRPr lang="en-US"/>
+            </a:p>
+          </p:txBody>
+        </p:sp>
+      </p:grpSp>
     </p:spTree>
     <p:extLst>
       <p:ext uri="{BB962C8B-B14F-4D97-AF65-F5344CB8AC3E}">
@@ -5055,94 +5055,6 @@
             </a:p>
           </p:txBody>
         </p:sp>
-        <p:grpSp>
-          <p:nvGrpSpPr>
-            <p:cNvPr id="10" name="Grouper 9"/>
-            <p:cNvGrpSpPr/>
-            <p:nvPr/>
-          </p:nvGrpSpPr>
-          <p:grpSpPr>
-            <a:xfrm>
-              <a:off x="7630464" y="6243112"/>
-              <a:ext cx="3195578" cy="5962744"/>
-              <a:chOff x="7630464" y="6243112"/>
-              <a:chExt cx="3195578" cy="5962744"/>
-            </a:xfrm>
-          </p:grpSpPr>
-          <p:pic>
-            <p:nvPicPr>
-              <p:cNvPr id="11" name="Image 10" descr="OculusRemoteControl_Camera001_Beauty001.jpg5b0ba155-2aba-4e81-8c1b-dd7f1ad1d005Original.jpg"/>
-              <p:cNvPicPr>
-                <a:picLocks noChangeAspect="1"/>
-              </p:cNvPicPr>
-              <p:nvPr/>
-            </p:nvPicPr>
-            <p:blipFill rotWithShape="1">
-              <a:blip r:embed="rId2">
-                <a:extLst>
-                  <a:ext uri="{28A0092B-C50C-407E-A947-70E740481C1C}">
-                    <a14:useLocalDpi xmlns:a14="http://schemas.microsoft.com/office/drawing/2010/main" val="0"/>
-                  </a:ext>
-                </a:extLst>
-              </a:blip>
-              <a:srcRect l="36035" r="34996"/>
-              <a:stretch/>
-            </p:blipFill>
-            <p:spPr>
-              <a:xfrm>
-                <a:off x="7630464" y="6243112"/>
-                <a:ext cx="3195578" cy="5962744"/>
-              </a:xfrm>
-              <a:prstGeom prst="rect">
-                <a:avLst/>
-              </a:prstGeom>
-            </p:spPr>
-          </p:pic>
-          <p:sp>
-            <p:nvSpPr>
-              <p:cNvPr id="12" name="Ellipse 11"/>
-              <p:cNvSpPr/>
-              <p:nvPr/>
-            </p:nvSpPr>
-            <p:spPr>
-              <a:xfrm>
-                <a:off x="8412657" y="6848531"/>
-                <a:ext cx="1497843" cy="1497843"/>
-              </a:xfrm>
-              <a:prstGeom prst="ellipse">
-                <a:avLst/>
-              </a:prstGeom>
-              <a:noFill/>
-              <a:ln w="76200" cmpd="sng">
-                <a:solidFill>
-                  <a:schemeClr val="accent2"/>
-                </a:solidFill>
-              </a:ln>
-            </p:spPr>
-            <p:style>
-              <a:lnRef idx="1">
-                <a:schemeClr val="accent1"/>
-              </a:lnRef>
-              <a:fillRef idx="3">
-                <a:schemeClr val="accent1"/>
-              </a:fillRef>
-              <a:effectRef idx="2">
-                <a:schemeClr val="accent1"/>
-              </a:effectRef>
-              <a:fontRef idx="minor">
-                <a:schemeClr val="lt1"/>
-              </a:fontRef>
-            </p:style>
-            <p:txBody>
-              <a:bodyPr rtlCol="0" anchor="ctr"/>
-              <a:lstStyle/>
-              <a:p>
-                <a:pPr algn="ctr"/>
-                <a:endParaRPr lang="en-US"/>
-              </a:p>
-            </p:txBody>
-          </p:sp>
-        </p:grpSp>
       </p:grpSp>
       <p:sp>
         <p:nvSpPr>
@@ -5202,6 +5114,94 @@
           </a:p>
         </p:txBody>
       </p:sp>
+      <p:grpSp>
+        <p:nvGrpSpPr>
+          <p:cNvPr id="13" name="Grouper 12"/>
+          <p:cNvGrpSpPr/>
+          <p:nvPr/>
+        </p:nvGrpSpPr>
+        <p:grpSpPr>
+          <a:xfrm>
+            <a:off x="7630464" y="6243112"/>
+            <a:ext cx="3195578" cy="5962744"/>
+            <a:chOff x="7630464" y="6243112"/>
+            <a:chExt cx="3195578" cy="5962744"/>
+          </a:xfrm>
+        </p:grpSpPr>
+        <p:pic>
+          <p:nvPicPr>
+            <p:cNvPr id="14" name="Image 13" descr="OculusRemoteControl_Camera001_Beauty001.jpg5b0ba155-2aba-4e81-8c1b-dd7f1ad1d005Original.jpg"/>
+            <p:cNvPicPr>
+              <a:picLocks noChangeAspect="1"/>
+            </p:cNvPicPr>
+            <p:nvPr/>
+          </p:nvPicPr>
+          <p:blipFill rotWithShape="1">
+            <a:blip r:embed="rId2">
+              <a:extLst>
+                <a:ext uri="{28A0092B-C50C-407E-A947-70E740481C1C}">
+                  <a14:useLocalDpi xmlns:a14="http://schemas.microsoft.com/office/drawing/2010/main" val="0"/>
+                </a:ext>
+              </a:extLst>
+            </a:blip>
+            <a:srcRect l="36035" r="34996"/>
+            <a:stretch/>
+          </p:blipFill>
+          <p:spPr>
+            <a:xfrm>
+              <a:off x="7630464" y="6243112"/>
+              <a:ext cx="3195578" cy="5962744"/>
+            </a:xfrm>
+            <a:prstGeom prst="rect">
+              <a:avLst/>
+            </a:prstGeom>
+          </p:spPr>
+        </p:pic>
+        <p:sp>
+          <p:nvSpPr>
+            <p:cNvPr id="15" name="Ellipse 14"/>
+            <p:cNvSpPr/>
+            <p:nvPr/>
+          </p:nvSpPr>
+          <p:spPr>
+            <a:xfrm>
+              <a:off x="8412657" y="6848531"/>
+              <a:ext cx="1497843" cy="1497843"/>
+            </a:xfrm>
+            <a:prstGeom prst="ellipse">
+              <a:avLst/>
+            </a:prstGeom>
+            <a:noFill/>
+            <a:ln w="304800" cmpd="sng">
+              <a:solidFill>
+                <a:schemeClr val="accent2"/>
+              </a:solidFill>
+            </a:ln>
+          </p:spPr>
+          <p:style>
+            <a:lnRef idx="1">
+              <a:schemeClr val="accent1"/>
+            </a:lnRef>
+            <a:fillRef idx="3">
+              <a:schemeClr val="accent1"/>
+            </a:fillRef>
+            <a:effectRef idx="2">
+              <a:schemeClr val="accent1"/>
+            </a:effectRef>
+            <a:fontRef idx="minor">
+              <a:schemeClr val="lt1"/>
+            </a:fontRef>
+          </p:style>
+          <p:txBody>
+            <a:bodyPr rtlCol="0" anchor="ctr"/>
+            <a:lstStyle/>
+            <a:p>
+              <a:pPr algn="ctr"/>
+              <a:endParaRPr lang="en-US"/>
+            </a:p>
+          </p:txBody>
+        </p:sp>
+      </p:grpSp>
     </p:spTree>
     <p:extLst>
       <p:ext uri="{BB962C8B-B14F-4D97-AF65-F5344CB8AC3E}">
@@ -5345,45 +5345,7 @@
                     </a:outerShdw>
                   </a:effectLst>
                 </a:rPr>
-                <a:t>When head is </a:t>
-              </a:r>
-              <a:r>
-                <a:rPr lang="en-US" sz="13800" b="1" spc="300" dirty="0" smtClean="0">
-                  <a:ln w="12700">
-                    <a:noFill/>
-                    <a:prstDash val="solid"/>
-                  </a:ln>
-                  <a:solidFill>
-                    <a:schemeClr val="accent1"/>
-                  </a:solidFill>
-                  <a:effectLst>
-                    <a:outerShdw blurRad="41275" dist="20320" dir="1800000" algn="tl" rotWithShape="0">
-                      <a:srgbClr val="000000">
-                        <a:alpha val="40000"/>
-                      </a:srgbClr>
-                    </a:outerShdw>
-                  </a:effectLst>
-                </a:rPr>
-                <a:t>straight, </a:t>
-              </a:r>
-              <a:r>
-                <a:rPr lang="en-US" sz="13800" b="1" spc="300" dirty="0" smtClean="0">
-                  <a:ln w="12700">
-                    <a:noFill/>
-                    <a:prstDash val="solid"/>
-                  </a:ln>
-                  <a:solidFill>
-                    <a:schemeClr val="accent1"/>
-                  </a:solidFill>
-                  <a:effectLst>
-                    <a:outerShdw blurRad="41275" dist="20320" dir="1800000" algn="tl" rotWithShape="0">
-                      <a:srgbClr val="000000">
-                        <a:alpha val="40000"/>
-                      </a:srgbClr>
-                    </a:outerShdw>
-                  </a:effectLst>
-                </a:rPr>
-                <a:t>press </a:t>
+                <a:t>When head is straight, press </a:t>
               </a:r>
               <a:r>
                 <a:rPr lang="en-US" sz="13800" b="1" spc="300" dirty="0" smtClean="0">
@@ -5480,94 +5442,6 @@
             </a:p>
           </p:txBody>
         </p:sp>
-        <p:grpSp>
-          <p:nvGrpSpPr>
-            <p:cNvPr id="10" name="Grouper 9"/>
-            <p:cNvGrpSpPr/>
-            <p:nvPr/>
-          </p:nvGrpSpPr>
-          <p:grpSpPr>
-            <a:xfrm>
-              <a:off x="7630464" y="6243112"/>
-              <a:ext cx="3195578" cy="5962744"/>
-              <a:chOff x="7630464" y="6243112"/>
-              <a:chExt cx="3195578" cy="5962744"/>
-            </a:xfrm>
-          </p:grpSpPr>
-          <p:pic>
-            <p:nvPicPr>
-              <p:cNvPr id="11" name="Image 10" descr="OculusRemoteControl_Camera001_Beauty001.jpg5b0ba155-2aba-4e81-8c1b-dd7f1ad1d005Original.jpg"/>
-              <p:cNvPicPr>
-                <a:picLocks noChangeAspect="1"/>
-              </p:cNvPicPr>
-              <p:nvPr/>
-            </p:nvPicPr>
-            <p:blipFill rotWithShape="1">
-              <a:blip r:embed="rId2">
-                <a:extLst>
-                  <a:ext uri="{28A0092B-C50C-407E-A947-70E740481C1C}">
-                    <a14:useLocalDpi xmlns:a14="http://schemas.microsoft.com/office/drawing/2010/main" val="0"/>
-                  </a:ext>
-                </a:extLst>
-              </a:blip>
-              <a:srcRect l="36035" r="34996"/>
-              <a:stretch/>
-            </p:blipFill>
-            <p:spPr>
-              <a:xfrm>
-                <a:off x="7630464" y="6243112"/>
-                <a:ext cx="3195578" cy="5962744"/>
-              </a:xfrm>
-              <a:prstGeom prst="rect">
-                <a:avLst/>
-              </a:prstGeom>
-            </p:spPr>
-          </p:pic>
-          <p:sp>
-            <p:nvSpPr>
-              <p:cNvPr id="12" name="Ellipse 11"/>
-              <p:cNvSpPr/>
-              <p:nvPr/>
-            </p:nvSpPr>
-            <p:spPr>
-              <a:xfrm>
-                <a:off x="8412657" y="6848531"/>
-                <a:ext cx="1497843" cy="1497843"/>
-              </a:xfrm>
-              <a:prstGeom prst="ellipse">
-                <a:avLst/>
-              </a:prstGeom>
-              <a:noFill/>
-              <a:ln w="76200" cmpd="sng">
-                <a:solidFill>
-                  <a:schemeClr val="accent2"/>
-                </a:solidFill>
-              </a:ln>
-            </p:spPr>
-            <p:style>
-              <a:lnRef idx="1">
-                <a:schemeClr val="accent1"/>
-              </a:lnRef>
-              <a:fillRef idx="3">
-                <a:schemeClr val="accent1"/>
-              </a:fillRef>
-              <a:effectRef idx="2">
-                <a:schemeClr val="accent1"/>
-              </a:effectRef>
-              <a:fontRef idx="minor">
-                <a:schemeClr val="lt1"/>
-              </a:fontRef>
-            </p:style>
-            <p:txBody>
-              <a:bodyPr rtlCol="0" anchor="ctr"/>
-              <a:lstStyle/>
-              <a:p>
-                <a:pPr algn="ctr"/>
-                <a:endParaRPr lang="en-US"/>
-              </a:p>
-            </p:txBody>
-          </p:sp>
-        </p:grpSp>
       </p:grpSp>
       <p:sp>
         <p:nvSpPr>
@@ -5631,6 +5505,94 @@
           </a:p>
         </p:txBody>
       </p:sp>
+      <p:grpSp>
+        <p:nvGrpSpPr>
+          <p:cNvPr id="13" name="Grouper 12"/>
+          <p:cNvGrpSpPr/>
+          <p:nvPr/>
+        </p:nvGrpSpPr>
+        <p:grpSpPr>
+          <a:xfrm>
+            <a:off x="7630464" y="6243112"/>
+            <a:ext cx="3195578" cy="5962744"/>
+            <a:chOff x="7630464" y="6243112"/>
+            <a:chExt cx="3195578" cy="5962744"/>
+          </a:xfrm>
+        </p:grpSpPr>
+        <p:pic>
+          <p:nvPicPr>
+            <p:cNvPr id="14" name="Image 13" descr="OculusRemoteControl_Camera001_Beauty001.jpg5b0ba155-2aba-4e81-8c1b-dd7f1ad1d005Original.jpg"/>
+            <p:cNvPicPr>
+              <a:picLocks noChangeAspect="1"/>
+            </p:cNvPicPr>
+            <p:nvPr/>
+          </p:nvPicPr>
+          <p:blipFill rotWithShape="1">
+            <a:blip r:embed="rId2">
+              <a:extLst>
+                <a:ext uri="{28A0092B-C50C-407E-A947-70E740481C1C}">
+                  <a14:useLocalDpi xmlns:a14="http://schemas.microsoft.com/office/drawing/2010/main" val="0"/>
+                </a:ext>
+              </a:extLst>
+            </a:blip>
+            <a:srcRect l="36035" r="34996"/>
+            <a:stretch/>
+          </p:blipFill>
+          <p:spPr>
+            <a:xfrm>
+              <a:off x="7630464" y="6243112"/>
+              <a:ext cx="3195578" cy="5962744"/>
+            </a:xfrm>
+            <a:prstGeom prst="rect">
+              <a:avLst/>
+            </a:prstGeom>
+          </p:spPr>
+        </p:pic>
+        <p:sp>
+          <p:nvSpPr>
+            <p:cNvPr id="15" name="Ellipse 14"/>
+            <p:cNvSpPr/>
+            <p:nvPr/>
+          </p:nvSpPr>
+          <p:spPr>
+            <a:xfrm>
+              <a:off x="8412657" y="6848531"/>
+              <a:ext cx="1497843" cy="1497843"/>
+            </a:xfrm>
+            <a:prstGeom prst="ellipse">
+              <a:avLst/>
+            </a:prstGeom>
+            <a:noFill/>
+            <a:ln w="304800" cmpd="sng">
+              <a:solidFill>
+                <a:schemeClr val="accent2"/>
+              </a:solidFill>
+            </a:ln>
+          </p:spPr>
+          <p:style>
+            <a:lnRef idx="1">
+              <a:schemeClr val="accent1"/>
+            </a:lnRef>
+            <a:fillRef idx="3">
+              <a:schemeClr val="accent1"/>
+            </a:fillRef>
+            <a:effectRef idx="2">
+              <a:schemeClr val="accent1"/>
+            </a:effectRef>
+            <a:fontRef idx="minor">
+              <a:schemeClr val="lt1"/>
+            </a:fontRef>
+          </p:style>
+          <p:txBody>
+            <a:bodyPr rtlCol="0" anchor="ctr"/>
+            <a:lstStyle/>
+            <a:p>
+              <a:pPr algn="ctr"/>
+              <a:endParaRPr lang="en-US"/>
+            </a:p>
+          </p:txBody>
+        </p:sp>
+      </p:grpSp>
     </p:spTree>
     <p:extLst>
       <p:ext uri="{BB962C8B-B14F-4D97-AF65-F5344CB8AC3E}">
@@ -5860,45 +5822,7 @@
                   </a:outerShdw>
                 </a:effectLst>
               </a:rPr>
-              <a:t>  then doff </a:t>
-            </a:r>
-            <a:r>
-              <a:rPr lang="en-US" sz="13800" b="1" spc="-150" dirty="0" smtClean="0">
-                <a:ln w="12700">
-                  <a:noFill/>
-                  <a:prstDash val="solid"/>
-                </a:ln>
-                <a:solidFill>
-                  <a:schemeClr val="accent1"/>
-                </a:solidFill>
-                <a:effectLst>
-                  <a:outerShdw blurRad="41275" dist="20320" dir="1800000" algn="tl" rotWithShape="0">
-                    <a:srgbClr val="000000">
-                      <a:alpha val="40000"/>
-                    </a:srgbClr>
-                  </a:outerShdw>
-                </a:effectLst>
-              </a:rPr>
-              <a:t>Virtual Reality </a:t>
-            </a:r>
-            <a:r>
-              <a:rPr lang="en-US" sz="13800" b="1" spc="-150" dirty="0" smtClean="0">
-                <a:ln w="12700">
-                  <a:noFill/>
-                  <a:prstDash val="solid"/>
-                </a:ln>
-                <a:solidFill>
-                  <a:schemeClr val="accent1"/>
-                </a:solidFill>
-                <a:effectLst>
-                  <a:outerShdw blurRad="41275" dist="20320" dir="1800000" algn="tl" rotWithShape="0">
-                    <a:srgbClr val="000000">
-                      <a:alpha val="40000"/>
-                    </a:srgbClr>
-                  </a:outerShdw>
-                </a:effectLst>
-              </a:rPr>
-              <a:t>Helmet. </a:t>
+              <a:t>  then doff Virtual Reality Helmet. </a:t>
             </a:r>
             <a:endParaRPr lang="en-US" sz="13800" b="1" spc="-150" dirty="0">
               <a:ln w="12700">
@@ -5919,79 +5843,94 @@
           </a:p>
         </p:txBody>
       </p:sp>
-      <p:pic>
-        <p:nvPicPr>
-          <p:cNvPr id="6" name="Image 5" descr="OculusRemoteControl_Camera001_Beauty001.jpg5b0ba155-2aba-4e81-8c1b-dd7f1ad1d005Original.jpg"/>
-          <p:cNvPicPr>
-            <a:picLocks noChangeAspect="1"/>
-          </p:cNvPicPr>
+      <p:grpSp>
+        <p:nvGrpSpPr>
+          <p:cNvPr id="7" name="Grouper 6"/>
+          <p:cNvGrpSpPr/>
           <p:nvPr/>
-        </p:nvPicPr>
-        <p:blipFill rotWithShape="1">
-          <a:blip r:embed="rId2">
-            <a:extLst>
-              <a:ext uri="{28A0092B-C50C-407E-A947-70E740481C1C}">
-                <a14:useLocalDpi xmlns:a14="http://schemas.microsoft.com/office/drawing/2010/main" val="0"/>
-              </a:ext>
-            </a:extLst>
-          </a:blip>
-          <a:srcRect l="36035" r="34996"/>
-          <a:stretch/>
-        </p:blipFill>
-        <p:spPr>
+        </p:nvGrpSpPr>
+        <p:grpSpPr>
           <a:xfrm>
             <a:off x="7630464" y="6243112"/>
             <a:ext cx="3195578" cy="5962744"/>
+            <a:chOff x="7630464" y="6243112"/>
+            <a:chExt cx="3195578" cy="5962744"/>
           </a:xfrm>
-          <a:prstGeom prst="rect">
-            <a:avLst/>
-          </a:prstGeom>
-        </p:spPr>
-      </p:pic>
-      <p:sp>
-        <p:nvSpPr>
-          <p:cNvPr id="8" name="Ellipse 7"/>
-          <p:cNvSpPr/>
-          <p:nvPr/>
-        </p:nvSpPr>
-        <p:spPr>
-          <a:xfrm>
-            <a:off x="8412657" y="6848531"/>
-            <a:ext cx="1497843" cy="1497843"/>
-          </a:xfrm>
-          <a:prstGeom prst="ellipse">
-            <a:avLst/>
-          </a:prstGeom>
-          <a:noFill/>
-          <a:ln w="76200" cmpd="sng">
-            <a:solidFill>
-              <a:schemeClr val="accent2"/>
-            </a:solidFill>
-          </a:ln>
-        </p:spPr>
-        <p:style>
-          <a:lnRef idx="1">
-            <a:schemeClr val="accent1"/>
-          </a:lnRef>
-          <a:fillRef idx="3">
-            <a:schemeClr val="accent1"/>
-          </a:fillRef>
-          <a:effectRef idx="2">
-            <a:schemeClr val="accent1"/>
-          </a:effectRef>
-          <a:fontRef idx="minor">
-            <a:schemeClr val="lt1"/>
-          </a:fontRef>
-        </p:style>
-        <p:txBody>
-          <a:bodyPr rtlCol="0" anchor="ctr"/>
-          <a:lstStyle/>
-          <a:p>
-            <a:pPr algn="ctr"/>
-            <a:endParaRPr lang="en-US"/>
-          </a:p>
-        </p:txBody>
-      </p:sp>
+        </p:grpSpPr>
+        <p:pic>
+          <p:nvPicPr>
+            <p:cNvPr id="9" name="Image 8" descr="OculusRemoteControl_Camera001_Beauty001.jpg5b0ba155-2aba-4e81-8c1b-dd7f1ad1d005Original.jpg"/>
+            <p:cNvPicPr>
+              <a:picLocks noChangeAspect="1"/>
+            </p:cNvPicPr>
+            <p:nvPr/>
+          </p:nvPicPr>
+          <p:blipFill rotWithShape="1">
+            <a:blip r:embed="rId2">
+              <a:extLst>
+                <a:ext uri="{28A0092B-C50C-407E-A947-70E740481C1C}">
+                  <a14:useLocalDpi xmlns:a14="http://schemas.microsoft.com/office/drawing/2010/main" val="0"/>
+                </a:ext>
+              </a:extLst>
+            </a:blip>
+            <a:srcRect l="36035" r="34996"/>
+            <a:stretch/>
+          </p:blipFill>
+          <p:spPr>
+            <a:xfrm>
+              <a:off x="7630464" y="6243112"/>
+              <a:ext cx="3195578" cy="5962744"/>
+            </a:xfrm>
+            <a:prstGeom prst="rect">
+              <a:avLst/>
+            </a:prstGeom>
+          </p:spPr>
+        </p:pic>
+        <p:sp>
+          <p:nvSpPr>
+            <p:cNvPr id="10" name="Ellipse 9"/>
+            <p:cNvSpPr/>
+            <p:nvPr/>
+          </p:nvSpPr>
+          <p:spPr>
+            <a:xfrm>
+              <a:off x="8412657" y="6848531"/>
+              <a:ext cx="1497843" cy="1497843"/>
+            </a:xfrm>
+            <a:prstGeom prst="ellipse">
+              <a:avLst/>
+            </a:prstGeom>
+            <a:noFill/>
+            <a:ln w="304800" cmpd="sng">
+              <a:solidFill>
+                <a:schemeClr val="accent2"/>
+              </a:solidFill>
+            </a:ln>
+          </p:spPr>
+          <p:style>
+            <a:lnRef idx="1">
+              <a:schemeClr val="accent1"/>
+            </a:lnRef>
+            <a:fillRef idx="3">
+              <a:schemeClr val="accent1"/>
+            </a:fillRef>
+            <a:effectRef idx="2">
+              <a:schemeClr val="accent1"/>
+            </a:effectRef>
+            <a:fontRef idx="minor">
+              <a:schemeClr val="lt1"/>
+            </a:fontRef>
+          </p:style>
+          <p:txBody>
+            <a:bodyPr rtlCol="0" anchor="ctr"/>
+            <a:lstStyle/>
+            <a:p>
+              <a:pPr algn="ctr"/>
+              <a:endParaRPr lang="en-US"/>
+            </a:p>
+          </p:txBody>
+        </p:sp>
+      </p:grpSp>
     </p:spTree>
     <p:extLst>
       <p:ext uri="{BB962C8B-B14F-4D97-AF65-F5344CB8AC3E}">
@@ -6242,45 +6181,7 @@
                   </a:outerShdw>
                 </a:effectLst>
               </a:rPr>
-              <a:t>to </a:t>
-            </a:r>
-            <a:r>
-              <a:rPr lang="en-US" sz="13800" b="1" spc="-150" dirty="0" smtClean="0">
-                <a:ln w="12700">
-                  <a:noFill/>
-                  <a:prstDash val="solid"/>
-                </a:ln>
-                <a:solidFill>
-                  <a:schemeClr val="accent1"/>
-                </a:solidFill>
-                <a:effectLst>
-                  <a:outerShdw blurRad="41275" dist="20320" dir="1800000" algn="tl" rotWithShape="0">
-                    <a:srgbClr val="000000">
-                      <a:alpha val="40000"/>
-                    </a:srgbClr>
-                  </a:outerShdw>
-                </a:effectLst>
-              </a:rPr>
-              <a:t>terminate</a:t>
-            </a:r>
-            <a:r>
-              <a:rPr lang="en-US" sz="13800" b="1" spc="-150" dirty="0" smtClean="0">
-                <a:ln w="12700">
-                  <a:noFill/>
-                  <a:prstDash val="solid"/>
-                </a:ln>
-                <a:solidFill>
-                  <a:schemeClr val="accent1"/>
-                </a:solidFill>
-                <a:effectLst>
-                  <a:outerShdw blurRad="41275" dist="20320" dir="1800000" algn="tl" rotWithShape="0">
-                    <a:srgbClr val="000000">
-                      <a:alpha val="40000"/>
-                    </a:srgbClr>
-                  </a:outerShdw>
-                </a:effectLst>
-              </a:rPr>
-              <a:t>. </a:t>
+              <a:t>to terminate. </a:t>
             </a:r>
             <a:endParaRPr lang="en-US" sz="13800" b="1" spc="-150" dirty="0">
               <a:ln w="12700">
@@ -6301,79 +6202,94 @@
           </a:p>
         </p:txBody>
       </p:sp>
-      <p:pic>
-        <p:nvPicPr>
-          <p:cNvPr id="8" name="Image 7" descr="OculusRemoteControl_Camera001_Beauty001.jpg5b0ba155-2aba-4e81-8c1b-dd7f1ad1d005Original.jpg"/>
-          <p:cNvPicPr>
-            <a:picLocks noChangeAspect="1"/>
-          </p:cNvPicPr>
+      <p:grpSp>
+        <p:nvGrpSpPr>
+          <p:cNvPr id="7" name="Grouper 6"/>
+          <p:cNvGrpSpPr/>
           <p:nvPr/>
-        </p:nvPicPr>
-        <p:blipFill rotWithShape="1">
-          <a:blip r:embed="rId2">
-            <a:extLst>
-              <a:ext uri="{28A0092B-C50C-407E-A947-70E740481C1C}">
-                <a14:useLocalDpi xmlns:a14="http://schemas.microsoft.com/office/drawing/2010/main" val="0"/>
-              </a:ext>
-            </a:extLst>
-          </a:blip>
-          <a:srcRect l="36035" r="34996"/>
-          <a:stretch/>
-        </p:blipFill>
-        <p:spPr>
+        </p:nvGrpSpPr>
+        <p:grpSpPr>
           <a:xfrm>
             <a:off x="7630464" y="6243112"/>
             <a:ext cx="3195578" cy="5962744"/>
+            <a:chOff x="7630464" y="6243112"/>
+            <a:chExt cx="3195578" cy="5962744"/>
           </a:xfrm>
-          <a:prstGeom prst="rect">
-            <a:avLst/>
-          </a:prstGeom>
-        </p:spPr>
-      </p:pic>
-      <p:sp>
-        <p:nvSpPr>
-          <p:cNvPr id="9" name="Ellipse 8"/>
-          <p:cNvSpPr/>
-          <p:nvPr/>
-        </p:nvSpPr>
-        <p:spPr>
-          <a:xfrm>
-            <a:off x="8412657" y="6848531"/>
-            <a:ext cx="1497843" cy="1497843"/>
-          </a:xfrm>
-          <a:prstGeom prst="ellipse">
-            <a:avLst/>
-          </a:prstGeom>
-          <a:noFill/>
-          <a:ln w="76200" cmpd="sng">
-            <a:solidFill>
-              <a:schemeClr val="accent2"/>
-            </a:solidFill>
-          </a:ln>
-        </p:spPr>
-        <p:style>
-          <a:lnRef idx="1">
-            <a:schemeClr val="accent1"/>
-          </a:lnRef>
-          <a:fillRef idx="3">
-            <a:schemeClr val="accent1"/>
-          </a:fillRef>
-          <a:effectRef idx="2">
-            <a:schemeClr val="accent1"/>
-          </a:effectRef>
-          <a:fontRef idx="minor">
-            <a:schemeClr val="lt1"/>
-          </a:fontRef>
-        </p:style>
-        <p:txBody>
-          <a:bodyPr rtlCol="0" anchor="ctr"/>
-          <a:lstStyle/>
-          <a:p>
-            <a:pPr algn="ctr"/>
-            <a:endParaRPr lang="en-US"/>
-          </a:p>
-        </p:txBody>
-      </p:sp>
+        </p:grpSpPr>
+        <p:pic>
+          <p:nvPicPr>
+            <p:cNvPr id="10" name="Image 9" descr="OculusRemoteControl_Camera001_Beauty001.jpg5b0ba155-2aba-4e81-8c1b-dd7f1ad1d005Original.jpg"/>
+            <p:cNvPicPr>
+              <a:picLocks noChangeAspect="1"/>
+            </p:cNvPicPr>
+            <p:nvPr/>
+          </p:nvPicPr>
+          <p:blipFill rotWithShape="1">
+            <a:blip r:embed="rId2">
+              <a:extLst>
+                <a:ext uri="{28A0092B-C50C-407E-A947-70E740481C1C}">
+                  <a14:useLocalDpi xmlns:a14="http://schemas.microsoft.com/office/drawing/2010/main" val="0"/>
+                </a:ext>
+              </a:extLst>
+            </a:blip>
+            <a:srcRect l="36035" r="34996"/>
+            <a:stretch/>
+          </p:blipFill>
+          <p:spPr>
+            <a:xfrm>
+              <a:off x="7630464" y="6243112"/>
+              <a:ext cx="3195578" cy="5962744"/>
+            </a:xfrm>
+            <a:prstGeom prst="rect">
+              <a:avLst/>
+            </a:prstGeom>
+          </p:spPr>
+        </p:pic>
+        <p:sp>
+          <p:nvSpPr>
+            <p:cNvPr id="11" name="Ellipse 10"/>
+            <p:cNvSpPr/>
+            <p:nvPr/>
+          </p:nvSpPr>
+          <p:spPr>
+            <a:xfrm>
+              <a:off x="8412657" y="6848531"/>
+              <a:ext cx="1497843" cy="1497843"/>
+            </a:xfrm>
+            <a:prstGeom prst="ellipse">
+              <a:avLst/>
+            </a:prstGeom>
+            <a:noFill/>
+            <a:ln w="304800" cmpd="sng">
+              <a:solidFill>
+                <a:schemeClr val="accent2"/>
+              </a:solidFill>
+            </a:ln>
+          </p:spPr>
+          <p:style>
+            <a:lnRef idx="1">
+              <a:schemeClr val="accent1"/>
+            </a:lnRef>
+            <a:fillRef idx="3">
+              <a:schemeClr val="accent1"/>
+            </a:fillRef>
+            <a:effectRef idx="2">
+              <a:schemeClr val="accent1"/>
+            </a:effectRef>
+            <a:fontRef idx="minor">
+              <a:schemeClr val="lt1"/>
+            </a:fontRef>
+          </p:style>
+          <p:txBody>
+            <a:bodyPr rtlCol="0" anchor="ctr"/>
+            <a:lstStyle/>
+            <a:p>
+              <a:pPr algn="ctr"/>
+              <a:endParaRPr lang="en-US"/>
+            </a:p>
+          </p:txBody>
+        </p:sp>
+      </p:grpSp>
     </p:spTree>
     <p:extLst>
       <p:ext uri="{BB962C8B-B14F-4D97-AF65-F5344CB8AC3E}">
@@ -6614,94 +6530,6 @@
             </a:p>
           </p:txBody>
         </p:sp>
-        <p:grpSp>
-          <p:nvGrpSpPr>
-            <p:cNvPr id="10" name="Grouper 9"/>
-            <p:cNvGrpSpPr/>
-            <p:nvPr/>
-          </p:nvGrpSpPr>
-          <p:grpSpPr>
-            <a:xfrm>
-              <a:off x="7630464" y="6243112"/>
-              <a:ext cx="3195578" cy="5962744"/>
-              <a:chOff x="7630464" y="6243112"/>
-              <a:chExt cx="3195578" cy="5962744"/>
-            </a:xfrm>
-          </p:grpSpPr>
-          <p:pic>
-            <p:nvPicPr>
-              <p:cNvPr id="11" name="Image 10" descr="OculusRemoteControl_Camera001_Beauty001.jpg5b0ba155-2aba-4e81-8c1b-dd7f1ad1d005Original.jpg"/>
-              <p:cNvPicPr>
-                <a:picLocks noChangeAspect="1"/>
-              </p:cNvPicPr>
-              <p:nvPr/>
-            </p:nvPicPr>
-            <p:blipFill rotWithShape="1">
-              <a:blip r:embed="rId2">
-                <a:extLst>
-                  <a:ext uri="{28A0092B-C50C-407E-A947-70E740481C1C}">
-                    <a14:useLocalDpi xmlns:a14="http://schemas.microsoft.com/office/drawing/2010/main" val="0"/>
-                  </a:ext>
-                </a:extLst>
-              </a:blip>
-              <a:srcRect l="36035" r="34996"/>
-              <a:stretch/>
-            </p:blipFill>
-            <p:spPr>
-              <a:xfrm>
-                <a:off x="7630464" y="6243112"/>
-                <a:ext cx="3195578" cy="5962744"/>
-              </a:xfrm>
-              <a:prstGeom prst="rect">
-                <a:avLst/>
-              </a:prstGeom>
-            </p:spPr>
-          </p:pic>
-          <p:sp>
-            <p:nvSpPr>
-              <p:cNvPr id="12" name="Ellipse 11"/>
-              <p:cNvSpPr/>
-              <p:nvPr/>
-            </p:nvSpPr>
-            <p:spPr>
-              <a:xfrm>
-                <a:off x="8412657" y="6848531"/>
-                <a:ext cx="1497843" cy="1497843"/>
-              </a:xfrm>
-              <a:prstGeom prst="ellipse">
-                <a:avLst/>
-              </a:prstGeom>
-              <a:noFill/>
-              <a:ln w="76200" cmpd="sng">
-                <a:solidFill>
-                  <a:schemeClr val="accent2"/>
-                </a:solidFill>
-              </a:ln>
-            </p:spPr>
-            <p:style>
-              <a:lnRef idx="1">
-                <a:schemeClr val="accent1"/>
-              </a:lnRef>
-              <a:fillRef idx="3">
-                <a:schemeClr val="accent1"/>
-              </a:fillRef>
-              <a:effectRef idx="2">
-                <a:schemeClr val="accent1"/>
-              </a:effectRef>
-              <a:fontRef idx="minor">
-                <a:schemeClr val="lt1"/>
-              </a:fontRef>
-            </p:style>
-            <p:txBody>
-              <a:bodyPr rtlCol="0" anchor="ctr"/>
-              <a:lstStyle/>
-              <a:p>
-                <a:pPr algn="ctr"/>
-                <a:endParaRPr lang="en-US"/>
-              </a:p>
-            </p:txBody>
-          </p:sp>
-        </p:grpSp>
       </p:grpSp>
       <p:sp>
         <p:nvSpPr>
@@ -6761,6 +6589,94 @@
           </a:p>
         </p:txBody>
       </p:sp>
+      <p:grpSp>
+        <p:nvGrpSpPr>
+          <p:cNvPr id="13" name="Grouper 12"/>
+          <p:cNvGrpSpPr/>
+          <p:nvPr/>
+        </p:nvGrpSpPr>
+        <p:grpSpPr>
+          <a:xfrm>
+            <a:off x="7630464" y="6243112"/>
+            <a:ext cx="3195578" cy="5962744"/>
+            <a:chOff x="7630464" y="6243112"/>
+            <a:chExt cx="3195578" cy="5962744"/>
+          </a:xfrm>
+        </p:grpSpPr>
+        <p:pic>
+          <p:nvPicPr>
+            <p:cNvPr id="14" name="Image 13" descr="OculusRemoteControl_Camera001_Beauty001.jpg5b0ba155-2aba-4e81-8c1b-dd7f1ad1d005Original.jpg"/>
+            <p:cNvPicPr>
+              <a:picLocks noChangeAspect="1"/>
+            </p:cNvPicPr>
+            <p:nvPr/>
+          </p:nvPicPr>
+          <p:blipFill rotWithShape="1">
+            <a:blip r:embed="rId2">
+              <a:extLst>
+                <a:ext uri="{28A0092B-C50C-407E-A947-70E740481C1C}">
+                  <a14:useLocalDpi xmlns:a14="http://schemas.microsoft.com/office/drawing/2010/main" val="0"/>
+                </a:ext>
+              </a:extLst>
+            </a:blip>
+            <a:srcRect l="36035" r="34996"/>
+            <a:stretch/>
+          </p:blipFill>
+          <p:spPr>
+            <a:xfrm>
+              <a:off x="7630464" y="6243112"/>
+              <a:ext cx="3195578" cy="5962744"/>
+            </a:xfrm>
+            <a:prstGeom prst="rect">
+              <a:avLst/>
+            </a:prstGeom>
+          </p:spPr>
+        </p:pic>
+        <p:sp>
+          <p:nvSpPr>
+            <p:cNvPr id="15" name="Ellipse 14"/>
+            <p:cNvSpPr/>
+            <p:nvPr/>
+          </p:nvSpPr>
+          <p:spPr>
+            <a:xfrm>
+              <a:off x="8412657" y="6848531"/>
+              <a:ext cx="1497843" cy="1497843"/>
+            </a:xfrm>
+            <a:prstGeom prst="ellipse">
+              <a:avLst/>
+            </a:prstGeom>
+            <a:noFill/>
+            <a:ln w="304800" cmpd="sng">
+              <a:solidFill>
+                <a:schemeClr val="accent2"/>
+              </a:solidFill>
+            </a:ln>
+          </p:spPr>
+          <p:style>
+            <a:lnRef idx="1">
+              <a:schemeClr val="accent1"/>
+            </a:lnRef>
+            <a:fillRef idx="3">
+              <a:schemeClr val="accent1"/>
+            </a:fillRef>
+            <a:effectRef idx="2">
+              <a:schemeClr val="accent1"/>
+            </a:effectRef>
+            <a:fontRef idx="minor">
+              <a:schemeClr val="lt1"/>
+            </a:fontRef>
+          </p:style>
+          <p:txBody>
+            <a:bodyPr rtlCol="0" anchor="ctr"/>
+            <a:lstStyle/>
+            <a:p>
+              <a:pPr algn="ctr"/>
+              <a:endParaRPr lang="en-US"/>
+            </a:p>
+          </p:txBody>
+        </p:sp>
+      </p:grpSp>
     </p:spTree>
     <p:extLst>
       <p:ext uri="{BB962C8B-B14F-4D97-AF65-F5344CB8AC3E}">
@@ -7001,94 +6917,6 @@
             </a:p>
           </p:txBody>
         </p:sp>
-        <p:grpSp>
-          <p:nvGrpSpPr>
-            <p:cNvPr id="10" name="Grouper 9"/>
-            <p:cNvGrpSpPr/>
-            <p:nvPr/>
-          </p:nvGrpSpPr>
-          <p:grpSpPr>
-            <a:xfrm>
-              <a:off x="7630464" y="6243112"/>
-              <a:ext cx="3195578" cy="5962744"/>
-              <a:chOff x="7630464" y="6243112"/>
-              <a:chExt cx="3195578" cy="5962744"/>
-            </a:xfrm>
-          </p:grpSpPr>
-          <p:pic>
-            <p:nvPicPr>
-              <p:cNvPr id="11" name="Image 10" descr="OculusRemoteControl_Camera001_Beauty001.jpg5b0ba155-2aba-4e81-8c1b-dd7f1ad1d005Original.jpg"/>
-              <p:cNvPicPr>
-                <a:picLocks noChangeAspect="1"/>
-              </p:cNvPicPr>
-              <p:nvPr/>
-            </p:nvPicPr>
-            <p:blipFill rotWithShape="1">
-              <a:blip r:embed="rId2">
-                <a:extLst>
-                  <a:ext uri="{28A0092B-C50C-407E-A947-70E740481C1C}">
-                    <a14:useLocalDpi xmlns:a14="http://schemas.microsoft.com/office/drawing/2010/main" val="0"/>
-                  </a:ext>
-                </a:extLst>
-              </a:blip>
-              <a:srcRect l="36035" r="34996"/>
-              <a:stretch/>
-            </p:blipFill>
-            <p:spPr>
-              <a:xfrm>
-                <a:off x="7630464" y="6243112"/>
-                <a:ext cx="3195578" cy="5962744"/>
-              </a:xfrm>
-              <a:prstGeom prst="rect">
-                <a:avLst/>
-              </a:prstGeom>
-            </p:spPr>
-          </p:pic>
-          <p:sp>
-            <p:nvSpPr>
-              <p:cNvPr id="12" name="Ellipse 11"/>
-              <p:cNvSpPr/>
-              <p:nvPr/>
-            </p:nvSpPr>
-            <p:spPr>
-              <a:xfrm>
-                <a:off x="8412657" y="6848531"/>
-                <a:ext cx="1497843" cy="1497843"/>
-              </a:xfrm>
-              <a:prstGeom prst="ellipse">
-                <a:avLst/>
-              </a:prstGeom>
-              <a:noFill/>
-              <a:ln w="76200" cmpd="sng">
-                <a:solidFill>
-                  <a:schemeClr val="accent2"/>
-                </a:solidFill>
-              </a:ln>
-            </p:spPr>
-            <p:style>
-              <a:lnRef idx="1">
-                <a:schemeClr val="accent1"/>
-              </a:lnRef>
-              <a:fillRef idx="3">
-                <a:schemeClr val="accent1"/>
-              </a:fillRef>
-              <a:effectRef idx="2">
-                <a:schemeClr val="accent1"/>
-              </a:effectRef>
-              <a:fontRef idx="minor">
-                <a:schemeClr val="lt1"/>
-              </a:fontRef>
-            </p:style>
-            <p:txBody>
-              <a:bodyPr rtlCol="0" anchor="ctr"/>
-              <a:lstStyle/>
-              <a:p>
-                <a:pPr algn="ctr"/>
-                <a:endParaRPr lang="en-US"/>
-              </a:p>
-            </p:txBody>
-          </p:sp>
-        </p:grpSp>
       </p:grpSp>
       <p:sp>
         <p:nvSpPr>
@@ -7152,6 +6980,94 @@
           </a:p>
         </p:txBody>
       </p:sp>
+      <p:grpSp>
+        <p:nvGrpSpPr>
+          <p:cNvPr id="13" name="Grouper 12"/>
+          <p:cNvGrpSpPr/>
+          <p:nvPr/>
+        </p:nvGrpSpPr>
+        <p:grpSpPr>
+          <a:xfrm>
+            <a:off x="7630464" y="6243112"/>
+            <a:ext cx="3195578" cy="5962744"/>
+            <a:chOff x="7630464" y="6243112"/>
+            <a:chExt cx="3195578" cy="5962744"/>
+          </a:xfrm>
+        </p:grpSpPr>
+        <p:pic>
+          <p:nvPicPr>
+            <p:cNvPr id="14" name="Image 13" descr="OculusRemoteControl_Camera001_Beauty001.jpg5b0ba155-2aba-4e81-8c1b-dd7f1ad1d005Original.jpg"/>
+            <p:cNvPicPr>
+              <a:picLocks noChangeAspect="1"/>
+            </p:cNvPicPr>
+            <p:nvPr/>
+          </p:nvPicPr>
+          <p:blipFill rotWithShape="1">
+            <a:blip r:embed="rId2">
+              <a:extLst>
+                <a:ext uri="{28A0092B-C50C-407E-A947-70E740481C1C}">
+                  <a14:useLocalDpi xmlns:a14="http://schemas.microsoft.com/office/drawing/2010/main" val="0"/>
+                </a:ext>
+              </a:extLst>
+            </a:blip>
+            <a:srcRect l="36035" r="34996"/>
+            <a:stretch/>
+          </p:blipFill>
+          <p:spPr>
+            <a:xfrm>
+              <a:off x="7630464" y="6243112"/>
+              <a:ext cx="3195578" cy="5962744"/>
+            </a:xfrm>
+            <a:prstGeom prst="rect">
+              <a:avLst/>
+            </a:prstGeom>
+          </p:spPr>
+        </p:pic>
+        <p:sp>
+          <p:nvSpPr>
+            <p:cNvPr id="15" name="Ellipse 14"/>
+            <p:cNvSpPr/>
+            <p:nvPr/>
+          </p:nvSpPr>
+          <p:spPr>
+            <a:xfrm>
+              <a:off x="8412657" y="6848531"/>
+              <a:ext cx="1497843" cy="1497843"/>
+            </a:xfrm>
+            <a:prstGeom prst="ellipse">
+              <a:avLst/>
+            </a:prstGeom>
+            <a:noFill/>
+            <a:ln w="304800" cmpd="sng">
+              <a:solidFill>
+                <a:schemeClr val="accent2"/>
+              </a:solidFill>
+            </a:ln>
+          </p:spPr>
+          <p:style>
+            <a:lnRef idx="1">
+              <a:schemeClr val="accent1"/>
+            </a:lnRef>
+            <a:fillRef idx="3">
+              <a:schemeClr val="accent1"/>
+            </a:fillRef>
+            <a:effectRef idx="2">
+              <a:schemeClr val="accent1"/>
+            </a:effectRef>
+            <a:fontRef idx="minor">
+              <a:schemeClr val="lt1"/>
+            </a:fontRef>
+          </p:style>
+          <p:txBody>
+            <a:bodyPr rtlCol="0" anchor="ctr"/>
+            <a:lstStyle/>
+            <a:p>
+              <a:pPr algn="ctr"/>
+              <a:endParaRPr lang="en-US"/>
+            </a:p>
+          </p:txBody>
+        </p:sp>
+      </p:grpSp>
     </p:spTree>
     <p:extLst>
       <p:ext uri="{BB962C8B-B14F-4D97-AF65-F5344CB8AC3E}">
@@ -7182,198 +7098,90 @@
           <a:chExt cx="0" cy="0"/>
         </a:xfrm>
       </p:grpSpPr>
-      <p:grpSp>
-        <p:nvGrpSpPr>
-          <p:cNvPr id="4" name="Grouper 3"/>
-          <p:cNvGrpSpPr/>
+      <p:sp>
+        <p:nvSpPr>
+          <p:cNvPr id="5" name="Bouée 4"/>
+          <p:cNvSpPr>
+            <a:spLocks noChangeAspect="1"/>
+          </p:cNvSpPr>
           <p:nvPr/>
-        </p:nvGrpSpPr>
-        <p:grpSpPr>
+        </p:nvSpPr>
+        <p:spPr>
           <a:xfrm>
             <a:off x="1614253" y="1610484"/>
             <a:ext cx="15228000" cy="15228000"/>
-            <a:chOff x="1614253" y="1610484"/>
-            <a:chExt cx="15228000" cy="15228000"/>
           </a:xfrm>
-        </p:grpSpPr>
-        <p:sp>
-          <p:nvSpPr>
-            <p:cNvPr id="5" name="Bouée 4"/>
-            <p:cNvSpPr>
-              <a:spLocks noChangeAspect="1"/>
-            </p:cNvSpPr>
-            <p:nvPr/>
-          </p:nvSpPr>
-          <p:spPr>
-            <a:xfrm>
-              <a:off x="1614253" y="1610484"/>
-              <a:ext cx="15228000" cy="15228000"/>
-            </a:xfrm>
-            <a:prstGeom prst="donut">
+          <a:prstGeom prst="donut">
+            <a:avLst>
+              <a:gd name="adj" fmla="val 48697"/>
+            </a:avLst>
+          </a:prstGeom>
+          <a:solidFill>
+            <a:schemeClr val="bg1"/>
+          </a:solidFill>
+          <a:ln w="76200" cmpd="sng">
+            <a:noFill/>
+          </a:ln>
+        </p:spPr>
+        <p:style>
+          <a:lnRef idx="1">
+            <a:schemeClr val="accent1"/>
+          </a:lnRef>
+          <a:fillRef idx="3">
+            <a:schemeClr val="accent1"/>
+          </a:fillRef>
+          <a:effectRef idx="2">
+            <a:schemeClr val="accent1"/>
+          </a:effectRef>
+          <a:fontRef idx="minor">
+            <a:schemeClr val="lt1"/>
+          </a:fontRef>
+        </p:style>
+        <p:txBody>
+          <a:bodyPr rtlCol="0" anchor="ctr"/>
+          <a:lstStyle/>
+          <a:p>
+            <a:pPr algn="ctr"/>
+            <a:endParaRPr lang="en-US">
+              <a:solidFill>
+                <a:schemeClr val="tx1"/>
+              </a:solidFill>
+            </a:endParaRPr>
+          </a:p>
+        </p:txBody>
+      </p:sp>
+      <p:sp>
+        <p:nvSpPr>
+          <p:cNvPr id="10" name="Rectangle 9"/>
+          <p:cNvSpPr>
+            <a:spLocks noChangeAspect="1"/>
+          </p:cNvSpPr>
+          <p:nvPr/>
+        </p:nvSpPr>
+        <p:spPr>
+          <a:xfrm rot="16200000">
+            <a:off x="5257022" y="5257026"/>
+            <a:ext cx="7920006" cy="7919999"/>
+          </a:xfrm>
+          <a:prstGeom prst="rect">
+            <a:avLst/>
+          </a:prstGeom>
+          <a:noFill/>
+        </p:spPr>
+        <p:txBody>
+          <a:bodyPr wrap="none" lIns="210669" tIns="105334" rIns="210669" bIns="105334">
+            <a:prstTxWarp prst="textCircle">
               <a:avLst>
-                <a:gd name="adj" fmla="val 48697"/>
+                <a:gd name="adj" fmla="val 10916975"/>
               </a:avLst>
-            </a:prstGeom>
-            <a:solidFill>
-              <a:schemeClr val="bg1"/>
-            </a:solidFill>
-            <a:ln w="76200" cmpd="sng">
-              <a:noFill/>
-            </a:ln>
-          </p:spPr>
-          <p:style>
-            <a:lnRef idx="1">
-              <a:schemeClr val="accent1"/>
-            </a:lnRef>
-            <a:fillRef idx="3">
-              <a:schemeClr val="accent1"/>
-            </a:fillRef>
-            <a:effectRef idx="2">
-              <a:schemeClr val="accent1"/>
-            </a:effectRef>
-            <a:fontRef idx="minor">
-              <a:schemeClr val="lt1"/>
-            </a:fontRef>
-          </p:style>
-          <p:txBody>
-            <a:bodyPr rtlCol="0" anchor="ctr"/>
-            <a:lstStyle/>
-            <a:p>
-              <a:pPr algn="ctr"/>
-              <a:endParaRPr lang="en-US">
-                <a:solidFill>
-                  <a:schemeClr val="tx1"/>
-                </a:solidFill>
-              </a:endParaRPr>
-            </a:p>
-          </p:txBody>
-        </p:sp>
-        <p:sp>
-          <p:nvSpPr>
-            <p:cNvPr id="10" name="Rectangle 9"/>
-            <p:cNvSpPr>
-              <a:spLocks noChangeAspect="1"/>
-            </p:cNvSpPr>
-            <p:nvPr/>
-          </p:nvSpPr>
-          <p:spPr>
-            <a:xfrm rot="16200000">
-              <a:off x="5257022" y="5257026"/>
-              <a:ext cx="7920006" cy="7919999"/>
-            </a:xfrm>
-            <a:prstGeom prst="rect">
-              <a:avLst/>
-            </a:prstGeom>
-            <a:noFill/>
-          </p:spPr>
-          <p:txBody>
-            <a:bodyPr wrap="none" lIns="210669" tIns="105334" rIns="210669" bIns="105334">
-              <a:prstTxWarp prst="textCircle">
-                <a:avLst>
-                  <a:gd name="adj" fmla="val 10916975"/>
-                </a:avLst>
-              </a:prstTxWarp>
-              <a:spAutoFit/>
-            </a:bodyPr>
-            <a:lstStyle/>
-            <a:p>
-              <a:pPr algn="ctr"/>
-              <a:r>
-                <a:rPr lang="en-US" sz="13800" b="1" spc="300" dirty="0" smtClean="0">
-                  <a:ln w="12700">
-                    <a:noFill/>
-                    <a:prstDash val="solid"/>
-                  </a:ln>
-                  <a:solidFill>
-                    <a:schemeClr val="accent1"/>
-                  </a:solidFill>
-                  <a:effectLst>
-                    <a:outerShdw blurRad="41275" dist="20320" dir="1800000" algn="tl" rotWithShape="0">
-                      <a:srgbClr val="000000">
-                        <a:alpha val="40000"/>
-                      </a:srgbClr>
-                    </a:outerShdw>
-                  </a:effectLst>
-                </a:rPr>
-                <a:t> Press </a:t>
-              </a:r>
-              <a:r>
-                <a:rPr lang="en-US" sz="13800" b="1" spc="300" dirty="0" smtClean="0">
-                  <a:ln w="12700">
-                    <a:noFill/>
-                    <a:prstDash val="solid"/>
-                  </a:ln>
-                  <a:solidFill>
-                    <a:srgbClr val="C0504D"/>
-                  </a:solidFill>
-                  <a:effectLst>
-                    <a:outerShdw blurRad="41275" dist="20320" dir="1800000" algn="tl" rotWithShape="0">
-                      <a:srgbClr val="000000">
-                        <a:alpha val="40000"/>
-                      </a:srgbClr>
-                    </a:outerShdw>
-                  </a:effectLst>
-                </a:rPr>
-                <a:t>Select</a:t>
-              </a:r>
-              <a:r>
-                <a:rPr lang="en-US" sz="13800" b="1" spc="300" dirty="0" smtClean="0">
-                  <a:ln w="12700">
-                    <a:noFill/>
-                    <a:prstDash val="solid"/>
-                  </a:ln>
-                  <a:solidFill>
-                    <a:schemeClr val="accent1"/>
-                  </a:solidFill>
-                  <a:effectLst>
-                    <a:outerShdw blurRad="41275" dist="20320" dir="1800000" algn="tl" rotWithShape="0">
-                      <a:srgbClr val="000000">
-                        <a:alpha val="40000"/>
-                      </a:srgbClr>
-                    </a:outerShdw>
-                  </a:effectLst>
-                </a:rPr>
-                <a:t> to </a:t>
-              </a:r>
-              <a:r>
-                <a:rPr lang="en-US" sz="13800" b="1" spc="300" dirty="0">
-                  <a:ln w="12700">
-                    <a:noFill/>
-                    <a:prstDash val="solid"/>
-                  </a:ln>
-                  <a:solidFill>
-                    <a:schemeClr val="accent1"/>
-                  </a:solidFill>
-                  <a:effectLst>
-                    <a:outerShdw blurRad="41275" dist="20320" dir="1800000" algn="tl" rotWithShape="0">
-                      <a:srgbClr val="000000">
-                        <a:alpha val="40000"/>
-                      </a:srgbClr>
-                    </a:outerShdw>
-                  </a:effectLst>
-                </a:rPr>
-                <a:t>continue</a:t>
-              </a:r>
-              <a:r>
-                <a:rPr lang="en-US" sz="13800" b="1" spc="300" dirty="0" smtClean="0">
-                  <a:ln w="12700">
-                    <a:noFill/>
-                    <a:prstDash val="solid"/>
-                  </a:ln>
-                  <a:solidFill>
-                    <a:schemeClr val="accent1"/>
-                  </a:solidFill>
-                  <a:effectLst>
-                    <a:outerShdw blurRad="41275" dist="20320" dir="1800000" algn="tl" rotWithShape="0">
-                      <a:srgbClr val="000000">
-                        <a:alpha val="40000"/>
-                      </a:srgbClr>
-                    </a:outerShdw>
-                  </a:effectLst>
-                </a:rPr>
-                <a:t>.</a:t>
-              </a:r>
-              <a:endParaRPr lang="en-US" sz="13800" b="1" spc="300" dirty="0">
+            </a:prstTxWarp>
+            <a:spAutoFit/>
+          </a:bodyPr>
+          <a:lstStyle/>
+          <a:p>
+            <a:pPr algn="ctr"/>
+            <a:r>
+              <a:rPr lang="en-US" sz="13800" b="1" spc="300" dirty="0" smtClean="0">
                 <a:ln w="12700">
                   <a:noFill/>
                   <a:prstDash val="solid"/>
@@ -7388,99 +7196,104 @@
                     </a:srgbClr>
                   </a:outerShdw>
                 </a:effectLst>
-              </a:endParaRPr>
-            </a:p>
-          </p:txBody>
-        </p:sp>
-        <p:grpSp>
-          <p:nvGrpSpPr>
-            <p:cNvPr id="11" name="Grouper 10"/>
-            <p:cNvGrpSpPr/>
-            <p:nvPr/>
-          </p:nvGrpSpPr>
-          <p:grpSpPr>
-            <a:xfrm>
-              <a:off x="7630464" y="6243112"/>
-              <a:ext cx="3195578" cy="5962744"/>
-              <a:chOff x="7630464" y="6243112"/>
-              <a:chExt cx="3195578" cy="5962744"/>
-            </a:xfrm>
-          </p:grpSpPr>
-          <p:pic>
-            <p:nvPicPr>
-              <p:cNvPr id="12" name="Image 11" descr="OculusRemoteControl_Camera001_Beauty001.jpg5b0ba155-2aba-4e81-8c1b-dd7f1ad1d005Original.jpg"/>
-              <p:cNvPicPr>
-                <a:picLocks noChangeAspect="1"/>
-              </p:cNvPicPr>
-              <p:nvPr/>
-            </p:nvPicPr>
-            <p:blipFill rotWithShape="1">
-              <a:blip r:embed="rId2">
-                <a:extLst>
-                  <a:ext uri="{28A0092B-C50C-407E-A947-70E740481C1C}">
-                    <a14:useLocalDpi xmlns:a14="http://schemas.microsoft.com/office/drawing/2010/main" val="0"/>
-                  </a:ext>
-                </a:extLst>
-              </a:blip>
-              <a:srcRect l="36035" r="34996"/>
-              <a:stretch/>
-            </p:blipFill>
-            <p:spPr>
-              <a:xfrm>
-                <a:off x="7630464" y="6243112"/>
-                <a:ext cx="3195578" cy="5962744"/>
-              </a:xfrm>
-              <a:prstGeom prst="rect">
-                <a:avLst/>
-              </a:prstGeom>
-            </p:spPr>
-          </p:pic>
-          <p:sp>
-            <p:nvSpPr>
-              <p:cNvPr id="13" name="Ellipse 12"/>
-              <p:cNvSpPr/>
-              <p:nvPr/>
-            </p:nvSpPr>
-            <p:spPr>
-              <a:xfrm>
-                <a:off x="8412657" y="6848531"/>
-                <a:ext cx="1497843" cy="1497843"/>
-              </a:xfrm>
-              <a:prstGeom prst="ellipse">
-                <a:avLst/>
-              </a:prstGeom>
-              <a:noFill/>
-              <a:ln w="76200" cmpd="sng">
-                <a:solidFill>
-                  <a:schemeClr val="accent2"/>
-                </a:solidFill>
+              </a:rPr>
+              <a:t> Press </a:t>
+            </a:r>
+            <a:r>
+              <a:rPr lang="en-US" sz="13800" b="1" spc="300" dirty="0" smtClean="0">
+                <a:ln w="12700">
+                  <a:noFill/>
+                  <a:prstDash val="solid"/>
+                </a:ln>
+                <a:solidFill>
+                  <a:srgbClr val="C0504D"/>
+                </a:solidFill>
+                <a:effectLst>
+                  <a:outerShdw blurRad="41275" dist="20320" dir="1800000" algn="tl" rotWithShape="0">
+                    <a:srgbClr val="000000">
+                      <a:alpha val="40000"/>
+                    </a:srgbClr>
+                  </a:outerShdw>
+                </a:effectLst>
+              </a:rPr>
+              <a:t>Select</a:t>
+            </a:r>
+            <a:r>
+              <a:rPr lang="en-US" sz="13800" b="1" spc="300" dirty="0" smtClean="0">
+                <a:ln w="12700">
+                  <a:noFill/>
+                  <a:prstDash val="solid"/>
+                </a:ln>
+                <a:solidFill>
+                  <a:schemeClr val="accent1"/>
+                </a:solidFill>
+                <a:effectLst>
+                  <a:outerShdw blurRad="41275" dist="20320" dir="1800000" algn="tl" rotWithShape="0">
+                    <a:srgbClr val="000000">
+                      <a:alpha val="40000"/>
+                    </a:srgbClr>
+                  </a:outerShdw>
+                </a:effectLst>
+              </a:rPr>
+              <a:t> to </a:t>
+            </a:r>
+            <a:r>
+              <a:rPr lang="en-US" sz="13800" b="1" spc="300" dirty="0">
+                <a:ln w="12700">
+                  <a:noFill/>
+                  <a:prstDash val="solid"/>
+                </a:ln>
+                <a:solidFill>
+                  <a:schemeClr val="accent1"/>
+                </a:solidFill>
+                <a:effectLst>
+                  <a:outerShdw blurRad="41275" dist="20320" dir="1800000" algn="tl" rotWithShape="0">
+                    <a:srgbClr val="000000">
+                      <a:alpha val="40000"/>
+                    </a:srgbClr>
+                  </a:outerShdw>
+                </a:effectLst>
+              </a:rPr>
+              <a:t>continue</a:t>
+            </a:r>
+            <a:r>
+              <a:rPr lang="en-US" sz="13800" b="1" spc="300" dirty="0" smtClean="0">
+                <a:ln w="12700">
+                  <a:noFill/>
+                  <a:prstDash val="solid"/>
+                </a:ln>
+                <a:solidFill>
+                  <a:schemeClr val="accent1"/>
+                </a:solidFill>
+                <a:effectLst>
+                  <a:outerShdw blurRad="41275" dist="20320" dir="1800000" algn="tl" rotWithShape="0">
+                    <a:srgbClr val="000000">
+                      <a:alpha val="40000"/>
+                    </a:srgbClr>
+                  </a:outerShdw>
+                </a:effectLst>
+              </a:rPr>
+              <a:t>.</a:t>
+            </a:r>
+            <a:endParaRPr lang="en-US" sz="13800" b="1" spc="300" dirty="0">
+              <a:ln w="12700">
+                <a:noFill/>
+                <a:prstDash val="solid"/>
               </a:ln>
-            </p:spPr>
-            <p:style>
-              <a:lnRef idx="1">
+              <a:solidFill>
                 <a:schemeClr val="accent1"/>
-              </a:lnRef>
-              <a:fillRef idx="3">
-                <a:schemeClr val="accent1"/>
-              </a:fillRef>
-              <a:effectRef idx="2">
-                <a:schemeClr val="accent1"/>
-              </a:effectRef>
-              <a:fontRef idx="minor">
-                <a:schemeClr val="lt1"/>
-              </a:fontRef>
-            </p:style>
-            <p:txBody>
-              <a:bodyPr rtlCol="0" anchor="ctr"/>
-              <a:lstStyle/>
-              <a:p>
-                <a:pPr algn="ctr"/>
-                <a:endParaRPr lang="en-US"/>
-              </a:p>
-            </p:txBody>
-          </p:sp>
-        </p:grpSp>
-      </p:grpSp>
+              </a:solidFill>
+              <a:effectLst>
+                <a:outerShdw blurRad="41275" dist="20320" dir="1800000" algn="tl" rotWithShape="0">
+                  <a:srgbClr val="000000">
+                    <a:alpha val="40000"/>
+                  </a:srgbClr>
+                </a:outerShdw>
+              </a:effectLst>
+            </a:endParaRPr>
+          </a:p>
+        </p:txBody>
+      </p:sp>
       <p:sp>
         <p:nvSpPr>
           <p:cNvPr id="9" name="Rectangle 8"/>
@@ -7543,6 +7356,94 @@
           </a:p>
         </p:txBody>
       </p:sp>
+      <p:grpSp>
+        <p:nvGrpSpPr>
+          <p:cNvPr id="15" name="Grouper 14"/>
+          <p:cNvGrpSpPr/>
+          <p:nvPr/>
+        </p:nvGrpSpPr>
+        <p:grpSpPr>
+          <a:xfrm>
+            <a:off x="7630464" y="6243112"/>
+            <a:ext cx="3195578" cy="5962744"/>
+            <a:chOff x="7630464" y="6243112"/>
+            <a:chExt cx="3195578" cy="5962744"/>
+          </a:xfrm>
+        </p:grpSpPr>
+        <p:pic>
+          <p:nvPicPr>
+            <p:cNvPr id="16" name="Image 15" descr="OculusRemoteControl_Camera001_Beauty001.jpg5b0ba155-2aba-4e81-8c1b-dd7f1ad1d005Original.jpg"/>
+            <p:cNvPicPr>
+              <a:picLocks noChangeAspect="1"/>
+            </p:cNvPicPr>
+            <p:nvPr/>
+          </p:nvPicPr>
+          <p:blipFill rotWithShape="1">
+            <a:blip r:embed="rId2">
+              <a:extLst>
+                <a:ext uri="{28A0092B-C50C-407E-A947-70E740481C1C}">
+                  <a14:useLocalDpi xmlns:a14="http://schemas.microsoft.com/office/drawing/2010/main" val="0"/>
+                </a:ext>
+              </a:extLst>
+            </a:blip>
+            <a:srcRect l="36035" r="34996"/>
+            <a:stretch/>
+          </p:blipFill>
+          <p:spPr>
+            <a:xfrm>
+              <a:off x="7630464" y="6243112"/>
+              <a:ext cx="3195578" cy="5962744"/>
+            </a:xfrm>
+            <a:prstGeom prst="rect">
+              <a:avLst/>
+            </a:prstGeom>
+          </p:spPr>
+        </p:pic>
+        <p:sp>
+          <p:nvSpPr>
+            <p:cNvPr id="17" name="Ellipse 16"/>
+            <p:cNvSpPr/>
+            <p:nvPr/>
+          </p:nvSpPr>
+          <p:spPr>
+            <a:xfrm>
+              <a:off x="8412657" y="6848531"/>
+              <a:ext cx="1497843" cy="1497843"/>
+            </a:xfrm>
+            <a:prstGeom prst="ellipse">
+              <a:avLst/>
+            </a:prstGeom>
+            <a:noFill/>
+            <a:ln w="304800" cmpd="sng">
+              <a:solidFill>
+                <a:schemeClr val="accent2"/>
+              </a:solidFill>
+            </a:ln>
+          </p:spPr>
+          <p:style>
+            <a:lnRef idx="1">
+              <a:schemeClr val="accent1"/>
+            </a:lnRef>
+            <a:fillRef idx="3">
+              <a:schemeClr val="accent1"/>
+            </a:fillRef>
+            <a:effectRef idx="2">
+              <a:schemeClr val="accent1"/>
+            </a:effectRef>
+            <a:fontRef idx="minor">
+              <a:schemeClr val="lt1"/>
+            </a:fontRef>
+          </p:style>
+          <p:txBody>
+            <a:bodyPr rtlCol="0" anchor="ctr"/>
+            <a:lstStyle/>
+            <a:p>
+              <a:pPr algn="ctr"/>
+              <a:endParaRPr lang="en-US"/>
+            </a:p>
+          </p:txBody>
+        </p:sp>
+      </p:grpSp>
     </p:spTree>
     <p:extLst>
       <p:ext uri="{BB962C8B-B14F-4D97-AF65-F5344CB8AC3E}">
@@ -7889,7 +7790,7 @@
               <a:avLst/>
             </a:prstGeom>
             <a:noFill/>
-            <a:ln w="76200" cmpd="sng">
+            <a:ln w="203200" cmpd="sng">
               <a:solidFill>
                 <a:schemeClr val="accent2"/>
               </a:solidFill>
@@ -7937,7 +7838,7 @@
               <a:gd name="adj1" fmla="val 50000"/>
             </a:avLst>
           </a:prstGeom>
-          <a:ln w="76200" cmpd="sng">
+          <a:ln w="203200" cmpd="sng">
             <a:solidFill>
               <a:schemeClr val="accent2"/>
             </a:solidFill>
@@ -8025,7 +7926,7 @@
           <a:prstGeom prst="bentConnector3">
             <a:avLst/>
           </a:prstGeom>
-          <a:ln w="76200" cmpd="sng">
+          <a:ln w="203200" cmpd="sng">
             <a:solidFill>
               <a:srgbClr val="4BACC6"/>
             </a:solidFill>
@@ -8062,7 +7963,7 @@
             <a:avLst/>
           </a:prstGeom>
           <a:noFill/>
-          <a:ln w="76200" cmpd="sng">
+          <a:ln w="203200" cmpd="sng">
             <a:solidFill>
               <a:srgbClr val="4BACC6"/>
             </a:solidFill>
@@ -8640,94 +8541,6 @@
             </a:p>
           </p:txBody>
         </p:sp>
-        <p:grpSp>
-          <p:nvGrpSpPr>
-            <p:cNvPr id="21" name="Grouper 20"/>
-            <p:cNvGrpSpPr/>
-            <p:nvPr/>
-          </p:nvGrpSpPr>
-          <p:grpSpPr>
-            <a:xfrm>
-              <a:off x="7630464" y="6243112"/>
-              <a:ext cx="3195578" cy="5962744"/>
-              <a:chOff x="7630464" y="6243112"/>
-              <a:chExt cx="3195578" cy="5962744"/>
-            </a:xfrm>
-          </p:grpSpPr>
-          <p:pic>
-            <p:nvPicPr>
-              <p:cNvPr id="22" name="Image 21" descr="OculusRemoteControl_Camera001_Beauty001.jpg5b0ba155-2aba-4e81-8c1b-dd7f1ad1d005Original.jpg"/>
-              <p:cNvPicPr>
-                <a:picLocks noChangeAspect="1"/>
-              </p:cNvPicPr>
-              <p:nvPr/>
-            </p:nvPicPr>
-            <p:blipFill rotWithShape="1">
-              <a:blip r:embed="rId2">
-                <a:extLst>
-                  <a:ext uri="{28A0092B-C50C-407E-A947-70E740481C1C}">
-                    <a14:useLocalDpi xmlns:a14="http://schemas.microsoft.com/office/drawing/2010/main" val="0"/>
-                  </a:ext>
-                </a:extLst>
-              </a:blip>
-              <a:srcRect l="36035" r="34996"/>
-              <a:stretch/>
-            </p:blipFill>
-            <p:spPr>
-              <a:xfrm>
-                <a:off x="7630464" y="6243112"/>
-                <a:ext cx="3195578" cy="5962744"/>
-              </a:xfrm>
-              <a:prstGeom prst="rect">
-                <a:avLst/>
-              </a:prstGeom>
-            </p:spPr>
-          </p:pic>
-          <p:sp>
-            <p:nvSpPr>
-              <p:cNvPr id="23" name="Ellipse 22"/>
-              <p:cNvSpPr/>
-              <p:nvPr/>
-            </p:nvSpPr>
-            <p:spPr>
-              <a:xfrm>
-                <a:off x="8412657" y="6848531"/>
-                <a:ext cx="1497843" cy="1497843"/>
-              </a:xfrm>
-              <a:prstGeom prst="ellipse">
-                <a:avLst/>
-              </a:prstGeom>
-              <a:noFill/>
-              <a:ln w="76200" cmpd="sng">
-                <a:solidFill>
-                  <a:schemeClr val="accent2"/>
-                </a:solidFill>
-              </a:ln>
-            </p:spPr>
-            <p:style>
-              <a:lnRef idx="1">
-                <a:schemeClr val="accent1"/>
-              </a:lnRef>
-              <a:fillRef idx="3">
-                <a:schemeClr val="accent1"/>
-              </a:fillRef>
-              <a:effectRef idx="2">
-                <a:schemeClr val="accent1"/>
-              </a:effectRef>
-              <a:fontRef idx="minor">
-                <a:schemeClr val="lt1"/>
-              </a:fontRef>
-            </p:style>
-            <p:txBody>
-              <a:bodyPr rtlCol="0" anchor="ctr"/>
-              <a:lstStyle/>
-              <a:p>
-                <a:pPr algn="ctr"/>
-                <a:endParaRPr lang="en-US"/>
-              </a:p>
-            </p:txBody>
-          </p:sp>
-        </p:grpSp>
       </p:grpSp>
       <p:sp>
         <p:nvSpPr>
@@ -8791,6 +8604,94 @@
           </a:p>
         </p:txBody>
       </p:sp>
+      <p:grpSp>
+        <p:nvGrpSpPr>
+          <p:cNvPr id="11" name="Grouper 10"/>
+          <p:cNvGrpSpPr/>
+          <p:nvPr/>
+        </p:nvGrpSpPr>
+        <p:grpSpPr>
+          <a:xfrm>
+            <a:off x="7630464" y="6243112"/>
+            <a:ext cx="3195578" cy="5962744"/>
+            <a:chOff x="7630464" y="6243112"/>
+            <a:chExt cx="3195578" cy="5962744"/>
+          </a:xfrm>
+        </p:grpSpPr>
+        <p:pic>
+          <p:nvPicPr>
+            <p:cNvPr id="12" name="Image 11" descr="OculusRemoteControl_Camera001_Beauty001.jpg5b0ba155-2aba-4e81-8c1b-dd7f1ad1d005Original.jpg"/>
+            <p:cNvPicPr>
+              <a:picLocks noChangeAspect="1"/>
+            </p:cNvPicPr>
+            <p:nvPr/>
+          </p:nvPicPr>
+          <p:blipFill rotWithShape="1">
+            <a:blip r:embed="rId2">
+              <a:extLst>
+                <a:ext uri="{28A0092B-C50C-407E-A947-70E740481C1C}">
+                  <a14:useLocalDpi xmlns:a14="http://schemas.microsoft.com/office/drawing/2010/main" val="0"/>
+                </a:ext>
+              </a:extLst>
+            </a:blip>
+            <a:srcRect l="36035" r="34996"/>
+            <a:stretch/>
+          </p:blipFill>
+          <p:spPr>
+            <a:xfrm>
+              <a:off x="7630464" y="6243112"/>
+              <a:ext cx="3195578" cy="5962744"/>
+            </a:xfrm>
+            <a:prstGeom prst="rect">
+              <a:avLst/>
+            </a:prstGeom>
+          </p:spPr>
+        </p:pic>
+        <p:sp>
+          <p:nvSpPr>
+            <p:cNvPr id="13" name="Ellipse 12"/>
+            <p:cNvSpPr/>
+            <p:nvPr/>
+          </p:nvSpPr>
+          <p:spPr>
+            <a:xfrm>
+              <a:off x="8412657" y="6848531"/>
+              <a:ext cx="1497843" cy="1497843"/>
+            </a:xfrm>
+            <a:prstGeom prst="ellipse">
+              <a:avLst/>
+            </a:prstGeom>
+            <a:noFill/>
+            <a:ln w="304800" cmpd="sng">
+              <a:solidFill>
+                <a:schemeClr val="accent2"/>
+              </a:solidFill>
+            </a:ln>
+          </p:spPr>
+          <p:style>
+            <a:lnRef idx="1">
+              <a:schemeClr val="accent1"/>
+            </a:lnRef>
+            <a:fillRef idx="3">
+              <a:schemeClr val="accent1"/>
+            </a:fillRef>
+            <a:effectRef idx="2">
+              <a:schemeClr val="accent1"/>
+            </a:effectRef>
+            <a:fontRef idx="minor">
+              <a:schemeClr val="lt1"/>
+            </a:fontRef>
+          </p:style>
+          <p:txBody>
+            <a:bodyPr rtlCol="0" anchor="ctr"/>
+            <a:lstStyle/>
+            <a:p>
+              <a:pPr algn="ctr"/>
+              <a:endParaRPr lang="en-US"/>
+            </a:p>
+          </p:txBody>
+        </p:sp>
+      </p:grpSp>
     </p:spTree>
     <p:extLst>
       <p:ext uri="{BB962C8B-B14F-4D97-AF65-F5344CB8AC3E}">
@@ -8948,7 +8849,35 @@
                   <a:srgbClr val="77933C"/>
                 </a:solidFill>
               </a:rPr>
-              <a:t>Raise hand and aim at target.</a:t>
+              <a:t>Raise hand and </a:t>
+            </a:r>
+            <a:r>
+              <a:rPr lang="en-US" sz="23900" b="1" spc="-300" dirty="0" smtClean="0">
+                <a:ln w="12700">
+                  <a:solidFill>
+                    <a:srgbClr val="FFFFFF"/>
+                  </a:solidFill>
+                  <a:prstDash val="solid"/>
+                </a:ln>
+                <a:solidFill>
+                  <a:srgbClr val="77933C"/>
+                </a:solidFill>
+              </a:rPr>
+              <a:t>point down tunnel</a:t>
+            </a:r>
+            <a:r>
+              <a:rPr lang="en-US" sz="23900" b="1" spc="-300" dirty="0" smtClean="0">
+                <a:ln w="12700">
+                  <a:solidFill>
+                    <a:srgbClr val="FFFFFF"/>
+                  </a:solidFill>
+                  <a:prstDash val="solid"/>
+                </a:ln>
+                <a:solidFill>
+                  <a:srgbClr val="77933C"/>
+                </a:solidFill>
+              </a:rPr>
+              <a:t>.</a:t>
             </a:r>
             <a:endParaRPr lang="en-US" sz="23900" b="1" spc="-300" dirty="0">
               <a:ln w="12700">
@@ -9250,94 +9179,6 @@
             </a:p>
           </p:txBody>
         </p:sp>
-        <p:grpSp>
-          <p:nvGrpSpPr>
-            <p:cNvPr id="21" name="Grouper 20"/>
-            <p:cNvGrpSpPr/>
-            <p:nvPr/>
-          </p:nvGrpSpPr>
-          <p:grpSpPr>
-            <a:xfrm>
-              <a:off x="7630464" y="6243112"/>
-              <a:ext cx="3195578" cy="5962744"/>
-              <a:chOff x="7630464" y="6243112"/>
-              <a:chExt cx="3195578" cy="5962744"/>
-            </a:xfrm>
-          </p:grpSpPr>
-          <p:pic>
-            <p:nvPicPr>
-              <p:cNvPr id="22" name="Image 21" descr="OculusRemoteControl_Camera001_Beauty001.jpg5b0ba155-2aba-4e81-8c1b-dd7f1ad1d005Original.jpg"/>
-              <p:cNvPicPr>
-                <a:picLocks noChangeAspect="1"/>
-              </p:cNvPicPr>
-              <p:nvPr/>
-            </p:nvPicPr>
-            <p:blipFill rotWithShape="1">
-              <a:blip r:embed="rId2">
-                <a:extLst>
-                  <a:ext uri="{28A0092B-C50C-407E-A947-70E740481C1C}">
-                    <a14:useLocalDpi xmlns:a14="http://schemas.microsoft.com/office/drawing/2010/main" val="0"/>
-                  </a:ext>
-                </a:extLst>
-              </a:blip>
-              <a:srcRect l="36035" r="34996"/>
-              <a:stretch/>
-            </p:blipFill>
-            <p:spPr>
-              <a:xfrm>
-                <a:off x="7630464" y="6243112"/>
-                <a:ext cx="3195578" cy="5962744"/>
-              </a:xfrm>
-              <a:prstGeom prst="rect">
-                <a:avLst/>
-              </a:prstGeom>
-            </p:spPr>
-          </p:pic>
-          <p:sp>
-            <p:nvSpPr>
-              <p:cNvPr id="23" name="Ellipse 22"/>
-              <p:cNvSpPr/>
-              <p:nvPr/>
-            </p:nvSpPr>
-            <p:spPr>
-              <a:xfrm>
-                <a:off x="8412657" y="6848531"/>
-                <a:ext cx="1497843" cy="1497843"/>
-              </a:xfrm>
-              <a:prstGeom prst="ellipse">
-                <a:avLst/>
-              </a:prstGeom>
-              <a:noFill/>
-              <a:ln w="76200" cmpd="sng">
-                <a:solidFill>
-                  <a:schemeClr val="accent2"/>
-                </a:solidFill>
-              </a:ln>
-            </p:spPr>
-            <p:style>
-              <a:lnRef idx="1">
-                <a:schemeClr val="accent1"/>
-              </a:lnRef>
-              <a:fillRef idx="3">
-                <a:schemeClr val="accent1"/>
-              </a:fillRef>
-              <a:effectRef idx="2">
-                <a:schemeClr val="accent1"/>
-              </a:effectRef>
-              <a:fontRef idx="minor">
-                <a:schemeClr val="lt1"/>
-              </a:fontRef>
-            </p:style>
-            <p:txBody>
-              <a:bodyPr rtlCol="0" anchor="ctr"/>
-              <a:lstStyle/>
-              <a:p>
-                <a:pPr algn="ctr"/>
-                <a:endParaRPr lang="en-US"/>
-              </a:p>
-            </p:txBody>
-          </p:sp>
-        </p:grpSp>
       </p:grpSp>
       <p:sp>
         <p:nvSpPr>
@@ -9397,6 +9238,94 @@
           </a:p>
         </p:txBody>
       </p:sp>
+      <p:grpSp>
+        <p:nvGrpSpPr>
+          <p:cNvPr id="10" name="Grouper 9"/>
+          <p:cNvGrpSpPr/>
+          <p:nvPr/>
+        </p:nvGrpSpPr>
+        <p:grpSpPr>
+          <a:xfrm>
+            <a:off x="7630464" y="6243112"/>
+            <a:ext cx="3195578" cy="5962744"/>
+            <a:chOff x="7630464" y="6243112"/>
+            <a:chExt cx="3195578" cy="5962744"/>
+          </a:xfrm>
+        </p:grpSpPr>
+        <p:pic>
+          <p:nvPicPr>
+            <p:cNvPr id="11" name="Image 10" descr="OculusRemoteControl_Camera001_Beauty001.jpg5b0ba155-2aba-4e81-8c1b-dd7f1ad1d005Original.jpg"/>
+            <p:cNvPicPr>
+              <a:picLocks noChangeAspect="1"/>
+            </p:cNvPicPr>
+            <p:nvPr/>
+          </p:nvPicPr>
+          <p:blipFill rotWithShape="1">
+            <a:blip r:embed="rId2">
+              <a:extLst>
+                <a:ext uri="{28A0092B-C50C-407E-A947-70E740481C1C}">
+                  <a14:useLocalDpi xmlns:a14="http://schemas.microsoft.com/office/drawing/2010/main" val="0"/>
+                </a:ext>
+              </a:extLst>
+            </a:blip>
+            <a:srcRect l="36035" r="34996"/>
+            <a:stretch/>
+          </p:blipFill>
+          <p:spPr>
+            <a:xfrm>
+              <a:off x="7630464" y="6243112"/>
+              <a:ext cx="3195578" cy="5962744"/>
+            </a:xfrm>
+            <a:prstGeom prst="rect">
+              <a:avLst/>
+            </a:prstGeom>
+          </p:spPr>
+        </p:pic>
+        <p:sp>
+          <p:nvSpPr>
+            <p:cNvPr id="12" name="Ellipse 11"/>
+            <p:cNvSpPr/>
+            <p:nvPr/>
+          </p:nvSpPr>
+          <p:spPr>
+            <a:xfrm>
+              <a:off x="8412657" y="6848531"/>
+              <a:ext cx="1497843" cy="1497843"/>
+            </a:xfrm>
+            <a:prstGeom prst="ellipse">
+              <a:avLst/>
+            </a:prstGeom>
+            <a:noFill/>
+            <a:ln w="304800" cmpd="sng">
+              <a:solidFill>
+                <a:schemeClr val="accent2"/>
+              </a:solidFill>
+            </a:ln>
+          </p:spPr>
+          <p:style>
+            <a:lnRef idx="1">
+              <a:schemeClr val="accent1"/>
+            </a:lnRef>
+            <a:fillRef idx="3">
+              <a:schemeClr val="accent1"/>
+            </a:fillRef>
+            <a:effectRef idx="2">
+              <a:schemeClr val="accent1"/>
+            </a:effectRef>
+            <a:fontRef idx="minor">
+              <a:schemeClr val="lt1"/>
+            </a:fontRef>
+          </p:style>
+          <p:txBody>
+            <a:bodyPr rtlCol="0" anchor="ctr"/>
+            <a:lstStyle/>
+            <a:p>
+              <a:pPr algn="ctr"/>
+              <a:endParaRPr lang="en-US"/>
+            </a:p>
+          </p:txBody>
+        </p:sp>
+      </p:grpSp>
     </p:spTree>
     <p:extLst>
       <p:ext uri="{BB962C8B-B14F-4D97-AF65-F5344CB8AC3E}">
@@ -9637,94 +9566,6 @@
             </a:p>
           </p:txBody>
         </p:sp>
-        <p:grpSp>
-          <p:nvGrpSpPr>
-            <p:cNvPr id="9" name="Grouper 8"/>
-            <p:cNvGrpSpPr/>
-            <p:nvPr/>
-          </p:nvGrpSpPr>
-          <p:grpSpPr>
-            <a:xfrm>
-              <a:off x="7630464" y="6243112"/>
-              <a:ext cx="3195578" cy="5962744"/>
-              <a:chOff x="7630464" y="6243112"/>
-              <a:chExt cx="3195578" cy="5962744"/>
-            </a:xfrm>
-          </p:grpSpPr>
-          <p:pic>
-            <p:nvPicPr>
-              <p:cNvPr id="10" name="Image 9" descr="OculusRemoteControl_Camera001_Beauty001.jpg5b0ba155-2aba-4e81-8c1b-dd7f1ad1d005Original.jpg"/>
-              <p:cNvPicPr>
-                <a:picLocks noChangeAspect="1"/>
-              </p:cNvPicPr>
-              <p:nvPr/>
-            </p:nvPicPr>
-            <p:blipFill rotWithShape="1">
-              <a:blip r:embed="rId2">
-                <a:extLst>
-                  <a:ext uri="{28A0092B-C50C-407E-A947-70E740481C1C}">
-                    <a14:useLocalDpi xmlns:a14="http://schemas.microsoft.com/office/drawing/2010/main" val="0"/>
-                  </a:ext>
-                </a:extLst>
-              </a:blip>
-              <a:srcRect l="36035" r="34996"/>
-              <a:stretch/>
-            </p:blipFill>
-            <p:spPr>
-              <a:xfrm>
-                <a:off x="7630464" y="6243112"/>
-                <a:ext cx="3195578" cy="5962744"/>
-              </a:xfrm>
-              <a:prstGeom prst="rect">
-                <a:avLst/>
-              </a:prstGeom>
-            </p:spPr>
-          </p:pic>
-          <p:sp>
-            <p:nvSpPr>
-              <p:cNvPr id="11" name="Ellipse 10"/>
-              <p:cNvSpPr/>
-              <p:nvPr/>
-            </p:nvSpPr>
-            <p:spPr>
-              <a:xfrm>
-                <a:off x="8412657" y="6848531"/>
-                <a:ext cx="1497843" cy="1497843"/>
-              </a:xfrm>
-              <a:prstGeom prst="ellipse">
-                <a:avLst/>
-              </a:prstGeom>
-              <a:noFill/>
-              <a:ln w="76200" cmpd="sng">
-                <a:solidFill>
-                  <a:schemeClr val="accent2"/>
-                </a:solidFill>
-              </a:ln>
-            </p:spPr>
-            <p:style>
-              <a:lnRef idx="1">
-                <a:schemeClr val="accent1"/>
-              </a:lnRef>
-              <a:fillRef idx="3">
-                <a:schemeClr val="accent1"/>
-              </a:fillRef>
-              <a:effectRef idx="2">
-                <a:schemeClr val="accent1"/>
-              </a:effectRef>
-              <a:fontRef idx="minor">
-                <a:schemeClr val="lt1"/>
-              </a:fontRef>
-            </p:style>
-            <p:txBody>
-              <a:bodyPr rtlCol="0" anchor="ctr"/>
-              <a:lstStyle/>
-              <a:p>
-                <a:pPr algn="ctr"/>
-                <a:endParaRPr lang="en-US"/>
-              </a:p>
-            </p:txBody>
-          </p:sp>
-        </p:grpSp>
       </p:grpSp>
       <p:sp>
         <p:nvSpPr>
@@ -9840,6 +9681,94 @@
           </a:p>
         </p:txBody>
       </p:sp>
+      <p:grpSp>
+        <p:nvGrpSpPr>
+          <p:cNvPr id="12" name="Grouper 11"/>
+          <p:cNvGrpSpPr/>
+          <p:nvPr/>
+        </p:nvGrpSpPr>
+        <p:grpSpPr>
+          <a:xfrm>
+            <a:off x="7630464" y="6243112"/>
+            <a:ext cx="3195578" cy="5962744"/>
+            <a:chOff x="7630464" y="6243112"/>
+            <a:chExt cx="3195578" cy="5962744"/>
+          </a:xfrm>
+        </p:grpSpPr>
+        <p:pic>
+          <p:nvPicPr>
+            <p:cNvPr id="13" name="Image 12" descr="OculusRemoteControl_Camera001_Beauty001.jpg5b0ba155-2aba-4e81-8c1b-dd7f1ad1d005Original.jpg"/>
+            <p:cNvPicPr>
+              <a:picLocks noChangeAspect="1"/>
+            </p:cNvPicPr>
+            <p:nvPr/>
+          </p:nvPicPr>
+          <p:blipFill rotWithShape="1">
+            <a:blip r:embed="rId2">
+              <a:extLst>
+                <a:ext uri="{28A0092B-C50C-407E-A947-70E740481C1C}">
+                  <a14:useLocalDpi xmlns:a14="http://schemas.microsoft.com/office/drawing/2010/main" val="0"/>
+                </a:ext>
+              </a:extLst>
+            </a:blip>
+            <a:srcRect l="36035" r="34996"/>
+            <a:stretch/>
+          </p:blipFill>
+          <p:spPr>
+            <a:xfrm>
+              <a:off x="7630464" y="6243112"/>
+              <a:ext cx="3195578" cy="5962744"/>
+            </a:xfrm>
+            <a:prstGeom prst="rect">
+              <a:avLst/>
+            </a:prstGeom>
+          </p:spPr>
+        </p:pic>
+        <p:sp>
+          <p:nvSpPr>
+            <p:cNvPr id="14" name="Ellipse 13"/>
+            <p:cNvSpPr/>
+            <p:nvPr/>
+          </p:nvSpPr>
+          <p:spPr>
+            <a:xfrm>
+              <a:off x="8412657" y="6848531"/>
+              <a:ext cx="1497843" cy="1497843"/>
+            </a:xfrm>
+            <a:prstGeom prst="ellipse">
+              <a:avLst/>
+            </a:prstGeom>
+            <a:noFill/>
+            <a:ln w="304800" cmpd="sng">
+              <a:solidFill>
+                <a:schemeClr val="accent2"/>
+              </a:solidFill>
+            </a:ln>
+          </p:spPr>
+          <p:style>
+            <a:lnRef idx="1">
+              <a:schemeClr val="accent1"/>
+            </a:lnRef>
+            <a:fillRef idx="3">
+              <a:schemeClr val="accent1"/>
+            </a:fillRef>
+            <a:effectRef idx="2">
+              <a:schemeClr val="accent1"/>
+            </a:effectRef>
+            <a:fontRef idx="minor">
+              <a:schemeClr val="lt1"/>
+            </a:fontRef>
+          </p:style>
+          <p:txBody>
+            <a:bodyPr rtlCol="0" anchor="ctr"/>
+            <a:lstStyle/>
+            <a:p>
+              <a:pPr algn="ctr"/>
+              <a:endParaRPr lang="en-US"/>
+            </a:p>
+          </p:txBody>
+        </p:sp>
+      </p:grpSp>
     </p:spTree>
     <p:extLst>
       <p:ext uri="{BB962C8B-B14F-4D97-AF65-F5344CB8AC3E}">
@@ -10080,94 +10009,6 @@
             </a:p>
           </p:txBody>
         </p:sp>
-        <p:grpSp>
-          <p:nvGrpSpPr>
-            <p:cNvPr id="21" name="Grouper 20"/>
-            <p:cNvGrpSpPr/>
-            <p:nvPr/>
-          </p:nvGrpSpPr>
-          <p:grpSpPr>
-            <a:xfrm>
-              <a:off x="7630464" y="6243112"/>
-              <a:ext cx="3195578" cy="5962744"/>
-              <a:chOff x="7630464" y="6243112"/>
-              <a:chExt cx="3195578" cy="5962744"/>
-            </a:xfrm>
-          </p:grpSpPr>
-          <p:pic>
-            <p:nvPicPr>
-              <p:cNvPr id="22" name="Image 21" descr="OculusRemoteControl_Camera001_Beauty001.jpg5b0ba155-2aba-4e81-8c1b-dd7f1ad1d005Original.jpg"/>
-              <p:cNvPicPr>
-                <a:picLocks noChangeAspect="1"/>
-              </p:cNvPicPr>
-              <p:nvPr/>
-            </p:nvPicPr>
-            <p:blipFill rotWithShape="1">
-              <a:blip r:embed="rId2">
-                <a:extLst>
-                  <a:ext uri="{28A0092B-C50C-407E-A947-70E740481C1C}">
-                    <a14:useLocalDpi xmlns:a14="http://schemas.microsoft.com/office/drawing/2010/main" val="0"/>
-                  </a:ext>
-                </a:extLst>
-              </a:blip>
-              <a:srcRect l="36035" r="34996"/>
-              <a:stretch/>
-            </p:blipFill>
-            <p:spPr>
-              <a:xfrm>
-                <a:off x="7630464" y="6243112"/>
-                <a:ext cx="3195578" cy="5962744"/>
-              </a:xfrm>
-              <a:prstGeom prst="rect">
-                <a:avLst/>
-              </a:prstGeom>
-            </p:spPr>
-          </p:pic>
-          <p:sp>
-            <p:nvSpPr>
-              <p:cNvPr id="23" name="Ellipse 22"/>
-              <p:cNvSpPr/>
-              <p:nvPr/>
-            </p:nvSpPr>
-            <p:spPr>
-              <a:xfrm>
-                <a:off x="8412657" y="6848531"/>
-                <a:ext cx="1497843" cy="1497843"/>
-              </a:xfrm>
-              <a:prstGeom prst="ellipse">
-                <a:avLst/>
-              </a:prstGeom>
-              <a:noFill/>
-              <a:ln w="76200" cmpd="sng">
-                <a:solidFill>
-                  <a:schemeClr val="accent2"/>
-                </a:solidFill>
-              </a:ln>
-            </p:spPr>
-            <p:style>
-              <a:lnRef idx="1">
-                <a:schemeClr val="accent1"/>
-              </a:lnRef>
-              <a:fillRef idx="3">
-                <a:schemeClr val="accent1"/>
-              </a:fillRef>
-              <a:effectRef idx="2">
-                <a:schemeClr val="accent1"/>
-              </a:effectRef>
-              <a:fontRef idx="minor">
-                <a:schemeClr val="lt1"/>
-              </a:fontRef>
-            </p:style>
-            <p:txBody>
-              <a:bodyPr rtlCol="0" anchor="ctr"/>
-              <a:lstStyle/>
-              <a:p>
-                <a:pPr algn="ctr"/>
-                <a:endParaRPr lang="en-US"/>
-              </a:p>
-            </p:txBody>
-          </p:sp>
-        </p:grpSp>
       </p:grpSp>
       <p:sp>
         <p:nvSpPr>
@@ -10283,6 +10124,94 @@
           </a:p>
         </p:txBody>
       </p:sp>
+      <p:grpSp>
+        <p:nvGrpSpPr>
+          <p:cNvPr id="9" name="Grouper 8"/>
+          <p:cNvGrpSpPr/>
+          <p:nvPr/>
+        </p:nvGrpSpPr>
+        <p:grpSpPr>
+          <a:xfrm>
+            <a:off x="7630464" y="6243112"/>
+            <a:ext cx="3195578" cy="5962744"/>
+            <a:chOff x="7630464" y="6243112"/>
+            <a:chExt cx="3195578" cy="5962744"/>
+          </a:xfrm>
+        </p:grpSpPr>
+        <p:pic>
+          <p:nvPicPr>
+            <p:cNvPr id="10" name="Image 9" descr="OculusRemoteControl_Camera001_Beauty001.jpg5b0ba155-2aba-4e81-8c1b-dd7f1ad1d005Original.jpg"/>
+            <p:cNvPicPr>
+              <a:picLocks noChangeAspect="1"/>
+            </p:cNvPicPr>
+            <p:nvPr/>
+          </p:nvPicPr>
+          <p:blipFill rotWithShape="1">
+            <a:blip r:embed="rId2">
+              <a:extLst>
+                <a:ext uri="{28A0092B-C50C-407E-A947-70E740481C1C}">
+                  <a14:useLocalDpi xmlns:a14="http://schemas.microsoft.com/office/drawing/2010/main" val="0"/>
+                </a:ext>
+              </a:extLst>
+            </a:blip>
+            <a:srcRect l="36035" r="34996"/>
+            <a:stretch/>
+          </p:blipFill>
+          <p:spPr>
+            <a:xfrm>
+              <a:off x="7630464" y="6243112"/>
+              <a:ext cx="3195578" cy="5962744"/>
+            </a:xfrm>
+            <a:prstGeom prst="rect">
+              <a:avLst/>
+            </a:prstGeom>
+          </p:spPr>
+        </p:pic>
+        <p:sp>
+          <p:nvSpPr>
+            <p:cNvPr id="11" name="Ellipse 10"/>
+            <p:cNvSpPr/>
+            <p:nvPr/>
+          </p:nvSpPr>
+          <p:spPr>
+            <a:xfrm>
+              <a:off x="8412657" y="6848531"/>
+              <a:ext cx="1497843" cy="1497843"/>
+            </a:xfrm>
+            <a:prstGeom prst="ellipse">
+              <a:avLst/>
+            </a:prstGeom>
+            <a:noFill/>
+            <a:ln w="304800" cmpd="sng">
+              <a:solidFill>
+                <a:schemeClr val="accent2"/>
+              </a:solidFill>
+            </a:ln>
+          </p:spPr>
+          <p:style>
+            <a:lnRef idx="1">
+              <a:schemeClr val="accent1"/>
+            </a:lnRef>
+            <a:fillRef idx="3">
+              <a:schemeClr val="accent1"/>
+            </a:fillRef>
+            <a:effectRef idx="2">
+              <a:schemeClr val="accent1"/>
+            </a:effectRef>
+            <a:fontRef idx="minor">
+              <a:schemeClr val="lt1"/>
+            </a:fontRef>
+          </p:style>
+          <p:txBody>
+            <a:bodyPr rtlCol="0" anchor="ctr"/>
+            <a:lstStyle/>
+            <a:p>
+              <a:pPr algn="ctr"/>
+              <a:endParaRPr lang="en-US"/>
+            </a:p>
+          </p:txBody>
+        </p:sp>
+      </p:grpSp>
     </p:spTree>
     <p:extLst>
       <p:ext uri="{BB962C8B-B14F-4D97-AF65-F5344CB8AC3E}">

</xml_diff>

<commit_message>
Slash to discourage wrong button use on remote
</commit_message>
<xml_diff>
--- a/Source Code/GraspBMPs/GraspCircularPrompts.pptx
+++ b/Source Code/GraspBMPs/GraspCircularPrompts.pptx
@@ -7913,14 +7913,13 @@
         <p:nvCxnSpPr>
           <p:cNvPr id="28" name="Connecteur en angle 27"/>
           <p:cNvCxnSpPr>
-            <a:stCxn id="25" idx="2"/>
             <a:endCxn id="8" idx="6"/>
           </p:cNvCxnSpPr>
           <p:nvPr/>
         </p:nvCxnSpPr>
         <p:spPr>
           <a:xfrm rot="10800000">
-            <a:off x="9662851" y="9433105"/>
+            <a:off x="9662851" y="9400543"/>
             <a:ext cx="2685633" cy="2299"/>
           </a:xfrm>
           <a:prstGeom prst="bentConnector3">
@@ -7956,7 +7955,7 @@
         </p:nvSpPr>
         <p:spPr>
           <a:xfrm>
-            <a:off x="8640857" y="8922107"/>
+            <a:off x="8640857" y="8889545"/>
             <a:ext cx="1021993" cy="1021993"/>
           </a:xfrm>
           <a:prstGeom prst="ellipse">
@@ -8001,7 +8000,7 @@
         </p:nvSpPr>
         <p:spPr>
           <a:xfrm>
-            <a:off x="12348483" y="9346503"/>
+            <a:off x="12348483" y="9308403"/>
             <a:ext cx="152400" cy="177800"/>
           </a:xfrm>
           <a:prstGeom prst="ellipse">
@@ -8040,6 +8039,139 @@
           </a:p>
         </p:txBody>
       </p:sp>
+      <p:grpSp>
+        <p:nvGrpSpPr>
+          <p:cNvPr id="12" name="Grouper 11"/>
+          <p:cNvGrpSpPr/>
+          <p:nvPr/>
+        </p:nvGrpSpPr>
+        <p:grpSpPr>
+          <a:xfrm>
+            <a:off x="8858346" y="10103856"/>
+            <a:ext cx="628554" cy="348243"/>
+            <a:chOff x="15694788" y="1031875"/>
+            <a:chExt cx="1465282" cy="704850"/>
+          </a:xfrm>
+        </p:grpSpPr>
+        <p:sp>
+          <p:nvSpPr>
+            <p:cNvPr id="4" name="Rectangle à coins arrondis 3"/>
+            <p:cNvSpPr/>
+            <p:nvPr/>
+          </p:nvSpPr>
+          <p:spPr>
+            <a:xfrm>
+              <a:off x="15694788" y="1083766"/>
+              <a:ext cx="1465282" cy="601068"/>
+            </a:xfrm>
+            <a:prstGeom prst="roundRect">
+              <a:avLst>
+                <a:gd name="adj" fmla="val 50000"/>
+              </a:avLst>
+            </a:prstGeom>
+            <a:noFill/>
+            <a:ln w="38100" cmpd="sng">
+              <a:solidFill>
+                <a:schemeClr val="bg1">
+                  <a:lumMod val="75000"/>
+                </a:schemeClr>
+              </a:solidFill>
+            </a:ln>
+          </p:spPr>
+          <p:style>
+            <a:lnRef idx="1">
+              <a:schemeClr val="accent1"/>
+            </a:lnRef>
+            <a:fillRef idx="3">
+              <a:schemeClr val="accent1"/>
+            </a:fillRef>
+            <a:effectRef idx="2">
+              <a:schemeClr val="accent1"/>
+            </a:effectRef>
+            <a:fontRef idx="minor">
+              <a:schemeClr val="lt1"/>
+            </a:fontRef>
+          </p:style>
+          <p:txBody>
+            <a:bodyPr rtlCol="0" anchor="ctr"/>
+            <a:lstStyle/>
+            <a:p>
+              <a:pPr algn="ctr"/>
+              <a:endParaRPr lang="en-US"/>
+            </a:p>
+          </p:txBody>
+        </p:sp>
+        <p:cxnSp>
+          <p:nvCxnSpPr>
+            <p:cNvPr id="10" name="Connecteur droit 9"/>
+            <p:cNvCxnSpPr/>
+            <p:nvPr/>
+          </p:nvCxnSpPr>
+          <p:spPr>
+            <a:xfrm>
+              <a:off x="15903554" y="1031875"/>
+              <a:ext cx="1047750" cy="704850"/>
+            </a:xfrm>
+            <a:prstGeom prst="line">
+              <a:avLst/>
+            </a:prstGeom>
+            <a:ln w="57150" cmpd="sng">
+              <a:solidFill>
+                <a:srgbClr val="660066"/>
+              </a:solidFill>
+            </a:ln>
+          </p:spPr>
+          <p:style>
+            <a:lnRef idx="2">
+              <a:schemeClr val="accent1"/>
+            </a:lnRef>
+            <a:fillRef idx="0">
+              <a:schemeClr val="accent1"/>
+            </a:fillRef>
+            <a:effectRef idx="1">
+              <a:schemeClr val="accent1"/>
+            </a:effectRef>
+            <a:fontRef idx="minor">
+              <a:schemeClr val="tx1"/>
+            </a:fontRef>
+          </p:style>
+        </p:cxnSp>
+        <p:cxnSp>
+          <p:nvCxnSpPr>
+            <p:cNvPr id="16" name="Connecteur droit 15"/>
+            <p:cNvCxnSpPr/>
+            <p:nvPr/>
+          </p:nvCxnSpPr>
+          <p:spPr>
+            <a:xfrm flipH="1">
+              <a:off x="15903554" y="1031875"/>
+              <a:ext cx="1047750" cy="704850"/>
+            </a:xfrm>
+            <a:prstGeom prst="line">
+              <a:avLst/>
+            </a:prstGeom>
+            <a:ln w="57150" cmpd="sng">
+              <a:solidFill>
+                <a:srgbClr val="660066"/>
+              </a:solidFill>
+            </a:ln>
+          </p:spPr>
+          <p:style>
+            <a:lnRef idx="2">
+              <a:schemeClr val="accent1"/>
+            </a:lnRef>
+            <a:fillRef idx="0">
+              <a:schemeClr val="accent1"/>
+            </a:fillRef>
+            <a:effectRef idx="1">
+              <a:schemeClr val="accent1"/>
+            </a:effectRef>
+            <a:fontRef idx="minor">
+              <a:schemeClr val="tx1"/>
+            </a:fontRef>
+          </p:style>
+        </p:cxnSp>
+      </p:grpSp>
     </p:spTree>
     <p:extLst>
       <p:ext uri="{BB962C8B-B14F-4D97-AF65-F5344CB8AC3E}">
@@ -8849,35 +8981,7 @@
                   <a:srgbClr val="77933C"/>
                 </a:solidFill>
               </a:rPr>
-              <a:t>Raise hand and </a:t>
-            </a:r>
-            <a:r>
-              <a:rPr lang="en-US" sz="23900" b="1" spc="-300" dirty="0" smtClean="0">
-                <a:ln w="12700">
-                  <a:solidFill>
-                    <a:srgbClr val="FFFFFF"/>
-                  </a:solidFill>
-                  <a:prstDash val="solid"/>
-                </a:ln>
-                <a:solidFill>
-                  <a:srgbClr val="77933C"/>
-                </a:solidFill>
-              </a:rPr>
-              <a:t>point down tunnel</a:t>
-            </a:r>
-            <a:r>
-              <a:rPr lang="en-US" sz="23900" b="1" spc="-300" dirty="0" smtClean="0">
-                <a:ln w="12700">
-                  <a:solidFill>
-                    <a:srgbClr val="FFFFFF"/>
-                  </a:solidFill>
-                  <a:prstDash val="solid"/>
-                </a:ln>
-                <a:solidFill>
-                  <a:srgbClr val="77933C"/>
-                </a:solidFill>
-              </a:rPr>
-              <a:t>.</a:t>
+              <a:t>Raise hand and point down tunnel.</a:t>
             </a:r>
             <a:endParaRPr lang="en-US" sz="23900" b="1" spc="-300" dirty="0">
               <a:ln w="12700">

</xml_diff>